<commit_message>
Agrego slides de tuning a ppt tidymodels y actualizo ppt 4
</commit_message>
<xml_diff>
--- a/clase2/Tidymodels.pptx
+++ b/clase2/Tidymodels.pptx
@@ -5,7 +5,7 @@
     <p:sldMasterId id="2147483659" r:id="rId1"/>
   </p:sldMasterIdLst>
   <p:notesMasterIdLst>
-    <p:notesMasterId r:id="rId11"/>
+    <p:notesMasterId r:id="rId12"/>
   </p:notesMasterIdLst>
   <p:sldIdLst>
     <p:sldId id="256" r:id="rId2"/>
@@ -16,24 +16,25 @@
     <p:sldId id="313" r:id="rId7"/>
     <p:sldId id="314" r:id="rId8"/>
     <p:sldId id="316" r:id="rId9"/>
-    <p:sldId id="312" r:id="rId10"/>
+    <p:sldId id="317" r:id="rId10"/>
+    <p:sldId id="312" r:id="rId11"/>
   </p:sldIdLst>
   <p:sldSz cx="9144000" cy="5143500" type="screen16x9"/>
   <p:notesSz cx="6858000" cy="9144000"/>
   <p:embeddedFontLst>
     <p:embeddedFont>
       <p:font typeface="Georgia" panose="02040502050405020303" pitchFamily="18" charset="0"/>
-      <p:regular r:id="rId12"/>
-      <p:bold r:id="rId13"/>
-      <p:italic r:id="rId14"/>
-      <p:boldItalic r:id="rId15"/>
+      <p:regular r:id="rId13"/>
+      <p:bold r:id="rId14"/>
+      <p:italic r:id="rId15"/>
+      <p:boldItalic r:id="rId16"/>
     </p:embeddedFont>
     <p:embeddedFont>
       <p:font typeface="Proxima Nova" panose="020B0604020202020204" charset="0"/>
-      <p:regular r:id="rId16"/>
-      <p:bold r:id="rId17"/>
-      <p:italic r:id="rId18"/>
-      <p:boldItalic r:id="rId19"/>
+      <p:regular r:id="rId17"/>
+      <p:bold r:id="rId18"/>
+      <p:italic r:id="rId19"/>
+      <p:boldItalic r:id="rId20"/>
     </p:embeddedFont>
   </p:embeddedFontLst>
   <p:defaultTextStyle>
@@ -829,6 +830,115 @@
 </p:notes>
 </file>
 
+<file path=ppt/notesSlides/notesSlide10.xml><?xml version="1.0" encoding="utf-8"?>
+<p:notes xmlns:a="http://schemas.openxmlformats.org/drawingml/2006/main" xmlns:r="http://schemas.openxmlformats.org/officeDocument/2006/relationships" xmlns:p="http://schemas.openxmlformats.org/presentationml/2006/main" showMasterSp="0" showMasterPhAnim="0">
+  <p:cSld>
+    <p:spTree>
+      <p:nvGrpSpPr>
+        <p:cNvPr id="1" name="Shape 270"/>
+        <p:cNvGrpSpPr/>
+        <p:nvPr/>
+      </p:nvGrpSpPr>
+      <p:grpSpPr>
+        <a:xfrm>
+          <a:off x="0" y="0"/>
+          <a:ext cx="0" cy="0"/>
+          <a:chOff x="0" y="0"/>
+          <a:chExt cx="0" cy="0"/>
+        </a:xfrm>
+      </p:grpSpPr>
+      <p:sp>
+        <p:nvSpPr>
+          <p:cNvPr id="271" name="Google Shape;271;ge626d24df6_0_261:notes"/>
+          <p:cNvSpPr>
+            <a:spLocks noGrp="1" noRot="1" noChangeAspect="1"/>
+          </p:cNvSpPr>
+          <p:nvPr>
+            <p:ph type="sldImg" idx="2"/>
+          </p:nvPr>
+        </p:nvSpPr>
+        <p:spPr>
+          <a:xfrm>
+            <a:off x="381000" y="685800"/>
+            <a:ext cx="6096000" cy="3429000"/>
+          </a:xfrm>
+          <a:custGeom>
+            <a:avLst/>
+            <a:gdLst/>
+            <a:ahLst/>
+            <a:cxnLst/>
+            <a:rect l="l" t="t" r="r" b="b"/>
+            <a:pathLst>
+              <a:path w="120000" h="120000" extrusionOk="0">
+                <a:moveTo>
+                  <a:pt x="0" y="0"/>
+                </a:moveTo>
+                <a:lnTo>
+                  <a:pt x="120000" y="0"/>
+                </a:lnTo>
+                <a:lnTo>
+                  <a:pt x="120000" y="120000"/>
+                </a:lnTo>
+                <a:lnTo>
+                  <a:pt x="0" y="120000"/>
+                </a:lnTo>
+                <a:close/>
+              </a:path>
+            </a:pathLst>
+          </a:custGeom>
+        </p:spPr>
+      </p:sp>
+      <p:sp>
+        <p:nvSpPr>
+          <p:cNvPr id="272" name="Google Shape;272;ge626d24df6_0_261:notes"/>
+          <p:cNvSpPr txBox="1">
+            <a:spLocks noGrp="1"/>
+          </p:cNvSpPr>
+          <p:nvPr>
+            <p:ph type="body" idx="1"/>
+          </p:nvPr>
+        </p:nvSpPr>
+        <p:spPr>
+          <a:xfrm>
+            <a:off x="685800" y="4343400"/>
+            <a:ext cx="5486400" cy="4114800"/>
+          </a:xfrm>
+          <a:prstGeom prst="rect">
+            <a:avLst/>
+          </a:prstGeom>
+        </p:spPr>
+        <p:txBody>
+          <a:bodyPr spcFirstLastPara="1" wrap="square" lIns="91425" tIns="91425" rIns="91425" bIns="91425" anchor="t" anchorCtr="0">
+            <a:noAutofit/>
+          </a:bodyPr>
+          <a:lstStyle/>
+          <a:p>
+            <a:pPr marL="0" lvl="0" indent="0" algn="l" rtl="0">
+              <a:spcBef>
+                <a:spcPts val="0"/>
+              </a:spcBef>
+              <a:spcAft>
+                <a:spcPts val="0"/>
+              </a:spcAft>
+              <a:buNone/>
+            </a:pPr>
+            <a:endParaRPr/>
+          </a:p>
+        </p:txBody>
+      </p:sp>
+    </p:spTree>
+    <p:extLst>
+      <p:ext uri="{BB962C8B-B14F-4D97-AF65-F5344CB8AC3E}">
+        <p14:creationId xmlns:p14="http://schemas.microsoft.com/office/powerpoint/2010/main" val="846089127"/>
+      </p:ext>
+    </p:extLst>
+  </p:cSld>
+  <p:clrMapOvr>
+    <a:masterClrMapping/>
+  </p:clrMapOvr>
+</p:notes>
+</file>
+
 <file path=ppt/notesSlides/notesSlide2.xml><?xml version="1.0" encoding="utf-8"?>
 <p:notes xmlns:a="http://schemas.openxmlformats.org/drawingml/2006/main" xmlns:r="http://schemas.openxmlformats.org/officeDocument/2006/relationships" xmlns:p="http://schemas.openxmlformats.org/presentationml/2006/main" showMasterSp="0" showMasterPhAnim="0">
   <p:cSld>
@@ -1667,7 +1777,7 @@
   <p:cSld>
     <p:spTree>
       <p:nvGrpSpPr>
-        <p:cNvPr id="1" name="Shape 270"/>
+        <p:cNvPr id="1" name="Shape 306"/>
         <p:cNvGrpSpPr/>
         <p:nvPr/>
       </p:nvGrpSpPr>
@@ -1681,7 +1791,7 @@
       </p:grpSpPr>
       <p:sp>
         <p:nvSpPr>
-          <p:cNvPr id="271" name="Google Shape;271;ge626d24df6_0_261:notes"/>
+          <p:cNvPr id="307" name="Google Shape;307;ge5a1b4e583_0_560:notes"/>
           <p:cNvSpPr>
             <a:spLocks noGrp="1" noRot="1" noChangeAspect="1"/>
           </p:cNvSpPr>
@@ -1722,7 +1832,7 @@
       </p:sp>
       <p:sp>
         <p:nvSpPr>
-          <p:cNvPr id="272" name="Google Shape;272;ge626d24df6_0_261:notes"/>
+          <p:cNvPr id="308" name="Google Shape;308;ge5a1b4e583_0_560:notes"/>
           <p:cNvSpPr txBox="1">
             <a:spLocks noGrp="1"/>
           </p:cNvSpPr>
@@ -1761,7 +1871,7 @@
     </p:spTree>
     <p:extLst>
       <p:ext uri="{BB962C8B-B14F-4D97-AF65-F5344CB8AC3E}">
-        <p14:creationId xmlns:p14="http://schemas.microsoft.com/office/powerpoint/2010/main" val="846089127"/>
+        <p14:creationId xmlns:p14="http://schemas.microsoft.com/office/powerpoint/2010/main" val="4286417770"/>
       </p:ext>
     </p:extLst>
   </p:cSld>
@@ -7405,6 +7515,78 @@
 </p:sld>
 </file>
 
+<file path=ppt/slides/slide10.xml><?xml version="1.0" encoding="utf-8"?>
+<p:sld xmlns:a="http://schemas.openxmlformats.org/drawingml/2006/main" xmlns:r="http://schemas.openxmlformats.org/officeDocument/2006/relationships" xmlns:p="http://schemas.openxmlformats.org/presentationml/2006/main">
+  <p:cSld>
+    <p:spTree>
+      <p:nvGrpSpPr>
+        <p:cNvPr id="1" name="Shape 273"/>
+        <p:cNvGrpSpPr/>
+        <p:nvPr/>
+      </p:nvGrpSpPr>
+      <p:grpSpPr>
+        <a:xfrm>
+          <a:off x="0" y="0"/>
+          <a:ext cx="0" cy="0"/>
+          <a:chOff x="0" y="0"/>
+          <a:chExt cx="0" cy="0"/>
+        </a:xfrm>
+      </p:grpSpPr>
+      <p:sp>
+        <p:nvSpPr>
+          <p:cNvPr id="274" name="Google Shape;274;p47"/>
+          <p:cNvSpPr txBox="1">
+            <a:spLocks noGrp="1"/>
+          </p:cNvSpPr>
+          <p:nvPr>
+            <p:ph type="title"/>
+          </p:nvPr>
+        </p:nvSpPr>
+        <p:spPr>
+          <a:xfrm>
+            <a:off x="490250" y="526350"/>
+            <a:ext cx="5797500" cy="4090800"/>
+          </a:xfrm>
+          <a:prstGeom prst="rect">
+            <a:avLst/>
+          </a:prstGeom>
+        </p:spPr>
+        <p:txBody>
+          <a:bodyPr spcFirstLastPara="1" wrap="square" lIns="91425" tIns="91425" rIns="91425" bIns="91425" anchor="ctr" anchorCtr="0">
+            <a:normAutofit/>
+          </a:bodyPr>
+          <a:lstStyle/>
+          <a:p>
+            <a:pPr marL="0" lvl="0" indent="0" algn="l" rtl="0">
+              <a:spcBef>
+                <a:spcPts val="0"/>
+              </a:spcBef>
+              <a:spcAft>
+                <a:spcPts val="0"/>
+              </a:spcAft>
+              <a:buNone/>
+            </a:pPr>
+            <a:r>
+              <a:rPr lang="en-GB" dirty="0"/>
+              <a:t>Gracias!</a:t>
+            </a:r>
+            <a:endParaRPr dirty="0"/>
+          </a:p>
+        </p:txBody>
+      </p:sp>
+    </p:spTree>
+    <p:extLst>
+      <p:ext uri="{BB962C8B-B14F-4D97-AF65-F5344CB8AC3E}">
+        <p14:creationId xmlns:p14="http://schemas.microsoft.com/office/powerpoint/2010/main" val="832657643"/>
+      </p:ext>
+    </p:extLst>
+  </p:cSld>
+  <p:clrMapOvr>
+    <a:masterClrMapping/>
+  </p:clrMapOvr>
+</p:sld>
+</file>
+
 <file path=ppt/slides/slide2.xml><?xml version="1.0" encoding="utf-8"?>
 <p:sld xmlns:a="http://schemas.openxmlformats.org/drawingml/2006/main" xmlns:r="http://schemas.openxmlformats.org/officeDocument/2006/relationships" xmlns:p="http://schemas.openxmlformats.org/presentationml/2006/main">
   <p:cSld>
@@ -12774,7 +12956,7 @@
   <p:cSld>
     <p:spTree>
       <p:nvGrpSpPr>
-        <p:cNvPr id="1" name="Shape 273"/>
+        <p:cNvPr id="1" name="Shape 309"/>
         <p:cNvGrpSpPr/>
         <p:nvPr/>
       </p:nvGrpSpPr>
@@ -12788,7 +12970,7 @@
       </p:grpSpPr>
       <p:sp>
         <p:nvSpPr>
-          <p:cNvPr id="274" name="Google Shape;274;p47"/>
+          <p:cNvPr id="310" name="Google Shape;310;p53"/>
           <p:cNvSpPr txBox="1">
             <a:spLocks noGrp="1"/>
           </p:cNvSpPr>
@@ -12798,16 +12980,16 @@
         </p:nvSpPr>
         <p:spPr>
           <a:xfrm>
-            <a:off x="490250" y="526350"/>
-            <a:ext cx="5797500" cy="4090800"/>
+            <a:off x="311700" y="156100"/>
+            <a:ext cx="8520600" cy="572700"/>
           </a:xfrm>
           <a:prstGeom prst="rect">
             <a:avLst/>
           </a:prstGeom>
         </p:spPr>
         <p:txBody>
-          <a:bodyPr spcFirstLastPara="1" wrap="square" lIns="91425" tIns="91425" rIns="91425" bIns="91425" anchor="ctr" anchorCtr="0">
-            <a:normAutofit/>
+          <a:bodyPr spcFirstLastPara="1" wrap="square" lIns="91425" tIns="91425" rIns="91425" bIns="91425" anchor="t" anchorCtr="0">
+            <a:normAutofit fontScale="90000"/>
           </a:bodyPr>
           <a:lstStyle/>
           <a:p>
@@ -12822,16 +13004,866 @@
             </a:pPr>
             <a:r>
               <a:rPr lang="en-GB" dirty="0"/>
-              <a:t>Gracias!</a:t>
+              <a:t>Tuning</a:t>
             </a:r>
             <a:endParaRPr dirty="0"/>
+          </a:p>
+        </p:txBody>
+      </p:sp>
+      <p:sp>
+        <p:nvSpPr>
+          <p:cNvPr id="311" name="Google Shape;311;p53"/>
+          <p:cNvSpPr txBox="1">
+            <a:spLocks noGrp="1"/>
+          </p:cNvSpPr>
+          <p:nvPr>
+            <p:ph type="body" idx="1"/>
+          </p:nvPr>
+        </p:nvSpPr>
+        <p:spPr>
+          <a:xfrm>
+            <a:off x="311699" y="728799"/>
+            <a:ext cx="6164052" cy="4258601"/>
+          </a:xfrm>
+          <a:prstGeom prst="rect">
+            <a:avLst/>
+          </a:prstGeom>
+        </p:spPr>
+        <p:txBody>
+          <a:bodyPr spcFirstLastPara="1" wrap="square" lIns="91425" tIns="91425" rIns="91425" bIns="91425" anchor="t" anchorCtr="0">
+            <a:normAutofit fontScale="85000" lnSpcReduction="20000"/>
+          </a:bodyPr>
+          <a:lstStyle/>
+          <a:p>
+            <a:pPr marL="114300" lvl="0" indent="0" algn="l" rtl="0">
+              <a:lnSpc>
+                <a:spcPct val="150000"/>
+              </a:lnSpc>
+              <a:spcBef>
+                <a:spcPts val="0"/>
+              </a:spcBef>
+              <a:spcAft>
+                <a:spcPts val="0"/>
+              </a:spcAft>
+              <a:buSzPts val="1800"/>
+              <a:buNone/>
+            </a:pPr>
+            <a:r>
+              <a:rPr lang="es-MX" sz="1200" dirty="0">
+                <a:latin typeface="Courier New" panose="02070309020205020404" pitchFamily="49" charset="0"/>
+                <a:cs typeface="Courier New" panose="02070309020205020404" pitchFamily="49" charset="0"/>
+              </a:rPr>
+              <a:t># Quiero agregar términos polinómicos a mi lm tuneando el grado</a:t>
+            </a:r>
+          </a:p>
+          <a:p>
+            <a:pPr marL="114300" lvl="0" indent="0" algn="l" rtl="0">
+              <a:lnSpc>
+                <a:spcPct val="150000"/>
+              </a:lnSpc>
+              <a:spcBef>
+                <a:spcPts val="0"/>
+              </a:spcBef>
+              <a:spcAft>
+                <a:spcPts val="0"/>
+              </a:spcAft>
+              <a:buSzPts val="1800"/>
+              <a:buNone/>
+            </a:pPr>
+            <a:r>
+              <a:rPr lang="es-MX" sz="1200" dirty="0" err="1">
+                <a:latin typeface="Courier New" panose="02070309020205020404" pitchFamily="49" charset="0"/>
+                <a:cs typeface="Courier New" panose="02070309020205020404" pitchFamily="49" charset="0"/>
+              </a:rPr>
+              <a:t>lm_rec_tune</a:t>
+            </a:r>
+            <a:r>
+              <a:rPr lang="es-MX" sz="1200" dirty="0">
+                <a:latin typeface="Courier New" panose="02070309020205020404" pitchFamily="49" charset="0"/>
+                <a:cs typeface="Courier New" panose="02070309020205020404" pitchFamily="49" charset="0"/>
+              </a:rPr>
+              <a:t> &lt;- </a:t>
+            </a:r>
+            <a:r>
+              <a:rPr lang="es-MX" sz="1200" dirty="0" err="1">
+                <a:latin typeface="Courier New" panose="02070309020205020404" pitchFamily="49" charset="0"/>
+                <a:cs typeface="Courier New" panose="02070309020205020404" pitchFamily="49" charset="0"/>
+              </a:rPr>
+              <a:t>lm_rec</a:t>
+            </a:r>
+            <a:r>
+              <a:rPr lang="es-MX" sz="1200" dirty="0">
+                <a:latin typeface="Courier New" panose="02070309020205020404" pitchFamily="49" charset="0"/>
+                <a:cs typeface="Courier New" panose="02070309020205020404" pitchFamily="49" charset="0"/>
+              </a:rPr>
+              <a:t> %&gt;% </a:t>
+            </a:r>
+          </a:p>
+          <a:p>
+            <a:pPr marL="114300" lvl="0" indent="0" algn="l" rtl="0">
+              <a:lnSpc>
+                <a:spcPct val="150000"/>
+              </a:lnSpc>
+              <a:spcBef>
+                <a:spcPts val="0"/>
+              </a:spcBef>
+              <a:spcAft>
+                <a:spcPts val="0"/>
+              </a:spcAft>
+              <a:buSzPts val="1800"/>
+              <a:buNone/>
+            </a:pPr>
+            <a:r>
+              <a:rPr lang="es-MX" sz="1200" dirty="0">
+                <a:latin typeface="Courier New" panose="02070309020205020404" pitchFamily="49" charset="0"/>
+                <a:cs typeface="Courier New" panose="02070309020205020404" pitchFamily="49" charset="0"/>
+              </a:rPr>
+              <a:t>	    	</a:t>
+            </a:r>
+            <a:r>
+              <a:rPr lang="es-MX" sz="1200" dirty="0" err="1">
+                <a:latin typeface="Courier New" panose="02070309020205020404" pitchFamily="49" charset="0"/>
+                <a:cs typeface="Courier New" panose="02070309020205020404" pitchFamily="49" charset="0"/>
+              </a:rPr>
+              <a:t>step_poly</a:t>
+            </a:r>
+            <a:r>
+              <a:rPr lang="es-MX" sz="1200" dirty="0">
+                <a:latin typeface="Courier New" panose="02070309020205020404" pitchFamily="49" charset="0"/>
+                <a:cs typeface="Courier New" panose="02070309020205020404" pitchFamily="49" charset="0"/>
+              </a:rPr>
+              <a:t>(</a:t>
+            </a:r>
+            <a:r>
+              <a:rPr lang="es-MX" sz="1200" dirty="0" err="1">
+                <a:latin typeface="Courier New" panose="02070309020205020404" pitchFamily="49" charset="0"/>
+                <a:cs typeface="Courier New" panose="02070309020205020404" pitchFamily="49" charset="0"/>
+              </a:rPr>
+              <a:t>all_numeric_predictors</a:t>
+            </a:r>
+            <a:r>
+              <a:rPr lang="es-MX" sz="1200" dirty="0">
+                <a:latin typeface="Courier New" panose="02070309020205020404" pitchFamily="49" charset="0"/>
+                <a:cs typeface="Courier New" panose="02070309020205020404" pitchFamily="49" charset="0"/>
+              </a:rPr>
+              <a:t>(),</a:t>
+            </a:r>
+          </a:p>
+          <a:p>
+            <a:pPr marL="114300" lvl="0" indent="0" algn="l" rtl="0">
+              <a:lnSpc>
+                <a:spcPct val="150000"/>
+              </a:lnSpc>
+              <a:spcBef>
+                <a:spcPts val="0"/>
+              </a:spcBef>
+              <a:spcAft>
+                <a:spcPts val="0"/>
+              </a:spcAft>
+              <a:buSzPts val="1800"/>
+              <a:buNone/>
+            </a:pPr>
+            <a:r>
+              <a:rPr lang="es-MX" sz="1200" dirty="0">
+                <a:latin typeface="Courier New" panose="02070309020205020404" pitchFamily="49" charset="0"/>
+                <a:cs typeface="Courier New" panose="02070309020205020404" pitchFamily="49" charset="0"/>
+              </a:rPr>
+              <a:t>	     		   </a:t>
+            </a:r>
+            <a:r>
+              <a:rPr lang="es-MX" sz="1200" dirty="0" err="1">
+                <a:latin typeface="Courier New" panose="02070309020205020404" pitchFamily="49" charset="0"/>
+                <a:cs typeface="Courier New" panose="02070309020205020404" pitchFamily="49" charset="0"/>
+              </a:rPr>
+              <a:t>degree</a:t>
+            </a:r>
+            <a:r>
+              <a:rPr lang="es-MX" sz="1200" dirty="0">
+                <a:latin typeface="Courier New" panose="02070309020205020404" pitchFamily="49" charset="0"/>
+                <a:cs typeface="Courier New" panose="02070309020205020404" pitchFamily="49" charset="0"/>
+              </a:rPr>
+              <a:t> = tune())</a:t>
+            </a:r>
+          </a:p>
+          <a:p>
+            <a:pPr marL="114300" lvl="0" indent="0" algn="l" rtl="0">
+              <a:lnSpc>
+                <a:spcPct val="150000"/>
+              </a:lnSpc>
+              <a:spcBef>
+                <a:spcPts val="0"/>
+              </a:spcBef>
+              <a:spcAft>
+                <a:spcPts val="0"/>
+              </a:spcAft>
+              <a:buSzPts val="1800"/>
+              <a:buNone/>
+            </a:pPr>
+            <a:endParaRPr lang="es-MX" sz="1200" dirty="0">
+              <a:latin typeface="Courier New" panose="02070309020205020404" pitchFamily="49" charset="0"/>
+              <a:cs typeface="Courier New" panose="02070309020205020404" pitchFamily="49" charset="0"/>
+            </a:endParaRPr>
+          </a:p>
+          <a:p>
+            <a:pPr marL="114300" lvl="0" indent="0" algn="l" rtl="0">
+              <a:lnSpc>
+                <a:spcPct val="150000"/>
+              </a:lnSpc>
+              <a:spcBef>
+                <a:spcPts val="0"/>
+              </a:spcBef>
+              <a:spcAft>
+                <a:spcPts val="0"/>
+              </a:spcAft>
+              <a:buSzPts val="1800"/>
+              <a:buNone/>
+            </a:pPr>
+            <a:r>
+              <a:rPr lang="es-MX" sz="1200" dirty="0">
+                <a:latin typeface="Courier New" panose="02070309020205020404" pitchFamily="49" charset="0"/>
+                <a:cs typeface="Courier New" panose="02070309020205020404" pitchFamily="49" charset="0"/>
+              </a:rPr>
+              <a:t># Armo el </a:t>
+            </a:r>
+            <a:r>
+              <a:rPr lang="es-MX" sz="1200" dirty="0" err="1">
+                <a:latin typeface="Courier New" panose="02070309020205020404" pitchFamily="49" charset="0"/>
+                <a:cs typeface="Courier New" panose="02070309020205020404" pitchFamily="49" charset="0"/>
+              </a:rPr>
+              <a:t>workflow</a:t>
+            </a:r>
+            <a:endParaRPr lang="es-MX" sz="1200" dirty="0">
+              <a:latin typeface="Courier New" panose="02070309020205020404" pitchFamily="49" charset="0"/>
+              <a:cs typeface="Courier New" panose="02070309020205020404" pitchFamily="49" charset="0"/>
+            </a:endParaRPr>
+          </a:p>
+          <a:p>
+            <a:pPr marL="114300" lvl="0" indent="0" algn="l" rtl="0">
+              <a:lnSpc>
+                <a:spcPct val="150000"/>
+              </a:lnSpc>
+              <a:spcBef>
+                <a:spcPts val="0"/>
+              </a:spcBef>
+              <a:spcAft>
+                <a:spcPts val="0"/>
+              </a:spcAft>
+              <a:buSzPts val="1800"/>
+              <a:buNone/>
+            </a:pPr>
+            <a:r>
+              <a:rPr lang="es-MX" sz="1200" dirty="0" err="1">
+                <a:latin typeface="Courier New" panose="02070309020205020404" pitchFamily="49" charset="0"/>
+                <a:cs typeface="Courier New" panose="02070309020205020404" pitchFamily="49" charset="0"/>
+              </a:rPr>
+              <a:t>lm_wflow_tune</a:t>
+            </a:r>
+            <a:r>
+              <a:rPr lang="es-MX" sz="1200" dirty="0">
+                <a:latin typeface="Courier New" panose="02070309020205020404" pitchFamily="49" charset="0"/>
+                <a:cs typeface="Courier New" panose="02070309020205020404" pitchFamily="49" charset="0"/>
+              </a:rPr>
+              <a:t> &lt;- </a:t>
+            </a:r>
+            <a:r>
+              <a:rPr lang="es-MX" sz="1200" dirty="0" err="1">
+                <a:latin typeface="Courier New" panose="02070309020205020404" pitchFamily="49" charset="0"/>
+                <a:cs typeface="Courier New" panose="02070309020205020404" pitchFamily="49" charset="0"/>
+              </a:rPr>
+              <a:t>lm_workflow</a:t>
+            </a:r>
+            <a:r>
+              <a:rPr lang="es-MX" sz="1200" dirty="0">
+                <a:latin typeface="Courier New" panose="02070309020205020404" pitchFamily="49" charset="0"/>
+                <a:cs typeface="Courier New" panose="02070309020205020404" pitchFamily="49" charset="0"/>
+              </a:rPr>
+              <a:t>() %&gt;%</a:t>
+            </a:r>
+          </a:p>
+          <a:p>
+            <a:pPr marL="114300" lvl="0" indent="0" algn="l" rtl="0">
+              <a:lnSpc>
+                <a:spcPct val="150000"/>
+              </a:lnSpc>
+              <a:spcBef>
+                <a:spcPts val="0"/>
+              </a:spcBef>
+              <a:spcAft>
+                <a:spcPts val="0"/>
+              </a:spcAft>
+              <a:buSzPts val="1800"/>
+              <a:buNone/>
+            </a:pPr>
+            <a:r>
+              <a:rPr lang="es-MX" sz="1200" dirty="0">
+                <a:latin typeface="Courier New" panose="02070309020205020404" pitchFamily="49" charset="0"/>
+                <a:cs typeface="Courier New" panose="02070309020205020404" pitchFamily="49" charset="0"/>
+              </a:rPr>
+              <a:t>	    	</a:t>
+            </a:r>
+            <a:r>
+              <a:rPr lang="es-MX" sz="1200" dirty="0" err="1">
+                <a:latin typeface="Courier New" panose="02070309020205020404" pitchFamily="49" charset="0"/>
+                <a:cs typeface="Courier New" panose="02070309020205020404" pitchFamily="49" charset="0"/>
+              </a:rPr>
+              <a:t>remove_reipe</a:t>
+            </a:r>
+            <a:r>
+              <a:rPr lang="es-MX" sz="1200" dirty="0">
+                <a:latin typeface="Courier New" panose="02070309020205020404" pitchFamily="49" charset="0"/>
+                <a:cs typeface="Courier New" panose="02070309020205020404" pitchFamily="49" charset="0"/>
+              </a:rPr>
+              <a:t>() %&gt;%</a:t>
+            </a:r>
+          </a:p>
+          <a:p>
+            <a:pPr marL="114300" lvl="0" indent="0" algn="l" rtl="0">
+              <a:lnSpc>
+                <a:spcPct val="150000"/>
+              </a:lnSpc>
+              <a:spcBef>
+                <a:spcPts val="0"/>
+              </a:spcBef>
+              <a:spcAft>
+                <a:spcPts val="0"/>
+              </a:spcAft>
+              <a:buSzPts val="1800"/>
+              <a:buNone/>
+            </a:pPr>
+            <a:r>
+              <a:rPr lang="es-MX" sz="1200" dirty="0">
+                <a:latin typeface="Courier New" panose="02070309020205020404" pitchFamily="49" charset="0"/>
+                <a:cs typeface="Courier New" panose="02070309020205020404" pitchFamily="49" charset="0"/>
+              </a:rPr>
+              <a:t>	    	</a:t>
+            </a:r>
+            <a:r>
+              <a:rPr lang="es-MX" sz="1200" dirty="0" err="1">
+                <a:latin typeface="Courier New" panose="02070309020205020404" pitchFamily="49" charset="0"/>
+                <a:cs typeface="Courier New" panose="02070309020205020404" pitchFamily="49" charset="0"/>
+              </a:rPr>
+              <a:t>add_recipe</a:t>
+            </a:r>
+            <a:r>
+              <a:rPr lang="es-MX" sz="1200" dirty="0">
+                <a:latin typeface="Courier New" panose="02070309020205020404" pitchFamily="49" charset="0"/>
+                <a:cs typeface="Courier New" panose="02070309020205020404" pitchFamily="49" charset="0"/>
+              </a:rPr>
+              <a:t>(</a:t>
+            </a:r>
+            <a:r>
+              <a:rPr lang="es-MX" sz="1200" dirty="0" err="1">
+                <a:latin typeface="Courier New" panose="02070309020205020404" pitchFamily="49" charset="0"/>
+                <a:cs typeface="Courier New" panose="02070309020205020404" pitchFamily="49" charset="0"/>
+              </a:rPr>
+              <a:t>lm_rec_tune</a:t>
+            </a:r>
+            <a:r>
+              <a:rPr lang="es-MX" sz="1200" dirty="0">
+                <a:latin typeface="Courier New" panose="02070309020205020404" pitchFamily="49" charset="0"/>
+                <a:cs typeface="Courier New" panose="02070309020205020404" pitchFamily="49" charset="0"/>
+              </a:rPr>
+              <a:t>)</a:t>
+            </a:r>
+          </a:p>
+          <a:p>
+            <a:pPr marL="114300" lvl="0" indent="0" algn="l" rtl="0">
+              <a:lnSpc>
+                <a:spcPct val="150000"/>
+              </a:lnSpc>
+              <a:spcBef>
+                <a:spcPts val="0"/>
+              </a:spcBef>
+              <a:spcAft>
+                <a:spcPts val="0"/>
+              </a:spcAft>
+              <a:buSzPts val="1800"/>
+              <a:buNone/>
+            </a:pPr>
+            <a:endParaRPr lang="es-MX" sz="1200" dirty="0">
+              <a:latin typeface="Courier New" panose="02070309020205020404" pitchFamily="49" charset="0"/>
+              <a:cs typeface="Courier New" panose="02070309020205020404" pitchFamily="49" charset="0"/>
+            </a:endParaRPr>
+          </a:p>
+          <a:p>
+            <a:pPr marL="114300" lvl="0" indent="0" algn="l" rtl="0">
+              <a:lnSpc>
+                <a:spcPct val="150000"/>
+              </a:lnSpc>
+              <a:spcBef>
+                <a:spcPts val="0"/>
+              </a:spcBef>
+              <a:spcAft>
+                <a:spcPts val="0"/>
+              </a:spcAft>
+              <a:buSzPts val="1800"/>
+              <a:buNone/>
+            </a:pPr>
+            <a:r>
+              <a:rPr lang="es-MX" sz="1200" dirty="0">
+                <a:latin typeface="Courier New" panose="02070309020205020404" pitchFamily="49" charset="0"/>
+                <a:cs typeface="Courier New" panose="02070309020205020404" pitchFamily="49" charset="0"/>
+              </a:rPr>
+              <a:t># Creo grilla de parámetros a tunear (los tune())</a:t>
+            </a:r>
+          </a:p>
+          <a:p>
+            <a:pPr marL="114300" lvl="0" indent="0" algn="l" rtl="0">
+              <a:lnSpc>
+                <a:spcPct val="150000"/>
+              </a:lnSpc>
+              <a:spcBef>
+                <a:spcPts val="0"/>
+              </a:spcBef>
+              <a:spcAft>
+                <a:spcPts val="0"/>
+              </a:spcAft>
+              <a:buSzPts val="1800"/>
+              <a:buNone/>
+            </a:pPr>
+            <a:r>
+              <a:rPr lang="es-MX" sz="1200" dirty="0">
+                <a:latin typeface="Courier New" panose="02070309020205020404" pitchFamily="49" charset="0"/>
+                <a:cs typeface="Courier New" panose="02070309020205020404" pitchFamily="49" charset="0"/>
+              </a:rPr>
+              <a:t>grilla &lt;- </a:t>
+            </a:r>
+            <a:r>
+              <a:rPr lang="es-MX" sz="1200" dirty="0" err="1">
+                <a:latin typeface="Courier New" panose="02070309020205020404" pitchFamily="49" charset="0"/>
+                <a:cs typeface="Courier New" panose="02070309020205020404" pitchFamily="49" charset="0"/>
+              </a:rPr>
+              <a:t>tibble</a:t>
+            </a:r>
+            <a:r>
+              <a:rPr lang="es-MX" sz="1200" dirty="0">
+                <a:latin typeface="Courier New" panose="02070309020205020404" pitchFamily="49" charset="0"/>
+                <a:cs typeface="Courier New" panose="02070309020205020404" pitchFamily="49" charset="0"/>
+              </a:rPr>
+              <a:t>(</a:t>
+            </a:r>
+            <a:r>
+              <a:rPr lang="es-MX" sz="1200" dirty="0" err="1">
+                <a:latin typeface="Courier New" panose="02070309020205020404" pitchFamily="49" charset="0"/>
+                <a:cs typeface="Courier New" panose="02070309020205020404" pitchFamily="49" charset="0"/>
+              </a:rPr>
+              <a:t>degree</a:t>
+            </a:r>
+            <a:r>
+              <a:rPr lang="es-MX" sz="1200" dirty="0">
+                <a:latin typeface="Courier New" panose="02070309020205020404" pitchFamily="49" charset="0"/>
+                <a:cs typeface="Courier New" panose="02070309020205020404" pitchFamily="49" charset="0"/>
+              </a:rPr>
+              <a:t> = 1:5</a:t>
+            </a:r>
+          </a:p>
+          <a:p>
+            <a:pPr marL="114300" lvl="0" indent="0" algn="l" rtl="0">
+              <a:lnSpc>
+                <a:spcPct val="150000"/>
+              </a:lnSpc>
+              <a:spcBef>
+                <a:spcPts val="0"/>
+              </a:spcBef>
+              <a:spcAft>
+                <a:spcPts val="0"/>
+              </a:spcAft>
+              <a:buSzPts val="1800"/>
+              <a:buNone/>
+            </a:pPr>
+            <a:endParaRPr lang="es-MX" sz="1200" dirty="0">
+              <a:latin typeface="Courier New" panose="02070309020205020404" pitchFamily="49" charset="0"/>
+              <a:cs typeface="Courier New" panose="02070309020205020404" pitchFamily="49" charset="0"/>
+            </a:endParaRPr>
+          </a:p>
+          <a:p>
+            <a:pPr marL="114300" lvl="0" indent="0" algn="l" rtl="0">
+              <a:lnSpc>
+                <a:spcPct val="150000"/>
+              </a:lnSpc>
+              <a:spcBef>
+                <a:spcPts val="0"/>
+              </a:spcBef>
+              <a:spcAft>
+                <a:spcPts val="0"/>
+              </a:spcAft>
+              <a:buSzPts val="1800"/>
+              <a:buNone/>
+            </a:pPr>
+            <a:r>
+              <a:rPr lang="es-MX" sz="1200" dirty="0">
+                <a:latin typeface="Courier New" panose="02070309020205020404" pitchFamily="49" charset="0"/>
+                <a:cs typeface="Courier New" panose="02070309020205020404" pitchFamily="49" charset="0"/>
+              </a:rPr>
+              <a:t># Corro métricas con </a:t>
+            </a:r>
+            <a:r>
+              <a:rPr lang="es-MX" sz="1200" dirty="0" err="1">
+                <a:latin typeface="Courier New" panose="02070309020205020404" pitchFamily="49" charset="0"/>
+                <a:cs typeface="Courier New" panose="02070309020205020404" pitchFamily="49" charset="0"/>
+              </a:rPr>
+              <a:t>cross</a:t>
+            </a:r>
+            <a:r>
+              <a:rPr lang="es-MX" sz="1200" dirty="0">
+                <a:latin typeface="Courier New" panose="02070309020205020404" pitchFamily="49" charset="0"/>
+                <a:cs typeface="Courier New" panose="02070309020205020404" pitchFamily="49" charset="0"/>
+              </a:rPr>
+              <a:t> </a:t>
+            </a:r>
+            <a:r>
+              <a:rPr lang="es-MX" sz="1200" dirty="0" err="1">
+                <a:latin typeface="Courier New" panose="02070309020205020404" pitchFamily="49" charset="0"/>
+                <a:cs typeface="Courier New" panose="02070309020205020404" pitchFamily="49" charset="0"/>
+              </a:rPr>
+              <a:t>validation</a:t>
+            </a:r>
+            <a:r>
+              <a:rPr lang="es-MX" sz="1200" dirty="0">
+                <a:latin typeface="Courier New" panose="02070309020205020404" pitchFamily="49" charset="0"/>
+                <a:cs typeface="Courier New" panose="02070309020205020404" pitchFamily="49" charset="0"/>
+              </a:rPr>
+              <a:t> y ploteo</a:t>
+            </a:r>
+          </a:p>
+          <a:p>
+            <a:pPr marL="114300" lvl="0" indent="0" algn="l" rtl="0">
+              <a:lnSpc>
+                <a:spcPct val="150000"/>
+              </a:lnSpc>
+              <a:spcBef>
+                <a:spcPts val="0"/>
+              </a:spcBef>
+              <a:spcAft>
+                <a:spcPts val="0"/>
+              </a:spcAft>
+              <a:buSzPts val="1800"/>
+              <a:buNone/>
+            </a:pPr>
+            <a:r>
+              <a:rPr lang="es-MX" sz="1200" dirty="0" err="1">
+                <a:latin typeface="Courier New" panose="02070309020205020404" pitchFamily="49" charset="0"/>
+                <a:cs typeface="Courier New" panose="02070309020205020404" pitchFamily="49" charset="0"/>
+              </a:rPr>
+              <a:t>tune_res</a:t>
+            </a:r>
+            <a:r>
+              <a:rPr lang="es-MX" sz="1200" dirty="0">
+                <a:latin typeface="Courier New" panose="02070309020205020404" pitchFamily="49" charset="0"/>
+                <a:cs typeface="Courier New" panose="02070309020205020404" pitchFamily="49" charset="0"/>
+              </a:rPr>
+              <a:t> &lt;- </a:t>
+            </a:r>
+            <a:r>
+              <a:rPr lang="es-MX" sz="1200" dirty="0" err="1">
+                <a:latin typeface="Courier New" panose="02070309020205020404" pitchFamily="49" charset="0"/>
+                <a:cs typeface="Courier New" panose="02070309020205020404" pitchFamily="49" charset="0"/>
+              </a:rPr>
+              <a:t>tune_grid</a:t>
+            </a:r>
+            <a:r>
+              <a:rPr lang="es-MX" sz="1200" dirty="0">
+                <a:latin typeface="Courier New" panose="02070309020205020404" pitchFamily="49" charset="0"/>
+                <a:cs typeface="Courier New" panose="02070309020205020404" pitchFamily="49" charset="0"/>
+              </a:rPr>
+              <a:t>(</a:t>
+            </a:r>
+          </a:p>
+          <a:p>
+            <a:pPr marL="114300" lvl="0" indent="0" algn="l" rtl="0">
+              <a:lnSpc>
+                <a:spcPct val="150000"/>
+              </a:lnSpc>
+              <a:spcBef>
+                <a:spcPts val="0"/>
+              </a:spcBef>
+              <a:spcAft>
+                <a:spcPts val="0"/>
+              </a:spcAft>
+              <a:buSzPts val="1800"/>
+              <a:buNone/>
+            </a:pPr>
+            <a:r>
+              <a:rPr lang="es-MX" sz="1200" dirty="0">
+                <a:latin typeface="Courier New" panose="02070309020205020404" pitchFamily="49" charset="0"/>
+                <a:cs typeface="Courier New" panose="02070309020205020404" pitchFamily="49" charset="0"/>
+              </a:rPr>
+              <a:t>  </a:t>
+            </a:r>
+            <a:r>
+              <a:rPr lang="es-MX" sz="1200" dirty="0" err="1">
+                <a:latin typeface="Courier New" panose="02070309020205020404" pitchFamily="49" charset="0"/>
+                <a:cs typeface="Courier New" panose="02070309020205020404" pitchFamily="49" charset="0"/>
+              </a:rPr>
+              <a:t>object</a:t>
+            </a:r>
+            <a:r>
+              <a:rPr lang="es-MX" sz="1200" dirty="0">
+                <a:latin typeface="Courier New" panose="02070309020205020404" pitchFamily="49" charset="0"/>
+                <a:cs typeface="Courier New" panose="02070309020205020404" pitchFamily="49" charset="0"/>
+              </a:rPr>
+              <a:t> = </a:t>
+            </a:r>
+            <a:r>
+              <a:rPr lang="es-MX" sz="1200" dirty="0" err="1">
+                <a:latin typeface="Courier New" panose="02070309020205020404" pitchFamily="49" charset="0"/>
+                <a:cs typeface="Courier New" panose="02070309020205020404" pitchFamily="49" charset="0"/>
+              </a:rPr>
+              <a:t>lm_wflow_tune</a:t>
+            </a:r>
+            <a:r>
+              <a:rPr lang="es-MX" sz="1200" dirty="0">
+                <a:latin typeface="Courier New" panose="02070309020205020404" pitchFamily="49" charset="0"/>
+                <a:cs typeface="Courier New" panose="02070309020205020404" pitchFamily="49" charset="0"/>
+              </a:rPr>
+              <a:t>, # Qué modelo voy a tunear</a:t>
+            </a:r>
+          </a:p>
+          <a:p>
+            <a:pPr marL="114300" lvl="0" indent="0" algn="l" rtl="0">
+              <a:lnSpc>
+                <a:spcPct val="150000"/>
+              </a:lnSpc>
+              <a:spcBef>
+                <a:spcPts val="0"/>
+              </a:spcBef>
+              <a:spcAft>
+                <a:spcPts val="0"/>
+              </a:spcAft>
+              <a:buSzPts val="1800"/>
+              <a:buNone/>
+            </a:pPr>
+            <a:r>
+              <a:rPr lang="es-MX" sz="1200" dirty="0">
+                <a:latin typeface="Courier New" panose="02070309020205020404" pitchFamily="49" charset="0"/>
+                <a:cs typeface="Courier New" panose="02070309020205020404" pitchFamily="49" charset="0"/>
+              </a:rPr>
+              <a:t>  </a:t>
+            </a:r>
+            <a:r>
+              <a:rPr lang="es-MX" sz="1200" dirty="0" err="1">
+                <a:latin typeface="Courier New" panose="02070309020205020404" pitchFamily="49" charset="0"/>
+                <a:cs typeface="Courier New" panose="02070309020205020404" pitchFamily="49" charset="0"/>
+              </a:rPr>
+              <a:t>resamples</a:t>
+            </a:r>
+            <a:r>
+              <a:rPr lang="es-MX" sz="1200" dirty="0">
+                <a:latin typeface="Courier New" panose="02070309020205020404" pitchFamily="49" charset="0"/>
+                <a:cs typeface="Courier New" panose="02070309020205020404" pitchFamily="49" charset="0"/>
+              </a:rPr>
+              <a:t> = </a:t>
+            </a:r>
+            <a:r>
+              <a:rPr lang="es-MX" sz="1200" dirty="0" err="1">
+                <a:latin typeface="Courier New" panose="02070309020205020404" pitchFamily="49" charset="0"/>
+                <a:cs typeface="Courier New" panose="02070309020205020404" pitchFamily="49" charset="0"/>
+              </a:rPr>
+              <a:t>base_folds</a:t>
+            </a:r>
+            <a:r>
+              <a:rPr lang="es-MX" sz="1200" dirty="0">
+                <a:latin typeface="Courier New" panose="02070309020205020404" pitchFamily="49" charset="0"/>
+                <a:cs typeface="Courier New" panose="02070309020205020404" pitchFamily="49" charset="0"/>
+              </a:rPr>
+              <a:t>, # De dónde saco los </a:t>
+            </a:r>
+            <a:r>
+              <a:rPr lang="es-MX" sz="1200" dirty="0" err="1">
+                <a:latin typeface="Courier New" panose="02070309020205020404" pitchFamily="49" charset="0"/>
+                <a:cs typeface="Courier New" panose="02070309020205020404" pitchFamily="49" charset="0"/>
+              </a:rPr>
+              <a:t>folds</a:t>
+            </a:r>
+            <a:r>
+              <a:rPr lang="es-MX" sz="1200" dirty="0">
+                <a:latin typeface="Courier New" panose="02070309020205020404" pitchFamily="49" charset="0"/>
+                <a:cs typeface="Courier New" panose="02070309020205020404" pitchFamily="49" charset="0"/>
+              </a:rPr>
+              <a:t> de datos </a:t>
+            </a:r>
+          </a:p>
+          <a:p>
+            <a:pPr marL="114300" lvl="0" indent="0" algn="l" rtl="0">
+              <a:lnSpc>
+                <a:spcPct val="150000"/>
+              </a:lnSpc>
+              <a:spcBef>
+                <a:spcPts val="0"/>
+              </a:spcBef>
+              <a:spcAft>
+                <a:spcPts val="0"/>
+              </a:spcAft>
+              <a:buSzPts val="1800"/>
+              <a:buNone/>
+            </a:pPr>
+            <a:r>
+              <a:rPr lang="es-MX" sz="1200" dirty="0">
+                <a:latin typeface="Courier New" panose="02070309020205020404" pitchFamily="49" charset="0"/>
+                <a:cs typeface="Courier New" panose="02070309020205020404" pitchFamily="49" charset="0"/>
+              </a:rPr>
+              <a:t>  </a:t>
+            </a:r>
+            <a:r>
+              <a:rPr lang="es-MX" sz="1200" dirty="0" err="1">
+                <a:latin typeface="Courier New" panose="02070309020205020404" pitchFamily="49" charset="0"/>
+                <a:cs typeface="Courier New" panose="02070309020205020404" pitchFamily="49" charset="0"/>
+              </a:rPr>
+              <a:t>grid</a:t>
+            </a:r>
+            <a:r>
+              <a:rPr lang="es-MX" sz="1200" dirty="0">
+                <a:latin typeface="Courier New" panose="02070309020205020404" pitchFamily="49" charset="0"/>
+                <a:cs typeface="Courier New" panose="02070309020205020404" pitchFamily="49" charset="0"/>
+              </a:rPr>
+              <a:t> = grilla,          # </a:t>
+            </a:r>
+            <a:r>
+              <a:rPr lang="es-MX" sz="1200" dirty="0" err="1">
+                <a:latin typeface="Courier New" panose="02070309020205020404" pitchFamily="49" charset="0"/>
+                <a:cs typeface="Courier New" panose="02070309020205020404" pitchFamily="49" charset="0"/>
+              </a:rPr>
+              <a:t>Hiperparametros</a:t>
+            </a:r>
+            <a:r>
+              <a:rPr lang="es-MX" sz="1200" dirty="0">
+                <a:latin typeface="Courier New" panose="02070309020205020404" pitchFamily="49" charset="0"/>
+                <a:cs typeface="Courier New" panose="02070309020205020404" pitchFamily="49" charset="0"/>
+              </a:rPr>
+              <a:t> a evaluar</a:t>
+            </a:r>
+          </a:p>
+          <a:p>
+            <a:pPr marL="114300" lvl="0" indent="0" algn="l" rtl="0">
+              <a:lnSpc>
+                <a:spcPct val="150000"/>
+              </a:lnSpc>
+              <a:spcBef>
+                <a:spcPts val="0"/>
+              </a:spcBef>
+              <a:spcAft>
+                <a:spcPts val="0"/>
+              </a:spcAft>
+              <a:buSzPts val="1800"/>
+              <a:buNone/>
+            </a:pPr>
+            <a:r>
+              <a:rPr lang="es-MX" sz="1200" dirty="0">
+                <a:latin typeface="Courier New" panose="02070309020205020404" pitchFamily="49" charset="0"/>
+                <a:cs typeface="Courier New" panose="02070309020205020404" pitchFamily="49" charset="0"/>
+              </a:rPr>
+              <a:t>  </a:t>
+            </a:r>
+            <a:r>
+              <a:rPr lang="es-MX" sz="1200" dirty="0" err="1">
+                <a:latin typeface="Courier New" panose="02070309020205020404" pitchFamily="49" charset="0"/>
+                <a:cs typeface="Courier New" panose="02070309020205020404" pitchFamily="49" charset="0"/>
+              </a:rPr>
+              <a:t>metrics</a:t>
+            </a:r>
+            <a:r>
+              <a:rPr lang="es-MX" sz="1200" dirty="0">
+                <a:latin typeface="Courier New" panose="02070309020205020404" pitchFamily="49" charset="0"/>
+                <a:cs typeface="Courier New" panose="02070309020205020404" pitchFamily="49" charset="0"/>
+              </a:rPr>
+              <a:t> = </a:t>
+            </a:r>
+            <a:r>
+              <a:rPr lang="es-MX" sz="1200" dirty="0" err="1">
+                <a:latin typeface="Courier New" panose="02070309020205020404" pitchFamily="49" charset="0"/>
+                <a:cs typeface="Courier New" panose="02070309020205020404" pitchFamily="49" charset="0"/>
+              </a:rPr>
+              <a:t>metric_set</a:t>
+            </a:r>
+            <a:r>
+              <a:rPr lang="es-MX" sz="1200" dirty="0">
+                <a:latin typeface="Courier New" panose="02070309020205020404" pitchFamily="49" charset="0"/>
+                <a:cs typeface="Courier New" panose="02070309020205020404" pitchFamily="49" charset="0"/>
+              </a:rPr>
+              <a:t>(</a:t>
+            </a:r>
+            <a:r>
+              <a:rPr lang="es-MX" sz="1200" dirty="0" err="1">
+                <a:latin typeface="Courier New" panose="02070309020205020404" pitchFamily="49" charset="0"/>
+                <a:cs typeface="Courier New" panose="02070309020205020404" pitchFamily="49" charset="0"/>
+              </a:rPr>
+              <a:t>rmse</a:t>
+            </a:r>
+            <a:r>
+              <a:rPr lang="es-MX" sz="1200" dirty="0">
+                <a:latin typeface="Courier New" panose="02070309020205020404" pitchFamily="49" charset="0"/>
+                <a:cs typeface="Courier New" panose="02070309020205020404" pitchFamily="49" charset="0"/>
+              </a:rPr>
+              <a:t>, </a:t>
+            </a:r>
+            <a:r>
+              <a:rPr lang="es-MX" sz="1200" dirty="0" err="1">
+                <a:latin typeface="Courier New" panose="02070309020205020404" pitchFamily="49" charset="0"/>
+                <a:cs typeface="Courier New" panose="02070309020205020404" pitchFamily="49" charset="0"/>
+              </a:rPr>
+              <a:t>rsq</a:t>
+            </a:r>
+            <a:r>
+              <a:rPr lang="es-MX" sz="1200" dirty="0">
+                <a:latin typeface="Courier New" panose="02070309020205020404" pitchFamily="49" charset="0"/>
+                <a:cs typeface="Courier New" panose="02070309020205020404" pitchFamily="49" charset="0"/>
+              </a:rPr>
+              <a:t>) # Métricas a evaluar</a:t>
+            </a:r>
+          </a:p>
+          <a:p>
+            <a:pPr marL="114300" lvl="0" indent="0" algn="l" rtl="0">
+              <a:lnSpc>
+                <a:spcPct val="150000"/>
+              </a:lnSpc>
+              <a:spcBef>
+                <a:spcPts val="0"/>
+              </a:spcBef>
+              <a:spcAft>
+                <a:spcPts val="0"/>
+              </a:spcAft>
+              <a:buSzPts val="1800"/>
+              <a:buNone/>
+            </a:pPr>
+            <a:r>
+              <a:rPr lang="es-MX" sz="1200" dirty="0">
+                <a:latin typeface="Courier New" panose="02070309020205020404" pitchFamily="49" charset="0"/>
+                <a:cs typeface="Courier New" panose="02070309020205020404" pitchFamily="49" charset="0"/>
+              </a:rPr>
+              <a:t>) %&gt;% </a:t>
+            </a:r>
+            <a:r>
+              <a:rPr lang="es-MX" sz="1200" dirty="0" err="1">
+                <a:latin typeface="Courier New" panose="02070309020205020404" pitchFamily="49" charset="0"/>
+                <a:cs typeface="Courier New" panose="02070309020205020404" pitchFamily="49" charset="0"/>
+              </a:rPr>
+              <a:t>autoplot</a:t>
+            </a:r>
+            <a:r>
+              <a:rPr lang="es-MX" sz="1200" dirty="0">
+                <a:latin typeface="Courier New" panose="02070309020205020404" pitchFamily="49" charset="0"/>
+                <a:cs typeface="Courier New" panose="02070309020205020404" pitchFamily="49" charset="0"/>
+              </a:rPr>
+              <a:t>()          # Que me haga directo el </a:t>
+            </a:r>
+            <a:r>
+              <a:rPr lang="es-MX" sz="1200" dirty="0" err="1">
+                <a:latin typeface="Courier New" panose="02070309020205020404" pitchFamily="49" charset="0"/>
+                <a:cs typeface="Courier New" panose="02070309020205020404" pitchFamily="49" charset="0"/>
+              </a:rPr>
+              <a:t>plot</a:t>
+            </a:r>
+            <a:endParaRPr lang="es-MX" sz="1200" dirty="0">
+              <a:latin typeface="Courier New" panose="02070309020205020404" pitchFamily="49" charset="0"/>
+              <a:cs typeface="Courier New" panose="02070309020205020404" pitchFamily="49" charset="0"/>
+            </a:endParaRPr>
           </a:p>
         </p:txBody>
       </p:sp>
     </p:spTree>
     <p:extLst>
       <p:ext uri="{BB962C8B-B14F-4D97-AF65-F5344CB8AC3E}">
-        <p14:creationId xmlns:p14="http://schemas.microsoft.com/office/powerpoint/2010/main" val="832657643"/>
+        <p14:creationId xmlns:p14="http://schemas.microsoft.com/office/powerpoint/2010/main" val="3128468253"/>
       </p:ext>
     </p:extLst>
   </p:cSld>

</xml_diff>

<commit_message>
Cambio de orden slides
</commit_message>
<xml_diff>
--- a/clase2/Tidymodels.pptx
+++ b/clase2/Tidymodels.pptx
@@ -10,11 +10,11 @@
   <p:sldIdLst>
     <p:sldId id="256" r:id="rId2"/>
     <p:sldId id="265" r:id="rId3"/>
-    <p:sldId id="296" r:id="rId4"/>
-    <p:sldId id="301" r:id="rId5"/>
-    <p:sldId id="315" r:id="rId6"/>
-    <p:sldId id="313" r:id="rId7"/>
-    <p:sldId id="314" r:id="rId8"/>
+    <p:sldId id="313" r:id="rId4"/>
+    <p:sldId id="314" r:id="rId5"/>
+    <p:sldId id="301" r:id="rId6"/>
+    <p:sldId id="315" r:id="rId7"/>
+    <p:sldId id="296" r:id="rId8"/>
     <p:sldId id="316" r:id="rId9"/>
     <p:sldId id="317" r:id="rId10"/>
     <p:sldId id="312" r:id="rId11"/>
@@ -1048,7 +1048,7 @@
   <p:cSld>
     <p:spTree>
       <p:nvGrpSpPr>
-        <p:cNvPr id="1" name="Shape 306"/>
+        <p:cNvPr id="1" name="Shape 224"/>
         <p:cNvGrpSpPr/>
         <p:nvPr/>
       </p:nvGrpSpPr>
@@ -1062,7 +1062,7 @@
       </p:grpSpPr>
       <p:sp>
         <p:nvSpPr>
-          <p:cNvPr id="307" name="Google Shape;307;ge5a1b4e583_0_560:notes"/>
+          <p:cNvPr id="225" name="Google Shape;225;ge626d24df6_0_249:notes"/>
           <p:cNvSpPr>
             <a:spLocks noGrp="1" noRot="1" noChangeAspect="1"/>
           </p:cNvSpPr>
@@ -1103,7 +1103,7 @@
       </p:sp>
       <p:sp>
         <p:nvSpPr>
-          <p:cNvPr id="308" name="Google Shape;308;ge5a1b4e583_0_560:notes"/>
+          <p:cNvPr id="226" name="Google Shape;226;ge626d24df6_0_249:notes"/>
           <p:cNvSpPr txBox="1">
             <a:spLocks noGrp="1"/>
           </p:cNvSpPr>
@@ -1135,11 +1135,36 @@
               </a:spcAft>
               <a:buNone/>
             </a:pPr>
-            <a:endParaRPr/>
+            <a:r>
+              <a:rPr lang="es-MX" b="0" i="1" dirty="0">
+                <a:solidFill>
+                  <a:srgbClr val="333333"/>
+                </a:solidFill>
+                <a:effectLst/>
+                <a:latin typeface="Georgia" panose="02040502050405020303" pitchFamily="18" charset="0"/>
+              </a:rPr>
+              <a:t>Nota:</a:t>
+            </a:r>
+            <a:r>
+              <a:rPr lang="es-MX" b="0" i="0" dirty="0">
+                <a:solidFill>
+                  <a:srgbClr val="333333"/>
+                </a:solidFill>
+                <a:effectLst/>
+                <a:latin typeface="Georgia" panose="02040502050405020303" pitchFamily="18" charset="0"/>
+              </a:rPr>
+              <a:t> en todos estos casos, estamos tomando la regresión lineal como un modelo de inferencia.</a:t>
+            </a:r>
+            <a:endParaRPr dirty="0"/>
           </a:p>
         </p:txBody>
       </p:sp>
     </p:spTree>
+    <p:extLst>
+      <p:ext uri="{BB962C8B-B14F-4D97-AF65-F5344CB8AC3E}">
+        <p14:creationId xmlns:p14="http://schemas.microsoft.com/office/powerpoint/2010/main" val="3761602769"/>
+      </p:ext>
+    </p:extLst>
   </p:cSld>
   <p:clrMapOvr>
     <a:masterClrMapping/>
@@ -1266,7 +1291,7 @@
     </p:spTree>
     <p:extLst>
       <p:ext uri="{BB962C8B-B14F-4D97-AF65-F5344CB8AC3E}">
-        <p14:creationId xmlns:p14="http://schemas.microsoft.com/office/powerpoint/2010/main" val="1975853175"/>
+        <p14:creationId xmlns:p14="http://schemas.microsoft.com/office/powerpoint/2010/main" val="1882344615"/>
       </p:ext>
     </p:extLst>
   </p:cSld>
@@ -1395,7 +1420,7 @@
     </p:spTree>
     <p:extLst>
       <p:ext uri="{BB962C8B-B14F-4D97-AF65-F5344CB8AC3E}">
-        <p14:creationId xmlns:p14="http://schemas.microsoft.com/office/powerpoint/2010/main" val="322590814"/>
+        <p14:creationId xmlns:p14="http://schemas.microsoft.com/office/powerpoint/2010/main" val="1975853175"/>
       </p:ext>
     </p:extLst>
   </p:cSld>
@@ -1524,7 +1549,7 @@
     </p:spTree>
     <p:extLst>
       <p:ext uri="{BB962C8B-B14F-4D97-AF65-F5344CB8AC3E}">
-        <p14:creationId xmlns:p14="http://schemas.microsoft.com/office/powerpoint/2010/main" val="3761602769"/>
+        <p14:creationId xmlns:p14="http://schemas.microsoft.com/office/powerpoint/2010/main" val="322590814"/>
       </p:ext>
     </p:extLst>
   </p:cSld>
@@ -1539,7 +1564,7 @@
   <p:cSld>
     <p:spTree>
       <p:nvGrpSpPr>
-        <p:cNvPr id="1" name="Shape 224"/>
+        <p:cNvPr id="1" name="Shape 306"/>
         <p:cNvGrpSpPr/>
         <p:nvPr/>
       </p:nvGrpSpPr>
@@ -1553,7 +1578,7 @@
       </p:grpSpPr>
       <p:sp>
         <p:nvSpPr>
-          <p:cNvPr id="225" name="Google Shape;225;ge626d24df6_0_249:notes"/>
+          <p:cNvPr id="307" name="Google Shape;307;ge5a1b4e583_0_560:notes"/>
           <p:cNvSpPr>
             <a:spLocks noGrp="1" noRot="1" noChangeAspect="1"/>
           </p:cNvSpPr>
@@ -1594,7 +1619,7 @@
       </p:sp>
       <p:sp>
         <p:nvSpPr>
-          <p:cNvPr id="226" name="Google Shape;226;ge626d24df6_0_249:notes"/>
+          <p:cNvPr id="308" name="Google Shape;308;ge5a1b4e583_0_560:notes"/>
           <p:cNvSpPr txBox="1">
             <a:spLocks noGrp="1"/>
           </p:cNvSpPr>
@@ -1626,36 +1651,11 @@
               </a:spcAft>
               <a:buNone/>
             </a:pPr>
-            <a:r>
-              <a:rPr lang="es-MX" b="0" i="1" dirty="0">
-                <a:solidFill>
-                  <a:srgbClr val="333333"/>
-                </a:solidFill>
-                <a:effectLst/>
-                <a:latin typeface="Georgia" panose="02040502050405020303" pitchFamily="18" charset="0"/>
-              </a:rPr>
-              <a:t>Nota:</a:t>
-            </a:r>
-            <a:r>
-              <a:rPr lang="es-MX" b="0" i="0" dirty="0">
-                <a:solidFill>
-                  <a:srgbClr val="333333"/>
-                </a:solidFill>
-                <a:effectLst/>
-                <a:latin typeface="Georgia" panose="02040502050405020303" pitchFamily="18" charset="0"/>
-              </a:rPr>
-              <a:t> en todos estos casos, estamos tomando la regresión lineal como un modelo de inferencia.</a:t>
-            </a:r>
-            <a:endParaRPr dirty="0"/>
+            <a:endParaRPr/>
           </a:p>
         </p:txBody>
       </p:sp>
     </p:spTree>
-    <p:extLst>
-      <p:ext uri="{BB962C8B-B14F-4D97-AF65-F5344CB8AC3E}">
-        <p14:creationId xmlns:p14="http://schemas.microsoft.com/office/powerpoint/2010/main" val="1882344615"/>
-      </p:ext>
-    </p:extLst>
   </p:cSld>
   <p:clrMapOvr>
     <a:masterClrMapping/>
@@ -7661,2169 +7661,6 @@
 <file path=ppt/slides/slide3.xml><?xml version="1.0" encoding="utf-8"?>
 <p:sld xmlns:a="http://schemas.openxmlformats.org/drawingml/2006/main" xmlns:r="http://schemas.openxmlformats.org/officeDocument/2006/relationships" xmlns:p="http://schemas.openxmlformats.org/presentationml/2006/main">
   <p:cSld>
-    <p:spTree>
-      <p:nvGrpSpPr>
-        <p:cNvPr id="1" name="Shape 309"/>
-        <p:cNvGrpSpPr/>
-        <p:nvPr/>
-      </p:nvGrpSpPr>
-      <p:grpSpPr>
-        <a:xfrm>
-          <a:off x="0" y="0"/>
-          <a:ext cx="0" cy="0"/>
-          <a:chOff x="0" y="0"/>
-          <a:chExt cx="0" cy="0"/>
-        </a:xfrm>
-      </p:grpSpPr>
-      <p:sp>
-        <p:nvSpPr>
-          <p:cNvPr id="310" name="Google Shape;310;p53"/>
-          <p:cNvSpPr txBox="1">
-            <a:spLocks noGrp="1"/>
-          </p:cNvSpPr>
-          <p:nvPr>
-            <p:ph type="title"/>
-          </p:nvPr>
-        </p:nvSpPr>
-        <p:spPr>
-          <a:xfrm>
-            <a:off x="311700" y="156100"/>
-            <a:ext cx="8520600" cy="572700"/>
-          </a:xfrm>
-          <a:prstGeom prst="rect">
-            <a:avLst/>
-          </a:prstGeom>
-        </p:spPr>
-        <p:txBody>
-          <a:bodyPr spcFirstLastPara="1" wrap="square" lIns="91425" tIns="91425" rIns="91425" bIns="91425" anchor="t" anchorCtr="0">
-            <a:normAutofit fontScale="90000"/>
-          </a:bodyPr>
-          <a:lstStyle/>
-          <a:p>
-            <a:pPr marL="0" lvl="0" indent="0" algn="l" rtl="0">
-              <a:spcBef>
-                <a:spcPts val="0"/>
-              </a:spcBef>
-              <a:spcAft>
-                <a:spcPts val="0"/>
-              </a:spcAft>
-              <a:buNone/>
-            </a:pPr>
-            <a:r>
-              <a:rPr lang="en-GB" dirty="0" err="1"/>
-              <a:t>Muestra</a:t>
-            </a:r>
-            <a:endParaRPr dirty="0"/>
-          </a:p>
-        </p:txBody>
-      </p:sp>
-      <p:sp>
-        <p:nvSpPr>
-          <p:cNvPr id="311" name="Google Shape;311;p53"/>
-          <p:cNvSpPr txBox="1">
-            <a:spLocks noGrp="1"/>
-          </p:cNvSpPr>
-          <p:nvPr>
-            <p:ph type="body" idx="1"/>
-          </p:nvPr>
-        </p:nvSpPr>
-        <p:spPr>
-          <a:xfrm>
-            <a:off x="311700" y="728800"/>
-            <a:ext cx="4650044" cy="3416400"/>
-          </a:xfrm>
-          <a:prstGeom prst="rect">
-            <a:avLst/>
-          </a:prstGeom>
-        </p:spPr>
-        <p:txBody>
-          <a:bodyPr spcFirstLastPara="1" wrap="square" lIns="91425" tIns="91425" rIns="91425" bIns="91425" anchor="t" anchorCtr="0">
-            <a:normAutofit/>
-          </a:bodyPr>
-          <a:lstStyle/>
-          <a:p>
-            <a:pPr marL="114300" lvl="0" indent="0" algn="l" rtl="0">
-              <a:lnSpc>
-                <a:spcPct val="150000"/>
-              </a:lnSpc>
-              <a:spcBef>
-                <a:spcPts val="0"/>
-              </a:spcBef>
-              <a:spcAft>
-                <a:spcPts val="0"/>
-              </a:spcAft>
-              <a:buSzPts val="1800"/>
-              <a:buNone/>
-            </a:pPr>
-            <a:r>
-              <a:rPr lang="es-MX" sz="1200" dirty="0">
-                <a:latin typeface="Courier New" panose="02070309020205020404" pitchFamily="49" charset="0"/>
-                <a:cs typeface="Courier New" panose="02070309020205020404" pitchFamily="49" charset="0"/>
-              </a:rPr>
-              <a:t># Separo un test set</a:t>
-            </a:r>
-          </a:p>
-          <a:p>
-            <a:pPr marL="114300" lvl="0" indent="0" algn="l" rtl="0">
-              <a:lnSpc>
-                <a:spcPct val="150000"/>
-              </a:lnSpc>
-              <a:spcBef>
-                <a:spcPts val="0"/>
-              </a:spcBef>
-              <a:spcAft>
-                <a:spcPts val="0"/>
-              </a:spcAft>
-              <a:buSzPts val="1800"/>
-              <a:buNone/>
-            </a:pPr>
-            <a:r>
-              <a:rPr lang="es-MX" sz="1200" dirty="0" err="1">
-                <a:latin typeface="Courier New" panose="02070309020205020404" pitchFamily="49" charset="0"/>
-                <a:cs typeface="Courier New" panose="02070309020205020404" pitchFamily="49" charset="0"/>
-              </a:rPr>
-              <a:t>set.seed</a:t>
-            </a:r>
-            <a:r>
-              <a:rPr lang="es-MX" sz="1200" dirty="0">
-                <a:latin typeface="Courier New" panose="02070309020205020404" pitchFamily="49" charset="0"/>
-                <a:cs typeface="Courier New" panose="02070309020205020404" pitchFamily="49" charset="0"/>
-              </a:rPr>
-              <a:t>(123)</a:t>
-            </a:r>
-          </a:p>
-          <a:p>
-            <a:pPr marL="114300" lvl="0" indent="0" algn="l" rtl="0">
-              <a:lnSpc>
-                <a:spcPct val="150000"/>
-              </a:lnSpc>
-              <a:spcBef>
-                <a:spcPts val="0"/>
-              </a:spcBef>
-              <a:spcAft>
-                <a:spcPts val="0"/>
-              </a:spcAft>
-              <a:buSzPts val="1800"/>
-              <a:buNone/>
-            </a:pPr>
-            <a:r>
-              <a:rPr lang="es-MX" sz="1200" dirty="0" err="1">
-                <a:latin typeface="Courier New" panose="02070309020205020404" pitchFamily="49" charset="0"/>
-                <a:cs typeface="Courier New" panose="02070309020205020404" pitchFamily="49" charset="0"/>
-              </a:rPr>
-              <a:t>base_split</a:t>
-            </a:r>
-            <a:r>
-              <a:rPr lang="es-MX" sz="1200" dirty="0">
-                <a:latin typeface="Courier New" panose="02070309020205020404" pitchFamily="49" charset="0"/>
-                <a:cs typeface="Courier New" panose="02070309020205020404" pitchFamily="49" charset="0"/>
-              </a:rPr>
-              <a:t> &lt;- </a:t>
-            </a:r>
-            <a:r>
-              <a:rPr lang="es-MX" sz="1200" dirty="0" err="1">
-                <a:latin typeface="Courier New" panose="02070309020205020404" pitchFamily="49" charset="0"/>
-                <a:cs typeface="Courier New" panose="02070309020205020404" pitchFamily="49" charset="0"/>
-              </a:rPr>
-              <a:t>initial_Split</a:t>
-            </a:r>
-            <a:r>
-              <a:rPr lang="es-MX" sz="1200" dirty="0">
-                <a:latin typeface="Courier New" panose="02070309020205020404" pitchFamily="49" charset="0"/>
-                <a:cs typeface="Courier New" panose="02070309020205020404" pitchFamily="49" charset="0"/>
-              </a:rPr>
-              <a:t>(base, </a:t>
-            </a:r>
-            <a:r>
-              <a:rPr lang="es-MX" sz="1200" dirty="0" err="1">
-                <a:latin typeface="Courier New" panose="02070309020205020404" pitchFamily="49" charset="0"/>
-                <a:cs typeface="Courier New" panose="02070309020205020404" pitchFamily="49" charset="0"/>
-              </a:rPr>
-              <a:t>prop</a:t>
-            </a:r>
-            <a:r>
-              <a:rPr lang="es-MX" sz="1200" dirty="0">
-                <a:latin typeface="Courier New" panose="02070309020205020404" pitchFamily="49" charset="0"/>
-                <a:cs typeface="Courier New" panose="02070309020205020404" pitchFamily="49" charset="0"/>
-              </a:rPr>
-              <a:t>=0.8)</a:t>
-            </a:r>
-          </a:p>
-          <a:p>
-            <a:pPr marL="114300" lvl="0" indent="0" algn="l" rtl="0">
-              <a:lnSpc>
-                <a:spcPct val="150000"/>
-              </a:lnSpc>
-              <a:spcBef>
-                <a:spcPts val="0"/>
-              </a:spcBef>
-              <a:spcAft>
-                <a:spcPts val="0"/>
-              </a:spcAft>
-              <a:buSzPts val="1800"/>
-              <a:buNone/>
-            </a:pPr>
-            <a:r>
-              <a:rPr lang="es-MX" sz="1200" dirty="0" err="1">
-                <a:latin typeface="Courier New" panose="02070309020205020404" pitchFamily="49" charset="0"/>
-                <a:cs typeface="Courier New" panose="02070309020205020404" pitchFamily="49" charset="0"/>
-              </a:rPr>
-              <a:t>base_train</a:t>
-            </a:r>
-            <a:r>
-              <a:rPr lang="es-MX" sz="1200" dirty="0">
-                <a:latin typeface="Courier New" panose="02070309020205020404" pitchFamily="49" charset="0"/>
-                <a:cs typeface="Courier New" panose="02070309020205020404" pitchFamily="49" charset="0"/>
-              </a:rPr>
-              <a:t> &lt;- training(</a:t>
-            </a:r>
-            <a:r>
-              <a:rPr lang="es-MX" sz="1200" dirty="0" err="1">
-                <a:latin typeface="Courier New" panose="02070309020205020404" pitchFamily="49" charset="0"/>
-                <a:cs typeface="Courier New" panose="02070309020205020404" pitchFamily="49" charset="0"/>
-              </a:rPr>
-              <a:t>base_split</a:t>
-            </a:r>
-            <a:r>
-              <a:rPr lang="es-MX" sz="1200" dirty="0">
-                <a:latin typeface="Courier New" panose="02070309020205020404" pitchFamily="49" charset="0"/>
-                <a:cs typeface="Courier New" panose="02070309020205020404" pitchFamily="49" charset="0"/>
-              </a:rPr>
-              <a:t>)</a:t>
-            </a:r>
-          </a:p>
-          <a:p>
-            <a:pPr marL="114300" lvl="0" indent="0" algn="l" rtl="0">
-              <a:lnSpc>
-                <a:spcPct val="150000"/>
-              </a:lnSpc>
-              <a:spcBef>
-                <a:spcPts val="0"/>
-              </a:spcBef>
-              <a:spcAft>
-                <a:spcPts val="0"/>
-              </a:spcAft>
-              <a:buSzPts val="1800"/>
-              <a:buNone/>
-            </a:pPr>
-            <a:r>
-              <a:rPr lang="es-MX" sz="1200" dirty="0" err="1">
-                <a:latin typeface="Courier New" panose="02070309020205020404" pitchFamily="49" charset="0"/>
-                <a:cs typeface="Courier New" panose="02070309020205020404" pitchFamily="49" charset="0"/>
-              </a:rPr>
-              <a:t>base_test</a:t>
-            </a:r>
-            <a:r>
-              <a:rPr lang="es-MX" sz="1200" dirty="0">
-                <a:latin typeface="Courier New" panose="02070309020205020404" pitchFamily="49" charset="0"/>
-                <a:cs typeface="Courier New" panose="02070309020205020404" pitchFamily="49" charset="0"/>
-              </a:rPr>
-              <a:t>  &lt;- </a:t>
-            </a:r>
-            <a:r>
-              <a:rPr lang="es-MX" sz="1200" dirty="0" err="1">
-                <a:latin typeface="Courier New" panose="02070309020205020404" pitchFamily="49" charset="0"/>
-                <a:cs typeface="Courier New" panose="02070309020205020404" pitchFamily="49" charset="0"/>
-              </a:rPr>
-              <a:t>testing</a:t>
-            </a:r>
-            <a:r>
-              <a:rPr lang="es-MX" sz="1200" dirty="0">
-                <a:latin typeface="Courier New" panose="02070309020205020404" pitchFamily="49" charset="0"/>
-                <a:cs typeface="Courier New" panose="02070309020205020404" pitchFamily="49" charset="0"/>
-              </a:rPr>
-              <a:t>(</a:t>
-            </a:r>
-            <a:r>
-              <a:rPr lang="es-MX" sz="1200" dirty="0" err="1">
-                <a:latin typeface="Courier New" panose="02070309020205020404" pitchFamily="49" charset="0"/>
-                <a:cs typeface="Courier New" panose="02070309020205020404" pitchFamily="49" charset="0"/>
-              </a:rPr>
-              <a:t>base_split</a:t>
-            </a:r>
-            <a:r>
-              <a:rPr lang="es-MX" sz="1200" dirty="0">
-                <a:latin typeface="Courier New" panose="02070309020205020404" pitchFamily="49" charset="0"/>
-                <a:cs typeface="Courier New" panose="02070309020205020404" pitchFamily="49" charset="0"/>
-              </a:rPr>
-              <a:t>)</a:t>
-            </a:r>
-          </a:p>
-          <a:p>
-            <a:pPr marL="114300" lvl="0" indent="0" algn="l" rtl="0">
-              <a:lnSpc>
-                <a:spcPct val="150000"/>
-              </a:lnSpc>
-              <a:spcBef>
-                <a:spcPts val="0"/>
-              </a:spcBef>
-              <a:spcAft>
-                <a:spcPts val="0"/>
-              </a:spcAft>
-              <a:buSzPts val="1800"/>
-              <a:buNone/>
-            </a:pPr>
-            <a:endParaRPr lang="es-MX" sz="1200" dirty="0">
-              <a:latin typeface="Courier New" panose="02070309020205020404" pitchFamily="49" charset="0"/>
-              <a:cs typeface="Courier New" panose="02070309020205020404" pitchFamily="49" charset="0"/>
-            </a:endParaRPr>
-          </a:p>
-          <a:p>
-            <a:pPr marL="114300" lvl="0" indent="0" algn="l" rtl="0">
-              <a:lnSpc>
-                <a:spcPct val="150000"/>
-              </a:lnSpc>
-              <a:spcBef>
-                <a:spcPts val="0"/>
-              </a:spcBef>
-              <a:spcAft>
-                <a:spcPts val="0"/>
-              </a:spcAft>
-              <a:buSzPts val="1800"/>
-              <a:buNone/>
-            </a:pPr>
-            <a:r>
-              <a:rPr lang="es-MX" sz="1200" dirty="0">
-                <a:latin typeface="Courier New" panose="02070309020205020404" pitchFamily="49" charset="0"/>
-                <a:cs typeface="Courier New" panose="02070309020205020404" pitchFamily="49" charset="0"/>
-              </a:rPr>
-              <a:t># Para Cross </a:t>
-            </a:r>
-            <a:r>
-              <a:rPr lang="es-MX" sz="1200" dirty="0" err="1">
-                <a:latin typeface="Courier New" panose="02070309020205020404" pitchFamily="49" charset="0"/>
-                <a:cs typeface="Courier New" panose="02070309020205020404" pitchFamily="49" charset="0"/>
-              </a:rPr>
-              <a:t>Validation</a:t>
-            </a:r>
-            <a:endParaRPr lang="es-MX" sz="1200" dirty="0">
-              <a:latin typeface="Courier New" panose="02070309020205020404" pitchFamily="49" charset="0"/>
-              <a:cs typeface="Courier New" panose="02070309020205020404" pitchFamily="49" charset="0"/>
-            </a:endParaRPr>
-          </a:p>
-          <a:p>
-            <a:pPr marL="114300" lvl="0" indent="0" algn="l" rtl="0">
-              <a:lnSpc>
-                <a:spcPct val="150000"/>
-              </a:lnSpc>
-              <a:spcBef>
-                <a:spcPts val="0"/>
-              </a:spcBef>
-              <a:spcAft>
-                <a:spcPts val="0"/>
-              </a:spcAft>
-              <a:buSzPts val="1800"/>
-              <a:buNone/>
-            </a:pPr>
-            <a:r>
-              <a:rPr lang="es-MX" sz="1200" dirty="0" err="1">
-                <a:latin typeface="Courier New" panose="02070309020205020404" pitchFamily="49" charset="0"/>
-                <a:cs typeface="Courier New" panose="02070309020205020404" pitchFamily="49" charset="0"/>
-              </a:rPr>
-              <a:t>set.seed</a:t>
-            </a:r>
-            <a:r>
-              <a:rPr lang="es-MX" sz="1200" dirty="0">
-                <a:latin typeface="Courier New" panose="02070309020205020404" pitchFamily="49" charset="0"/>
-                <a:cs typeface="Courier New" panose="02070309020205020404" pitchFamily="49" charset="0"/>
-              </a:rPr>
-              <a:t>(234335)</a:t>
-            </a:r>
-          </a:p>
-          <a:p>
-            <a:pPr marL="114300" lvl="0" indent="0" algn="l" rtl="0">
-              <a:lnSpc>
-                <a:spcPct val="150000"/>
-              </a:lnSpc>
-              <a:spcBef>
-                <a:spcPts val="0"/>
-              </a:spcBef>
-              <a:spcAft>
-                <a:spcPts val="0"/>
-              </a:spcAft>
-              <a:buSzPts val="1800"/>
-              <a:buNone/>
-            </a:pPr>
-            <a:r>
-              <a:rPr lang="es-MX" sz="1200" dirty="0" err="1">
-                <a:latin typeface="Courier New" panose="02070309020205020404" pitchFamily="49" charset="0"/>
-                <a:cs typeface="Courier New" panose="02070309020205020404" pitchFamily="49" charset="0"/>
-              </a:rPr>
-              <a:t>base_folds</a:t>
-            </a:r>
-            <a:r>
-              <a:rPr lang="es-MX" sz="1200" dirty="0">
-                <a:latin typeface="Courier New" panose="02070309020205020404" pitchFamily="49" charset="0"/>
-                <a:cs typeface="Courier New" panose="02070309020205020404" pitchFamily="49" charset="0"/>
-              </a:rPr>
-              <a:t> &lt;- </a:t>
-            </a:r>
-            <a:r>
-              <a:rPr lang="es-MX" sz="1200" dirty="0" err="1">
-                <a:latin typeface="Courier New" panose="02070309020205020404" pitchFamily="49" charset="0"/>
-                <a:cs typeface="Courier New" panose="02070309020205020404" pitchFamily="49" charset="0"/>
-              </a:rPr>
-              <a:t>vfold_cv</a:t>
-            </a:r>
-            <a:r>
-              <a:rPr lang="es-MX" sz="1200" dirty="0">
-                <a:latin typeface="Courier New" panose="02070309020205020404" pitchFamily="49" charset="0"/>
-                <a:cs typeface="Courier New" panose="02070309020205020404" pitchFamily="49" charset="0"/>
-              </a:rPr>
-              <a:t>(</a:t>
-            </a:r>
-            <a:r>
-              <a:rPr lang="es-MX" sz="1200" dirty="0" err="1">
-                <a:latin typeface="Courier New" panose="02070309020205020404" pitchFamily="49" charset="0"/>
-                <a:cs typeface="Courier New" panose="02070309020205020404" pitchFamily="49" charset="0"/>
-              </a:rPr>
-              <a:t>base_train</a:t>
-            </a:r>
-            <a:r>
-              <a:rPr lang="es-MX" sz="1200" dirty="0">
-                <a:latin typeface="Courier New" panose="02070309020205020404" pitchFamily="49" charset="0"/>
-                <a:cs typeface="Courier New" panose="02070309020205020404" pitchFamily="49" charset="0"/>
-              </a:rPr>
-              <a:t>, v = 10)</a:t>
-            </a:r>
-            <a:endParaRPr sz="1200" dirty="0">
-              <a:latin typeface="Courier New" panose="02070309020205020404" pitchFamily="49" charset="0"/>
-              <a:cs typeface="Courier New" panose="02070309020205020404" pitchFamily="49" charset="0"/>
-            </a:endParaRPr>
-          </a:p>
-        </p:txBody>
-      </p:sp>
-    </p:spTree>
-  </p:cSld>
-  <p:clrMapOvr>
-    <a:masterClrMapping/>
-  </p:clrMapOvr>
-</p:sld>
-</file>
-
-<file path=ppt/slides/slide4.xml><?xml version="1.0" encoding="utf-8"?>
-<p:sld xmlns:a="http://schemas.openxmlformats.org/drawingml/2006/main" xmlns:r="http://schemas.openxmlformats.org/officeDocument/2006/relationships" xmlns:p="http://schemas.openxmlformats.org/presentationml/2006/main">
-  <p:cSld>
-    <p:bg>
-      <p:bgPr>
-        <a:pattFill prst="pct50">
-          <a:fgClr>
-            <a:schemeClr val="lt2"/>
-          </a:fgClr>
-          <a:bgClr>
-            <a:schemeClr val="bg1"/>
-          </a:bgClr>
-        </a:pattFill>
-        <a:effectLst/>
-      </p:bgPr>
-    </p:bg>
-    <p:spTree>
-      <p:nvGrpSpPr>
-        <p:cNvPr id="1" name="Shape 227"/>
-        <p:cNvGrpSpPr/>
-        <p:nvPr/>
-      </p:nvGrpSpPr>
-      <p:grpSpPr>
-        <a:xfrm>
-          <a:off x="0" y="0"/>
-          <a:ext cx="0" cy="0"/>
-          <a:chOff x="0" y="0"/>
-          <a:chExt cx="0" cy="0"/>
-        </a:xfrm>
-      </p:grpSpPr>
-      <p:sp>
-        <p:nvSpPr>
-          <p:cNvPr id="5" name="Rectángulo: esquinas redondeadas 4">
-            <a:extLst>
-              <a:ext uri="{FF2B5EF4-FFF2-40B4-BE49-F238E27FC236}">
-                <a16:creationId xmlns:a16="http://schemas.microsoft.com/office/drawing/2014/main" id="{B5F1ADFD-124A-4771-A1B8-1F4E5627381A}"/>
-              </a:ext>
-            </a:extLst>
-          </p:cNvPr>
-          <p:cNvSpPr/>
-          <p:nvPr/>
-        </p:nvSpPr>
-        <p:spPr>
-          <a:xfrm>
-            <a:off x="3329403" y="382250"/>
-            <a:ext cx="1947600" cy="509666"/>
-          </a:xfrm>
-          <a:prstGeom prst="roundRect">
-            <a:avLst/>
-          </a:prstGeom>
-          <a:noFill/>
-          <a:ln>
-            <a:solidFill>
-              <a:schemeClr val="accent3"/>
-            </a:solidFill>
-          </a:ln>
-        </p:spPr>
-        <p:style>
-          <a:lnRef idx="2">
-            <a:schemeClr val="accent1">
-              <a:shade val="50000"/>
-            </a:schemeClr>
-          </a:lnRef>
-          <a:fillRef idx="1">
-            <a:schemeClr val="accent1"/>
-          </a:fillRef>
-          <a:effectRef idx="0">
-            <a:schemeClr val="accent1"/>
-          </a:effectRef>
-          <a:fontRef idx="minor">
-            <a:schemeClr val="lt1"/>
-          </a:fontRef>
-        </p:style>
-        <p:txBody>
-          <a:bodyPr rtlCol="0" anchor="ctr"/>
-          <a:lstStyle/>
-          <a:p>
-            <a:pPr algn="ctr"/>
-            <a:r>
-              <a:rPr lang="es-MX" sz="2000" dirty="0" err="1">
-                <a:solidFill>
-                  <a:schemeClr val="accent2"/>
-                </a:solidFill>
-                <a:latin typeface="Proxima Nova" panose="020B0604020202020204" charset="0"/>
-              </a:rPr>
-              <a:t>workflow_set</a:t>
-            </a:r>
-            <a:r>
-              <a:rPr lang="es-MX" sz="2000" dirty="0">
-                <a:solidFill>
-                  <a:schemeClr val="accent2"/>
-                </a:solidFill>
-                <a:latin typeface="Proxima Nova" panose="020B0604020202020204" charset="0"/>
-              </a:rPr>
-              <a:t>()</a:t>
-            </a:r>
-            <a:endParaRPr lang="es-AR" sz="2000" dirty="0">
-              <a:solidFill>
-                <a:schemeClr val="accent2"/>
-              </a:solidFill>
-              <a:latin typeface="Proxima Nova" panose="020B0604020202020204" charset="0"/>
-            </a:endParaRPr>
-          </a:p>
-        </p:txBody>
-      </p:sp>
-      <p:sp>
-        <p:nvSpPr>
-          <p:cNvPr id="7" name="Rectángulo: esquinas redondeadas 6">
-            <a:extLst>
-              <a:ext uri="{FF2B5EF4-FFF2-40B4-BE49-F238E27FC236}">
-                <a16:creationId xmlns:a16="http://schemas.microsoft.com/office/drawing/2014/main" id="{A8A787CA-B489-4779-A5FC-F309DF3C6BFB}"/>
-              </a:ext>
-            </a:extLst>
-          </p:cNvPr>
-          <p:cNvSpPr/>
-          <p:nvPr/>
-        </p:nvSpPr>
-        <p:spPr>
-          <a:xfrm>
-            <a:off x="1058394" y="1823802"/>
-            <a:ext cx="1948723" cy="509666"/>
-          </a:xfrm>
-          <a:prstGeom prst="roundRect">
-            <a:avLst/>
-          </a:prstGeom>
-          <a:noFill/>
-          <a:ln>
-            <a:solidFill>
-              <a:schemeClr val="accent3"/>
-            </a:solidFill>
-          </a:ln>
-        </p:spPr>
-        <p:style>
-          <a:lnRef idx="2">
-            <a:schemeClr val="accent1">
-              <a:shade val="50000"/>
-            </a:schemeClr>
-          </a:lnRef>
-          <a:fillRef idx="1">
-            <a:schemeClr val="accent1"/>
-          </a:fillRef>
-          <a:effectRef idx="0">
-            <a:schemeClr val="accent1"/>
-          </a:effectRef>
-          <a:fontRef idx="minor">
-            <a:schemeClr val="lt1"/>
-          </a:fontRef>
-        </p:style>
-        <p:txBody>
-          <a:bodyPr rtlCol="0" anchor="ctr"/>
-          <a:lstStyle/>
-          <a:p>
-            <a:pPr algn="ctr"/>
-            <a:r>
-              <a:rPr lang="es-MX" sz="2000" dirty="0" err="1">
-                <a:solidFill>
-                  <a:schemeClr val="accent2"/>
-                </a:solidFill>
-                <a:latin typeface="Proxima Nova" panose="020B0604020202020204" charset="0"/>
-              </a:rPr>
-              <a:t>workflow</a:t>
-            </a:r>
-            <a:r>
-              <a:rPr lang="es-MX" sz="2000" dirty="0">
-                <a:solidFill>
-                  <a:schemeClr val="accent2"/>
-                </a:solidFill>
-                <a:latin typeface="Proxima Nova" panose="020B0604020202020204" charset="0"/>
-              </a:rPr>
-              <a:t>()</a:t>
-            </a:r>
-            <a:endParaRPr lang="es-AR" sz="2000" dirty="0">
-              <a:solidFill>
-                <a:schemeClr val="accent2"/>
-              </a:solidFill>
-              <a:latin typeface="Proxima Nova" panose="020B0604020202020204" charset="0"/>
-            </a:endParaRPr>
-          </a:p>
-        </p:txBody>
-      </p:sp>
-      <p:sp>
-        <p:nvSpPr>
-          <p:cNvPr id="8" name="Rectángulo: esquinas redondeadas 7">
-            <a:extLst>
-              <a:ext uri="{FF2B5EF4-FFF2-40B4-BE49-F238E27FC236}">
-                <a16:creationId xmlns:a16="http://schemas.microsoft.com/office/drawing/2014/main" id="{249CE5F6-F95F-462D-A74D-C78EB194E69C}"/>
-              </a:ext>
-            </a:extLst>
-          </p:cNvPr>
-          <p:cNvSpPr/>
-          <p:nvPr/>
-        </p:nvSpPr>
-        <p:spPr>
-          <a:xfrm>
-            <a:off x="3329403" y="1823802"/>
-            <a:ext cx="1948723" cy="509666"/>
-          </a:xfrm>
-          <a:prstGeom prst="roundRect">
-            <a:avLst/>
-          </a:prstGeom>
-          <a:noFill/>
-          <a:ln>
-            <a:solidFill>
-              <a:schemeClr val="accent3"/>
-            </a:solidFill>
-          </a:ln>
-        </p:spPr>
-        <p:style>
-          <a:lnRef idx="2">
-            <a:schemeClr val="accent1">
-              <a:shade val="50000"/>
-            </a:schemeClr>
-          </a:lnRef>
-          <a:fillRef idx="1">
-            <a:schemeClr val="accent1"/>
-          </a:fillRef>
-          <a:effectRef idx="0">
-            <a:schemeClr val="accent1"/>
-          </a:effectRef>
-          <a:fontRef idx="minor">
-            <a:schemeClr val="lt1"/>
-          </a:fontRef>
-        </p:style>
-        <p:txBody>
-          <a:bodyPr rtlCol="0" anchor="ctr"/>
-          <a:lstStyle/>
-          <a:p>
-            <a:pPr algn="ctr"/>
-            <a:r>
-              <a:rPr lang="es-MX" sz="2000" dirty="0" err="1">
-                <a:solidFill>
-                  <a:schemeClr val="accent2"/>
-                </a:solidFill>
-                <a:latin typeface="Proxima Nova" panose="020B0604020202020204" charset="0"/>
-              </a:rPr>
-              <a:t>workflow</a:t>
-            </a:r>
-            <a:r>
-              <a:rPr lang="es-MX" sz="2000" dirty="0">
-                <a:solidFill>
-                  <a:schemeClr val="accent2"/>
-                </a:solidFill>
-                <a:latin typeface="Proxima Nova" panose="020B0604020202020204" charset="0"/>
-              </a:rPr>
-              <a:t>()</a:t>
-            </a:r>
-            <a:endParaRPr lang="es-AR" sz="2000" dirty="0">
-              <a:solidFill>
-                <a:schemeClr val="accent2"/>
-              </a:solidFill>
-              <a:latin typeface="Proxima Nova" panose="020B0604020202020204" charset="0"/>
-            </a:endParaRPr>
-          </a:p>
-        </p:txBody>
-      </p:sp>
-      <p:sp>
-        <p:nvSpPr>
-          <p:cNvPr id="9" name="Rectángulo: esquinas redondeadas 8">
-            <a:extLst>
-              <a:ext uri="{FF2B5EF4-FFF2-40B4-BE49-F238E27FC236}">
-                <a16:creationId xmlns:a16="http://schemas.microsoft.com/office/drawing/2014/main" id="{00781763-53BC-4787-8C02-57940FDEE2D4}"/>
-              </a:ext>
-            </a:extLst>
-          </p:cNvPr>
-          <p:cNvSpPr/>
-          <p:nvPr/>
-        </p:nvSpPr>
-        <p:spPr>
-          <a:xfrm>
-            <a:off x="5600413" y="1823802"/>
-            <a:ext cx="1948723" cy="509666"/>
-          </a:xfrm>
-          <a:prstGeom prst="roundRect">
-            <a:avLst/>
-          </a:prstGeom>
-          <a:noFill/>
-          <a:ln>
-            <a:solidFill>
-              <a:schemeClr val="accent3"/>
-            </a:solidFill>
-          </a:ln>
-        </p:spPr>
-        <p:style>
-          <a:lnRef idx="2">
-            <a:schemeClr val="accent1">
-              <a:shade val="50000"/>
-            </a:schemeClr>
-          </a:lnRef>
-          <a:fillRef idx="1">
-            <a:schemeClr val="accent1"/>
-          </a:fillRef>
-          <a:effectRef idx="0">
-            <a:schemeClr val="accent1"/>
-          </a:effectRef>
-          <a:fontRef idx="minor">
-            <a:schemeClr val="lt1"/>
-          </a:fontRef>
-        </p:style>
-        <p:txBody>
-          <a:bodyPr rtlCol="0" anchor="ctr"/>
-          <a:lstStyle/>
-          <a:p>
-            <a:pPr algn="ctr"/>
-            <a:r>
-              <a:rPr lang="es-MX" sz="2000" dirty="0" err="1">
-                <a:solidFill>
-                  <a:schemeClr val="accent2"/>
-                </a:solidFill>
-                <a:latin typeface="Proxima Nova" panose="020B0604020202020204" charset="0"/>
-              </a:rPr>
-              <a:t>workflow</a:t>
-            </a:r>
-            <a:r>
-              <a:rPr lang="es-MX" sz="2000" dirty="0">
-                <a:solidFill>
-                  <a:schemeClr val="accent2"/>
-                </a:solidFill>
-                <a:latin typeface="Proxima Nova" panose="020B0604020202020204" charset="0"/>
-              </a:rPr>
-              <a:t>()</a:t>
-            </a:r>
-            <a:endParaRPr lang="es-AR" sz="2000" dirty="0">
-              <a:solidFill>
-                <a:schemeClr val="accent2"/>
-              </a:solidFill>
-              <a:latin typeface="Proxima Nova" panose="020B0604020202020204" charset="0"/>
-            </a:endParaRPr>
-          </a:p>
-        </p:txBody>
-      </p:sp>
-      <p:sp>
-        <p:nvSpPr>
-          <p:cNvPr id="10" name="Rectángulo: esquinas redondeadas 9">
-            <a:extLst>
-              <a:ext uri="{FF2B5EF4-FFF2-40B4-BE49-F238E27FC236}">
-                <a16:creationId xmlns:a16="http://schemas.microsoft.com/office/drawing/2014/main" id="{2AD61BE8-FB51-4870-968E-2A1F946B8575}"/>
-              </a:ext>
-            </a:extLst>
-          </p:cNvPr>
-          <p:cNvSpPr/>
-          <p:nvPr/>
-        </p:nvSpPr>
-        <p:spPr>
-          <a:xfrm>
-            <a:off x="1058394" y="2470878"/>
-            <a:ext cx="1948723" cy="509666"/>
-          </a:xfrm>
-          <a:prstGeom prst="roundRect">
-            <a:avLst/>
-          </a:prstGeom>
-          <a:noFill/>
-          <a:ln>
-            <a:solidFill>
-              <a:schemeClr val="accent3"/>
-            </a:solidFill>
-          </a:ln>
-        </p:spPr>
-        <p:style>
-          <a:lnRef idx="2">
-            <a:schemeClr val="accent1">
-              <a:shade val="50000"/>
-            </a:schemeClr>
-          </a:lnRef>
-          <a:fillRef idx="1">
-            <a:schemeClr val="accent1"/>
-          </a:fillRef>
-          <a:effectRef idx="0">
-            <a:schemeClr val="accent1"/>
-          </a:effectRef>
-          <a:fontRef idx="minor">
-            <a:schemeClr val="lt1"/>
-          </a:fontRef>
-        </p:style>
-        <p:txBody>
-          <a:bodyPr rtlCol="0" anchor="ctr"/>
-          <a:lstStyle/>
-          <a:p>
-            <a:pPr algn="ctr"/>
-            <a:r>
-              <a:rPr lang="es-MX" sz="2000" dirty="0" err="1">
-                <a:solidFill>
-                  <a:schemeClr val="accent2"/>
-                </a:solidFill>
-                <a:latin typeface="Proxima Nova" panose="020B0604020202020204" charset="0"/>
-              </a:rPr>
-              <a:t>add_model</a:t>
-            </a:r>
-            <a:r>
-              <a:rPr lang="es-MX" sz="2000" dirty="0">
-                <a:solidFill>
-                  <a:schemeClr val="accent2"/>
-                </a:solidFill>
-                <a:latin typeface="Proxima Nova" panose="020B0604020202020204" charset="0"/>
-              </a:rPr>
-              <a:t>()</a:t>
-            </a:r>
-            <a:endParaRPr lang="es-AR" sz="2000" dirty="0">
-              <a:solidFill>
-                <a:schemeClr val="accent2"/>
-              </a:solidFill>
-              <a:latin typeface="Proxima Nova" panose="020B0604020202020204" charset="0"/>
-            </a:endParaRPr>
-          </a:p>
-        </p:txBody>
-      </p:sp>
-      <p:sp>
-        <p:nvSpPr>
-          <p:cNvPr id="11" name="Rectángulo: esquinas redondeadas 10">
-            <a:extLst>
-              <a:ext uri="{FF2B5EF4-FFF2-40B4-BE49-F238E27FC236}">
-                <a16:creationId xmlns:a16="http://schemas.microsoft.com/office/drawing/2014/main" id="{B578388D-FCFB-454C-841B-34B17EA0ECAF}"/>
-              </a:ext>
-            </a:extLst>
-          </p:cNvPr>
-          <p:cNvSpPr/>
-          <p:nvPr/>
-        </p:nvSpPr>
-        <p:spPr>
-          <a:xfrm>
-            <a:off x="3329403" y="2470878"/>
-            <a:ext cx="1948723" cy="509666"/>
-          </a:xfrm>
-          <a:prstGeom prst="roundRect">
-            <a:avLst/>
-          </a:prstGeom>
-          <a:noFill/>
-          <a:ln>
-            <a:solidFill>
-              <a:schemeClr val="accent3"/>
-            </a:solidFill>
-          </a:ln>
-        </p:spPr>
-        <p:style>
-          <a:lnRef idx="2">
-            <a:schemeClr val="accent1">
-              <a:shade val="50000"/>
-            </a:schemeClr>
-          </a:lnRef>
-          <a:fillRef idx="1">
-            <a:schemeClr val="accent1"/>
-          </a:fillRef>
-          <a:effectRef idx="0">
-            <a:schemeClr val="accent1"/>
-          </a:effectRef>
-          <a:fontRef idx="minor">
-            <a:schemeClr val="lt1"/>
-          </a:fontRef>
-        </p:style>
-        <p:txBody>
-          <a:bodyPr rtlCol="0" anchor="ctr"/>
-          <a:lstStyle/>
-          <a:p>
-            <a:pPr algn="ctr"/>
-            <a:r>
-              <a:rPr lang="es-MX" sz="2000" dirty="0" err="1">
-                <a:solidFill>
-                  <a:schemeClr val="accent2"/>
-                </a:solidFill>
-                <a:latin typeface="Proxima Nova" panose="020B0604020202020204" charset="0"/>
-              </a:rPr>
-              <a:t>add_model</a:t>
-            </a:r>
-            <a:r>
-              <a:rPr lang="es-MX" sz="2000" dirty="0">
-                <a:solidFill>
-                  <a:schemeClr val="accent2"/>
-                </a:solidFill>
-                <a:latin typeface="Proxima Nova" panose="020B0604020202020204" charset="0"/>
-              </a:rPr>
-              <a:t>()</a:t>
-            </a:r>
-            <a:endParaRPr lang="es-AR" sz="2000" dirty="0">
-              <a:solidFill>
-                <a:schemeClr val="accent2"/>
-              </a:solidFill>
-              <a:latin typeface="Proxima Nova" panose="020B0604020202020204" charset="0"/>
-            </a:endParaRPr>
-          </a:p>
-        </p:txBody>
-      </p:sp>
-      <p:sp>
-        <p:nvSpPr>
-          <p:cNvPr id="12" name="Rectángulo: esquinas redondeadas 11">
-            <a:extLst>
-              <a:ext uri="{FF2B5EF4-FFF2-40B4-BE49-F238E27FC236}">
-                <a16:creationId xmlns:a16="http://schemas.microsoft.com/office/drawing/2014/main" id="{CCABEB81-B0EF-4D6E-B700-7F98246D32D2}"/>
-              </a:ext>
-            </a:extLst>
-          </p:cNvPr>
-          <p:cNvSpPr/>
-          <p:nvPr/>
-        </p:nvSpPr>
-        <p:spPr>
-          <a:xfrm>
-            <a:off x="5600413" y="2470878"/>
-            <a:ext cx="1948723" cy="509666"/>
-          </a:xfrm>
-          <a:prstGeom prst="roundRect">
-            <a:avLst/>
-          </a:prstGeom>
-          <a:noFill/>
-          <a:ln>
-            <a:solidFill>
-              <a:schemeClr val="accent3"/>
-            </a:solidFill>
-          </a:ln>
-        </p:spPr>
-        <p:style>
-          <a:lnRef idx="2">
-            <a:schemeClr val="accent1">
-              <a:shade val="50000"/>
-            </a:schemeClr>
-          </a:lnRef>
-          <a:fillRef idx="1">
-            <a:schemeClr val="accent1"/>
-          </a:fillRef>
-          <a:effectRef idx="0">
-            <a:schemeClr val="accent1"/>
-          </a:effectRef>
-          <a:fontRef idx="minor">
-            <a:schemeClr val="lt1"/>
-          </a:fontRef>
-        </p:style>
-        <p:txBody>
-          <a:bodyPr rtlCol="0" anchor="ctr"/>
-          <a:lstStyle/>
-          <a:p>
-            <a:pPr algn="ctr"/>
-            <a:r>
-              <a:rPr lang="es-MX" sz="2000" dirty="0" err="1">
-                <a:solidFill>
-                  <a:schemeClr val="accent2"/>
-                </a:solidFill>
-                <a:latin typeface="Proxima Nova" panose="020B0604020202020204" charset="0"/>
-              </a:rPr>
-              <a:t>add_model</a:t>
-            </a:r>
-            <a:r>
-              <a:rPr lang="es-MX" sz="2000" dirty="0">
-                <a:solidFill>
-                  <a:schemeClr val="accent2"/>
-                </a:solidFill>
-                <a:latin typeface="Proxima Nova" panose="020B0604020202020204" charset="0"/>
-              </a:rPr>
-              <a:t>()</a:t>
-            </a:r>
-            <a:endParaRPr lang="es-AR" sz="2000" dirty="0">
-              <a:solidFill>
-                <a:schemeClr val="accent2"/>
-              </a:solidFill>
-              <a:latin typeface="Proxima Nova" panose="020B0604020202020204" charset="0"/>
-            </a:endParaRPr>
-          </a:p>
-        </p:txBody>
-      </p:sp>
-      <p:sp>
-        <p:nvSpPr>
-          <p:cNvPr id="13" name="Rectángulo: esquinas redondeadas 12">
-            <a:extLst>
-              <a:ext uri="{FF2B5EF4-FFF2-40B4-BE49-F238E27FC236}">
-                <a16:creationId xmlns:a16="http://schemas.microsoft.com/office/drawing/2014/main" id="{55771EAD-A082-418F-85F5-6E2CE8F126E3}"/>
-              </a:ext>
-            </a:extLst>
-          </p:cNvPr>
-          <p:cNvSpPr/>
-          <p:nvPr/>
-        </p:nvSpPr>
-        <p:spPr>
-          <a:xfrm>
-            <a:off x="1058394" y="3117954"/>
-            <a:ext cx="1948723" cy="509666"/>
-          </a:xfrm>
-          <a:prstGeom prst="roundRect">
-            <a:avLst/>
-          </a:prstGeom>
-          <a:noFill/>
-          <a:ln>
-            <a:solidFill>
-              <a:schemeClr val="accent3"/>
-            </a:solidFill>
-          </a:ln>
-        </p:spPr>
-        <p:style>
-          <a:lnRef idx="2">
-            <a:schemeClr val="accent1">
-              <a:shade val="50000"/>
-            </a:schemeClr>
-          </a:lnRef>
-          <a:fillRef idx="1">
-            <a:schemeClr val="accent1"/>
-          </a:fillRef>
-          <a:effectRef idx="0">
-            <a:schemeClr val="accent1"/>
-          </a:effectRef>
-          <a:fontRef idx="minor">
-            <a:schemeClr val="lt1"/>
-          </a:fontRef>
-        </p:style>
-        <p:txBody>
-          <a:bodyPr rtlCol="0" anchor="ctr"/>
-          <a:lstStyle/>
-          <a:p>
-            <a:pPr algn="ctr"/>
-            <a:r>
-              <a:rPr lang="es-MX" sz="2000" dirty="0" err="1">
-                <a:solidFill>
-                  <a:schemeClr val="accent2"/>
-                </a:solidFill>
-                <a:latin typeface="Proxima Nova" panose="020B0604020202020204" charset="0"/>
-              </a:rPr>
-              <a:t>add_recipe</a:t>
-            </a:r>
-            <a:r>
-              <a:rPr lang="es-MX" sz="2000" dirty="0">
-                <a:solidFill>
-                  <a:schemeClr val="accent2"/>
-                </a:solidFill>
-                <a:latin typeface="Proxima Nova" panose="020B0604020202020204" charset="0"/>
-              </a:rPr>
-              <a:t>()</a:t>
-            </a:r>
-            <a:endParaRPr lang="es-AR" sz="2000" dirty="0">
-              <a:solidFill>
-                <a:schemeClr val="accent2"/>
-              </a:solidFill>
-              <a:latin typeface="Proxima Nova" panose="020B0604020202020204" charset="0"/>
-            </a:endParaRPr>
-          </a:p>
-        </p:txBody>
-      </p:sp>
-      <p:sp>
-        <p:nvSpPr>
-          <p:cNvPr id="14" name="Rectángulo: esquinas redondeadas 13">
-            <a:extLst>
-              <a:ext uri="{FF2B5EF4-FFF2-40B4-BE49-F238E27FC236}">
-                <a16:creationId xmlns:a16="http://schemas.microsoft.com/office/drawing/2014/main" id="{F7A954A3-E6A2-4944-B7E8-80652337BA66}"/>
-              </a:ext>
-            </a:extLst>
-          </p:cNvPr>
-          <p:cNvSpPr/>
-          <p:nvPr/>
-        </p:nvSpPr>
-        <p:spPr>
-          <a:xfrm>
-            <a:off x="3329403" y="3117954"/>
-            <a:ext cx="1948723" cy="509666"/>
-          </a:xfrm>
-          <a:prstGeom prst="roundRect">
-            <a:avLst/>
-          </a:prstGeom>
-          <a:noFill/>
-          <a:ln>
-            <a:solidFill>
-              <a:schemeClr val="accent3"/>
-            </a:solidFill>
-          </a:ln>
-        </p:spPr>
-        <p:style>
-          <a:lnRef idx="2">
-            <a:schemeClr val="accent1">
-              <a:shade val="50000"/>
-            </a:schemeClr>
-          </a:lnRef>
-          <a:fillRef idx="1">
-            <a:schemeClr val="accent1"/>
-          </a:fillRef>
-          <a:effectRef idx="0">
-            <a:schemeClr val="accent1"/>
-          </a:effectRef>
-          <a:fontRef idx="minor">
-            <a:schemeClr val="lt1"/>
-          </a:fontRef>
-        </p:style>
-        <p:txBody>
-          <a:bodyPr rtlCol="0" anchor="ctr"/>
-          <a:lstStyle/>
-          <a:p>
-            <a:pPr algn="ctr"/>
-            <a:r>
-              <a:rPr lang="es-MX" sz="2000" dirty="0" err="1">
-                <a:solidFill>
-                  <a:schemeClr val="accent2"/>
-                </a:solidFill>
-                <a:latin typeface="Proxima Nova" panose="020B0604020202020204" charset="0"/>
-              </a:rPr>
-              <a:t>add_formula</a:t>
-            </a:r>
-            <a:r>
-              <a:rPr lang="es-MX" sz="2000" dirty="0">
-                <a:solidFill>
-                  <a:schemeClr val="accent2"/>
-                </a:solidFill>
-                <a:latin typeface="Proxima Nova" panose="020B0604020202020204" charset="0"/>
-              </a:rPr>
-              <a:t>()</a:t>
-            </a:r>
-            <a:endParaRPr lang="es-AR" sz="2000" dirty="0">
-              <a:solidFill>
-                <a:schemeClr val="accent2"/>
-              </a:solidFill>
-              <a:latin typeface="Proxima Nova" panose="020B0604020202020204" charset="0"/>
-            </a:endParaRPr>
-          </a:p>
-        </p:txBody>
-      </p:sp>
-      <p:sp>
-        <p:nvSpPr>
-          <p:cNvPr id="15" name="Rectángulo: esquinas redondeadas 14">
-            <a:extLst>
-              <a:ext uri="{FF2B5EF4-FFF2-40B4-BE49-F238E27FC236}">
-                <a16:creationId xmlns:a16="http://schemas.microsoft.com/office/drawing/2014/main" id="{DE6E9040-F929-4089-BFED-89BB58022E02}"/>
-              </a:ext>
-            </a:extLst>
-          </p:cNvPr>
-          <p:cNvSpPr/>
-          <p:nvPr/>
-        </p:nvSpPr>
-        <p:spPr>
-          <a:xfrm>
-            <a:off x="5600413" y="3117954"/>
-            <a:ext cx="1948723" cy="509666"/>
-          </a:xfrm>
-          <a:prstGeom prst="roundRect">
-            <a:avLst/>
-          </a:prstGeom>
-          <a:noFill/>
-          <a:ln>
-            <a:solidFill>
-              <a:schemeClr val="accent3"/>
-            </a:solidFill>
-          </a:ln>
-        </p:spPr>
-        <p:style>
-          <a:lnRef idx="2">
-            <a:schemeClr val="accent1">
-              <a:shade val="50000"/>
-            </a:schemeClr>
-          </a:lnRef>
-          <a:fillRef idx="1">
-            <a:schemeClr val="accent1"/>
-          </a:fillRef>
-          <a:effectRef idx="0">
-            <a:schemeClr val="accent1"/>
-          </a:effectRef>
-          <a:fontRef idx="minor">
-            <a:schemeClr val="lt1"/>
-          </a:fontRef>
-        </p:style>
-        <p:txBody>
-          <a:bodyPr rtlCol="0" anchor="ctr"/>
-          <a:lstStyle/>
-          <a:p>
-            <a:pPr algn="ctr"/>
-            <a:r>
-              <a:rPr lang="es-MX" sz="2000" dirty="0" err="1">
-                <a:solidFill>
-                  <a:schemeClr val="accent2"/>
-                </a:solidFill>
-                <a:latin typeface="Proxima Nova" panose="020B0604020202020204" charset="0"/>
-              </a:rPr>
-              <a:t>add_recipe</a:t>
-            </a:r>
-            <a:r>
-              <a:rPr lang="es-MX" sz="2000" dirty="0">
-                <a:solidFill>
-                  <a:schemeClr val="accent2"/>
-                </a:solidFill>
-                <a:latin typeface="Proxima Nova" panose="020B0604020202020204" charset="0"/>
-              </a:rPr>
-              <a:t>()</a:t>
-            </a:r>
-            <a:endParaRPr lang="es-AR" sz="2000" dirty="0">
-              <a:solidFill>
-                <a:schemeClr val="accent2"/>
-              </a:solidFill>
-              <a:latin typeface="Proxima Nova" panose="020B0604020202020204" charset="0"/>
-            </a:endParaRPr>
-          </a:p>
-        </p:txBody>
-      </p:sp>
-      <p:cxnSp>
-        <p:nvCxnSpPr>
-          <p:cNvPr id="19" name="Conector recto de flecha 18">
-            <a:extLst>
-              <a:ext uri="{FF2B5EF4-FFF2-40B4-BE49-F238E27FC236}">
-                <a16:creationId xmlns:a16="http://schemas.microsoft.com/office/drawing/2014/main" id="{8E350DD8-3A44-49E6-B39A-B5F9FBDBE02A}"/>
-              </a:ext>
-            </a:extLst>
-          </p:cNvPr>
-          <p:cNvCxnSpPr>
-            <a:stCxn id="5" idx="2"/>
-            <a:endCxn id="7" idx="0"/>
-          </p:cNvCxnSpPr>
-          <p:nvPr/>
-        </p:nvCxnSpPr>
-        <p:spPr>
-          <a:xfrm flipH="1">
-            <a:off x="2032756" y="891916"/>
-            <a:ext cx="2270447" cy="931886"/>
-          </a:xfrm>
-          <a:prstGeom prst="straightConnector1">
-            <a:avLst/>
-          </a:prstGeom>
-          <a:ln>
-            <a:tailEnd type="triangle"/>
-          </a:ln>
-        </p:spPr>
-        <p:style>
-          <a:lnRef idx="1">
-            <a:schemeClr val="accent1"/>
-          </a:lnRef>
-          <a:fillRef idx="0">
-            <a:schemeClr val="accent1"/>
-          </a:fillRef>
-          <a:effectRef idx="0">
-            <a:schemeClr val="accent1"/>
-          </a:effectRef>
-          <a:fontRef idx="minor">
-            <a:schemeClr val="tx1"/>
-          </a:fontRef>
-        </p:style>
-      </p:cxnSp>
-      <p:cxnSp>
-        <p:nvCxnSpPr>
-          <p:cNvPr id="21" name="Conector recto de flecha 20">
-            <a:extLst>
-              <a:ext uri="{FF2B5EF4-FFF2-40B4-BE49-F238E27FC236}">
-                <a16:creationId xmlns:a16="http://schemas.microsoft.com/office/drawing/2014/main" id="{AD53D817-D836-4315-9887-6B5D9BBD543A}"/>
-              </a:ext>
-            </a:extLst>
-          </p:cNvPr>
-          <p:cNvCxnSpPr>
-            <a:stCxn id="5" idx="2"/>
-            <a:endCxn id="8" idx="0"/>
-          </p:cNvCxnSpPr>
-          <p:nvPr/>
-        </p:nvCxnSpPr>
-        <p:spPr>
-          <a:xfrm>
-            <a:off x="4303203" y="891916"/>
-            <a:ext cx="562" cy="931886"/>
-          </a:xfrm>
-          <a:prstGeom prst="straightConnector1">
-            <a:avLst/>
-          </a:prstGeom>
-          <a:ln>
-            <a:tailEnd type="triangle"/>
-          </a:ln>
-        </p:spPr>
-        <p:style>
-          <a:lnRef idx="1">
-            <a:schemeClr val="accent1"/>
-          </a:lnRef>
-          <a:fillRef idx="0">
-            <a:schemeClr val="accent1"/>
-          </a:fillRef>
-          <a:effectRef idx="0">
-            <a:schemeClr val="accent1"/>
-          </a:effectRef>
-          <a:fontRef idx="minor">
-            <a:schemeClr val="tx1"/>
-          </a:fontRef>
-        </p:style>
-      </p:cxnSp>
-      <p:cxnSp>
-        <p:nvCxnSpPr>
-          <p:cNvPr id="23" name="Conector recto de flecha 22">
-            <a:extLst>
-              <a:ext uri="{FF2B5EF4-FFF2-40B4-BE49-F238E27FC236}">
-                <a16:creationId xmlns:a16="http://schemas.microsoft.com/office/drawing/2014/main" id="{7B9D299F-9C70-4AA5-A45F-D76EFD8CF15C}"/>
-              </a:ext>
-            </a:extLst>
-          </p:cNvPr>
-          <p:cNvCxnSpPr>
-            <a:stCxn id="5" idx="2"/>
-            <a:endCxn id="9" idx="0"/>
-          </p:cNvCxnSpPr>
-          <p:nvPr/>
-        </p:nvCxnSpPr>
-        <p:spPr>
-          <a:xfrm>
-            <a:off x="4303203" y="891916"/>
-            <a:ext cx="2271572" cy="931886"/>
-          </a:xfrm>
-          <a:prstGeom prst="straightConnector1">
-            <a:avLst/>
-          </a:prstGeom>
-          <a:ln>
-            <a:tailEnd type="triangle"/>
-          </a:ln>
-        </p:spPr>
-        <p:style>
-          <a:lnRef idx="1">
-            <a:schemeClr val="accent1"/>
-          </a:lnRef>
-          <a:fillRef idx="0">
-            <a:schemeClr val="accent1"/>
-          </a:fillRef>
-          <a:effectRef idx="0">
-            <a:schemeClr val="accent1"/>
-          </a:effectRef>
-          <a:fontRef idx="minor">
-            <a:schemeClr val="tx1"/>
-          </a:fontRef>
-        </p:style>
-      </p:cxnSp>
-    </p:spTree>
-    <p:extLst>
-      <p:ext uri="{BB962C8B-B14F-4D97-AF65-F5344CB8AC3E}">
-        <p14:creationId xmlns:p14="http://schemas.microsoft.com/office/powerpoint/2010/main" val="3365813946"/>
-      </p:ext>
-    </p:extLst>
-  </p:cSld>
-  <p:clrMapOvr>
-    <a:masterClrMapping/>
-  </p:clrMapOvr>
-</p:sld>
-</file>
-
-<file path=ppt/slides/slide5.xml><?xml version="1.0" encoding="utf-8"?>
-<p:sld xmlns:a="http://schemas.openxmlformats.org/drawingml/2006/main" xmlns:r="http://schemas.openxmlformats.org/officeDocument/2006/relationships" xmlns:p="http://schemas.openxmlformats.org/presentationml/2006/main">
-  <p:cSld>
-    <p:bg>
-      <p:bgPr>
-        <a:pattFill prst="pct50">
-          <a:fgClr>
-            <a:schemeClr val="lt2"/>
-          </a:fgClr>
-          <a:bgClr>
-            <a:schemeClr val="bg1"/>
-          </a:bgClr>
-        </a:pattFill>
-        <a:effectLst/>
-      </p:bgPr>
-    </p:bg>
-    <p:spTree>
-      <p:nvGrpSpPr>
-        <p:cNvPr id="1" name="Shape 227"/>
-        <p:cNvGrpSpPr/>
-        <p:nvPr/>
-      </p:nvGrpSpPr>
-      <p:grpSpPr>
-        <a:xfrm>
-          <a:off x="0" y="0"/>
-          <a:ext cx="0" cy="0"/>
-          <a:chOff x="0" y="0"/>
-          <a:chExt cx="0" cy="0"/>
-        </a:xfrm>
-      </p:grpSpPr>
-      <p:sp>
-        <p:nvSpPr>
-          <p:cNvPr id="5" name="Rectángulo: esquinas redondeadas 4">
-            <a:extLst>
-              <a:ext uri="{FF2B5EF4-FFF2-40B4-BE49-F238E27FC236}">
-                <a16:creationId xmlns:a16="http://schemas.microsoft.com/office/drawing/2014/main" id="{B5F1ADFD-124A-4771-A1B8-1F4E5627381A}"/>
-              </a:ext>
-            </a:extLst>
-          </p:cNvPr>
-          <p:cNvSpPr/>
-          <p:nvPr/>
-        </p:nvSpPr>
-        <p:spPr>
-          <a:xfrm>
-            <a:off x="3329403" y="382250"/>
-            <a:ext cx="1947600" cy="509666"/>
-          </a:xfrm>
-          <a:prstGeom prst="roundRect">
-            <a:avLst/>
-          </a:prstGeom>
-          <a:noFill/>
-          <a:ln>
-            <a:solidFill>
-              <a:schemeClr val="accent3"/>
-            </a:solidFill>
-          </a:ln>
-        </p:spPr>
-        <p:style>
-          <a:lnRef idx="2">
-            <a:schemeClr val="accent1">
-              <a:shade val="50000"/>
-            </a:schemeClr>
-          </a:lnRef>
-          <a:fillRef idx="1">
-            <a:schemeClr val="accent1"/>
-          </a:fillRef>
-          <a:effectRef idx="0">
-            <a:schemeClr val="accent1"/>
-          </a:effectRef>
-          <a:fontRef idx="minor">
-            <a:schemeClr val="lt1"/>
-          </a:fontRef>
-        </p:style>
-        <p:txBody>
-          <a:bodyPr rtlCol="0" anchor="ctr"/>
-          <a:lstStyle/>
-          <a:p>
-            <a:pPr algn="ctr"/>
-            <a:r>
-              <a:rPr lang="es-MX" sz="2000" dirty="0" err="1">
-                <a:solidFill>
-                  <a:schemeClr val="accent2"/>
-                </a:solidFill>
-                <a:latin typeface="Proxima Nova" panose="020B0604020202020204" charset="0"/>
-              </a:rPr>
-              <a:t>workflow_set</a:t>
-            </a:r>
-            <a:r>
-              <a:rPr lang="es-MX" sz="2000" dirty="0">
-                <a:solidFill>
-                  <a:schemeClr val="accent2"/>
-                </a:solidFill>
-                <a:latin typeface="Proxima Nova" panose="020B0604020202020204" charset="0"/>
-              </a:rPr>
-              <a:t>()</a:t>
-            </a:r>
-            <a:endParaRPr lang="es-AR" sz="2000" dirty="0">
-              <a:solidFill>
-                <a:schemeClr val="accent2"/>
-              </a:solidFill>
-              <a:latin typeface="Proxima Nova" panose="020B0604020202020204" charset="0"/>
-            </a:endParaRPr>
-          </a:p>
-        </p:txBody>
-      </p:sp>
-      <p:sp>
-        <p:nvSpPr>
-          <p:cNvPr id="7" name="Rectángulo: esquinas redondeadas 6">
-            <a:extLst>
-              <a:ext uri="{FF2B5EF4-FFF2-40B4-BE49-F238E27FC236}">
-                <a16:creationId xmlns:a16="http://schemas.microsoft.com/office/drawing/2014/main" id="{A8A787CA-B489-4779-A5FC-F309DF3C6BFB}"/>
-              </a:ext>
-            </a:extLst>
-          </p:cNvPr>
-          <p:cNvSpPr/>
-          <p:nvPr/>
-        </p:nvSpPr>
-        <p:spPr>
-          <a:xfrm>
-            <a:off x="1058394" y="1823802"/>
-            <a:ext cx="1948723" cy="509666"/>
-          </a:xfrm>
-          <a:prstGeom prst="roundRect">
-            <a:avLst/>
-          </a:prstGeom>
-          <a:noFill/>
-          <a:ln>
-            <a:solidFill>
-              <a:schemeClr val="accent3"/>
-            </a:solidFill>
-          </a:ln>
-        </p:spPr>
-        <p:style>
-          <a:lnRef idx="2">
-            <a:schemeClr val="accent1">
-              <a:shade val="50000"/>
-            </a:schemeClr>
-          </a:lnRef>
-          <a:fillRef idx="1">
-            <a:schemeClr val="accent1"/>
-          </a:fillRef>
-          <a:effectRef idx="0">
-            <a:schemeClr val="accent1"/>
-          </a:effectRef>
-          <a:fontRef idx="minor">
-            <a:schemeClr val="lt1"/>
-          </a:fontRef>
-        </p:style>
-        <p:txBody>
-          <a:bodyPr rtlCol="0" anchor="ctr"/>
-          <a:lstStyle/>
-          <a:p>
-            <a:pPr algn="ctr"/>
-            <a:r>
-              <a:rPr lang="es-MX" sz="2000" dirty="0" err="1">
-                <a:solidFill>
-                  <a:schemeClr val="accent2"/>
-                </a:solidFill>
-                <a:latin typeface="Proxima Nova" panose="020B0604020202020204" charset="0"/>
-              </a:rPr>
-              <a:t>preproc</a:t>
-            </a:r>
-            <a:endParaRPr lang="es-AR" sz="2000" dirty="0">
-              <a:solidFill>
-                <a:schemeClr val="accent2"/>
-              </a:solidFill>
-              <a:latin typeface="Proxima Nova" panose="020B0604020202020204" charset="0"/>
-            </a:endParaRPr>
-          </a:p>
-        </p:txBody>
-      </p:sp>
-      <p:sp>
-        <p:nvSpPr>
-          <p:cNvPr id="8" name="Rectángulo: esquinas redondeadas 7">
-            <a:extLst>
-              <a:ext uri="{FF2B5EF4-FFF2-40B4-BE49-F238E27FC236}">
-                <a16:creationId xmlns:a16="http://schemas.microsoft.com/office/drawing/2014/main" id="{249CE5F6-F95F-462D-A74D-C78EB194E69C}"/>
-              </a:ext>
-            </a:extLst>
-          </p:cNvPr>
-          <p:cNvSpPr/>
-          <p:nvPr/>
-        </p:nvSpPr>
-        <p:spPr>
-          <a:xfrm>
-            <a:off x="3329403" y="1823802"/>
-            <a:ext cx="1948723" cy="509666"/>
-          </a:xfrm>
-          <a:prstGeom prst="roundRect">
-            <a:avLst/>
-          </a:prstGeom>
-          <a:noFill/>
-          <a:ln>
-            <a:solidFill>
-              <a:schemeClr val="accent3"/>
-            </a:solidFill>
-          </a:ln>
-        </p:spPr>
-        <p:style>
-          <a:lnRef idx="2">
-            <a:schemeClr val="accent1">
-              <a:shade val="50000"/>
-            </a:schemeClr>
-          </a:lnRef>
-          <a:fillRef idx="1">
-            <a:schemeClr val="accent1"/>
-          </a:fillRef>
-          <a:effectRef idx="0">
-            <a:schemeClr val="accent1"/>
-          </a:effectRef>
-          <a:fontRef idx="minor">
-            <a:schemeClr val="lt1"/>
-          </a:fontRef>
-        </p:style>
-        <p:txBody>
-          <a:bodyPr rtlCol="0" anchor="ctr"/>
-          <a:lstStyle/>
-          <a:p>
-            <a:pPr algn="ctr"/>
-            <a:r>
-              <a:rPr lang="es-MX" sz="2000" dirty="0" err="1">
-                <a:solidFill>
-                  <a:schemeClr val="accent2"/>
-                </a:solidFill>
-                <a:latin typeface="Proxima Nova" panose="020B0604020202020204" charset="0"/>
-              </a:rPr>
-              <a:t>models</a:t>
-            </a:r>
-            <a:endParaRPr lang="es-AR" sz="2000" dirty="0">
-              <a:solidFill>
-                <a:schemeClr val="accent2"/>
-              </a:solidFill>
-              <a:latin typeface="Proxima Nova" panose="020B0604020202020204" charset="0"/>
-            </a:endParaRPr>
-          </a:p>
-        </p:txBody>
-      </p:sp>
-      <p:sp>
-        <p:nvSpPr>
-          <p:cNvPr id="9" name="Rectángulo: esquinas redondeadas 8">
-            <a:extLst>
-              <a:ext uri="{FF2B5EF4-FFF2-40B4-BE49-F238E27FC236}">
-                <a16:creationId xmlns:a16="http://schemas.microsoft.com/office/drawing/2014/main" id="{00781763-53BC-4787-8C02-57940FDEE2D4}"/>
-              </a:ext>
-            </a:extLst>
-          </p:cNvPr>
-          <p:cNvSpPr/>
-          <p:nvPr/>
-        </p:nvSpPr>
-        <p:spPr>
-          <a:xfrm>
-            <a:off x="5600413" y="1823802"/>
-            <a:ext cx="1948723" cy="509666"/>
-          </a:xfrm>
-          <a:prstGeom prst="roundRect">
-            <a:avLst/>
-          </a:prstGeom>
-          <a:noFill/>
-          <a:ln>
-            <a:solidFill>
-              <a:schemeClr val="accent3"/>
-            </a:solidFill>
-          </a:ln>
-        </p:spPr>
-        <p:style>
-          <a:lnRef idx="2">
-            <a:schemeClr val="accent1">
-              <a:shade val="50000"/>
-            </a:schemeClr>
-          </a:lnRef>
-          <a:fillRef idx="1">
-            <a:schemeClr val="accent1"/>
-          </a:fillRef>
-          <a:effectRef idx="0">
-            <a:schemeClr val="accent1"/>
-          </a:effectRef>
-          <a:fontRef idx="minor">
-            <a:schemeClr val="lt1"/>
-          </a:fontRef>
-        </p:style>
-        <p:txBody>
-          <a:bodyPr rtlCol="0" anchor="ctr"/>
-          <a:lstStyle/>
-          <a:p>
-            <a:pPr algn="ctr"/>
-            <a:r>
-              <a:rPr lang="es-MX" sz="2000" dirty="0" err="1">
-                <a:solidFill>
-                  <a:schemeClr val="accent2"/>
-                </a:solidFill>
-                <a:latin typeface="Proxima Nova" panose="020B0604020202020204" charset="0"/>
-              </a:rPr>
-              <a:t>cross</a:t>
-            </a:r>
-            <a:endParaRPr lang="es-AR" sz="2000" dirty="0">
-              <a:solidFill>
-                <a:schemeClr val="accent2"/>
-              </a:solidFill>
-              <a:latin typeface="Proxima Nova" panose="020B0604020202020204" charset="0"/>
-            </a:endParaRPr>
-          </a:p>
-        </p:txBody>
-      </p:sp>
-      <p:sp>
-        <p:nvSpPr>
-          <p:cNvPr id="10" name="Rectángulo: esquinas redondeadas 9">
-            <a:extLst>
-              <a:ext uri="{FF2B5EF4-FFF2-40B4-BE49-F238E27FC236}">
-                <a16:creationId xmlns:a16="http://schemas.microsoft.com/office/drawing/2014/main" id="{2AD61BE8-FB51-4870-968E-2A1F946B8575}"/>
-              </a:ext>
-            </a:extLst>
-          </p:cNvPr>
-          <p:cNvSpPr/>
-          <p:nvPr/>
-        </p:nvSpPr>
-        <p:spPr>
-          <a:xfrm>
-            <a:off x="1520317" y="2470878"/>
-            <a:ext cx="1486800" cy="509666"/>
-          </a:xfrm>
-          <a:prstGeom prst="roundRect">
-            <a:avLst/>
-          </a:prstGeom>
-          <a:noFill/>
-          <a:ln>
-            <a:noFill/>
-          </a:ln>
-        </p:spPr>
-        <p:style>
-          <a:lnRef idx="2">
-            <a:schemeClr val="accent1">
-              <a:shade val="50000"/>
-            </a:schemeClr>
-          </a:lnRef>
-          <a:fillRef idx="1">
-            <a:schemeClr val="accent1"/>
-          </a:fillRef>
-          <a:effectRef idx="0">
-            <a:schemeClr val="accent1"/>
-          </a:effectRef>
-          <a:fontRef idx="minor">
-            <a:schemeClr val="lt1"/>
-          </a:fontRef>
-        </p:style>
-        <p:txBody>
-          <a:bodyPr rtlCol="0" anchor="ctr"/>
-          <a:lstStyle/>
-          <a:p>
-            <a:r>
-              <a:rPr lang="es-MX" sz="1200" dirty="0">
-                <a:solidFill>
-                  <a:schemeClr val="accent2"/>
-                </a:solidFill>
-                <a:latin typeface="Proxima Nova" panose="020B0604020202020204" charset="0"/>
-              </a:rPr>
-              <a:t>- Lista de </a:t>
-            </a:r>
-            <a:r>
-              <a:rPr lang="es-MX" sz="1200" dirty="0" err="1">
-                <a:solidFill>
-                  <a:schemeClr val="accent2"/>
-                </a:solidFill>
-                <a:latin typeface="Proxima Nova" panose="020B0604020202020204" charset="0"/>
-              </a:rPr>
-              <a:t>preproc</a:t>
-            </a:r>
-            <a:r>
-              <a:rPr lang="es-MX" sz="1200" dirty="0">
-                <a:solidFill>
-                  <a:schemeClr val="accent2"/>
-                </a:solidFill>
-                <a:latin typeface="Proxima Nova" panose="020B0604020202020204" charset="0"/>
-              </a:rPr>
-              <a:t>. (recetas)</a:t>
-            </a:r>
-            <a:endParaRPr lang="es-AR" sz="1200" dirty="0">
-              <a:solidFill>
-                <a:schemeClr val="accent2"/>
-              </a:solidFill>
-              <a:latin typeface="Proxima Nova" panose="020B0604020202020204" charset="0"/>
-            </a:endParaRPr>
-          </a:p>
-        </p:txBody>
-      </p:sp>
-      <p:sp>
-        <p:nvSpPr>
-          <p:cNvPr id="11" name="Rectángulo: esquinas redondeadas 10">
-            <a:extLst>
-              <a:ext uri="{FF2B5EF4-FFF2-40B4-BE49-F238E27FC236}">
-                <a16:creationId xmlns:a16="http://schemas.microsoft.com/office/drawing/2014/main" id="{B578388D-FCFB-454C-841B-34B17EA0ECAF}"/>
-              </a:ext>
-            </a:extLst>
-          </p:cNvPr>
-          <p:cNvSpPr/>
-          <p:nvPr/>
-        </p:nvSpPr>
-        <p:spPr>
-          <a:xfrm>
-            <a:off x="3793103" y="2470878"/>
-            <a:ext cx="1485615" cy="509666"/>
-          </a:xfrm>
-          <a:prstGeom prst="roundRect">
-            <a:avLst/>
-          </a:prstGeom>
-          <a:noFill/>
-          <a:ln>
-            <a:noFill/>
-          </a:ln>
-        </p:spPr>
-        <p:style>
-          <a:lnRef idx="2">
-            <a:schemeClr val="accent1">
-              <a:shade val="50000"/>
-            </a:schemeClr>
-          </a:lnRef>
-          <a:fillRef idx="1">
-            <a:schemeClr val="accent1"/>
-          </a:fillRef>
-          <a:effectRef idx="0">
-            <a:schemeClr val="accent1"/>
-          </a:effectRef>
-          <a:fontRef idx="minor">
-            <a:schemeClr val="lt1"/>
-          </a:fontRef>
-        </p:style>
-        <p:txBody>
-          <a:bodyPr rtlCol="0" anchor="ctr"/>
-          <a:lstStyle/>
-          <a:p>
-            <a:r>
-              <a:rPr lang="es-MX" sz="1200" dirty="0">
-                <a:solidFill>
-                  <a:schemeClr val="accent2"/>
-                </a:solidFill>
-                <a:latin typeface="Proxima Nova" panose="020B0604020202020204" charset="0"/>
-              </a:rPr>
-              <a:t>- Lista de modelos</a:t>
-            </a:r>
-            <a:endParaRPr lang="es-AR" sz="1200" dirty="0">
-              <a:solidFill>
-                <a:schemeClr val="accent2"/>
-              </a:solidFill>
-              <a:latin typeface="Proxima Nova" panose="020B0604020202020204" charset="0"/>
-            </a:endParaRPr>
-          </a:p>
-        </p:txBody>
-      </p:sp>
-      <p:sp>
-        <p:nvSpPr>
-          <p:cNvPr id="12" name="Rectángulo: esquinas redondeadas 11">
-            <a:extLst>
-              <a:ext uri="{FF2B5EF4-FFF2-40B4-BE49-F238E27FC236}">
-                <a16:creationId xmlns:a16="http://schemas.microsoft.com/office/drawing/2014/main" id="{CCABEB81-B0EF-4D6E-B700-7F98246D32D2}"/>
-              </a:ext>
-            </a:extLst>
-          </p:cNvPr>
-          <p:cNvSpPr/>
-          <p:nvPr/>
-        </p:nvSpPr>
-        <p:spPr>
-          <a:xfrm>
-            <a:off x="6063521" y="2470878"/>
-            <a:ext cx="1485615" cy="509666"/>
-          </a:xfrm>
-          <a:prstGeom prst="roundRect">
-            <a:avLst/>
-          </a:prstGeom>
-          <a:noFill/>
-          <a:ln>
-            <a:noFill/>
-          </a:ln>
-        </p:spPr>
-        <p:style>
-          <a:lnRef idx="2">
-            <a:schemeClr val="accent1">
-              <a:shade val="50000"/>
-            </a:schemeClr>
-          </a:lnRef>
-          <a:fillRef idx="1">
-            <a:schemeClr val="accent1"/>
-          </a:fillRef>
-          <a:effectRef idx="0">
-            <a:schemeClr val="accent1"/>
-          </a:effectRef>
-          <a:fontRef idx="minor">
-            <a:schemeClr val="lt1"/>
-          </a:fontRef>
-        </p:style>
-        <p:txBody>
-          <a:bodyPr rtlCol="0" anchor="ctr"/>
-          <a:lstStyle/>
-          <a:p>
-            <a:r>
-              <a:rPr lang="es-MX" sz="1200" dirty="0">
-                <a:solidFill>
-                  <a:schemeClr val="accent2"/>
-                </a:solidFill>
-                <a:latin typeface="Proxima Nova" panose="020B0604020202020204" charset="0"/>
-              </a:rPr>
-              <a:t>- TRUE: todas las combinaciones</a:t>
-            </a:r>
-            <a:endParaRPr lang="es-AR" sz="1200" dirty="0">
-              <a:solidFill>
-                <a:schemeClr val="accent2"/>
-              </a:solidFill>
-              <a:latin typeface="Proxima Nova" panose="020B0604020202020204" charset="0"/>
-            </a:endParaRPr>
-          </a:p>
-        </p:txBody>
-      </p:sp>
-      <p:sp>
-        <p:nvSpPr>
-          <p:cNvPr id="15" name="Rectángulo: esquinas redondeadas 14">
-            <a:extLst>
-              <a:ext uri="{FF2B5EF4-FFF2-40B4-BE49-F238E27FC236}">
-                <a16:creationId xmlns:a16="http://schemas.microsoft.com/office/drawing/2014/main" id="{DE6E9040-F929-4089-BFED-89BB58022E02}"/>
-              </a:ext>
-            </a:extLst>
-          </p:cNvPr>
-          <p:cNvSpPr/>
-          <p:nvPr/>
-        </p:nvSpPr>
-        <p:spPr>
-          <a:xfrm>
-            <a:off x="6063521" y="3117954"/>
-            <a:ext cx="1485615" cy="509666"/>
-          </a:xfrm>
-          <a:prstGeom prst="roundRect">
-            <a:avLst/>
-          </a:prstGeom>
-          <a:noFill/>
-          <a:ln>
-            <a:noFill/>
-          </a:ln>
-        </p:spPr>
-        <p:style>
-          <a:lnRef idx="2">
-            <a:schemeClr val="accent1">
-              <a:shade val="50000"/>
-            </a:schemeClr>
-          </a:lnRef>
-          <a:fillRef idx="1">
-            <a:schemeClr val="accent1"/>
-          </a:fillRef>
-          <a:effectRef idx="0">
-            <a:schemeClr val="accent1"/>
-          </a:effectRef>
-          <a:fontRef idx="minor">
-            <a:schemeClr val="lt1"/>
-          </a:fontRef>
-        </p:style>
-        <p:txBody>
-          <a:bodyPr rtlCol="0" anchor="ctr"/>
-          <a:lstStyle/>
-          <a:p>
-            <a:r>
-              <a:rPr lang="es-MX" sz="1200" dirty="0">
-                <a:solidFill>
-                  <a:schemeClr val="accent2"/>
-                </a:solidFill>
-                <a:latin typeface="Proxima Nova" panose="020B0604020202020204" charset="0"/>
-              </a:rPr>
-              <a:t>- FALSE: modelo 1 con </a:t>
-            </a:r>
-            <a:r>
-              <a:rPr lang="es-MX" sz="1200" dirty="0" err="1">
-                <a:solidFill>
-                  <a:schemeClr val="accent2"/>
-                </a:solidFill>
-                <a:latin typeface="Proxima Nova" panose="020B0604020202020204" charset="0"/>
-              </a:rPr>
-              <a:t>preproc</a:t>
-            </a:r>
-            <a:r>
-              <a:rPr lang="es-MX" sz="1200" dirty="0">
-                <a:solidFill>
-                  <a:schemeClr val="accent2"/>
-                </a:solidFill>
-                <a:latin typeface="Proxima Nova" panose="020B0604020202020204" charset="0"/>
-              </a:rPr>
-              <a:t> 1, etc.</a:t>
-            </a:r>
-            <a:endParaRPr lang="es-AR" sz="1200" dirty="0">
-              <a:solidFill>
-                <a:schemeClr val="accent2"/>
-              </a:solidFill>
-              <a:latin typeface="Proxima Nova" panose="020B0604020202020204" charset="0"/>
-            </a:endParaRPr>
-          </a:p>
-        </p:txBody>
-      </p:sp>
-      <p:cxnSp>
-        <p:nvCxnSpPr>
-          <p:cNvPr id="19" name="Conector recto de flecha 18">
-            <a:extLst>
-              <a:ext uri="{FF2B5EF4-FFF2-40B4-BE49-F238E27FC236}">
-                <a16:creationId xmlns:a16="http://schemas.microsoft.com/office/drawing/2014/main" id="{8E350DD8-3A44-49E6-B39A-B5F9FBDBE02A}"/>
-              </a:ext>
-            </a:extLst>
-          </p:cNvPr>
-          <p:cNvCxnSpPr>
-            <a:stCxn id="5" idx="2"/>
-            <a:endCxn id="7" idx="0"/>
-          </p:cNvCxnSpPr>
-          <p:nvPr/>
-        </p:nvCxnSpPr>
-        <p:spPr>
-          <a:xfrm flipH="1">
-            <a:off x="2032756" y="891916"/>
-            <a:ext cx="2270447" cy="931886"/>
-          </a:xfrm>
-          <a:prstGeom prst="straightConnector1">
-            <a:avLst/>
-          </a:prstGeom>
-          <a:ln>
-            <a:tailEnd type="triangle"/>
-          </a:ln>
-        </p:spPr>
-        <p:style>
-          <a:lnRef idx="1">
-            <a:schemeClr val="accent1"/>
-          </a:lnRef>
-          <a:fillRef idx="0">
-            <a:schemeClr val="accent1"/>
-          </a:fillRef>
-          <a:effectRef idx="0">
-            <a:schemeClr val="accent1"/>
-          </a:effectRef>
-          <a:fontRef idx="minor">
-            <a:schemeClr val="tx1"/>
-          </a:fontRef>
-        </p:style>
-      </p:cxnSp>
-      <p:cxnSp>
-        <p:nvCxnSpPr>
-          <p:cNvPr id="21" name="Conector recto de flecha 20">
-            <a:extLst>
-              <a:ext uri="{FF2B5EF4-FFF2-40B4-BE49-F238E27FC236}">
-                <a16:creationId xmlns:a16="http://schemas.microsoft.com/office/drawing/2014/main" id="{AD53D817-D836-4315-9887-6B5D9BBD543A}"/>
-              </a:ext>
-            </a:extLst>
-          </p:cNvPr>
-          <p:cNvCxnSpPr>
-            <a:stCxn id="5" idx="2"/>
-            <a:endCxn id="8" idx="0"/>
-          </p:cNvCxnSpPr>
-          <p:nvPr/>
-        </p:nvCxnSpPr>
-        <p:spPr>
-          <a:xfrm>
-            <a:off x="4303203" y="891916"/>
-            <a:ext cx="562" cy="931886"/>
-          </a:xfrm>
-          <a:prstGeom prst="straightConnector1">
-            <a:avLst/>
-          </a:prstGeom>
-          <a:ln>
-            <a:tailEnd type="triangle"/>
-          </a:ln>
-        </p:spPr>
-        <p:style>
-          <a:lnRef idx="1">
-            <a:schemeClr val="accent1"/>
-          </a:lnRef>
-          <a:fillRef idx="0">
-            <a:schemeClr val="accent1"/>
-          </a:fillRef>
-          <a:effectRef idx="0">
-            <a:schemeClr val="accent1"/>
-          </a:effectRef>
-          <a:fontRef idx="minor">
-            <a:schemeClr val="tx1"/>
-          </a:fontRef>
-        </p:style>
-      </p:cxnSp>
-      <p:cxnSp>
-        <p:nvCxnSpPr>
-          <p:cNvPr id="23" name="Conector recto de flecha 22">
-            <a:extLst>
-              <a:ext uri="{FF2B5EF4-FFF2-40B4-BE49-F238E27FC236}">
-                <a16:creationId xmlns:a16="http://schemas.microsoft.com/office/drawing/2014/main" id="{7B9D299F-9C70-4AA5-A45F-D76EFD8CF15C}"/>
-              </a:ext>
-            </a:extLst>
-          </p:cNvPr>
-          <p:cNvCxnSpPr>
-            <a:stCxn id="5" idx="2"/>
-            <a:endCxn id="9" idx="0"/>
-          </p:cNvCxnSpPr>
-          <p:nvPr/>
-        </p:nvCxnSpPr>
-        <p:spPr>
-          <a:xfrm>
-            <a:off x="4303203" y="891916"/>
-            <a:ext cx="2271572" cy="931886"/>
-          </a:xfrm>
-          <a:prstGeom prst="straightConnector1">
-            <a:avLst/>
-          </a:prstGeom>
-          <a:ln>
-            <a:tailEnd type="triangle"/>
-          </a:ln>
-        </p:spPr>
-        <p:style>
-          <a:lnRef idx="1">
-            <a:schemeClr val="accent1"/>
-          </a:lnRef>
-          <a:fillRef idx="0">
-            <a:schemeClr val="accent1"/>
-          </a:fillRef>
-          <a:effectRef idx="0">
-            <a:schemeClr val="accent1"/>
-          </a:effectRef>
-          <a:fontRef idx="minor">
-            <a:schemeClr val="tx1"/>
-          </a:fontRef>
-        </p:style>
-      </p:cxnSp>
-      <p:sp>
-        <p:nvSpPr>
-          <p:cNvPr id="16" name="Bocadillo: rectángulo con esquinas redondeadas 15">
-            <a:extLst>
-              <a:ext uri="{FF2B5EF4-FFF2-40B4-BE49-F238E27FC236}">
-                <a16:creationId xmlns:a16="http://schemas.microsoft.com/office/drawing/2014/main" id="{1A288852-C21B-49A7-93E4-89AA4A3951D7}"/>
-              </a:ext>
-            </a:extLst>
-          </p:cNvPr>
-          <p:cNvSpPr/>
-          <p:nvPr/>
-        </p:nvSpPr>
-        <p:spPr>
-          <a:xfrm>
-            <a:off x="7457607" y="127417"/>
-            <a:ext cx="1198653" cy="412229"/>
-          </a:xfrm>
-          <a:prstGeom prst="wedgeRoundRectCallout">
-            <a:avLst>
-              <a:gd name="adj1" fmla="val 43481"/>
-              <a:gd name="adj2" fmla="val 80148"/>
-              <a:gd name="adj3" fmla="val 16667"/>
-            </a:avLst>
-          </a:prstGeom>
-          <a:noFill/>
-          <a:ln w="12700">
-            <a:solidFill>
-              <a:schemeClr val="accent3"/>
-            </a:solidFill>
-            <a:prstDash val="dash"/>
-          </a:ln>
-        </p:spPr>
-        <p:style>
-          <a:lnRef idx="2">
-            <a:schemeClr val="accent1">
-              <a:shade val="50000"/>
-            </a:schemeClr>
-          </a:lnRef>
-          <a:fillRef idx="1">
-            <a:schemeClr val="accent1"/>
-          </a:fillRef>
-          <a:effectRef idx="0">
-            <a:schemeClr val="accent1"/>
-          </a:effectRef>
-          <a:fontRef idx="minor">
-            <a:schemeClr val="lt1"/>
-          </a:fontRef>
-        </p:style>
-        <p:txBody>
-          <a:bodyPr rtlCol="0" anchor="ctr"/>
-          <a:lstStyle/>
-          <a:p>
-            <a:pPr algn="ctr"/>
-            <a:r>
-              <a:rPr lang="es-MX" dirty="0">
-                <a:solidFill>
-                  <a:schemeClr val="accent2"/>
-                </a:solidFill>
-                <a:latin typeface="Proxima Nova" panose="020B0604020202020204" charset="0"/>
-              </a:rPr>
-              <a:t>Otra opción</a:t>
-            </a:r>
-            <a:endParaRPr lang="es-AR" dirty="0">
-              <a:solidFill>
-                <a:schemeClr val="accent2"/>
-              </a:solidFill>
-              <a:latin typeface="Proxima Nova" panose="020B0604020202020204" charset="0"/>
-            </a:endParaRPr>
-          </a:p>
-        </p:txBody>
-      </p:sp>
-    </p:spTree>
-    <p:extLst>
-      <p:ext uri="{BB962C8B-B14F-4D97-AF65-F5344CB8AC3E}">
-        <p14:creationId xmlns:p14="http://schemas.microsoft.com/office/powerpoint/2010/main" val="478091037"/>
-      </p:ext>
-    </p:extLst>
-  </p:cSld>
-  <p:clrMapOvr>
-    <a:masterClrMapping/>
-  </p:clrMapOvr>
-</p:sld>
-</file>
-
-<file path=ppt/slides/slide6.xml><?xml version="1.0" encoding="utf-8"?>
-<p:sld xmlns:a="http://schemas.openxmlformats.org/drawingml/2006/main" xmlns:r="http://schemas.openxmlformats.org/officeDocument/2006/relationships" xmlns:p="http://schemas.openxmlformats.org/presentationml/2006/main">
-  <p:cSld>
     <p:bg>
       <p:bgPr>
         <a:pattFill prst="pct50">
@@ -11190,7 +9027,7 @@
 </p:sld>
 </file>
 
-<file path=ppt/slides/slide7.xml><?xml version="1.0" encoding="utf-8"?>
+<file path=ppt/slides/slide4.xml><?xml version="1.0" encoding="utf-8"?>
 <p:sld xmlns:a="http://schemas.openxmlformats.org/drawingml/2006/main" xmlns:r="http://schemas.openxmlformats.org/officeDocument/2006/relationships" xmlns:p="http://schemas.openxmlformats.org/presentationml/2006/main">
   <p:cSld>
     <p:bg>
@@ -12279,6 +10116,2169 @@
         <p14:creationId xmlns:p14="http://schemas.microsoft.com/office/powerpoint/2010/main" val="2262623421"/>
       </p:ext>
     </p:extLst>
+  </p:cSld>
+  <p:clrMapOvr>
+    <a:masterClrMapping/>
+  </p:clrMapOvr>
+</p:sld>
+</file>
+
+<file path=ppt/slides/slide5.xml><?xml version="1.0" encoding="utf-8"?>
+<p:sld xmlns:a="http://schemas.openxmlformats.org/drawingml/2006/main" xmlns:r="http://schemas.openxmlformats.org/officeDocument/2006/relationships" xmlns:p="http://schemas.openxmlformats.org/presentationml/2006/main">
+  <p:cSld>
+    <p:bg>
+      <p:bgPr>
+        <a:pattFill prst="pct50">
+          <a:fgClr>
+            <a:schemeClr val="lt2"/>
+          </a:fgClr>
+          <a:bgClr>
+            <a:schemeClr val="bg1"/>
+          </a:bgClr>
+        </a:pattFill>
+        <a:effectLst/>
+      </p:bgPr>
+    </p:bg>
+    <p:spTree>
+      <p:nvGrpSpPr>
+        <p:cNvPr id="1" name="Shape 227"/>
+        <p:cNvGrpSpPr/>
+        <p:nvPr/>
+      </p:nvGrpSpPr>
+      <p:grpSpPr>
+        <a:xfrm>
+          <a:off x="0" y="0"/>
+          <a:ext cx="0" cy="0"/>
+          <a:chOff x="0" y="0"/>
+          <a:chExt cx="0" cy="0"/>
+        </a:xfrm>
+      </p:grpSpPr>
+      <p:sp>
+        <p:nvSpPr>
+          <p:cNvPr id="5" name="Rectángulo: esquinas redondeadas 4">
+            <a:extLst>
+              <a:ext uri="{FF2B5EF4-FFF2-40B4-BE49-F238E27FC236}">
+                <a16:creationId xmlns:a16="http://schemas.microsoft.com/office/drawing/2014/main" id="{B5F1ADFD-124A-4771-A1B8-1F4E5627381A}"/>
+              </a:ext>
+            </a:extLst>
+          </p:cNvPr>
+          <p:cNvSpPr/>
+          <p:nvPr/>
+        </p:nvSpPr>
+        <p:spPr>
+          <a:xfrm>
+            <a:off x="3329403" y="382250"/>
+            <a:ext cx="1947600" cy="509666"/>
+          </a:xfrm>
+          <a:prstGeom prst="roundRect">
+            <a:avLst/>
+          </a:prstGeom>
+          <a:noFill/>
+          <a:ln>
+            <a:solidFill>
+              <a:schemeClr val="accent3"/>
+            </a:solidFill>
+          </a:ln>
+        </p:spPr>
+        <p:style>
+          <a:lnRef idx="2">
+            <a:schemeClr val="accent1">
+              <a:shade val="50000"/>
+            </a:schemeClr>
+          </a:lnRef>
+          <a:fillRef idx="1">
+            <a:schemeClr val="accent1"/>
+          </a:fillRef>
+          <a:effectRef idx="0">
+            <a:schemeClr val="accent1"/>
+          </a:effectRef>
+          <a:fontRef idx="minor">
+            <a:schemeClr val="lt1"/>
+          </a:fontRef>
+        </p:style>
+        <p:txBody>
+          <a:bodyPr rtlCol="0" anchor="ctr"/>
+          <a:lstStyle/>
+          <a:p>
+            <a:pPr algn="ctr"/>
+            <a:r>
+              <a:rPr lang="es-MX" sz="2000" dirty="0" err="1">
+                <a:solidFill>
+                  <a:schemeClr val="accent2"/>
+                </a:solidFill>
+                <a:latin typeface="Proxima Nova" panose="020B0604020202020204" charset="0"/>
+              </a:rPr>
+              <a:t>workflow_set</a:t>
+            </a:r>
+            <a:r>
+              <a:rPr lang="es-MX" sz="2000" dirty="0">
+                <a:solidFill>
+                  <a:schemeClr val="accent2"/>
+                </a:solidFill>
+                <a:latin typeface="Proxima Nova" panose="020B0604020202020204" charset="0"/>
+              </a:rPr>
+              <a:t>()</a:t>
+            </a:r>
+            <a:endParaRPr lang="es-AR" sz="2000" dirty="0">
+              <a:solidFill>
+                <a:schemeClr val="accent2"/>
+              </a:solidFill>
+              <a:latin typeface="Proxima Nova" panose="020B0604020202020204" charset="0"/>
+            </a:endParaRPr>
+          </a:p>
+        </p:txBody>
+      </p:sp>
+      <p:sp>
+        <p:nvSpPr>
+          <p:cNvPr id="7" name="Rectángulo: esquinas redondeadas 6">
+            <a:extLst>
+              <a:ext uri="{FF2B5EF4-FFF2-40B4-BE49-F238E27FC236}">
+                <a16:creationId xmlns:a16="http://schemas.microsoft.com/office/drawing/2014/main" id="{A8A787CA-B489-4779-A5FC-F309DF3C6BFB}"/>
+              </a:ext>
+            </a:extLst>
+          </p:cNvPr>
+          <p:cNvSpPr/>
+          <p:nvPr/>
+        </p:nvSpPr>
+        <p:spPr>
+          <a:xfrm>
+            <a:off x="1058394" y="1823802"/>
+            <a:ext cx="1948723" cy="509666"/>
+          </a:xfrm>
+          <a:prstGeom prst="roundRect">
+            <a:avLst/>
+          </a:prstGeom>
+          <a:noFill/>
+          <a:ln>
+            <a:solidFill>
+              <a:schemeClr val="accent3"/>
+            </a:solidFill>
+          </a:ln>
+        </p:spPr>
+        <p:style>
+          <a:lnRef idx="2">
+            <a:schemeClr val="accent1">
+              <a:shade val="50000"/>
+            </a:schemeClr>
+          </a:lnRef>
+          <a:fillRef idx="1">
+            <a:schemeClr val="accent1"/>
+          </a:fillRef>
+          <a:effectRef idx="0">
+            <a:schemeClr val="accent1"/>
+          </a:effectRef>
+          <a:fontRef idx="minor">
+            <a:schemeClr val="lt1"/>
+          </a:fontRef>
+        </p:style>
+        <p:txBody>
+          <a:bodyPr rtlCol="0" anchor="ctr"/>
+          <a:lstStyle/>
+          <a:p>
+            <a:pPr algn="ctr"/>
+            <a:r>
+              <a:rPr lang="es-MX" sz="2000" dirty="0" err="1">
+                <a:solidFill>
+                  <a:schemeClr val="accent2"/>
+                </a:solidFill>
+                <a:latin typeface="Proxima Nova" panose="020B0604020202020204" charset="0"/>
+              </a:rPr>
+              <a:t>workflow</a:t>
+            </a:r>
+            <a:r>
+              <a:rPr lang="es-MX" sz="2000" dirty="0">
+                <a:solidFill>
+                  <a:schemeClr val="accent2"/>
+                </a:solidFill>
+                <a:latin typeface="Proxima Nova" panose="020B0604020202020204" charset="0"/>
+              </a:rPr>
+              <a:t>()</a:t>
+            </a:r>
+            <a:endParaRPr lang="es-AR" sz="2000" dirty="0">
+              <a:solidFill>
+                <a:schemeClr val="accent2"/>
+              </a:solidFill>
+              <a:latin typeface="Proxima Nova" panose="020B0604020202020204" charset="0"/>
+            </a:endParaRPr>
+          </a:p>
+        </p:txBody>
+      </p:sp>
+      <p:sp>
+        <p:nvSpPr>
+          <p:cNvPr id="8" name="Rectángulo: esquinas redondeadas 7">
+            <a:extLst>
+              <a:ext uri="{FF2B5EF4-FFF2-40B4-BE49-F238E27FC236}">
+                <a16:creationId xmlns:a16="http://schemas.microsoft.com/office/drawing/2014/main" id="{249CE5F6-F95F-462D-A74D-C78EB194E69C}"/>
+              </a:ext>
+            </a:extLst>
+          </p:cNvPr>
+          <p:cNvSpPr/>
+          <p:nvPr/>
+        </p:nvSpPr>
+        <p:spPr>
+          <a:xfrm>
+            <a:off x="3329403" y="1823802"/>
+            <a:ext cx="1948723" cy="509666"/>
+          </a:xfrm>
+          <a:prstGeom prst="roundRect">
+            <a:avLst/>
+          </a:prstGeom>
+          <a:noFill/>
+          <a:ln>
+            <a:solidFill>
+              <a:schemeClr val="accent3"/>
+            </a:solidFill>
+          </a:ln>
+        </p:spPr>
+        <p:style>
+          <a:lnRef idx="2">
+            <a:schemeClr val="accent1">
+              <a:shade val="50000"/>
+            </a:schemeClr>
+          </a:lnRef>
+          <a:fillRef idx="1">
+            <a:schemeClr val="accent1"/>
+          </a:fillRef>
+          <a:effectRef idx="0">
+            <a:schemeClr val="accent1"/>
+          </a:effectRef>
+          <a:fontRef idx="minor">
+            <a:schemeClr val="lt1"/>
+          </a:fontRef>
+        </p:style>
+        <p:txBody>
+          <a:bodyPr rtlCol="0" anchor="ctr"/>
+          <a:lstStyle/>
+          <a:p>
+            <a:pPr algn="ctr"/>
+            <a:r>
+              <a:rPr lang="es-MX" sz="2000" dirty="0" err="1">
+                <a:solidFill>
+                  <a:schemeClr val="accent2"/>
+                </a:solidFill>
+                <a:latin typeface="Proxima Nova" panose="020B0604020202020204" charset="0"/>
+              </a:rPr>
+              <a:t>workflow</a:t>
+            </a:r>
+            <a:r>
+              <a:rPr lang="es-MX" sz="2000" dirty="0">
+                <a:solidFill>
+                  <a:schemeClr val="accent2"/>
+                </a:solidFill>
+                <a:latin typeface="Proxima Nova" panose="020B0604020202020204" charset="0"/>
+              </a:rPr>
+              <a:t>()</a:t>
+            </a:r>
+            <a:endParaRPr lang="es-AR" sz="2000" dirty="0">
+              <a:solidFill>
+                <a:schemeClr val="accent2"/>
+              </a:solidFill>
+              <a:latin typeface="Proxima Nova" panose="020B0604020202020204" charset="0"/>
+            </a:endParaRPr>
+          </a:p>
+        </p:txBody>
+      </p:sp>
+      <p:sp>
+        <p:nvSpPr>
+          <p:cNvPr id="9" name="Rectángulo: esquinas redondeadas 8">
+            <a:extLst>
+              <a:ext uri="{FF2B5EF4-FFF2-40B4-BE49-F238E27FC236}">
+                <a16:creationId xmlns:a16="http://schemas.microsoft.com/office/drawing/2014/main" id="{00781763-53BC-4787-8C02-57940FDEE2D4}"/>
+              </a:ext>
+            </a:extLst>
+          </p:cNvPr>
+          <p:cNvSpPr/>
+          <p:nvPr/>
+        </p:nvSpPr>
+        <p:spPr>
+          <a:xfrm>
+            <a:off x="5600413" y="1823802"/>
+            <a:ext cx="1948723" cy="509666"/>
+          </a:xfrm>
+          <a:prstGeom prst="roundRect">
+            <a:avLst/>
+          </a:prstGeom>
+          <a:noFill/>
+          <a:ln>
+            <a:solidFill>
+              <a:schemeClr val="accent3"/>
+            </a:solidFill>
+          </a:ln>
+        </p:spPr>
+        <p:style>
+          <a:lnRef idx="2">
+            <a:schemeClr val="accent1">
+              <a:shade val="50000"/>
+            </a:schemeClr>
+          </a:lnRef>
+          <a:fillRef idx="1">
+            <a:schemeClr val="accent1"/>
+          </a:fillRef>
+          <a:effectRef idx="0">
+            <a:schemeClr val="accent1"/>
+          </a:effectRef>
+          <a:fontRef idx="minor">
+            <a:schemeClr val="lt1"/>
+          </a:fontRef>
+        </p:style>
+        <p:txBody>
+          <a:bodyPr rtlCol="0" anchor="ctr"/>
+          <a:lstStyle/>
+          <a:p>
+            <a:pPr algn="ctr"/>
+            <a:r>
+              <a:rPr lang="es-MX" sz="2000" dirty="0" err="1">
+                <a:solidFill>
+                  <a:schemeClr val="accent2"/>
+                </a:solidFill>
+                <a:latin typeface="Proxima Nova" panose="020B0604020202020204" charset="0"/>
+              </a:rPr>
+              <a:t>workflow</a:t>
+            </a:r>
+            <a:r>
+              <a:rPr lang="es-MX" sz="2000" dirty="0">
+                <a:solidFill>
+                  <a:schemeClr val="accent2"/>
+                </a:solidFill>
+                <a:latin typeface="Proxima Nova" panose="020B0604020202020204" charset="0"/>
+              </a:rPr>
+              <a:t>()</a:t>
+            </a:r>
+            <a:endParaRPr lang="es-AR" sz="2000" dirty="0">
+              <a:solidFill>
+                <a:schemeClr val="accent2"/>
+              </a:solidFill>
+              <a:latin typeface="Proxima Nova" panose="020B0604020202020204" charset="0"/>
+            </a:endParaRPr>
+          </a:p>
+        </p:txBody>
+      </p:sp>
+      <p:sp>
+        <p:nvSpPr>
+          <p:cNvPr id="10" name="Rectángulo: esquinas redondeadas 9">
+            <a:extLst>
+              <a:ext uri="{FF2B5EF4-FFF2-40B4-BE49-F238E27FC236}">
+                <a16:creationId xmlns:a16="http://schemas.microsoft.com/office/drawing/2014/main" id="{2AD61BE8-FB51-4870-968E-2A1F946B8575}"/>
+              </a:ext>
+            </a:extLst>
+          </p:cNvPr>
+          <p:cNvSpPr/>
+          <p:nvPr/>
+        </p:nvSpPr>
+        <p:spPr>
+          <a:xfrm>
+            <a:off x="1058394" y="2470878"/>
+            <a:ext cx="1948723" cy="509666"/>
+          </a:xfrm>
+          <a:prstGeom prst="roundRect">
+            <a:avLst/>
+          </a:prstGeom>
+          <a:noFill/>
+          <a:ln>
+            <a:solidFill>
+              <a:schemeClr val="accent3"/>
+            </a:solidFill>
+          </a:ln>
+        </p:spPr>
+        <p:style>
+          <a:lnRef idx="2">
+            <a:schemeClr val="accent1">
+              <a:shade val="50000"/>
+            </a:schemeClr>
+          </a:lnRef>
+          <a:fillRef idx="1">
+            <a:schemeClr val="accent1"/>
+          </a:fillRef>
+          <a:effectRef idx="0">
+            <a:schemeClr val="accent1"/>
+          </a:effectRef>
+          <a:fontRef idx="minor">
+            <a:schemeClr val="lt1"/>
+          </a:fontRef>
+        </p:style>
+        <p:txBody>
+          <a:bodyPr rtlCol="0" anchor="ctr"/>
+          <a:lstStyle/>
+          <a:p>
+            <a:pPr algn="ctr"/>
+            <a:r>
+              <a:rPr lang="es-MX" sz="2000" dirty="0" err="1">
+                <a:solidFill>
+                  <a:schemeClr val="accent2"/>
+                </a:solidFill>
+                <a:latin typeface="Proxima Nova" panose="020B0604020202020204" charset="0"/>
+              </a:rPr>
+              <a:t>add_model</a:t>
+            </a:r>
+            <a:r>
+              <a:rPr lang="es-MX" sz="2000" dirty="0">
+                <a:solidFill>
+                  <a:schemeClr val="accent2"/>
+                </a:solidFill>
+                <a:latin typeface="Proxima Nova" panose="020B0604020202020204" charset="0"/>
+              </a:rPr>
+              <a:t>()</a:t>
+            </a:r>
+            <a:endParaRPr lang="es-AR" sz="2000" dirty="0">
+              <a:solidFill>
+                <a:schemeClr val="accent2"/>
+              </a:solidFill>
+              <a:latin typeface="Proxima Nova" panose="020B0604020202020204" charset="0"/>
+            </a:endParaRPr>
+          </a:p>
+        </p:txBody>
+      </p:sp>
+      <p:sp>
+        <p:nvSpPr>
+          <p:cNvPr id="11" name="Rectángulo: esquinas redondeadas 10">
+            <a:extLst>
+              <a:ext uri="{FF2B5EF4-FFF2-40B4-BE49-F238E27FC236}">
+                <a16:creationId xmlns:a16="http://schemas.microsoft.com/office/drawing/2014/main" id="{B578388D-FCFB-454C-841B-34B17EA0ECAF}"/>
+              </a:ext>
+            </a:extLst>
+          </p:cNvPr>
+          <p:cNvSpPr/>
+          <p:nvPr/>
+        </p:nvSpPr>
+        <p:spPr>
+          <a:xfrm>
+            <a:off x="3329403" y="2470878"/>
+            <a:ext cx="1948723" cy="509666"/>
+          </a:xfrm>
+          <a:prstGeom prst="roundRect">
+            <a:avLst/>
+          </a:prstGeom>
+          <a:noFill/>
+          <a:ln>
+            <a:solidFill>
+              <a:schemeClr val="accent3"/>
+            </a:solidFill>
+          </a:ln>
+        </p:spPr>
+        <p:style>
+          <a:lnRef idx="2">
+            <a:schemeClr val="accent1">
+              <a:shade val="50000"/>
+            </a:schemeClr>
+          </a:lnRef>
+          <a:fillRef idx="1">
+            <a:schemeClr val="accent1"/>
+          </a:fillRef>
+          <a:effectRef idx="0">
+            <a:schemeClr val="accent1"/>
+          </a:effectRef>
+          <a:fontRef idx="minor">
+            <a:schemeClr val="lt1"/>
+          </a:fontRef>
+        </p:style>
+        <p:txBody>
+          <a:bodyPr rtlCol="0" anchor="ctr"/>
+          <a:lstStyle/>
+          <a:p>
+            <a:pPr algn="ctr"/>
+            <a:r>
+              <a:rPr lang="es-MX" sz="2000" dirty="0" err="1">
+                <a:solidFill>
+                  <a:schemeClr val="accent2"/>
+                </a:solidFill>
+                <a:latin typeface="Proxima Nova" panose="020B0604020202020204" charset="0"/>
+              </a:rPr>
+              <a:t>add_model</a:t>
+            </a:r>
+            <a:r>
+              <a:rPr lang="es-MX" sz="2000" dirty="0">
+                <a:solidFill>
+                  <a:schemeClr val="accent2"/>
+                </a:solidFill>
+                <a:latin typeface="Proxima Nova" panose="020B0604020202020204" charset="0"/>
+              </a:rPr>
+              <a:t>()</a:t>
+            </a:r>
+            <a:endParaRPr lang="es-AR" sz="2000" dirty="0">
+              <a:solidFill>
+                <a:schemeClr val="accent2"/>
+              </a:solidFill>
+              <a:latin typeface="Proxima Nova" panose="020B0604020202020204" charset="0"/>
+            </a:endParaRPr>
+          </a:p>
+        </p:txBody>
+      </p:sp>
+      <p:sp>
+        <p:nvSpPr>
+          <p:cNvPr id="12" name="Rectángulo: esquinas redondeadas 11">
+            <a:extLst>
+              <a:ext uri="{FF2B5EF4-FFF2-40B4-BE49-F238E27FC236}">
+                <a16:creationId xmlns:a16="http://schemas.microsoft.com/office/drawing/2014/main" id="{CCABEB81-B0EF-4D6E-B700-7F98246D32D2}"/>
+              </a:ext>
+            </a:extLst>
+          </p:cNvPr>
+          <p:cNvSpPr/>
+          <p:nvPr/>
+        </p:nvSpPr>
+        <p:spPr>
+          <a:xfrm>
+            <a:off x="5600413" y="2470878"/>
+            <a:ext cx="1948723" cy="509666"/>
+          </a:xfrm>
+          <a:prstGeom prst="roundRect">
+            <a:avLst/>
+          </a:prstGeom>
+          <a:noFill/>
+          <a:ln>
+            <a:solidFill>
+              <a:schemeClr val="accent3"/>
+            </a:solidFill>
+          </a:ln>
+        </p:spPr>
+        <p:style>
+          <a:lnRef idx="2">
+            <a:schemeClr val="accent1">
+              <a:shade val="50000"/>
+            </a:schemeClr>
+          </a:lnRef>
+          <a:fillRef idx="1">
+            <a:schemeClr val="accent1"/>
+          </a:fillRef>
+          <a:effectRef idx="0">
+            <a:schemeClr val="accent1"/>
+          </a:effectRef>
+          <a:fontRef idx="minor">
+            <a:schemeClr val="lt1"/>
+          </a:fontRef>
+        </p:style>
+        <p:txBody>
+          <a:bodyPr rtlCol="0" anchor="ctr"/>
+          <a:lstStyle/>
+          <a:p>
+            <a:pPr algn="ctr"/>
+            <a:r>
+              <a:rPr lang="es-MX" sz="2000" dirty="0" err="1">
+                <a:solidFill>
+                  <a:schemeClr val="accent2"/>
+                </a:solidFill>
+                <a:latin typeface="Proxima Nova" panose="020B0604020202020204" charset="0"/>
+              </a:rPr>
+              <a:t>add_model</a:t>
+            </a:r>
+            <a:r>
+              <a:rPr lang="es-MX" sz="2000" dirty="0">
+                <a:solidFill>
+                  <a:schemeClr val="accent2"/>
+                </a:solidFill>
+                <a:latin typeface="Proxima Nova" panose="020B0604020202020204" charset="0"/>
+              </a:rPr>
+              <a:t>()</a:t>
+            </a:r>
+            <a:endParaRPr lang="es-AR" sz="2000" dirty="0">
+              <a:solidFill>
+                <a:schemeClr val="accent2"/>
+              </a:solidFill>
+              <a:latin typeface="Proxima Nova" panose="020B0604020202020204" charset="0"/>
+            </a:endParaRPr>
+          </a:p>
+        </p:txBody>
+      </p:sp>
+      <p:sp>
+        <p:nvSpPr>
+          <p:cNvPr id="13" name="Rectángulo: esquinas redondeadas 12">
+            <a:extLst>
+              <a:ext uri="{FF2B5EF4-FFF2-40B4-BE49-F238E27FC236}">
+                <a16:creationId xmlns:a16="http://schemas.microsoft.com/office/drawing/2014/main" id="{55771EAD-A082-418F-85F5-6E2CE8F126E3}"/>
+              </a:ext>
+            </a:extLst>
+          </p:cNvPr>
+          <p:cNvSpPr/>
+          <p:nvPr/>
+        </p:nvSpPr>
+        <p:spPr>
+          <a:xfrm>
+            <a:off x="1058394" y="3117954"/>
+            <a:ext cx="1948723" cy="509666"/>
+          </a:xfrm>
+          <a:prstGeom prst="roundRect">
+            <a:avLst/>
+          </a:prstGeom>
+          <a:noFill/>
+          <a:ln>
+            <a:solidFill>
+              <a:schemeClr val="accent3"/>
+            </a:solidFill>
+          </a:ln>
+        </p:spPr>
+        <p:style>
+          <a:lnRef idx="2">
+            <a:schemeClr val="accent1">
+              <a:shade val="50000"/>
+            </a:schemeClr>
+          </a:lnRef>
+          <a:fillRef idx="1">
+            <a:schemeClr val="accent1"/>
+          </a:fillRef>
+          <a:effectRef idx="0">
+            <a:schemeClr val="accent1"/>
+          </a:effectRef>
+          <a:fontRef idx="minor">
+            <a:schemeClr val="lt1"/>
+          </a:fontRef>
+        </p:style>
+        <p:txBody>
+          <a:bodyPr rtlCol="0" anchor="ctr"/>
+          <a:lstStyle/>
+          <a:p>
+            <a:pPr algn="ctr"/>
+            <a:r>
+              <a:rPr lang="es-MX" sz="2000" dirty="0" err="1">
+                <a:solidFill>
+                  <a:schemeClr val="accent2"/>
+                </a:solidFill>
+                <a:latin typeface="Proxima Nova" panose="020B0604020202020204" charset="0"/>
+              </a:rPr>
+              <a:t>add_recipe</a:t>
+            </a:r>
+            <a:r>
+              <a:rPr lang="es-MX" sz="2000" dirty="0">
+                <a:solidFill>
+                  <a:schemeClr val="accent2"/>
+                </a:solidFill>
+                <a:latin typeface="Proxima Nova" panose="020B0604020202020204" charset="0"/>
+              </a:rPr>
+              <a:t>()</a:t>
+            </a:r>
+            <a:endParaRPr lang="es-AR" sz="2000" dirty="0">
+              <a:solidFill>
+                <a:schemeClr val="accent2"/>
+              </a:solidFill>
+              <a:latin typeface="Proxima Nova" panose="020B0604020202020204" charset="0"/>
+            </a:endParaRPr>
+          </a:p>
+        </p:txBody>
+      </p:sp>
+      <p:sp>
+        <p:nvSpPr>
+          <p:cNvPr id="14" name="Rectángulo: esquinas redondeadas 13">
+            <a:extLst>
+              <a:ext uri="{FF2B5EF4-FFF2-40B4-BE49-F238E27FC236}">
+                <a16:creationId xmlns:a16="http://schemas.microsoft.com/office/drawing/2014/main" id="{F7A954A3-E6A2-4944-B7E8-80652337BA66}"/>
+              </a:ext>
+            </a:extLst>
+          </p:cNvPr>
+          <p:cNvSpPr/>
+          <p:nvPr/>
+        </p:nvSpPr>
+        <p:spPr>
+          <a:xfrm>
+            <a:off x="3329403" y="3117954"/>
+            <a:ext cx="1948723" cy="509666"/>
+          </a:xfrm>
+          <a:prstGeom prst="roundRect">
+            <a:avLst/>
+          </a:prstGeom>
+          <a:noFill/>
+          <a:ln>
+            <a:solidFill>
+              <a:schemeClr val="accent3"/>
+            </a:solidFill>
+          </a:ln>
+        </p:spPr>
+        <p:style>
+          <a:lnRef idx="2">
+            <a:schemeClr val="accent1">
+              <a:shade val="50000"/>
+            </a:schemeClr>
+          </a:lnRef>
+          <a:fillRef idx="1">
+            <a:schemeClr val="accent1"/>
+          </a:fillRef>
+          <a:effectRef idx="0">
+            <a:schemeClr val="accent1"/>
+          </a:effectRef>
+          <a:fontRef idx="minor">
+            <a:schemeClr val="lt1"/>
+          </a:fontRef>
+        </p:style>
+        <p:txBody>
+          <a:bodyPr rtlCol="0" anchor="ctr"/>
+          <a:lstStyle/>
+          <a:p>
+            <a:pPr algn="ctr"/>
+            <a:r>
+              <a:rPr lang="es-MX" sz="2000" dirty="0" err="1">
+                <a:solidFill>
+                  <a:schemeClr val="accent2"/>
+                </a:solidFill>
+                <a:latin typeface="Proxima Nova" panose="020B0604020202020204" charset="0"/>
+              </a:rPr>
+              <a:t>add_formula</a:t>
+            </a:r>
+            <a:r>
+              <a:rPr lang="es-MX" sz="2000" dirty="0">
+                <a:solidFill>
+                  <a:schemeClr val="accent2"/>
+                </a:solidFill>
+                <a:latin typeface="Proxima Nova" panose="020B0604020202020204" charset="0"/>
+              </a:rPr>
+              <a:t>()</a:t>
+            </a:r>
+            <a:endParaRPr lang="es-AR" sz="2000" dirty="0">
+              <a:solidFill>
+                <a:schemeClr val="accent2"/>
+              </a:solidFill>
+              <a:latin typeface="Proxima Nova" panose="020B0604020202020204" charset="0"/>
+            </a:endParaRPr>
+          </a:p>
+        </p:txBody>
+      </p:sp>
+      <p:sp>
+        <p:nvSpPr>
+          <p:cNvPr id="15" name="Rectángulo: esquinas redondeadas 14">
+            <a:extLst>
+              <a:ext uri="{FF2B5EF4-FFF2-40B4-BE49-F238E27FC236}">
+                <a16:creationId xmlns:a16="http://schemas.microsoft.com/office/drawing/2014/main" id="{DE6E9040-F929-4089-BFED-89BB58022E02}"/>
+              </a:ext>
+            </a:extLst>
+          </p:cNvPr>
+          <p:cNvSpPr/>
+          <p:nvPr/>
+        </p:nvSpPr>
+        <p:spPr>
+          <a:xfrm>
+            <a:off x="5600413" y="3117954"/>
+            <a:ext cx="1948723" cy="509666"/>
+          </a:xfrm>
+          <a:prstGeom prst="roundRect">
+            <a:avLst/>
+          </a:prstGeom>
+          <a:noFill/>
+          <a:ln>
+            <a:solidFill>
+              <a:schemeClr val="accent3"/>
+            </a:solidFill>
+          </a:ln>
+        </p:spPr>
+        <p:style>
+          <a:lnRef idx="2">
+            <a:schemeClr val="accent1">
+              <a:shade val="50000"/>
+            </a:schemeClr>
+          </a:lnRef>
+          <a:fillRef idx="1">
+            <a:schemeClr val="accent1"/>
+          </a:fillRef>
+          <a:effectRef idx="0">
+            <a:schemeClr val="accent1"/>
+          </a:effectRef>
+          <a:fontRef idx="minor">
+            <a:schemeClr val="lt1"/>
+          </a:fontRef>
+        </p:style>
+        <p:txBody>
+          <a:bodyPr rtlCol="0" anchor="ctr"/>
+          <a:lstStyle/>
+          <a:p>
+            <a:pPr algn="ctr"/>
+            <a:r>
+              <a:rPr lang="es-MX" sz="2000" dirty="0" err="1">
+                <a:solidFill>
+                  <a:schemeClr val="accent2"/>
+                </a:solidFill>
+                <a:latin typeface="Proxima Nova" panose="020B0604020202020204" charset="0"/>
+              </a:rPr>
+              <a:t>add_recipe</a:t>
+            </a:r>
+            <a:r>
+              <a:rPr lang="es-MX" sz="2000" dirty="0">
+                <a:solidFill>
+                  <a:schemeClr val="accent2"/>
+                </a:solidFill>
+                <a:latin typeface="Proxima Nova" panose="020B0604020202020204" charset="0"/>
+              </a:rPr>
+              <a:t>()</a:t>
+            </a:r>
+            <a:endParaRPr lang="es-AR" sz="2000" dirty="0">
+              <a:solidFill>
+                <a:schemeClr val="accent2"/>
+              </a:solidFill>
+              <a:latin typeface="Proxima Nova" panose="020B0604020202020204" charset="0"/>
+            </a:endParaRPr>
+          </a:p>
+        </p:txBody>
+      </p:sp>
+      <p:cxnSp>
+        <p:nvCxnSpPr>
+          <p:cNvPr id="19" name="Conector recto de flecha 18">
+            <a:extLst>
+              <a:ext uri="{FF2B5EF4-FFF2-40B4-BE49-F238E27FC236}">
+                <a16:creationId xmlns:a16="http://schemas.microsoft.com/office/drawing/2014/main" id="{8E350DD8-3A44-49E6-B39A-B5F9FBDBE02A}"/>
+              </a:ext>
+            </a:extLst>
+          </p:cNvPr>
+          <p:cNvCxnSpPr>
+            <a:stCxn id="5" idx="2"/>
+            <a:endCxn id="7" idx="0"/>
+          </p:cNvCxnSpPr>
+          <p:nvPr/>
+        </p:nvCxnSpPr>
+        <p:spPr>
+          <a:xfrm flipH="1">
+            <a:off x="2032756" y="891916"/>
+            <a:ext cx="2270447" cy="931886"/>
+          </a:xfrm>
+          <a:prstGeom prst="straightConnector1">
+            <a:avLst/>
+          </a:prstGeom>
+          <a:ln>
+            <a:tailEnd type="triangle"/>
+          </a:ln>
+        </p:spPr>
+        <p:style>
+          <a:lnRef idx="1">
+            <a:schemeClr val="accent1"/>
+          </a:lnRef>
+          <a:fillRef idx="0">
+            <a:schemeClr val="accent1"/>
+          </a:fillRef>
+          <a:effectRef idx="0">
+            <a:schemeClr val="accent1"/>
+          </a:effectRef>
+          <a:fontRef idx="minor">
+            <a:schemeClr val="tx1"/>
+          </a:fontRef>
+        </p:style>
+      </p:cxnSp>
+      <p:cxnSp>
+        <p:nvCxnSpPr>
+          <p:cNvPr id="21" name="Conector recto de flecha 20">
+            <a:extLst>
+              <a:ext uri="{FF2B5EF4-FFF2-40B4-BE49-F238E27FC236}">
+                <a16:creationId xmlns:a16="http://schemas.microsoft.com/office/drawing/2014/main" id="{AD53D817-D836-4315-9887-6B5D9BBD543A}"/>
+              </a:ext>
+            </a:extLst>
+          </p:cNvPr>
+          <p:cNvCxnSpPr>
+            <a:stCxn id="5" idx="2"/>
+            <a:endCxn id="8" idx="0"/>
+          </p:cNvCxnSpPr>
+          <p:nvPr/>
+        </p:nvCxnSpPr>
+        <p:spPr>
+          <a:xfrm>
+            <a:off x="4303203" y="891916"/>
+            <a:ext cx="562" cy="931886"/>
+          </a:xfrm>
+          <a:prstGeom prst="straightConnector1">
+            <a:avLst/>
+          </a:prstGeom>
+          <a:ln>
+            <a:tailEnd type="triangle"/>
+          </a:ln>
+        </p:spPr>
+        <p:style>
+          <a:lnRef idx="1">
+            <a:schemeClr val="accent1"/>
+          </a:lnRef>
+          <a:fillRef idx="0">
+            <a:schemeClr val="accent1"/>
+          </a:fillRef>
+          <a:effectRef idx="0">
+            <a:schemeClr val="accent1"/>
+          </a:effectRef>
+          <a:fontRef idx="minor">
+            <a:schemeClr val="tx1"/>
+          </a:fontRef>
+        </p:style>
+      </p:cxnSp>
+      <p:cxnSp>
+        <p:nvCxnSpPr>
+          <p:cNvPr id="23" name="Conector recto de flecha 22">
+            <a:extLst>
+              <a:ext uri="{FF2B5EF4-FFF2-40B4-BE49-F238E27FC236}">
+                <a16:creationId xmlns:a16="http://schemas.microsoft.com/office/drawing/2014/main" id="{7B9D299F-9C70-4AA5-A45F-D76EFD8CF15C}"/>
+              </a:ext>
+            </a:extLst>
+          </p:cNvPr>
+          <p:cNvCxnSpPr>
+            <a:stCxn id="5" idx="2"/>
+            <a:endCxn id="9" idx="0"/>
+          </p:cNvCxnSpPr>
+          <p:nvPr/>
+        </p:nvCxnSpPr>
+        <p:spPr>
+          <a:xfrm>
+            <a:off x="4303203" y="891916"/>
+            <a:ext cx="2271572" cy="931886"/>
+          </a:xfrm>
+          <a:prstGeom prst="straightConnector1">
+            <a:avLst/>
+          </a:prstGeom>
+          <a:ln>
+            <a:tailEnd type="triangle"/>
+          </a:ln>
+        </p:spPr>
+        <p:style>
+          <a:lnRef idx="1">
+            <a:schemeClr val="accent1"/>
+          </a:lnRef>
+          <a:fillRef idx="0">
+            <a:schemeClr val="accent1"/>
+          </a:fillRef>
+          <a:effectRef idx="0">
+            <a:schemeClr val="accent1"/>
+          </a:effectRef>
+          <a:fontRef idx="minor">
+            <a:schemeClr val="tx1"/>
+          </a:fontRef>
+        </p:style>
+      </p:cxnSp>
+    </p:spTree>
+    <p:extLst>
+      <p:ext uri="{BB962C8B-B14F-4D97-AF65-F5344CB8AC3E}">
+        <p14:creationId xmlns:p14="http://schemas.microsoft.com/office/powerpoint/2010/main" val="3365813946"/>
+      </p:ext>
+    </p:extLst>
+  </p:cSld>
+  <p:clrMapOvr>
+    <a:masterClrMapping/>
+  </p:clrMapOvr>
+</p:sld>
+</file>
+
+<file path=ppt/slides/slide6.xml><?xml version="1.0" encoding="utf-8"?>
+<p:sld xmlns:a="http://schemas.openxmlformats.org/drawingml/2006/main" xmlns:r="http://schemas.openxmlformats.org/officeDocument/2006/relationships" xmlns:p="http://schemas.openxmlformats.org/presentationml/2006/main">
+  <p:cSld>
+    <p:bg>
+      <p:bgPr>
+        <a:pattFill prst="pct50">
+          <a:fgClr>
+            <a:schemeClr val="lt2"/>
+          </a:fgClr>
+          <a:bgClr>
+            <a:schemeClr val="bg1"/>
+          </a:bgClr>
+        </a:pattFill>
+        <a:effectLst/>
+      </p:bgPr>
+    </p:bg>
+    <p:spTree>
+      <p:nvGrpSpPr>
+        <p:cNvPr id="1" name="Shape 227"/>
+        <p:cNvGrpSpPr/>
+        <p:nvPr/>
+      </p:nvGrpSpPr>
+      <p:grpSpPr>
+        <a:xfrm>
+          <a:off x="0" y="0"/>
+          <a:ext cx="0" cy="0"/>
+          <a:chOff x="0" y="0"/>
+          <a:chExt cx="0" cy="0"/>
+        </a:xfrm>
+      </p:grpSpPr>
+      <p:sp>
+        <p:nvSpPr>
+          <p:cNvPr id="5" name="Rectángulo: esquinas redondeadas 4">
+            <a:extLst>
+              <a:ext uri="{FF2B5EF4-FFF2-40B4-BE49-F238E27FC236}">
+                <a16:creationId xmlns:a16="http://schemas.microsoft.com/office/drawing/2014/main" id="{B5F1ADFD-124A-4771-A1B8-1F4E5627381A}"/>
+              </a:ext>
+            </a:extLst>
+          </p:cNvPr>
+          <p:cNvSpPr/>
+          <p:nvPr/>
+        </p:nvSpPr>
+        <p:spPr>
+          <a:xfrm>
+            <a:off x="3329403" y="382250"/>
+            <a:ext cx="1947600" cy="509666"/>
+          </a:xfrm>
+          <a:prstGeom prst="roundRect">
+            <a:avLst/>
+          </a:prstGeom>
+          <a:noFill/>
+          <a:ln>
+            <a:solidFill>
+              <a:schemeClr val="accent3"/>
+            </a:solidFill>
+          </a:ln>
+        </p:spPr>
+        <p:style>
+          <a:lnRef idx="2">
+            <a:schemeClr val="accent1">
+              <a:shade val="50000"/>
+            </a:schemeClr>
+          </a:lnRef>
+          <a:fillRef idx="1">
+            <a:schemeClr val="accent1"/>
+          </a:fillRef>
+          <a:effectRef idx="0">
+            <a:schemeClr val="accent1"/>
+          </a:effectRef>
+          <a:fontRef idx="minor">
+            <a:schemeClr val="lt1"/>
+          </a:fontRef>
+        </p:style>
+        <p:txBody>
+          <a:bodyPr rtlCol="0" anchor="ctr"/>
+          <a:lstStyle/>
+          <a:p>
+            <a:pPr algn="ctr"/>
+            <a:r>
+              <a:rPr lang="es-MX" sz="2000" dirty="0" err="1">
+                <a:solidFill>
+                  <a:schemeClr val="accent2"/>
+                </a:solidFill>
+                <a:latin typeface="Proxima Nova" panose="020B0604020202020204" charset="0"/>
+              </a:rPr>
+              <a:t>workflow_set</a:t>
+            </a:r>
+            <a:r>
+              <a:rPr lang="es-MX" sz="2000" dirty="0">
+                <a:solidFill>
+                  <a:schemeClr val="accent2"/>
+                </a:solidFill>
+                <a:latin typeface="Proxima Nova" panose="020B0604020202020204" charset="0"/>
+              </a:rPr>
+              <a:t>()</a:t>
+            </a:r>
+            <a:endParaRPr lang="es-AR" sz="2000" dirty="0">
+              <a:solidFill>
+                <a:schemeClr val="accent2"/>
+              </a:solidFill>
+              <a:latin typeface="Proxima Nova" panose="020B0604020202020204" charset="0"/>
+            </a:endParaRPr>
+          </a:p>
+        </p:txBody>
+      </p:sp>
+      <p:sp>
+        <p:nvSpPr>
+          <p:cNvPr id="7" name="Rectángulo: esquinas redondeadas 6">
+            <a:extLst>
+              <a:ext uri="{FF2B5EF4-FFF2-40B4-BE49-F238E27FC236}">
+                <a16:creationId xmlns:a16="http://schemas.microsoft.com/office/drawing/2014/main" id="{A8A787CA-B489-4779-A5FC-F309DF3C6BFB}"/>
+              </a:ext>
+            </a:extLst>
+          </p:cNvPr>
+          <p:cNvSpPr/>
+          <p:nvPr/>
+        </p:nvSpPr>
+        <p:spPr>
+          <a:xfrm>
+            <a:off x="1058394" y="1823802"/>
+            <a:ext cx="1948723" cy="509666"/>
+          </a:xfrm>
+          <a:prstGeom prst="roundRect">
+            <a:avLst/>
+          </a:prstGeom>
+          <a:noFill/>
+          <a:ln>
+            <a:solidFill>
+              <a:schemeClr val="accent3"/>
+            </a:solidFill>
+          </a:ln>
+        </p:spPr>
+        <p:style>
+          <a:lnRef idx="2">
+            <a:schemeClr val="accent1">
+              <a:shade val="50000"/>
+            </a:schemeClr>
+          </a:lnRef>
+          <a:fillRef idx="1">
+            <a:schemeClr val="accent1"/>
+          </a:fillRef>
+          <a:effectRef idx="0">
+            <a:schemeClr val="accent1"/>
+          </a:effectRef>
+          <a:fontRef idx="minor">
+            <a:schemeClr val="lt1"/>
+          </a:fontRef>
+        </p:style>
+        <p:txBody>
+          <a:bodyPr rtlCol="0" anchor="ctr"/>
+          <a:lstStyle/>
+          <a:p>
+            <a:pPr algn="ctr"/>
+            <a:r>
+              <a:rPr lang="es-MX" sz="2000" dirty="0" err="1">
+                <a:solidFill>
+                  <a:schemeClr val="accent2"/>
+                </a:solidFill>
+                <a:latin typeface="Proxima Nova" panose="020B0604020202020204" charset="0"/>
+              </a:rPr>
+              <a:t>preproc</a:t>
+            </a:r>
+            <a:endParaRPr lang="es-AR" sz="2000" dirty="0">
+              <a:solidFill>
+                <a:schemeClr val="accent2"/>
+              </a:solidFill>
+              <a:latin typeface="Proxima Nova" panose="020B0604020202020204" charset="0"/>
+            </a:endParaRPr>
+          </a:p>
+        </p:txBody>
+      </p:sp>
+      <p:sp>
+        <p:nvSpPr>
+          <p:cNvPr id="8" name="Rectángulo: esquinas redondeadas 7">
+            <a:extLst>
+              <a:ext uri="{FF2B5EF4-FFF2-40B4-BE49-F238E27FC236}">
+                <a16:creationId xmlns:a16="http://schemas.microsoft.com/office/drawing/2014/main" id="{249CE5F6-F95F-462D-A74D-C78EB194E69C}"/>
+              </a:ext>
+            </a:extLst>
+          </p:cNvPr>
+          <p:cNvSpPr/>
+          <p:nvPr/>
+        </p:nvSpPr>
+        <p:spPr>
+          <a:xfrm>
+            <a:off x="3329403" y="1823802"/>
+            <a:ext cx="1948723" cy="509666"/>
+          </a:xfrm>
+          <a:prstGeom prst="roundRect">
+            <a:avLst/>
+          </a:prstGeom>
+          <a:noFill/>
+          <a:ln>
+            <a:solidFill>
+              <a:schemeClr val="accent3"/>
+            </a:solidFill>
+          </a:ln>
+        </p:spPr>
+        <p:style>
+          <a:lnRef idx="2">
+            <a:schemeClr val="accent1">
+              <a:shade val="50000"/>
+            </a:schemeClr>
+          </a:lnRef>
+          <a:fillRef idx="1">
+            <a:schemeClr val="accent1"/>
+          </a:fillRef>
+          <a:effectRef idx="0">
+            <a:schemeClr val="accent1"/>
+          </a:effectRef>
+          <a:fontRef idx="minor">
+            <a:schemeClr val="lt1"/>
+          </a:fontRef>
+        </p:style>
+        <p:txBody>
+          <a:bodyPr rtlCol="0" anchor="ctr"/>
+          <a:lstStyle/>
+          <a:p>
+            <a:pPr algn="ctr"/>
+            <a:r>
+              <a:rPr lang="es-MX" sz="2000" dirty="0" err="1">
+                <a:solidFill>
+                  <a:schemeClr val="accent2"/>
+                </a:solidFill>
+                <a:latin typeface="Proxima Nova" panose="020B0604020202020204" charset="0"/>
+              </a:rPr>
+              <a:t>models</a:t>
+            </a:r>
+            <a:endParaRPr lang="es-AR" sz="2000" dirty="0">
+              <a:solidFill>
+                <a:schemeClr val="accent2"/>
+              </a:solidFill>
+              <a:latin typeface="Proxima Nova" panose="020B0604020202020204" charset="0"/>
+            </a:endParaRPr>
+          </a:p>
+        </p:txBody>
+      </p:sp>
+      <p:sp>
+        <p:nvSpPr>
+          <p:cNvPr id="9" name="Rectángulo: esquinas redondeadas 8">
+            <a:extLst>
+              <a:ext uri="{FF2B5EF4-FFF2-40B4-BE49-F238E27FC236}">
+                <a16:creationId xmlns:a16="http://schemas.microsoft.com/office/drawing/2014/main" id="{00781763-53BC-4787-8C02-57940FDEE2D4}"/>
+              </a:ext>
+            </a:extLst>
+          </p:cNvPr>
+          <p:cNvSpPr/>
+          <p:nvPr/>
+        </p:nvSpPr>
+        <p:spPr>
+          <a:xfrm>
+            <a:off x="5600413" y="1823802"/>
+            <a:ext cx="1948723" cy="509666"/>
+          </a:xfrm>
+          <a:prstGeom prst="roundRect">
+            <a:avLst/>
+          </a:prstGeom>
+          <a:noFill/>
+          <a:ln>
+            <a:solidFill>
+              <a:schemeClr val="accent3"/>
+            </a:solidFill>
+          </a:ln>
+        </p:spPr>
+        <p:style>
+          <a:lnRef idx="2">
+            <a:schemeClr val="accent1">
+              <a:shade val="50000"/>
+            </a:schemeClr>
+          </a:lnRef>
+          <a:fillRef idx="1">
+            <a:schemeClr val="accent1"/>
+          </a:fillRef>
+          <a:effectRef idx="0">
+            <a:schemeClr val="accent1"/>
+          </a:effectRef>
+          <a:fontRef idx="minor">
+            <a:schemeClr val="lt1"/>
+          </a:fontRef>
+        </p:style>
+        <p:txBody>
+          <a:bodyPr rtlCol="0" anchor="ctr"/>
+          <a:lstStyle/>
+          <a:p>
+            <a:pPr algn="ctr"/>
+            <a:r>
+              <a:rPr lang="es-MX" sz="2000" dirty="0" err="1">
+                <a:solidFill>
+                  <a:schemeClr val="accent2"/>
+                </a:solidFill>
+                <a:latin typeface="Proxima Nova" panose="020B0604020202020204" charset="0"/>
+              </a:rPr>
+              <a:t>cross</a:t>
+            </a:r>
+            <a:endParaRPr lang="es-AR" sz="2000" dirty="0">
+              <a:solidFill>
+                <a:schemeClr val="accent2"/>
+              </a:solidFill>
+              <a:latin typeface="Proxima Nova" panose="020B0604020202020204" charset="0"/>
+            </a:endParaRPr>
+          </a:p>
+        </p:txBody>
+      </p:sp>
+      <p:sp>
+        <p:nvSpPr>
+          <p:cNvPr id="10" name="Rectángulo: esquinas redondeadas 9">
+            <a:extLst>
+              <a:ext uri="{FF2B5EF4-FFF2-40B4-BE49-F238E27FC236}">
+                <a16:creationId xmlns:a16="http://schemas.microsoft.com/office/drawing/2014/main" id="{2AD61BE8-FB51-4870-968E-2A1F946B8575}"/>
+              </a:ext>
+            </a:extLst>
+          </p:cNvPr>
+          <p:cNvSpPr/>
+          <p:nvPr/>
+        </p:nvSpPr>
+        <p:spPr>
+          <a:xfrm>
+            <a:off x="1520317" y="2470878"/>
+            <a:ext cx="1486800" cy="509666"/>
+          </a:xfrm>
+          <a:prstGeom prst="roundRect">
+            <a:avLst/>
+          </a:prstGeom>
+          <a:noFill/>
+          <a:ln>
+            <a:noFill/>
+          </a:ln>
+        </p:spPr>
+        <p:style>
+          <a:lnRef idx="2">
+            <a:schemeClr val="accent1">
+              <a:shade val="50000"/>
+            </a:schemeClr>
+          </a:lnRef>
+          <a:fillRef idx="1">
+            <a:schemeClr val="accent1"/>
+          </a:fillRef>
+          <a:effectRef idx="0">
+            <a:schemeClr val="accent1"/>
+          </a:effectRef>
+          <a:fontRef idx="minor">
+            <a:schemeClr val="lt1"/>
+          </a:fontRef>
+        </p:style>
+        <p:txBody>
+          <a:bodyPr rtlCol="0" anchor="ctr"/>
+          <a:lstStyle/>
+          <a:p>
+            <a:r>
+              <a:rPr lang="es-MX" sz="1200" dirty="0">
+                <a:solidFill>
+                  <a:schemeClr val="accent2"/>
+                </a:solidFill>
+                <a:latin typeface="Proxima Nova" panose="020B0604020202020204" charset="0"/>
+              </a:rPr>
+              <a:t>- Lista de </a:t>
+            </a:r>
+            <a:r>
+              <a:rPr lang="es-MX" sz="1200" dirty="0" err="1">
+                <a:solidFill>
+                  <a:schemeClr val="accent2"/>
+                </a:solidFill>
+                <a:latin typeface="Proxima Nova" panose="020B0604020202020204" charset="0"/>
+              </a:rPr>
+              <a:t>preproc</a:t>
+            </a:r>
+            <a:r>
+              <a:rPr lang="es-MX" sz="1200" dirty="0">
+                <a:solidFill>
+                  <a:schemeClr val="accent2"/>
+                </a:solidFill>
+                <a:latin typeface="Proxima Nova" panose="020B0604020202020204" charset="0"/>
+              </a:rPr>
+              <a:t>. (recetas)</a:t>
+            </a:r>
+            <a:endParaRPr lang="es-AR" sz="1200" dirty="0">
+              <a:solidFill>
+                <a:schemeClr val="accent2"/>
+              </a:solidFill>
+              <a:latin typeface="Proxima Nova" panose="020B0604020202020204" charset="0"/>
+            </a:endParaRPr>
+          </a:p>
+        </p:txBody>
+      </p:sp>
+      <p:sp>
+        <p:nvSpPr>
+          <p:cNvPr id="11" name="Rectángulo: esquinas redondeadas 10">
+            <a:extLst>
+              <a:ext uri="{FF2B5EF4-FFF2-40B4-BE49-F238E27FC236}">
+                <a16:creationId xmlns:a16="http://schemas.microsoft.com/office/drawing/2014/main" id="{B578388D-FCFB-454C-841B-34B17EA0ECAF}"/>
+              </a:ext>
+            </a:extLst>
+          </p:cNvPr>
+          <p:cNvSpPr/>
+          <p:nvPr/>
+        </p:nvSpPr>
+        <p:spPr>
+          <a:xfrm>
+            <a:off x="3793103" y="2470878"/>
+            <a:ext cx="1485615" cy="509666"/>
+          </a:xfrm>
+          <a:prstGeom prst="roundRect">
+            <a:avLst/>
+          </a:prstGeom>
+          <a:noFill/>
+          <a:ln>
+            <a:noFill/>
+          </a:ln>
+        </p:spPr>
+        <p:style>
+          <a:lnRef idx="2">
+            <a:schemeClr val="accent1">
+              <a:shade val="50000"/>
+            </a:schemeClr>
+          </a:lnRef>
+          <a:fillRef idx="1">
+            <a:schemeClr val="accent1"/>
+          </a:fillRef>
+          <a:effectRef idx="0">
+            <a:schemeClr val="accent1"/>
+          </a:effectRef>
+          <a:fontRef idx="minor">
+            <a:schemeClr val="lt1"/>
+          </a:fontRef>
+        </p:style>
+        <p:txBody>
+          <a:bodyPr rtlCol="0" anchor="ctr"/>
+          <a:lstStyle/>
+          <a:p>
+            <a:r>
+              <a:rPr lang="es-MX" sz="1200" dirty="0">
+                <a:solidFill>
+                  <a:schemeClr val="accent2"/>
+                </a:solidFill>
+                <a:latin typeface="Proxima Nova" panose="020B0604020202020204" charset="0"/>
+              </a:rPr>
+              <a:t>- Lista de modelos</a:t>
+            </a:r>
+            <a:endParaRPr lang="es-AR" sz="1200" dirty="0">
+              <a:solidFill>
+                <a:schemeClr val="accent2"/>
+              </a:solidFill>
+              <a:latin typeface="Proxima Nova" panose="020B0604020202020204" charset="0"/>
+            </a:endParaRPr>
+          </a:p>
+        </p:txBody>
+      </p:sp>
+      <p:sp>
+        <p:nvSpPr>
+          <p:cNvPr id="12" name="Rectángulo: esquinas redondeadas 11">
+            <a:extLst>
+              <a:ext uri="{FF2B5EF4-FFF2-40B4-BE49-F238E27FC236}">
+                <a16:creationId xmlns:a16="http://schemas.microsoft.com/office/drawing/2014/main" id="{CCABEB81-B0EF-4D6E-B700-7F98246D32D2}"/>
+              </a:ext>
+            </a:extLst>
+          </p:cNvPr>
+          <p:cNvSpPr/>
+          <p:nvPr/>
+        </p:nvSpPr>
+        <p:spPr>
+          <a:xfrm>
+            <a:off x="6063521" y="2470878"/>
+            <a:ext cx="1485615" cy="509666"/>
+          </a:xfrm>
+          <a:prstGeom prst="roundRect">
+            <a:avLst/>
+          </a:prstGeom>
+          <a:noFill/>
+          <a:ln>
+            <a:noFill/>
+          </a:ln>
+        </p:spPr>
+        <p:style>
+          <a:lnRef idx="2">
+            <a:schemeClr val="accent1">
+              <a:shade val="50000"/>
+            </a:schemeClr>
+          </a:lnRef>
+          <a:fillRef idx="1">
+            <a:schemeClr val="accent1"/>
+          </a:fillRef>
+          <a:effectRef idx="0">
+            <a:schemeClr val="accent1"/>
+          </a:effectRef>
+          <a:fontRef idx="minor">
+            <a:schemeClr val="lt1"/>
+          </a:fontRef>
+        </p:style>
+        <p:txBody>
+          <a:bodyPr rtlCol="0" anchor="ctr"/>
+          <a:lstStyle/>
+          <a:p>
+            <a:r>
+              <a:rPr lang="es-MX" sz="1200" dirty="0">
+                <a:solidFill>
+                  <a:schemeClr val="accent2"/>
+                </a:solidFill>
+                <a:latin typeface="Proxima Nova" panose="020B0604020202020204" charset="0"/>
+              </a:rPr>
+              <a:t>- TRUE: todas las combinaciones</a:t>
+            </a:r>
+            <a:endParaRPr lang="es-AR" sz="1200" dirty="0">
+              <a:solidFill>
+                <a:schemeClr val="accent2"/>
+              </a:solidFill>
+              <a:latin typeface="Proxima Nova" panose="020B0604020202020204" charset="0"/>
+            </a:endParaRPr>
+          </a:p>
+        </p:txBody>
+      </p:sp>
+      <p:sp>
+        <p:nvSpPr>
+          <p:cNvPr id="15" name="Rectángulo: esquinas redondeadas 14">
+            <a:extLst>
+              <a:ext uri="{FF2B5EF4-FFF2-40B4-BE49-F238E27FC236}">
+                <a16:creationId xmlns:a16="http://schemas.microsoft.com/office/drawing/2014/main" id="{DE6E9040-F929-4089-BFED-89BB58022E02}"/>
+              </a:ext>
+            </a:extLst>
+          </p:cNvPr>
+          <p:cNvSpPr/>
+          <p:nvPr/>
+        </p:nvSpPr>
+        <p:spPr>
+          <a:xfrm>
+            <a:off x="6063521" y="3117954"/>
+            <a:ext cx="1485615" cy="509666"/>
+          </a:xfrm>
+          <a:prstGeom prst="roundRect">
+            <a:avLst/>
+          </a:prstGeom>
+          <a:noFill/>
+          <a:ln>
+            <a:noFill/>
+          </a:ln>
+        </p:spPr>
+        <p:style>
+          <a:lnRef idx="2">
+            <a:schemeClr val="accent1">
+              <a:shade val="50000"/>
+            </a:schemeClr>
+          </a:lnRef>
+          <a:fillRef idx="1">
+            <a:schemeClr val="accent1"/>
+          </a:fillRef>
+          <a:effectRef idx="0">
+            <a:schemeClr val="accent1"/>
+          </a:effectRef>
+          <a:fontRef idx="minor">
+            <a:schemeClr val="lt1"/>
+          </a:fontRef>
+        </p:style>
+        <p:txBody>
+          <a:bodyPr rtlCol="0" anchor="ctr"/>
+          <a:lstStyle/>
+          <a:p>
+            <a:r>
+              <a:rPr lang="es-MX" sz="1200" dirty="0">
+                <a:solidFill>
+                  <a:schemeClr val="accent2"/>
+                </a:solidFill>
+                <a:latin typeface="Proxima Nova" panose="020B0604020202020204" charset="0"/>
+              </a:rPr>
+              <a:t>- FALSE: modelo 1 con </a:t>
+            </a:r>
+            <a:r>
+              <a:rPr lang="es-MX" sz="1200" dirty="0" err="1">
+                <a:solidFill>
+                  <a:schemeClr val="accent2"/>
+                </a:solidFill>
+                <a:latin typeface="Proxima Nova" panose="020B0604020202020204" charset="0"/>
+              </a:rPr>
+              <a:t>preproc</a:t>
+            </a:r>
+            <a:r>
+              <a:rPr lang="es-MX" sz="1200" dirty="0">
+                <a:solidFill>
+                  <a:schemeClr val="accent2"/>
+                </a:solidFill>
+                <a:latin typeface="Proxima Nova" panose="020B0604020202020204" charset="0"/>
+              </a:rPr>
+              <a:t> 1, etc.</a:t>
+            </a:r>
+            <a:endParaRPr lang="es-AR" sz="1200" dirty="0">
+              <a:solidFill>
+                <a:schemeClr val="accent2"/>
+              </a:solidFill>
+              <a:latin typeface="Proxima Nova" panose="020B0604020202020204" charset="0"/>
+            </a:endParaRPr>
+          </a:p>
+        </p:txBody>
+      </p:sp>
+      <p:cxnSp>
+        <p:nvCxnSpPr>
+          <p:cNvPr id="19" name="Conector recto de flecha 18">
+            <a:extLst>
+              <a:ext uri="{FF2B5EF4-FFF2-40B4-BE49-F238E27FC236}">
+                <a16:creationId xmlns:a16="http://schemas.microsoft.com/office/drawing/2014/main" id="{8E350DD8-3A44-49E6-B39A-B5F9FBDBE02A}"/>
+              </a:ext>
+            </a:extLst>
+          </p:cNvPr>
+          <p:cNvCxnSpPr>
+            <a:stCxn id="5" idx="2"/>
+            <a:endCxn id="7" idx="0"/>
+          </p:cNvCxnSpPr>
+          <p:nvPr/>
+        </p:nvCxnSpPr>
+        <p:spPr>
+          <a:xfrm flipH="1">
+            <a:off x="2032756" y="891916"/>
+            <a:ext cx="2270447" cy="931886"/>
+          </a:xfrm>
+          <a:prstGeom prst="straightConnector1">
+            <a:avLst/>
+          </a:prstGeom>
+          <a:ln>
+            <a:tailEnd type="triangle"/>
+          </a:ln>
+        </p:spPr>
+        <p:style>
+          <a:lnRef idx="1">
+            <a:schemeClr val="accent1"/>
+          </a:lnRef>
+          <a:fillRef idx="0">
+            <a:schemeClr val="accent1"/>
+          </a:fillRef>
+          <a:effectRef idx="0">
+            <a:schemeClr val="accent1"/>
+          </a:effectRef>
+          <a:fontRef idx="minor">
+            <a:schemeClr val="tx1"/>
+          </a:fontRef>
+        </p:style>
+      </p:cxnSp>
+      <p:cxnSp>
+        <p:nvCxnSpPr>
+          <p:cNvPr id="21" name="Conector recto de flecha 20">
+            <a:extLst>
+              <a:ext uri="{FF2B5EF4-FFF2-40B4-BE49-F238E27FC236}">
+                <a16:creationId xmlns:a16="http://schemas.microsoft.com/office/drawing/2014/main" id="{AD53D817-D836-4315-9887-6B5D9BBD543A}"/>
+              </a:ext>
+            </a:extLst>
+          </p:cNvPr>
+          <p:cNvCxnSpPr>
+            <a:stCxn id="5" idx="2"/>
+            <a:endCxn id="8" idx="0"/>
+          </p:cNvCxnSpPr>
+          <p:nvPr/>
+        </p:nvCxnSpPr>
+        <p:spPr>
+          <a:xfrm>
+            <a:off x="4303203" y="891916"/>
+            <a:ext cx="562" cy="931886"/>
+          </a:xfrm>
+          <a:prstGeom prst="straightConnector1">
+            <a:avLst/>
+          </a:prstGeom>
+          <a:ln>
+            <a:tailEnd type="triangle"/>
+          </a:ln>
+        </p:spPr>
+        <p:style>
+          <a:lnRef idx="1">
+            <a:schemeClr val="accent1"/>
+          </a:lnRef>
+          <a:fillRef idx="0">
+            <a:schemeClr val="accent1"/>
+          </a:fillRef>
+          <a:effectRef idx="0">
+            <a:schemeClr val="accent1"/>
+          </a:effectRef>
+          <a:fontRef idx="minor">
+            <a:schemeClr val="tx1"/>
+          </a:fontRef>
+        </p:style>
+      </p:cxnSp>
+      <p:cxnSp>
+        <p:nvCxnSpPr>
+          <p:cNvPr id="23" name="Conector recto de flecha 22">
+            <a:extLst>
+              <a:ext uri="{FF2B5EF4-FFF2-40B4-BE49-F238E27FC236}">
+                <a16:creationId xmlns:a16="http://schemas.microsoft.com/office/drawing/2014/main" id="{7B9D299F-9C70-4AA5-A45F-D76EFD8CF15C}"/>
+              </a:ext>
+            </a:extLst>
+          </p:cNvPr>
+          <p:cNvCxnSpPr>
+            <a:stCxn id="5" idx="2"/>
+            <a:endCxn id="9" idx="0"/>
+          </p:cNvCxnSpPr>
+          <p:nvPr/>
+        </p:nvCxnSpPr>
+        <p:spPr>
+          <a:xfrm>
+            <a:off x="4303203" y="891916"/>
+            <a:ext cx="2271572" cy="931886"/>
+          </a:xfrm>
+          <a:prstGeom prst="straightConnector1">
+            <a:avLst/>
+          </a:prstGeom>
+          <a:ln>
+            <a:tailEnd type="triangle"/>
+          </a:ln>
+        </p:spPr>
+        <p:style>
+          <a:lnRef idx="1">
+            <a:schemeClr val="accent1"/>
+          </a:lnRef>
+          <a:fillRef idx="0">
+            <a:schemeClr val="accent1"/>
+          </a:fillRef>
+          <a:effectRef idx="0">
+            <a:schemeClr val="accent1"/>
+          </a:effectRef>
+          <a:fontRef idx="minor">
+            <a:schemeClr val="tx1"/>
+          </a:fontRef>
+        </p:style>
+      </p:cxnSp>
+      <p:sp>
+        <p:nvSpPr>
+          <p:cNvPr id="16" name="Bocadillo: rectángulo con esquinas redondeadas 15">
+            <a:extLst>
+              <a:ext uri="{FF2B5EF4-FFF2-40B4-BE49-F238E27FC236}">
+                <a16:creationId xmlns:a16="http://schemas.microsoft.com/office/drawing/2014/main" id="{1A288852-C21B-49A7-93E4-89AA4A3951D7}"/>
+              </a:ext>
+            </a:extLst>
+          </p:cNvPr>
+          <p:cNvSpPr/>
+          <p:nvPr/>
+        </p:nvSpPr>
+        <p:spPr>
+          <a:xfrm>
+            <a:off x="7457607" y="127417"/>
+            <a:ext cx="1198653" cy="412229"/>
+          </a:xfrm>
+          <a:prstGeom prst="wedgeRoundRectCallout">
+            <a:avLst>
+              <a:gd name="adj1" fmla="val 43481"/>
+              <a:gd name="adj2" fmla="val 80148"/>
+              <a:gd name="adj3" fmla="val 16667"/>
+            </a:avLst>
+          </a:prstGeom>
+          <a:noFill/>
+          <a:ln w="12700">
+            <a:solidFill>
+              <a:schemeClr val="accent3"/>
+            </a:solidFill>
+            <a:prstDash val="dash"/>
+          </a:ln>
+        </p:spPr>
+        <p:style>
+          <a:lnRef idx="2">
+            <a:schemeClr val="accent1">
+              <a:shade val="50000"/>
+            </a:schemeClr>
+          </a:lnRef>
+          <a:fillRef idx="1">
+            <a:schemeClr val="accent1"/>
+          </a:fillRef>
+          <a:effectRef idx="0">
+            <a:schemeClr val="accent1"/>
+          </a:effectRef>
+          <a:fontRef idx="minor">
+            <a:schemeClr val="lt1"/>
+          </a:fontRef>
+        </p:style>
+        <p:txBody>
+          <a:bodyPr rtlCol="0" anchor="ctr"/>
+          <a:lstStyle/>
+          <a:p>
+            <a:pPr algn="ctr"/>
+            <a:r>
+              <a:rPr lang="es-MX" dirty="0">
+                <a:solidFill>
+                  <a:schemeClr val="accent2"/>
+                </a:solidFill>
+                <a:latin typeface="Proxima Nova" panose="020B0604020202020204" charset="0"/>
+              </a:rPr>
+              <a:t>Otra opción</a:t>
+            </a:r>
+            <a:endParaRPr lang="es-AR" dirty="0">
+              <a:solidFill>
+                <a:schemeClr val="accent2"/>
+              </a:solidFill>
+              <a:latin typeface="Proxima Nova" panose="020B0604020202020204" charset="0"/>
+            </a:endParaRPr>
+          </a:p>
+        </p:txBody>
+      </p:sp>
+    </p:spTree>
+    <p:extLst>
+      <p:ext uri="{BB962C8B-B14F-4D97-AF65-F5344CB8AC3E}">
+        <p14:creationId xmlns:p14="http://schemas.microsoft.com/office/powerpoint/2010/main" val="478091037"/>
+      </p:ext>
+    </p:extLst>
+  </p:cSld>
+  <p:clrMapOvr>
+    <a:masterClrMapping/>
+  </p:clrMapOvr>
+</p:sld>
+</file>
+
+<file path=ppt/slides/slide7.xml><?xml version="1.0" encoding="utf-8"?>
+<p:sld xmlns:a="http://schemas.openxmlformats.org/drawingml/2006/main" xmlns:r="http://schemas.openxmlformats.org/officeDocument/2006/relationships" xmlns:p="http://schemas.openxmlformats.org/presentationml/2006/main">
+  <p:cSld>
+    <p:spTree>
+      <p:nvGrpSpPr>
+        <p:cNvPr id="1" name="Shape 309"/>
+        <p:cNvGrpSpPr/>
+        <p:nvPr/>
+      </p:nvGrpSpPr>
+      <p:grpSpPr>
+        <a:xfrm>
+          <a:off x="0" y="0"/>
+          <a:ext cx="0" cy="0"/>
+          <a:chOff x="0" y="0"/>
+          <a:chExt cx="0" cy="0"/>
+        </a:xfrm>
+      </p:grpSpPr>
+      <p:sp>
+        <p:nvSpPr>
+          <p:cNvPr id="310" name="Google Shape;310;p53"/>
+          <p:cNvSpPr txBox="1">
+            <a:spLocks noGrp="1"/>
+          </p:cNvSpPr>
+          <p:nvPr>
+            <p:ph type="title"/>
+          </p:nvPr>
+        </p:nvSpPr>
+        <p:spPr>
+          <a:xfrm>
+            <a:off x="311700" y="156100"/>
+            <a:ext cx="8520600" cy="572700"/>
+          </a:xfrm>
+          <a:prstGeom prst="rect">
+            <a:avLst/>
+          </a:prstGeom>
+        </p:spPr>
+        <p:txBody>
+          <a:bodyPr spcFirstLastPara="1" wrap="square" lIns="91425" tIns="91425" rIns="91425" bIns="91425" anchor="t" anchorCtr="0">
+            <a:normAutofit fontScale="90000"/>
+          </a:bodyPr>
+          <a:lstStyle/>
+          <a:p>
+            <a:pPr marL="0" lvl="0" indent="0" algn="l" rtl="0">
+              <a:spcBef>
+                <a:spcPts val="0"/>
+              </a:spcBef>
+              <a:spcAft>
+                <a:spcPts val="0"/>
+              </a:spcAft>
+              <a:buNone/>
+            </a:pPr>
+            <a:r>
+              <a:rPr lang="en-GB" dirty="0" err="1"/>
+              <a:t>Muestra</a:t>
+            </a:r>
+            <a:endParaRPr dirty="0"/>
+          </a:p>
+        </p:txBody>
+      </p:sp>
+      <p:sp>
+        <p:nvSpPr>
+          <p:cNvPr id="311" name="Google Shape;311;p53"/>
+          <p:cNvSpPr txBox="1">
+            <a:spLocks noGrp="1"/>
+          </p:cNvSpPr>
+          <p:nvPr>
+            <p:ph type="body" idx="1"/>
+          </p:nvPr>
+        </p:nvSpPr>
+        <p:spPr>
+          <a:xfrm>
+            <a:off x="311700" y="728800"/>
+            <a:ext cx="4650044" cy="3416400"/>
+          </a:xfrm>
+          <a:prstGeom prst="rect">
+            <a:avLst/>
+          </a:prstGeom>
+        </p:spPr>
+        <p:txBody>
+          <a:bodyPr spcFirstLastPara="1" wrap="square" lIns="91425" tIns="91425" rIns="91425" bIns="91425" anchor="t" anchorCtr="0">
+            <a:normAutofit/>
+          </a:bodyPr>
+          <a:lstStyle/>
+          <a:p>
+            <a:pPr marL="114300" lvl="0" indent="0" algn="l" rtl="0">
+              <a:lnSpc>
+                <a:spcPct val="150000"/>
+              </a:lnSpc>
+              <a:spcBef>
+                <a:spcPts val="0"/>
+              </a:spcBef>
+              <a:spcAft>
+                <a:spcPts val="0"/>
+              </a:spcAft>
+              <a:buSzPts val="1800"/>
+              <a:buNone/>
+            </a:pPr>
+            <a:r>
+              <a:rPr lang="es-MX" sz="1200" dirty="0">
+                <a:latin typeface="Courier New" panose="02070309020205020404" pitchFamily="49" charset="0"/>
+                <a:cs typeface="Courier New" panose="02070309020205020404" pitchFamily="49" charset="0"/>
+              </a:rPr>
+              <a:t># Separo un test set</a:t>
+            </a:r>
+          </a:p>
+          <a:p>
+            <a:pPr marL="114300" lvl="0" indent="0" algn="l" rtl="0">
+              <a:lnSpc>
+                <a:spcPct val="150000"/>
+              </a:lnSpc>
+              <a:spcBef>
+                <a:spcPts val="0"/>
+              </a:spcBef>
+              <a:spcAft>
+                <a:spcPts val="0"/>
+              </a:spcAft>
+              <a:buSzPts val="1800"/>
+              <a:buNone/>
+            </a:pPr>
+            <a:r>
+              <a:rPr lang="es-MX" sz="1200" dirty="0" err="1">
+                <a:latin typeface="Courier New" panose="02070309020205020404" pitchFamily="49" charset="0"/>
+                <a:cs typeface="Courier New" panose="02070309020205020404" pitchFamily="49" charset="0"/>
+              </a:rPr>
+              <a:t>set.seed</a:t>
+            </a:r>
+            <a:r>
+              <a:rPr lang="es-MX" sz="1200" dirty="0">
+                <a:latin typeface="Courier New" panose="02070309020205020404" pitchFamily="49" charset="0"/>
+                <a:cs typeface="Courier New" panose="02070309020205020404" pitchFamily="49" charset="0"/>
+              </a:rPr>
+              <a:t>(123)</a:t>
+            </a:r>
+          </a:p>
+          <a:p>
+            <a:pPr marL="114300" lvl="0" indent="0" algn="l" rtl="0">
+              <a:lnSpc>
+                <a:spcPct val="150000"/>
+              </a:lnSpc>
+              <a:spcBef>
+                <a:spcPts val="0"/>
+              </a:spcBef>
+              <a:spcAft>
+                <a:spcPts val="0"/>
+              </a:spcAft>
+              <a:buSzPts val="1800"/>
+              <a:buNone/>
+            </a:pPr>
+            <a:r>
+              <a:rPr lang="es-MX" sz="1200" dirty="0" err="1">
+                <a:latin typeface="Courier New" panose="02070309020205020404" pitchFamily="49" charset="0"/>
+                <a:cs typeface="Courier New" panose="02070309020205020404" pitchFamily="49" charset="0"/>
+              </a:rPr>
+              <a:t>base_split</a:t>
+            </a:r>
+            <a:r>
+              <a:rPr lang="es-MX" sz="1200" dirty="0">
+                <a:latin typeface="Courier New" panose="02070309020205020404" pitchFamily="49" charset="0"/>
+                <a:cs typeface="Courier New" panose="02070309020205020404" pitchFamily="49" charset="0"/>
+              </a:rPr>
+              <a:t> &lt;- </a:t>
+            </a:r>
+            <a:r>
+              <a:rPr lang="es-MX" sz="1200" dirty="0" err="1">
+                <a:latin typeface="Courier New" panose="02070309020205020404" pitchFamily="49" charset="0"/>
+                <a:cs typeface="Courier New" panose="02070309020205020404" pitchFamily="49" charset="0"/>
+              </a:rPr>
+              <a:t>initial_Split</a:t>
+            </a:r>
+            <a:r>
+              <a:rPr lang="es-MX" sz="1200" dirty="0">
+                <a:latin typeface="Courier New" panose="02070309020205020404" pitchFamily="49" charset="0"/>
+                <a:cs typeface="Courier New" panose="02070309020205020404" pitchFamily="49" charset="0"/>
+              </a:rPr>
+              <a:t>(base, </a:t>
+            </a:r>
+            <a:r>
+              <a:rPr lang="es-MX" sz="1200" dirty="0" err="1">
+                <a:latin typeface="Courier New" panose="02070309020205020404" pitchFamily="49" charset="0"/>
+                <a:cs typeface="Courier New" panose="02070309020205020404" pitchFamily="49" charset="0"/>
+              </a:rPr>
+              <a:t>prop</a:t>
+            </a:r>
+            <a:r>
+              <a:rPr lang="es-MX" sz="1200" dirty="0">
+                <a:latin typeface="Courier New" panose="02070309020205020404" pitchFamily="49" charset="0"/>
+                <a:cs typeface="Courier New" panose="02070309020205020404" pitchFamily="49" charset="0"/>
+              </a:rPr>
+              <a:t>=0.8)</a:t>
+            </a:r>
+          </a:p>
+          <a:p>
+            <a:pPr marL="114300" lvl="0" indent="0" algn="l" rtl="0">
+              <a:lnSpc>
+                <a:spcPct val="150000"/>
+              </a:lnSpc>
+              <a:spcBef>
+                <a:spcPts val="0"/>
+              </a:spcBef>
+              <a:spcAft>
+                <a:spcPts val="0"/>
+              </a:spcAft>
+              <a:buSzPts val="1800"/>
+              <a:buNone/>
+            </a:pPr>
+            <a:r>
+              <a:rPr lang="es-MX" sz="1200" dirty="0" err="1">
+                <a:latin typeface="Courier New" panose="02070309020205020404" pitchFamily="49" charset="0"/>
+                <a:cs typeface="Courier New" panose="02070309020205020404" pitchFamily="49" charset="0"/>
+              </a:rPr>
+              <a:t>base_train</a:t>
+            </a:r>
+            <a:r>
+              <a:rPr lang="es-MX" sz="1200" dirty="0">
+                <a:latin typeface="Courier New" panose="02070309020205020404" pitchFamily="49" charset="0"/>
+                <a:cs typeface="Courier New" panose="02070309020205020404" pitchFamily="49" charset="0"/>
+              </a:rPr>
+              <a:t> &lt;- training(</a:t>
+            </a:r>
+            <a:r>
+              <a:rPr lang="es-MX" sz="1200" dirty="0" err="1">
+                <a:latin typeface="Courier New" panose="02070309020205020404" pitchFamily="49" charset="0"/>
+                <a:cs typeface="Courier New" panose="02070309020205020404" pitchFamily="49" charset="0"/>
+              </a:rPr>
+              <a:t>base_split</a:t>
+            </a:r>
+            <a:r>
+              <a:rPr lang="es-MX" sz="1200" dirty="0">
+                <a:latin typeface="Courier New" panose="02070309020205020404" pitchFamily="49" charset="0"/>
+                <a:cs typeface="Courier New" panose="02070309020205020404" pitchFamily="49" charset="0"/>
+              </a:rPr>
+              <a:t>)</a:t>
+            </a:r>
+          </a:p>
+          <a:p>
+            <a:pPr marL="114300" lvl="0" indent="0" algn="l" rtl="0">
+              <a:lnSpc>
+                <a:spcPct val="150000"/>
+              </a:lnSpc>
+              <a:spcBef>
+                <a:spcPts val="0"/>
+              </a:spcBef>
+              <a:spcAft>
+                <a:spcPts val="0"/>
+              </a:spcAft>
+              <a:buSzPts val="1800"/>
+              <a:buNone/>
+            </a:pPr>
+            <a:r>
+              <a:rPr lang="es-MX" sz="1200" dirty="0" err="1">
+                <a:latin typeface="Courier New" panose="02070309020205020404" pitchFamily="49" charset="0"/>
+                <a:cs typeface="Courier New" panose="02070309020205020404" pitchFamily="49" charset="0"/>
+              </a:rPr>
+              <a:t>base_test</a:t>
+            </a:r>
+            <a:r>
+              <a:rPr lang="es-MX" sz="1200" dirty="0">
+                <a:latin typeface="Courier New" panose="02070309020205020404" pitchFamily="49" charset="0"/>
+                <a:cs typeface="Courier New" panose="02070309020205020404" pitchFamily="49" charset="0"/>
+              </a:rPr>
+              <a:t>  &lt;- </a:t>
+            </a:r>
+            <a:r>
+              <a:rPr lang="es-MX" sz="1200" dirty="0" err="1">
+                <a:latin typeface="Courier New" panose="02070309020205020404" pitchFamily="49" charset="0"/>
+                <a:cs typeface="Courier New" panose="02070309020205020404" pitchFamily="49" charset="0"/>
+              </a:rPr>
+              <a:t>testing</a:t>
+            </a:r>
+            <a:r>
+              <a:rPr lang="es-MX" sz="1200" dirty="0">
+                <a:latin typeface="Courier New" panose="02070309020205020404" pitchFamily="49" charset="0"/>
+                <a:cs typeface="Courier New" panose="02070309020205020404" pitchFamily="49" charset="0"/>
+              </a:rPr>
+              <a:t>(</a:t>
+            </a:r>
+            <a:r>
+              <a:rPr lang="es-MX" sz="1200" dirty="0" err="1">
+                <a:latin typeface="Courier New" panose="02070309020205020404" pitchFamily="49" charset="0"/>
+                <a:cs typeface="Courier New" panose="02070309020205020404" pitchFamily="49" charset="0"/>
+              </a:rPr>
+              <a:t>base_split</a:t>
+            </a:r>
+            <a:r>
+              <a:rPr lang="es-MX" sz="1200" dirty="0">
+                <a:latin typeface="Courier New" panose="02070309020205020404" pitchFamily="49" charset="0"/>
+                <a:cs typeface="Courier New" panose="02070309020205020404" pitchFamily="49" charset="0"/>
+              </a:rPr>
+              <a:t>)</a:t>
+            </a:r>
+          </a:p>
+          <a:p>
+            <a:pPr marL="114300" lvl="0" indent="0" algn="l" rtl="0">
+              <a:lnSpc>
+                <a:spcPct val="150000"/>
+              </a:lnSpc>
+              <a:spcBef>
+                <a:spcPts val="0"/>
+              </a:spcBef>
+              <a:spcAft>
+                <a:spcPts val="0"/>
+              </a:spcAft>
+              <a:buSzPts val="1800"/>
+              <a:buNone/>
+            </a:pPr>
+            <a:endParaRPr lang="es-MX" sz="1200" dirty="0">
+              <a:latin typeface="Courier New" panose="02070309020205020404" pitchFamily="49" charset="0"/>
+              <a:cs typeface="Courier New" panose="02070309020205020404" pitchFamily="49" charset="0"/>
+            </a:endParaRPr>
+          </a:p>
+          <a:p>
+            <a:pPr marL="114300" lvl="0" indent="0" algn="l" rtl="0">
+              <a:lnSpc>
+                <a:spcPct val="150000"/>
+              </a:lnSpc>
+              <a:spcBef>
+                <a:spcPts val="0"/>
+              </a:spcBef>
+              <a:spcAft>
+                <a:spcPts val="0"/>
+              </a:spcAft>
+              <a:buSzPts val="1800"/>
+              <a:buNone/>
+            </a:pPr>
+            <a:r>
+              <a:rPr lang="es-MX" sz="1200" dirty="0">
+                <a:latin typeface="Courier New" panose="02070309020205020404" pitchFamily="49" charset="0"/>
+                <a:cs typeface="Courier New" panose="02070309020205020404" pitchFamily="49" charset="0"/>
+              </a:rPr>
+              <a:t># Para Cross </a:t>
+            </a:r>
+            <a:r>
+              <a:rPr lang="es-MX" sz="1200" dirty="0" err="1">
+                <a:latin typeface="Courier New" panose="02070309020205020404" pitchFamily="49" charset="0"/>
+                <a:cs typeface="Courier New" panose="02070309020205020404" pitchFamily="49" charset="0"/>
+              </a:rPr>
+              <a:t>Validation</a:t>
+            </a:r>
+            <a:endParaRPr lang="es-MX" sz="1200" dirty="0">
+              <a:latin typeface="Courier New" panose="02070309020205020404" pitchFamily="49" charset="0"/>
+              <a:cs typeface="Courier New" panose="02070309020205020404" pitchFamily="49" charset="0"/>
+            </a:endParaRPr>
+          </a:p>
+          <a:p>
+            <a:pPr marL="114300" lvl="0" indent="0" algn="l" rtl="0">
+              <a:lnSpc>
+                <a:spcPct val="150000"/>
+              </a:lnSpc>
+              <a:spcBef>
+                <a:spcPts val="0"/>
+              </a:spcBef>
+              <a:spcAft>
+                <a:spcPts val="0"/>
+              </a:spcAft>
+              <a:buSzPts val="1800"/>
+              <a:buNone/>
+            </a:pPr>
+            <a:r>
+              <a:rPr lang="es-MX" sz="1200" dirty="0" err="1">
+                <a:latin typeface="Courier New" panose="02070309020205020404" pitchFamily="49" charset="0"/>
+                <a:cs typeface="Courier New" panose="02070309020205020404" pitchFamily="49" charset="0"/>
+              </a:rPr>
+              <a:t>set.seed</a:t>
+            </a:r>
+            <a:r>
+              <a:rPr lang="es-MX" sz="1200" dirty="0">
+                <a:latin typeface="Courier New" panose="02070309020205020404" pitchFamily="49" charset="0"/>
+                <a:cs typeface="Courier New" panose="02070309020205020404" pitchFamily="49" charset="0"/>
+              </a:rPr>
+              <a:t>(234335)</a:t>
+            </a:r>
+          </a:p>
+          <a:p>
+            <a:pPr marL="114300" lvl="0" indent="0" algn="l" rtl="0">
+              <a:lnSpc>
+                <a:spcPct val="150000"/>
+              </a:lnSpc>
+              <a:spcBef>
+                <a:spcPts val="0"/>
+              </a:spcBef>
+              <a:spcAft>
+                <a:spcPts val="0"/>
+              </a:spcAft>
+              <a:buSzPts val="1800"/>
+              <a:buNone/>
+            </a:pPr>
+            <a:r>
+              <a:rPr lang="es-MX" sz="1200" dirty="0" err="1">
+                <a:latin typeface="Courier New" panose="02070309020205020404" pitchFamily="49" charset="0"/>
+                <a:cs typeface="Courier New" panose="02070309020205020404" pitchFamily="49" charset="0"/>
+              </a:rPr>
+              <a:t>base_folds</a:t>
+            </a:r>
+            <a:r>
+              <a:rPr lang="es-MX" sz="1200" dirty="0">
+                <a:latin typeface="Courier New" panose="02070309020205020404" pitchFamily="49" charset="0"/>
+                <a:cs typeface="Courier New" panose="02070309020205020404" pitchFamily="49" charset="0"/>
+              </a:rPr>
+              <a:t> &lt;- </a:t>
+            </a:r>
+            <a:r>
+              <a:rPr lang="es-MX" sz="1200" dirty="0" err="1">
+                <a:latin typeface="Courier New" panose="02070309020205020404" pitchFamily="49" charset="0"/>
+                <a:cs typeface="Courier New" panose="02070309020205020404" pitchFamily="49" charset="0"/>
+              </a:rPr>
+              <a:t>vfold_cv</a:t>
+            </a:r>
+            <a:r>
+              <a:rPr lang="es-MX" sz="1200" dirty="0">
+                <a:latin typeface="Courier New" panose="02070309020205020404" pitchFamily="49" charset="0"/>
+                <a:cs typeface="Courier New" panose="02070309020205020404" pitchFamily="49" charset="0"/>
+              </a:rPr>
+              <a:t>(</a:t>
+            </a:r>
+            <a:r>
+              <a:rPr lang="es-MX" sz="1200" dirty="0" err="1">
+                <a:latin typeface="Courier New" panose="02070309020205020404" pitchFamily="49" charset="0"/>
+                <a:cs typeface="Courier New" panose="02070309020205020404" pitchFamily="49" charset="0"/>
+              </a:rPr>
+              <a:t>base_train</a:t>
+            </a:r>
+            <a:r>
+              <a:rPr lang="es-MX" sz="1200" dirty="0">
+                <a:latin typeface="Courier New" panose="02070309020205020404" pitchFamily="49" charset="0"/>
+                <a:cs typeface="Courier New" panose="02070309020205020404" pitchFamily="49" charset="0"/>
+              </a:rPr>
+              <a:t>, v = 10)</a:t>
+            </a:r>
+            <a:endParaRPr sz="1200" dirty="0">
+              <a:latin typeface="Courier New" panose="02070309020205020404" pitchFamily="49" charset="0"/>
+              <a:cs typeface="Courier New" panose="02070309020205020404" pitchFamily="49" charset="0"/>
+            </a:endParaRPr>
+          </a:p>
+        </p:txBody>
+      </p:sp>
+    </p:spTree>
   </p:cSld>
   <p:clrMapOvr>
     <a:masterClrMapping/>

</xml_diff>

<commit_message>
agrego .R de las practicas y actualizaciones menores
</commit_message>
<xml_diff>
--- a/clase2/Tidymodels.pptx
+++ b/clase2/Tidymodels.pptx
@@ -5,36 +5,30 @@
     <p:sldMasterId id="2147483659" r:id="rId1"/>
   </p:sldMasterIdLst>
   <p:notesMasterIdLst>
-    <p:notesMasterId r:id="rId12"/>
+    <p:notesMasterId r:id="rId13"/>
   </p:notesMasterIdLst>
   <p:sldIdLst>
     <p:sldId id="256" r:id="rId2"/>
     <p:sldId id="265" r:id="rId3"/>
     <p:sldId id="313" r:id="rId4"/>
     <p:sldId id="314" r:id="rId5"/>
-    <p:sldId id="301" r:id="rId6"/>
-    <p:sldId id="315" r:id="rId7"/>
-    <p:sldId id="296" r:id="rId8"/>
-    <p:sldId id="316" r:id="rId9"/>
-    <p:sldId id="317" r:id="rId10"/>
-    <p:sldId id="312" r:id="rId11"/>
+    <p:sldId id="318" r:id="rId6"/>
+    <p:sldId id="301" r:id="rId7"/>
+    <p:sldId id="315" r:id="rId8"/>
+    <p:sldId id="296" r:id="rId9"/>
+    <p:sldId id="316" r:id="rId10"/>
+    <p:sldId id="317" r:id="rId11"/>
+    <p:sldId id="312" r:id="rId12"/>
   </p:sldIdLst>
   <p:sldSz cx="9144000" cy="5143500" type="screen16x9"/>
   <p:notesSz cx="6858000" cy="9144000"/>
   <p:embeddedFontLst>
     <p:embeddedFont>
-      <p:font typeface="Georgia" panose="02040502050405020303" pitchFamily="18" charset="0"/>
-      <p:regular r:id="rId13"/>
-      <p:bold r:id="rId14"/>
-      <p:italic r:id="rId15"/>
-      <p:boldItalic r:id="rId16"/>
-    </p:embeddedFont>
-    <p:embeddedFont>
       <p:font typeface="Proxima Nova" panose="020B0604020202020204" charset="0"/>
-      <p:regular r:id="rId17"/>
-      <p:bold r:id="rId18"/>
-      <p:italic r:id="rId19"/>
-      <p:boldItalic r:id="rId20"/>
+      <p:regular r:id="rId14"/>
+      <p:bold r:id="rId15"/>
+      <p:italic r:id="rId16"/>
+      <p:boldItalic r:id="rId17"/>
     </p:embeddedFont>
   </p:embeddedFontLst>
   <p:defaultTextStyle>
@@ -835,6 +829,115 @@
   <p:cSld>
     <p:spTree>
       <p:nvGrpSpPr>
+        <p:cNvPr id="1" name="Shape 306"/>
+        <p:cNvGrpSpPr/>
+        <p:nvPr/>
+      </p:nvGrpSpPr>
+      <p:grpSpPr>
+        <a:xfrm>
+          <a:off x="0" y="0"/>
+          <a:ext cx="0" cy="0"/>
+          <a:chOff x="0" y="0"/>
+          <a:chExt cx="0" cy="0"/>
+        </a:xfrm>
+      </p:grpSpPr>
+      <p:sp>
+        <p:nvSpPr>
+          <p:cNvPr id="307" name="Google Shape;307;ge5a1b4e583_0_560:notes"/>
+          <p:cNvSpPr>
+            <a:spLocks noGrp="1" noRot="1" noChangeAspect="1"/>
+          </p:cNvSpPr>
+          <p:nvPr>
+            <p:ph type="sldImg" idx="2"/>
+          </p:nvPr>
+        </p:nvSpPr>
+        <p:spPr>
+          <a:xfrm>
+            <a:off x="381000" y="685800"/>
+            <a:ext cx="6096000" cy="3429000"/>
+          </a:xfrm>
+          <a:custGeom>
+            <a:avLst/>
+            <a:gdLst/>
+            <a:ahLst/>
+            <a:cxnLst/>
+            <a:rect l="l" t="t" r="r" b="b"/>
+            <a:pathLst>
+              <a:path w="120000" h="120000" extrusionOk="0">
+                <a:moveTo>
+                  <a:pt x="0" y="0"/>
+                </a:moveTo>
+                <a:lnTo>
+                  <a:pt x="120000" y="0"/>
+                </a:lnTo>
+                <a:lnTo>
+                  <a:pt x="120000" y="120000"/>
+                </a:lnTo>
+                <a:lnTo>
+                  <a:pt x="0" y="120000"/>
+                </a:lnTo>
+                <a:close/>
+              </a:path>
+            </a:pathLst>
+          </a:custGeom>
+        </p:spPr>
+      </p:sp>
+      <p:sp>
+        <p:nvSpPr>
+          <p:cNvPr id="308" name="Google Shape;308;ge5a1b4e583_0_560:notes"/>
+          <p:cNvSpPr txBox="1">
+            <a:spLocks noGrp="1"/>
+          </p:cNvSpPr>
+          <p:nvPr>
+            <p:ph type="body" idx="1"/>
+          </p:nvPr>
+        </p:nvSpPr>
+        <p:spPr>
+          <a:xfrm>
+            <a:off x="685800" y="4343400"/>
+            <a:ext cx="5486400" cy="4114800"/>
+          </a:xfrm>
+          <a:prstGeom prst="rect">
+            <a:avLst/>
+          </a:prstGeom>
+        </p:spPr>
+        <p:txBody>
+          <a:bodyPr spcFirstLastPara="1" wrap="square" lIns="91425" tIns="91425" rIns="91425" bIns="91425" anchor="t" anchorCtr="0">
+            <a:noAutofit/>
+          </a:bodyPr>
+          <a:lstStyle/>
+          <a:p>
+            <a:pPr marL="0" lvl="0" indent="0" algn="l" rtl="0">
+              <a:spcBef>
+                <a:spcPts val="0"/>
+              </a:spcBef>
+              <a:spcAft>
+                <a:spcPts val="0"/>
+              </a:spcAft>
+              <a:buNone/>
+            </a:pPr>
+            <a:endParaRPr/>
+          </a:p>
+        </p:txBody>
+      </p:sp>
+    </p:spTree>
+    <p:extLst>
+      <p:ext uri="{BB962C8B-B14F-4D97-AF65-F5344CB8AC3E}">
+        <p14:creationId xmlns:p14="http://schemas.microsoft.com/office/powerpoint/2010/main" val="4286417770"/>
+      </p:ext>
+    </p:extLst>
+  </p:cSld>
+  <p:clrMapOvr>
+    <a:masterClrMapping/>
+  </p:clrMapOvr>
+</p:notes>
+</file>
+
+<file path=ppt/notesSlides/notesSlide11.xml><?xml version="1.0" encoding="utf-8"?>
+<p:notes xmlns:a="http://schemas.openxmlformats.org/drawingml/2006/main" xmlns:r="http://schemas.openxmlformats.org/officeDocument/2006/relationships" xmlns:p="http://schemas.openxmlformats.org/presentationml/2006/main" showMasterSp="0" showMasterPhAnim="0">
+  <p:cSld>
+    <p:spTree>
+      <p:nvGrpSpPr>
         <p:cNvPr id="1" name="Shape 270"/>
         <p:cNvGrpSpPr/>
         <p:nvPr/>
@@ -1135,26 +1238,6 @@
               </a:spcAft>
               <a:buNone/>
             </a:pPr>
-            <a:r>
-              <a:rPr lang="es-MX" b="0" i="1" dirty="0">
-                <a:solidFill>
-                  <a:srgbClr val="333333"/>
-                </a:solidFill>
-                <a:effectLst/>
-                <a:latin typeface="Georgia" panose="02040502050405020303" pitchFamily="18" charset="0"/>
-              </a:rPr>
-              <a:t>Nota:</a:t>
-            </a:r>
-            <a:r>
-              <a:rPr lang="es-MX" b="0" i="0" dirty="0">
-                <a:solidFill>
-                  <a:srgbClr val="333333"/>
-                </a:solidFill>
-                <a:effectLst/>
-                <a:latin typeface="Georgia" panose="02040502050405020303" pitchFamily="18" charset="0"/>
-              </a:rPr>
-              <a:t> en todos estos casos, estamos tomando la regresión lineal como un modelo de inferencia.</a:t>
-            </a:r>
             <a:endParaRPr dirty="0"/>
           </a:p>
         </p:txBody>
@@ -1264,26 +1347,6 @@
               </a:spcAft>
               <a:buNone/>
             </a:pPr>
-            <a:r>
-              <a:rPr lang="es-MX" b="0" i="1" dirty="0">
-                <a:solidFill>
-                  <a:srgbClr val="333333"/>
-                </a:solidFill>
-                <a:effectLst/>
-                <a:latin typeface="Georgia" panose="02040502050405020303" pitchFamily="18" charset="0"/>
-              </a:rPr>
-              <a:t>Nota:</a:t>
-            </a:r>
-            <a:r>
-              <a:rPr lang="es-MX" b="0" i="0" dirty="0">
-                <a:solidFill>
-                  <a:srgbClr val="333333"/>
-                </a:solidFill>
-                <a:effectLst/>
-                <a:latin typeface="Georgia" panose="02040502050405020303" pitchFamily="18" charset="0"/>
-              </a:rPr>
-              <a:t> en todos estos casos, estamos tomando la regresión lineal como un modelo de inferencia.</a:t>
-            </a:r>
             <a:endParaRPr dirty="0"/>
           </a:p>
         </p:txBody>
@@ -1393,26 +1456,6 @@
               </a:spcAft>
               <a:buNone/>
             </a:pPr>
-            <a:r>
-              <a:rPr lang="es-MX" b="0" i="1" dirty="0">
-                <a:solidFill>
-                  <a:srgbClr val="333333"/>
-                </a:solidFill>
-                <a:effectLst/>
-                <a:latin typeface="Georgia" panose="02040502050405020303" pitchFamily="18" charset="0"/>
-              </a:rPr>
-              <a:t>Nota:</a:t>
-            </a:r>
-            <a:r>
-              <a:rPr lang="es-MX" b="0" i="0" dirty="0">
-                <a:solidFill>
-                  <a:srgbClr val="333333"/>
-                </a:solidFill>
-                <a:effectLst/>
-                <a:latin typeface="Georgia" panose="02040502050405020303" pitchFamily="18" charset="0"/>
-              </a:rPr>
-              <a:t> en todos estos casos, estamos tomando la regresión lineal como un modelo de inferencia.</a:t>
-            </a:r>
             <a:endParaRPr dirty="0"/>
           </a:p>
         </p:txBody>
@@ -1420,7 +1463,7 @@
     </p:spTree>
     <p:extLst>
       <p:ext uri="{BB962C8B-B14F-4D97-AF65-F5344CB8AC3E}">
-        <p14:creationId xmlns:p14="http://schemas.microsoft.com/office/powerpoint/2010/main" val="1975853175"/>
+        <p14:creationId xmlns:p14="http://schemas.microsoft.com/office/powerpoint/2010/main" val="3691601506"/>
       </p:ext>
     </p:extLst>
   </p:cSld>
@@ -1522,26 +1565,6 @@
               </a:spcAft>
               <a:buNone/>
             </a:pPr>
-            <a:r>
-              <a:rPr lang="es-MX" b="0" i="1" dirty="0">
-                <a:solidFill>
-                  <a:srgbClr val="333333"/>
-                </a:solidFill>
-                <a:effectLst/>
-                <a:latin typeface="Georgia" panose="02040502050405020303" pitchFamily="18" charset="0"/>
-              </a:rPr>
-              <a:t>Nota:</a:t>
-            </a:r>
-            <a:r>
-              <a:rPr lang="es-MX" b="0" i="0" dirty="0">
-                <a:solidFill>
-                  <a:srgbClr val="333333"/>
-                </a:solidFill>
-                <a:effectLst/>
-                <a:latin typeface="Georgia" panose="02040502050405020303" pitchFamily="18" charset="0"/>
-              </a:rPr>
-              <a:t> en todos estos casos, estamos tomando la regresión lineal como un modelo de inferencia.</a:t>
-            </a:r>
             <a:endParaRPr dirty="0"/>
           </a:p>
         </p:txBody>
@@ -1549,7 +1572,7 @@
     </p:spTree>
     <p:extLst>
       <p:ext uri="{BB962C8B-B14F-4D97-AF65-F5344CB8AC3E}">
-        <p14:creationId xmlns:p14="http://schemas.microsoft.com/office/powerpoint/2010/main" val="322590814"/>
+        <p14:creationId xmlns:p14="http://schemas.microsoft.com/office/powerpoint/2010/main" val="1975853175"/>
       </p:ext>
     </p:extLst>
   </p:cSld>
@@ -1564,7 +1587,7 @@
   <p:cSld>
     <p:spTree>
       <p:nvGrpSpPr>
-        <p:cNvPr id="1" name="Shape 306"/>
+        <p:cNvPr id="1" name="Shape 224"/>
         <p:cNvGrpSpPr/>
         <p:nvPr/>
       </p:nvGrpSpPr>
@@ -1578,7 +1601,7 @@
       </p:grpSpPr>
       <p:sp>
         <p:nvSpPr>
-          <p:cNvPr id="307" name="Google Shape;307;ge5a1b4e583_0_560:notes"/>
+          <p:cNvPr id="225" name="Google Shape;225;ge626d24df6_0_249:notes"/>
           <p:cNvSpPr>
             <a:spLocks noGrp="1" noRot="1" noChangeAspect="1"/>
           </p:cNvSpPr>
@@ -1619,7 +1642,7 @@
       </p:sp>
       <p:sp>
         <p:nvSpPr>
-          <p:cNvPr id="308" name="Google Shape;308;ge5a1b4e583_0_560:notes"/>
+          <p:cNvPr id="226" name="Google Shape;226;ge626d24df6_0_249:notes"/>
           <p:cNvSpPr txBox="1">
             <a:spLocks noGrp="1"/>
           </p:cNvSpPr>
@@ -1651,11 +1674,16 @@
               </a:spcAft>
               <a:buNone/>
             </a:pPr>
-            <a:endParaRPr/>
+            <a:endParaRPr dirty="0"/>
           </a:p>
         </p:txBody>
       </p:sp>
     </p:spTree>
+    <p:extLst>
+      <p:ext uri="{BB962C8B-B14F-4D97-AF65-F5344CB8AC3E}">
+        <p14:creationId xmlns:p14="http://schemas.microsoft.com/office/powerpoint/2010/main" val="322590814"/>
+      </p:ext>
+    </p:extLst>
   </p:cSld>
   <p:clrMapOvr>
     <a:masterClrMapping/>
@@ -1760,11 +1788,6 @@
         </p:txBody>
       </p:sp>
     </p:spTree>
-    <p:extLst>
-      <p:ext uri="{BB962C8B-B14F-4D97-AF65-F5344CB8AC3E}">
-        <p14:creationId xmlns:p14="http://schemas.microsoft.com/office/powerpoint/2010/main" val="1643401085"/>
-      </p:ext>
-    </p:extLst>
   </p:cSld>
   <p:clrMapOvr>
     <a:masterClrMapping/>
@@ -1871,7 +1894,7 @@
     </p:spTree>
     <p:extLst>
       <p:ext uri="{BB962C8B-B14F-4D97-AF65-F5344CB8AC3E}">
-        <p14:creationId xmlns:p14="http://schemas.microsoft.com/office/powerpoint/2010/main" val="4286417770"/>
+        <p14:creationId xmlns:p14="http://schemas.microsoft.com/office/powerpoint/2010/main" val="1643401085"/>
       </p:ext>
     </p:extLst>
   </p:cSld>
@@ -7480,33 +7503,6 @@
           </a:p>
         </p:txBody>
       </p:sp>
-      <p:pic>
-        <p:nvPicPr>
-          <p:cNvPr id="61" name="Google Shape;61;p13"/>
-          <p:cNvPicPr preferRelativeResize="0"/>
-          <p:nvPr/>
-        </p:nvPicPr>
-        <p:blipFill rotWithShape="1">
-          <a:blip r:embed="rId3">
-            <a:alphaModFix/>
-          </a:blip>
-          <a:srcRect l="15544" t="36940" r="15948" b="37818"/>
-          <a:stretch/>
-        </p:blipFill>
-        <p:spPr>
-          <a:xfrm>
-            <a:off x="7195950" y="284375"/>
-            <a:ext cx="1684874" cy="465550"/>
-          </a:xfrm>
-          <a:prstGeom prst="rect">
-            <a:avLst/>
-          </a:prstGeom>
-          <a:noFill/>
-          <a:ln>
-            <a:noFill/>
-          </a:ln>
-        </p:spPr>
-      </p:pic>
     </p:spTree>
   </p:cSld>
   <p:clrMapOvr>
@@ -7516,6 +7512,928 @@
 </file>
 
 <file path=ppt/slides/slide10.xml><?xml version="1.0" encoding="utf-8"?>
+<p:sld xmlns:a="http://schemas.openxmlformats.org/drawingml/2006/main" xmlns:r="http://schemas.openxmlformats.org/officeDocument/2006/relationships" xmlns:p="http://schemas.openxmlformats.org/presentationml/2006/main">
+  <p:cSld>
+    <p:spTree>
+      <p:nvGrpSpPr>
+        <p:cNvPr id="1" name="Shape 309"/>
+        <p:cNvGrpSpPr/>
+        <p:nvPr/>
+      </p:nvGrpSpPr>
+      <p:grpSpPr>
+        <a:xfrm>
+          <a:off x="0" y="0"/>
+          <a:ext cx="0" cy="0"/>
+          <a:chOff x="0" y="0"/>
+          <a:chExt cx="0" cy="0"/>
+        </a:xfrm>
+      </p:grpSpPr>
+      <p:sp>
+        <p:nvSpPr>
+          <p:cNvPr id="310" name="Google Shape;310;p53"/>
+          <p:cNvSpPr txBox="1">
+            <a:spLocks noGrp="1"/>
+          </p:cNvSpPr>
+          <p:nvPr>
+            <p:ph type="title"/>
+          </p:nvPr>
+        </p:nvSpPr>
+        <p:spPr>
+          <a:xfrm>
+            <a:off x="311700" y="156100"/>
+            <a:ext cx="8520600" cy="572700"/>
+          </a:xfrm>
+          <a:prstGeom prst="rect">
+            <a:avLst/>
+          </a:prstGeom>
+        </p:spPr>
+        <p:txBody>
+          <a:bodyPr spcFirstLastPara="1" wrap="square" lIns="91425" tIns="91425" rIns="91425" bIns="91425" anchor="t" anchorCtr="0">
+            <a:normAutofit fontScale="90000"/>
+          </a:bodyPr>
+          <a:lstStyle/>
+          <a:p>
+            <a:pPr marL="0" lvl="0" indent="0" algn="l" rtl="0">
+              <a:spcBef>
+                <a:spcPts val="0"/>
+              </a:spcBef>
+              <a:spcAft>
+                <a:spcPts val="0"/>
+              </a:spcAft>
+              <a:buNone/>
+            </a:pPr>
+            <a:r>
+              <a:rPr lang="en-GB" dirty="0"/>
+              <a:t>Tuning</a:t>
+            </a:r>
+            <a:endParaRPr dirty="0"/>
+          </a:p>
+        </p:txBody>
+      </p:sp>
+      <p:sp>
+        <p:nvSpPr>
+          <p:cNvPr id="311" name="Google Shape;311;p53"/>
+          <p:cNvSpPr txBox="1">
+            <a:spLocks noGrp="1"/>
+          </p:cNvSpPr>
+          <p:nvPr>
+            <p:ph type="body" idx="1"/>
+          </p:nvPr>
+        </p:nvSpPr>
+        <p:spPr>
+          <a:xfrm>
+            <a:off x="311699" y="728799"/>
+            <a:ext cx="6164052" cy="4258601"/>
+          </a:xfrm>
+          <a:prstGeom prst="rect">
+            <a:avLst/>
+          </a:prstGeom>
+        </p:spPr>
+        <p:txBody>
+          <a:bodyPr spcFirstLastPara="1" wrap="square" lIns="91425" tIns="91425" rIns="91425" bIns="91425" anchor="t" anchorCtr="0">
+            <a:normAutofit fontScale="85000" lnSpcReduction="20000"/>
+          </a:bodyPr>
+          <a:lstStyle/>
+          <a:p>
+            <a:pPr marL="114300" lvl="0" indent="0" algn="l" rtl="0">
+              <a:lnSpc>
+                <a:spcPct val="150000"/>
+              </a:lnSpc>
+              <a:spcBef>
+                <a:spcPts val="0"/>
+              </a:spcBef>
+              <a:spcAft>
+                <a:spcPts val="0"/>
+              </a:spcAft>
+              <a:buSzPts val="1800"/>
+              <a:buNone/>
+            </a:pPr>
+            <a:r>
+              <a:rPr lang="es-MX" sz="1200" dirty="0">
+                <a:latin typeface="Courier New" panose="02070309020205020404" pitchFamily="49" charset="0"/>
+                <a:cs typeface="Courier New" panose="02070309020205020404" pitchFamily="49" charset="0"/>
+              </a:rPr>
+              <a:t># Quiero agregar términos polinómicos a mi lm tuneando el grado</a:t>
+            </a:r>
+          </a:p>
+          <a:p>
+            <a:pPr marL="114300" lvl="0" indent="0" algn="l" rtl="0">
+              <a:lnSpc>
+                <a:spcPct val="150000"/>
+              </a:lnSpc>
+              <a:spcBef>
+                <a:spcPts val="0"/>
+              </a:spcBef>
+              <a:spcAft>
+                <a:spcPts val="0"/>
+              </a:spcAft>
+              <a:buSzPts val="1800"/>
+              <a:buNone/>
+            </a:pPr>
+            <a:r>
+              <a:rPr lang="es-MX" sz="1200" dirty="0" err="1">
+                <a:latin typeface="Courier New" panose="02070309020205020404" pitchFamily="49" charset="0"/>
+                <a:cs typeface="Courier New" panose="02070309020205020404" pitchFamily="49" charset="0"/>
+              </a:rPr>
+              <a:t>lm_rec_tune</a:t>
+            </a:r>
+            <a:r>
+              <a:rPr lang="es-MX" sz="1200" dirty="0">
+                <a:latin typeface="Courier New" panose="02070309020205020404" pitchFamily="49" charset="0"/>
+                <a:cs typeface="Courier New" panose="02070309020205020404" pitchFamily="49" charset="0"/>
+              </a:rPr>
+              <a:t> &lt;- </a:t>
+            </a:r>
+            <a:r>
+              <a:rPr lang="es-MX" sz="1200" dirty="0" err="1">
+                <a:latin typeface="Courier New" panose="02070309020205020404" pitchFamily="49" charset="0"/>
+                <a:cs typeface="Courier New" panose="02070309020205020404" pitchFamily="49" charset="0"/>
+              </a:rPr>
+              <a:t>lm_rec</a:t>
+            </a:r>
+            <a:r>
+              <a:rPr lang="es-MX" sz="1200" dirty="0">
+                <a:latin typeface="Courier New" panose="02070309020205020404" pitchFamily="49" charset="0"/>
+                <a:cs typeface="Courier New" panose="02070309020205020404" pitchFamily="49" charset="0"/>
+              </a:rPr>
+              <a:t> %&gt;% </a:t>
+            </a:r>
+          </a:p>
+          <a:p>
+            <a:pPr marL="114300" lvl="0" indent="0" algn="l" rtl="0">
+              <a:lnSpc>
+                <a:spcPct val="150000"/>
+              </a:lnSpc>
+              <a:spcBef>
+                <a:spcPts val="0"/>
+              </a:spcBef>
+              <a:spcAft>
+                <a:spcPts val="0"/>
+              </a:spcAft>
+              <a:buSzPts val="1800"/>
+              <a:buNone/>
+            </a:pPr>
+            <a:r>
+              <a:rPr lang="es-MX" sz="1200" dirty="0">
+                <a:latin typeface="Courier New" panose="02070309020205020404" pitchFamily="49" charset="0"/>
+                <a:cs typeface="Courier New" panose="02070309020205020404" pitchFamily="49" charset="0"/>
+              </a:rPr>
+              <a:t>	    	</a:t>
+            </a:r>
+            <a:r>
+              <a:rPr lang="es-MX" sz="1200" dirty="0" err="1">
+                <a:latin typeface="Courier New" panose="02070309020205020404" pitchFamily="49" charset="0"/>
+                <a:cs typeface="Courier New" panose="02070309020205020404" pitchFamily="49" charset="0"/>
+              </a:rPr>
+              <a:t>step_poly</a:t>
+            </a:r>
+            <a:r>
+              <a:rPr lang="es-MX" sz="1200" dirty="0">
+                <a:latin typeface="Courier New" panose="02070309020205020404" pitchFamily="49" charset="0"/>
+                <a:cs typeface="Courier New" panose="02070309020205020404" pitchFamily="49" charset="0"/>
+              </a:rPr>
+              <a:t>(</a:t>
+            </a:r>
+            <a:r>
+              <a:rPr lang="es-MX" sz="1200" dirty="0" err="1">
+                <a:latin typeface="Courier New" panose="02070309020205020404" pitchFamily="49" charset="0"/>
+                <a:cs typeface="Courier New" panose="02070309020205020404" pitchFamily="49" charset="0"/>
+              </a:rPr>
+              <a:t>all_numeric_predictors</a:t>
+            </a:r>
+            <a:r>
+              <a:rPr lang="es-MX" sz="1200" dirty="0">
+                <a:latin typeface="Courier New" panose="02070309020205020404" pitchFamily="49" charset="0"/>
+                <a:cs typeface="Courier New" panose="02070309020205020404" pitchFamily="49" charset="0"/>
+              </a:rPr>
+              <a:t>(),</a:t>
+            </a:r>
+          </a:p>
+          <a:p>
+            <a:pPr marL="114300" lvl="0" indent="0" algn="l" rtl="0">
+              <a:lnSpc>
+                <a:spcPct val="150000"/>
+              </a:lnSpc>
+              <a:spcBef>
+                <a:spcPts val="0"/>
+              </a:spcBef>
+              <a:spcAft>
+                <a:spcPts val="0"/>
+              </a:spcAft>
+              <a:buSzPts val="1800"/>
+              <a:buNone/>
+            </a:pPr>
+            <a:r>
+              <a:rPr lang="es-MX" sz="1200" dirty="0">
+                <a:latin typeface="Courier New" panose="02070309020205020404" pitchFamily="49" charset="0"/>
+                <a:cs typeface="Courier New" panose="02070309020205020404" pitchFamily="49" charset="0"/>
+              </a:rPr>
+              <a:t>	     		   </a:t>
+            </a:r>
+            <a:r>
+              <a:rPr lang="es-MX" sz="1200" dirty="0" err="1">
+                <a:latin typeface="Courier New" panose="02070309020205020404" pitchFamily="49" charset="0"/>
+                <a:cs typeface="Courier New" panose="02070309020205020404" pitchFamily="49" charset="0"/>
+              </a:rPr>
+              <a:t>degree</a:t>
+            </a:r>
+            <a:r>
+              <a:rPr lang="es-MX" sz="1200" dirty="0">
+                <a:latin typeface="Courier New" panose="02070309020205020404" pitchFamily="49" charset="0"/>
+                <a:cs typeface="Courier New" panose="02070309020205020404" pitchFamily="49" charset="0"/>
+              </a:rPr>
+              <a:t> = tune())</a:t>
+            </a:r>
+          </a:p>
+          <a:p>
+            <a:pPr marL="114300" lvl="0" indent="0" algn="l" rtl="0">
+              <a:lnSpc>
+                <a:spcPct val="150000"/>
+              </a:lnSpc>
+              <a:spcBef>
+                <a:spcPts val="0"/>
+              </a:spcBef>
+              <a:spcAft>
+                <a:spcPts val="0"/>
+              </a:spcAft>
+              <a:buSzPts val="1800"/>
+              <a:buNone/>
+            </a:pPr>
+            <a:endParaRPr lang="es-MX" sz="1200" dirty="0">
+              <a:latin typeface="Courier New" panose="02070309020205020404" pitchFamily="49" charset="0"/>
+              <a:cs typeface="Courier New" panose="02070309020205020404" pitchFamily="49" charset="0"/>
+            </a:endParaRPr>
+          </a:p>
+          <a:p>
+            <a:pPr marL="114300" lvl="0" indent="0" algn="l" rtl="0">
+              <a:lnSpc>
+                <a:spcPct val="150000"/>
+              </a:lnSpc>
+              <a:spcBef>
+                <a:spcPts val="0"/>
+              </a:spcBef>
+              <a:spcAft>
+                <a:spcPts val="0"/>
+              </a:spcAft>
+              <a:buSzPts val="1800"/>
+              <a:buNone/>
+            </a:pPr>
+            <a:r>
+              <a:rPr lang="es-MX" sz="1200" dirty="0">
+                <a:latin typeface="Courier New" panose="02070309020205020404" pitchFamily="49" charset="0"/>
+                <a:cs typeface="Courier New" panose="02070309020205020404" pitchFamily="49" charset="0"/>
+              </a:rPr>
+              <a:t># Armo el </a:t>
+            </a:r>
+            <a:r>
+              <a:rPr lang="es-MX" sz="1200" dirty="0" err="1">
+                <a:latin typeface="Courier New" panose="02070309020205020404" pitchFamily="49" charset="0"/>
+                <a:cs typeface="Courier New" panose="02070309020205020404" pitchFamily="49" charset="0"/>
+              </a:rPr>
+              <a:t>workflow</a:t>
+            </a:r>
+            <a:endParaRPr lang="es-MX" sz="1200" dirty="0">
+              <a:latin typeface="Courier New" panose="02070309020205020404" pitchFamily="49" charset="0"/>
+              <a:cs typeface="Courier New" panose="02070309020205020404" pitchFamily="49" charset="0"/>
+            </a:endParaRPr>
+          </a:p>
+          <a:p>
+            <a:pPr marL="114300" lvl="0" indent="0" algn="l" rtl="0">
+              <a:lnSpc>
+                <a:spcPct val="150000"/>
+              </a:lnSpc>
+              <a:spcBef>
+                <a:spcPts val="0"/>
+              </a:spcBef>
+              <a:spcAft>
+                <a:spcPts val="0"/>
+              </a:spcAft>
+              <a:buSzPts val="1800"/>
+              <a:buNone/>
+            </a:pPr>
+            <a:r>
+              <a:rPr lang="es-MX" sz="1200" dirty="0" err="1">
+                <a:latin typeface="Courier New" panose="02070309020205020404" pitchFamily="49" charset="0"/>
+                <a:cs typeface="Courier New" panose="02070309020205020404" pitchFamily="49" charset="0"/>
+              </a:rPr>
+              <a:t>lm_wflow_tune</a:t>
+            </a:r>
+            <a:r>
+              <a:rPr lang="es-MX" sz="1200" dirty="0">
+                <a:latin typeface="Courier New" panose="02070309020205020404" pitchFamily="49" charset="0"/>
+                <a:cs typeface="Courier New" panose="02070309020205020404" pitchFamily="49" charset="0"/>
+              </a:rPr>
+              <a:t> &lt;- </a:t>
+            </a:r>
+            <a:r>
+              <a:rPr lang="es-MX" sz="1200" dirty="0" err="1">
+                <a:latin typeface="Courier New" panose="02070309020205020404" pitchFamily="49" charset="0"/>
+                <a:cs typeface="Courier New" panose="02070309020205020404" pitchFamily="49" charset="0"/>
+              </a:rPr>
+              <a:t>lm_workflow</a:t>
+            </a:r>
+            <a:r>
+              <a:rPr lang="es-MX" sz="1200" dirty="0">
+                <a:latin typeface="Courier New" panose="02070309020205020404" pitchFamily="49" charset="0"/>
+                <a:cs typeface="Courier New" panose="02070309020205020404" pitchFamily="49" charset="0"/>
+              </a:rPr>
+              <a:t>() %&gt;%</a:t>
+            </a:r>
+          </a:p>
+          <a:p>
+            <a:pPr marL="114300" lvl="0" indent="0" algn="l" rtl="0">
+              <a:lnSpc>
+                <a:spcPct val="150000"/>
+              </a:lnSpc>
+              <a:spcBef>
+                <a:spcPts val="0"/>
+              </a:spcBef>
+              <a:spcAft>
+                <a:spcPts val="0"/>
+              </a:spcAft>
+              <a:buSzPts val="1800"/>
+              <a:buNone/>
+            </a:pPr>
+            <a:r>
+              <a:rPr lang="es-MX" sz="1200" dirty="0">
+                <a:latin typeface="Courier New" panose="02070309020205020404" pitchFamily="49" charset="0"/>
+                <a:cs typeface="Courier New" panose="02070309020205020404" pitchFamily="49" charset="0"/>
+              </a:rPr>
+              <a:t>	    	</a:t>
+            </a:r>
+            <a:r>
+              <a:rPr lang="es-MX" sz="1200" dirty="0" err="1">
+                <a:latin typeface="Courier New" panose="02070309020205020404" pitchFamily="49" charset="0"/>
+                <a:cs typeface="Courier New" panose="02070309020205020404" pitchFamily="49" charset="0"/>
+              </a:rPr>
+              <a:t>remove_reipe</a:t>
+            </a:r>
+            <a:r>
+              <a:rPr lang="es-MX" sz="1200" dirty="0">
+                <a:latin typeface="Courier New" panose="02070309020205020404" pitchFamily="49" charset="0"/>
+                <a:cs typeface="Courier New" panose="02070309020205020404" pitchFamily="49" charset="0"/>
+              </a:rPr>
+              <a:t>() %&gt;%</a:t>
+            </a:r>
+          </a:p>
+          <a:p>
+            <a:pPr marL="114300" lvl="0" indent="0" algn="l" rtl="0">
+              <a:lnSpc>
+                <a:spcPct val="150000"/>
+              </a:lnSpc>
+              <a:spcBef>
+                <a:spcPts val="0"/>
+              </a:spcBef>
+              <a:spcAft>
+                <a:spcPts val="0"/>
+              </a:spcAft>
+              <a:buSzPts val="1800"/>
+              <a:buNone/>
+            </a:pPr>
+            <a:r>
+              <a:rPr lang="es-MX" sz="1200" dirty="0">
+                <a:latin typeface="Courier New" panose="02070309020205020404" pitchFamily="49" charset="0"/>
+                <a:cs typeface="Courier New" panose="02070309020205020404" pitchFamily="49" charset="0"/>
+              </a:rPr>
+              <a:t>	    	</a:t>
+            </a:r>
+            <a:r>
+              <a:rPr lang="es-MX" sz="1200" dirty="0" err="1">
+                <a:latin typeface="Courier New" panose="02070309020205020404" pitchFamily="49" charset="0"/>
+                <a:cs typeface="Courier New" panose="02070309020205020404" pitchFamily="49" charset="0"/>
+              </a:rPr>
+              <a:t>add_recipe</a:t>
+            </a:r>
+            <a:r>
+              <a:rPr lang="es-MX" sz="1200" dirty="0">
+                <a:latin typeface="Courier New" panose="02070309020205020404" pitchFamily="49" charset="0"/>
+                <a:cs typeface="Courier New" panose="02070309020205020404" pitchFamily="49" charset="0"/>
+              </a:rPr>
+              <a:t>(</a:t>
+            </a:r>
+            <a:r>
+              <a:rPr lang="es-MX" sz="1200" dirty="0" err="1">
+                <a:latin typeface="Courier New" panose="02070309020205020404" pitchFamily="49" charset="0"/>
+                <a:cs typeface="Courier New" panose="02070309020205020404" pitchFamily="49" charset="0"/>
+              </a:rPr>
+              <a:t>lm_rec_tune</a:t>
+            </a:r>
+            <a:r>
+              <a:rPr lang="es-MX" sz="1200" dirty="0">
+                <a:latin typeface="Courier New" panose="02070309020205020404" pitchFamily="49" charset="0"/>
+                <a:cs typeface="Courier New" panose="02070309020205020404" pitchFamily="49" charset="0"/>
+              </a:rPr>
+              <a:t>)</a:t>
+            </a:r>
+          </a:p>
+          <a:p>
+            <a:pPr marL="114300" lvl="0" indent="0" algn="l" rtl="0">
+              <a:lnSpc>
+                <a:spcPct val="150000"/>
+              </a:lnSpc>
+              <a:spcBef>
+                <a:spcPts val="0"/>
+              </a:spcBef>
+              <a:spcAft>
+                <a:spcPts val="0"/>
+              </a:spcAft>
+              <a:buSzPts val="1800"/>
+              <a:buNone/>
+            </a:pPr>
+            <a:endParaRPr lang="es-MX" sz="1200" dirty="0">
+              <a:latin typeface="Courier New" panose="02070309020205020404" pitchFamily="49" charset="0"/>
+              <a:cs typeface="Courier New" panose="02070309020205020404" pitchFamily="49" charset="0"/>
+            </a:endParaRPr>
+          </a:p>
+          <a:p>
+            <a:pPr marL="114300" lvl="0" indent="0" algn="l" rtl="0">
+              <a:lnSpc>
+                <a:spcPct val="150000"/>
+              </a:lnSpc>
+              <a:spcBef>
+                <a:spcPts val="0"/>
+              </a:spcBef>
+              <a:spcAft>
+                <a:spcPts val="0"/>
+              </a:spcAft>
+              <a:buSzPts val="1800"/>
+              <a:buNone/>
+            </a:pPr>
+            <a:r>
+              <a:rPr lang="es-MX" sz="1200" dirty="0">
+                <a:latin typeface="Courier New" panose="02070309020205020404" pitchFamily="49" charset="0"/>
+                <a:cs typeface="Courier New" panose="02070309020205020404" pitchFamily="49" charset="0"/>
+              </a:rPr>
+              <a:t># Creo grilla de parámetros a tunear (los tune())</a:t>
+            </a:r>
+          </a:p>
+          <a:p>
+            <a:pPr marL="114300" lvl="0" indent="0" algn="l" rtl="0">
+              <a:lnSpc>
+                <a:spcPct val="150000"/>
+              </a:lnSpc>
+              <a:spcBef>
+                <a:spcPts val="0"/>
+              </a:spcBef>
+              <a:spcAft>
+                <a:spcPts val="0"/>
+              </a:spcAft>
+              <a:buSzPts val="1800"/>
+              <a:buNone/>
+            </a:pPr>
+            <a:r>
+              <a:rPr lang="es-MX" sz="1200" dirty="0">
+                <a:latin typeface="Courier New" panose="02070309020205020404" pitchFamily="49" charset="0"/>
+                <a:cs typeface="Courier New" panose="02070309020205020404" pitchFamily="49" charset="0"/>
+              </a:rPr>
+              <a:t>grilla &lt;- </a:t>
+            </a:r>
+            <a:r>
+              <a:rPr lang="es-MX" sz="1200" dirty="0" err="1">
+                <a:latin typeface="Courier New" panose="02070309020205020404" pitchFamily="49" charset="0"/>
+                <a:cs typeface="Courier New" panose="02070309020205020404" pitchFamily="49" charset="0"/>
+              </a:rPr>
+              <a:t>tibble</a:t>
+            </a:r>
+            <a:r>
+              <a:rPr lang="es-MX" sz="1200" dirty="0">
+                <a:latin typeface="Courier New" panose="02070309020205020404" pitchFamily="49" charset="0"/>
+                <a:cs typeface="Courier New" panose="02070309020205020404" pitchFamily="49" charset="0"/>
+              </a:rPr>
+              <a:t>(</a:t>
+            </a:r>
+            <a:r>
+              <a:rPr lang="es-MX" sz="1200" dirty="0" err="1">
+                <a:latin typeface="Courier New" panose="02070309020205020404" pitchFamily="49" charset="0"/>
+                <a:cs typeface="Courier New" panose="02070309020205020404" pitchFamily="49" charset="0"/>
+              </a:rPr>
+              <a:t>degree</a:t>
+            </a:r>
+            <a:r>
+              <a:rPr lang="es-MX" sz="1200" dirty="0">
+                <a:latin typeface="Courier New" panose="02070309020205020404" pitchFamily="49" charset="0"/>
+                <a:cs typeface="Courier New" panose="02070309020205020404" pitchFamily="49" charset="0"/>
+              </a:rPr>
+              <a:t> = 1:5)</a:t>
+            </a:r>
+          </a:p>
+          <a:p>
+            <a:pPr marL="114300" lvl="0" indent="0" algn="l" rtl="0">
+              <a:lnSpc>
+                <a:spcPct val="150000"/>
+              </a:lnSpc>
+              <a:spcBef>
+                <a:spcPts val="0"/>
+              </a:spcBef>
+              <a:spcAft>
+                <a:spcPts val="0"/>
+              </a:spcAft>
+              <a:buSzPts val="1800"/>
+              <a:buNone/>
+            </a:pPr>
+            <a:endParaRPr lang="es-MX" sz="1200" dirty="0">
+              <a:latin typeface="Courier New" panose="02070309020205020404" pitchFamily="49" charset="0"/>
+              <a:cs typeface="Courier New" panose="02070309020205020404" pitchFamily="49" charset="0"/>
+            </a:endParaRPr>
+          </a:p>
+          <a:p>
+            <a:pPr marL="114300" lvl="0" indent="0" algn="l" rtl="0">
+              <a:lnSpc>
+                <a:spcPct val="150000"/>
+              </a:lnSpc>
+              <a:spcBef>
+                <a:spcPts val="0"/>
+              </a:spcBef>
+              <a:spcAft>
+                <a:spcPts val="0"/>
+              </a:spcAft>
+              <a:buSzPts val="1800"/>
+              <a:buNone/>
+            </a:pPr>
+            <a:r>
+              <a:rPr lang="es-MX" sz="1200" dirty="0">
+                <a:latin typeface="Courier New" panose="02070309020205020404" pitchFamily="49" charset="0"/>
+                <a:cs typeface="Courier New" panose="02070309020205020404" pitchFamily="49" charset="0"/>
+              </a:rPr>
+              <a:t># Corro métricas con </a:t>
+            </a:r>
+            <a:r>
+              <a:rPr lang="es-MX" sz="1200" dirty="0" err="1">
+                <a:latin typeface="Courier New" panose="02070309020205020404" pitchFamily="49" charset="0"/>
+                <a:cs typeface="Courier New" panose="02070309020205020404" pitchFamily="49" charset="0"/>
+              </a:rPr>
+              <a:t>cross</a:t>
+            </a:r>
+            <a:r>
+              <a:rPr lang="es-MX" sz="1200" dirty="0">
+                <a:latin typeface="Courier New" panose="02070309020205020404" pitchFamily="49" charset="0"/>
+                <a:cs typeface="Courier New" panose="02070309020205020404" pitchFamily="49" charset="0"/>
+              </a:rPr>
+              <a:t> </a:t>
+            </a:r>
+            <a:r>
+              <a:rPr lang="es-MX" sz="1200" dirty="0" err="1">
+                <a:latin typeface="Courier New" panose="02070309020205020404" pitchFamily="49" charset="0"/>
+                <a:cs typeface="Courier New" panose="02070309020205020404" pitchFamily="49" charset="0"/>
+              </a:rPr>
+              <a:t>validation</a:t>
+            </a:r>
+            <a:r>
+              <a:rPr lang="es-MX" sz="1200" dirty="0">
+                <a:latin typeface="Courier New" panose="02070309020205020404" pitchFamily="49" charset="0"/>
+                <a:cs typeface="Courier New" panose="02070309020205020404" pitchFamily="49" charset="0"/>
+              </a:rPr>
+              <a:t> y ploteo</a:t>
+            </a:r>
+          </a:p>
+          <a:p>
+            <a:pPr marL="114300" lvl="0" indent="0" algn="l" rtl="0">
+              <a:lnSpc>
+                <a:spcPct val="150000"/>
+              </a:lnSpc>
+              <a:spcBef>
+                <a:spcPts val="0"/>
+              </a:spcBef>
+              <a:spcAft>
+                <a:spcPts val="0"/>
+              </a:spcAft>
+              <a:buSzPts val="1800"/>
+              <a:buNone/>
+            </a:pPr>
+            <a:r>
+              <a:rPr lang="es-MX" sz="1200" dirty="0" err="1">
+                <a:latin typeface="Courier New" panose="02070309020205020404" pitchFamily="49" charset="0"/>
+                <a:cs typeface="Courier New" panose="02070309020205020404" pitchFamily="49" charset="0"/>
+              </a:rPr>
+              <a:t>tune_res</a:t>
+            </a:r>
+            <a:r>
+              <a:rPr lang="es-MX" sz="1200" dirty="0">
+                <a:latin typeface="Courier New" panose="02070309020205020404" pitchFamily="49" charset="0"/>
+                <a:cs typeface="Courier New" panose="02070309020205020404" pitchFamily="49" charset="0"/>
+              </a:rPr>
+              <a:t> &lt;- </a:t>
+            </a:r>
+            <a:r>
+              <a:rPr lang="es-MX" sz="1200" dirty="0" err="1">
+                <a:latin typeface="Courier New" panose="02070309020205020404" pitchFamily="49" charset="0"/>
+                <a:cs typeface="Courier New" panose="02070309020205020404" pitchFamily="49" charset="0"/>
+              </a:rPr>
+              <a:t>tune_grid</a:t>
+            </a:r>
+            <a:r>
+              <a:rPr lang="es-MX" sz="1200" dirty="0">
+                <a:latin typeface="Courier New" panose="02070309020205020404" pitchFamily="49" charset="0"/>
+                <a:cs typeface="Courier New" panose="02070309020205020404" pitchFamily="49" charset="0"/>
+              </a:rPr>
+              <a:t>(</a:t>
+            </a:r>
+          </a:p>
+          <a:p>
+            <a:pPr marL="114300" lvl="0" indent="0" algn="l" rtl="0">
+              <a:lnSpc>
+                <a:spcPct val="150000"/>
+              </a:lnSpc>
+              <a:spcBef>
+                <a:spcPts val="0"/>
+              </a:spcBef>
+              <a:spcAft>
+                <a:spcPts val="0"/>
+              </a:spcAft>
+              <a:buSzPts val="1800"/>
+              <a:buNone/>
+            </a:pPr>
+            <a:r>
+              <a:rPr lang="es-MX" sz="1200" dirty="0">
+                <a:latin typeface="Courier New" panose="02070309020205020404" pitchFamily="49" charset="0"/>
+                <a:cs typeface="Courier New" panose="02070309020205020404" pitchFamily="49" charset="0"/>
+              </a:rPr>
+              <a:t>  </a:t>
+            </a:r>
+            <a:r>
+              <a:rPr lang="es-MX" sz="1200" dirty="0" err="1">
+                <a:latin typeface="Courier New" panose="02070309020205020404" pitchFamily="49" charset="0"/>
+                <a:cs typeface="Courier New" panose="02070309020205020404" pitchFamily="49" charset="0"/>
+              </a:rPr>
+              <a:t>object</a:t>
+            </a:r>
+            <a:r>
+              <a:rPr lang="es-MX" sz="1200" dirty="0">
+                <a:latin typeface="Courier New" panose="02070309020205020404" pitchFamily="49" charset="0"/>
+                <a:cs typeface="Courier New" panose="02070309020205020404" pitchFamily="49" charset="0"/>
+              </a:rPr>
+              <a:t> = </a:t>
+            </a:r>
+            <a:r>
+              <a:rPr lang="es-MX" sz="1200" dirty="0" err="1">
+                <a:latin typeface="Courier New" panose="02070309020205020404" pitchFamily="49" charset="0"/>
+                <a:cs typeface="Courier New" panose="02070309020205020404" pitchFamily="49" charset="0"/>
+              </a:rPr>
+              <a:t>lm_wflow_tune</a:t>
+            </a:r>
+            <a:r>
+              <a:rPr lang="es-MX" sz="1200" dirty="0">
+                <a:latin typeface="Courier New" panose="02070309020205020404" pitchFamily="49" charset="0"/>
+                <a:cs typeface="Courier New" panose="02070309020205020404" pitchFamily="49" charset="0"/>
+              </a:rPr>
+              <a:t>, # Qué modelo voy a tunear</a:t>
+            </a:r>
+          </a:p>
+          <a:p>
+            <a:pPr marL="114300" lvl="0" indent="0" algn="l" rtl="0">
+              <a:lnSpc>
+                <a:spcPct val="150000"/>
+              </a:lnSpc>
+              <a:spcBef>
+                <a:spcPts val="0"/>
+              </a:spcBef>
+              <a:spcAft>
+                <a:spcPts val="0"/>
+              </a:spcAft>
+              <a:buSzPts val="1800"/>
+              <a:buNone/>
+            </a:pPr>
+            <a:r>
+              <a:rPr lang="es-MX" sz="1200" dirty="0">
+                <a:latin typeface="Courier New" panose="02070309020205020404" pitchFamily="49" charset="0"/>
+                <a:cs typeface="Courier New" panose="02070309020205020404" pitchFamily="49" charset="0"/>
+              </a:rPr>
+              <a:t>  </a:t>
+            </a:r>
+            <a:r>
+              <a:rPr lang="es-MX" sz="1200" dirty="0" err="1">
+                <a:latin typeface="Courier New" panose="02070309020205020404" pitchFamily="49" charset="0"/>
+                <a:cs typeface="Courier New" panose="02070309020205020404" pitchFamily="49" charset="0"/>
+              </a:rPr>
+              <a:t>resamples</a:t>
+            </a:r>
+            <a:r>
+              <a:rPr lang="es-MX" sz="1200" dirty="0">
+                <a:latin typeface="Courier New" panose="02070309020205020404" pitchFamily="49" charset="0"/>
+                <a:cs typeface="Courier New" panose="02070309020205020404" pitchFamily="49" charset="0"/>
+              </a:rPr>
+              <a:t> = </a:t>
+            </a:r>
+            <a:r>
+              <a:rPr lang="es-MX" sz="1200" dirty="0" err="1">
+                <a:latin typeface="Courier New" panose="02070309020205020404" pitchFamily="49" charset="0"/>
+                <a:cs typeface="Courier New" panose="02070309020205020404" pitchFamily="49" charset="0"/>
+              </a:rPr>
+              <a:t>base_folds</a:t>
+            </a:r>
+            <a:r>
+              <a:rPr lang="es-MX" sz="1200" dirty="0">
+                <a:latin typeface="Courier New" panose="02070309020205020404" pitchFamily="49" charset="0"/>
+                <a:cs typeface="Courier New" panose="02070309020205020404" pitchFamily="49" charset="0"/>
+              </a:rPr>
+              <a:t>, # De dónde saco los </a:t>
+            </a:r>
+            <a:r>
+              <a:rPr lang="es-MX" sz="1200" dirty="0" err="1">
+                <a:latin typeface="Courier New" panose="02070309020205020404" pitchFamily="49" charset="0"/>
+                <a:cs typeface="Courier New" panose="02070309020205020404" pitchFamily="49" charset="0"/>
+              </a:rPr>
+              <a:t>folds</a:t>
+            </a:r>
+            <a:r>
+              <a:rPr lang="es-MX" sz="1200" dirty="0">
+                <a:latin typeface="Courier New" panose="02070309020205020404" pitchFamily="49" charset="0"/>
+                <a:cs typeface="Courier New" panose="02070309020205020404" pitchFamily="49" charset="0"/>
+              </a:rPr>
+              <a:t> de datos </a:t>
+            </a:r>
+          </a:p>
+          <a:p>
+            <a:pPr marL="114300" lvl="0" indent="0" algn="l" rtl="0">
+              <a:lnSpc>
+                <a:spcPct val="150000"/>
+              </a:lnSpc>
+              <a:spcBef>
+                <a:spcPts val="0"/>
+              </a:spcBef>
+              <a:spcAft>
+                <a:spcPts val="0"/>
+              </a:spcAft>
+              <a:buSzPts val="1800"/>
+              <a:buNone/>
+            </a:pPr>
+            <a:r>
+              <a:rPr lang="es-MX" sz="1200" dirty="0">
+                <a:latin typeface="Courier New" panose="02070309020205020404" pitchFamily="49" charset="0"/>
+                <a:cs typeface="Courier New" panose="02070309020205020404" pitchFamily="49" charset="0"/>
+              </a:rPr>
+              <a:t>  </a:t>
+            </a:r>
+            <a:r>
+              <a:rPr lang="es-MX" sz="1200" dirty="0" err="1">
+                <a:latin typeface="Courier New" panose="02070309020205020404" pitchFamily="49" charset="0"/>
+                <a:cs typeface="Courier New" panose="02070309020205020404" pitchFamily="49" charset="0"/>
+              </a:rPr>
+              <a:t>grid</a:t>
+            </a:r>
+            <a:r>
+              <a:rPr lang="es-MX" sz="1200" dirty="0">
+                <a:latin typeface="Courier New" panose="02070309020205020404" pitchFamily="49" charset="0"/>
+                <a:cs typeface="Courier New" panose="02070309020205020404" pitchFamily="49" charset="0"/>
+              </a:rPr>
+              <a:t> = grilla,          # </a:t>
+            </a:r>
+            <a:r>
+              <a:rPr lang="es-MX" sz="1200" dirty="0" err="1">
+                <a:latin typeface="Courier New" panose="02070309020205020404" pitchFamily="49" charset="0"/>
+                <a:cs typeface="Courier New" panose="02070309020205020404" pitchFamily="49" charset="0"/>
+              </a:rPr>
+              <a:t>Hiperparametros</a:t>
+            </a:r>
+            <a:r>
+              <a:rPr lang="es-MX" sz="1200" dirty="0">
+                <a:latin typeface="Courier New" panose="02070309020205020404" pitchFamily="49" charset="0"/>
+                <a:cs typeface="Courier New" panose="02070309020205020404" pitchFamily="49" charset="0"/>
+              </a:rPr>
+              <a:t> a evaluar</a:t>
+            </a:r>
+          </a:p>
+          <a:p>
+            <a:pPr marL="114300" lvl="0" indent="0" algn="l" rtl="0">
+              <a:lnSpc>
+                <a:spcPct val="150000"/>
+              </a:lnSpc>
+              <a:spcBef>
+                <a:spcPts val="0"/>
+              </a:spcBef>
+              <a:spcAft>
+                <a:spcPts val="0"/>
+              </a:spcAft>
+              <a:buSzPts val="1800"/>
+              <a:buNone/>
+            </a:pPr>
+            <a:r>
+              <a:rPr lang="es-MX" sz="1200" dirty="0">
+                <a:latin typeface="Courier New" panose="02070309020205020404" pitchFamily="49" charset="0"/>
+                <a:cs typeface="Courier New" panose="02070309020205020404" pitchFamily="49" charset="0"/>
+              </a:rPr>
+              <a:t>  </a:t>
+            </a:r>
+            <a:r>
+              <a:rPr lang="es-MX" sz="1200" dirty="0" err="1">
+                <a:latin typeface="Courier New" panose="02070309020205020404" pitchFamily="49" charset="0"/>
+                <a:cs typeface="Courier New" panose="02070309020205020404" pitchFamily="49" charset="0"/>
+              </a:rPr>
+              <a:t>metrics</a:t>
+            </a:r>
+            <a:r>
+              <a:rPr lang="es-MX" sz="1200" dirty="0">
+                <a:latin typeface="Courier New" panose="02070309020205020404" pitchFamily="49" charset="0"/>
+                <a:cs typeface="Courier New" panose="02070309020205020404" pitchFamily="49" charset="0"/>
+              </a:rPr>
+              <a:t> = </a:t>
+            </a:r>
+            <a:r>
+              <a:rPr lang="es-MX" sz="1200" dirty="0" err="1">
+                <a:latin typeface="Courier New" panose="02070309020205020404" pitchFamily="49" charset="0"/>
+                <a:cs typeface="Courier New" panose="02070309020205020404" pitchFamily="49" charset="0"/>
+              </a:rPr>
+              <a:t>metric_set</a:t>
+            </a:r>
+            <a:r>
+              <a:rPr lang="es-MX" sz="1200" dirty="0">
+                <a:latin typeface="Courier New" panose="02070309020205020404" pitchFamily="49" charset="0"/>
+                <a:cs typeface="Courier New" panose="02070309020205020404" pitchFamily="49" charset="0"/>
+              </a:rPr>
+              <a:t>(</a:t>
+            </a:r>
+            <a:r>
+              <a:rPr lang="es-MX" sz="1200" dirty="0" err="1">
+                <a:latin typeface="Courier New" panose="02070309020205020404" pitchFamily="49" charset="0"/>
+                <a:cs typeface="Courier New" panose="02070309020205020404" pitchFamily="49" charset="0"/>
+              </a:rPr>
+              <a:t>rmse</a:t>
+            </a:r>
+            <a:r>
+              <a:rPr lang="es-MX" sz="1200" dirty="0">
+                <a:latin typeface="Courier New" panose="02070309020205020404" pitchFamily="49" charset="0"/>
+                <a:cs typeface="Courier New" panose="02070309020205020404" pitchFamily="49" charset="0"/>
+              </a:rPr>
+              <a:t>, </a:t>
+            </a:r>
+            <a:r>
+              <a:rPr lang="es-MX" sz="1200" dirty="0" err="1">
+                <a:latin typeface="Courier New" panose="02070309020205020404" pitchFamily="49" charset="0"/>
+                <a:cs typeface="Courier New" panose="02070309020205020404" pitchFamily="49" charset="0"/>
+              </a:rPr>
+              <a:t>rsq</a:t>
+            </a:r>
+            <a:r>
+              <a:rPr lang="es-MX" sz="1200" dirty="0">
+                <a:latin typeface="Courier New" panose="02070309020205020404" pitchFamily="49" charset="0"/>
+                <a:cs typeface="Courier New" panose="02070309020205020404" pitchFamily="49" charset="0"/>
+              </a:rPr>
+              <a:t>) # Métricas a evaluar</a:t>
+            </a:r>
+          </a:p>
+          <a:p>
+            <a:pPr marL="114300" lvl="0" indent="0" algn="l" rtl="0">
+              <a:lnSpc>
+                <a:spcPct val="150000"/>
+              </a:lnSpc>
+              <a:spcBef>
+                <a:spcPts val="0"/>
+              </a:spcBef>
+              <a:spcAft>
+                <a:spcPts val="0"/>
+              </a:spcAft>
+              <a:buSzPts val="1800"/>
+              <a:buNone/>
+            </a:pPr>
+            <a:r>
+              <a:rPr lang="es-MX" sz="1200" dirty="0">
+                <a:latin typeface="Courier New" panose="02070309020205020404" pitchFamily="49" charset="0"/>
+                <a:cs typeface="Courier New" panose="02070309020205020404" pitchFamily="49" charset="0"/>
+              </a:rPr>
+              <a:t>) %&gt;% </a:t>
+            </a:r>
+            <a:r>
+              <a:rPr lang="es-MX" sz="1200" dirty="0" err="1">
+                <a:latin typeface="Courier New" panose="02070309020205020404" pitchFamily="49" charset="0"/>
+                <a:cs typeface="Courier New" panose="02070309020205020404" pitchFamily="49" charset="0"/>
+              </a:rPr>
+              <a:t>autoplot</a:t>
+            </a:r>
+            <a:r>
+              <a:rPr lang="es-MX" sz="1200" dirty="0">
+                <a:latin typeface="Courier New" panose="02070309020205020404" pitchFamily="49" charset="0"/>
+                <a:cs typeface="Courier New" panose="02070309020205020404" pitchFamily="49" charset="0"/>
+              </a:rPr>
+              <a:t>()          # Que me haga directo el </a:t>
+            </a:r>
+            <a:r>
+              <a:rPr lang="es-MX" sz="1200" dirty="0" err="1">
+                <a:latin typeface="Courier New" panose="02070309020205020404" pitchFamily="49" charset="0"/>
+                <a:cs typeface="Courier New" panose="02070309020205020404" pitchFamily="49" charset="0"/>
+              </a:rPr>
+              <a:t>plot</a:t>
+            </a:r>
+            <a:endParaRPr lang="es-MX" sz="1200" dirty="0">
+              <a:latin typeface="Courier New" panose="02070309020205020404" pitchFamily="49" charset="0"/>
+              <a:cs typeface="Courier New" panose="02070309020205020404" pitchFamily="49" charset="0"/>
+            </a:endParaRPr>
+          </a:p>
+        </p:txBody>
+      </p:sp>
+    </p:spTree>
+    <p:extLst>
+      <p:ext uri="{BB962C8B-B14F-4D97-AF65-F5344CB8AC3E}">
+        <p14:creationId xmlns:p14="http://schemas.microsoft.com/office/powerpoint/2010/main" val="3128468253"/>
+      </p:ext>
+    </p:extLst>
+  </p:cSld>
+  <p:clrMapOvr>
+    <a:masterClrMapping/>
+  </p:clrMapOvr>
+</p:sld>
+</file>
+
+<file path=ppt/slides/slide11.xml><?xml version="1.0" encoding="utf-8"?>
 <p:sld xmlns:a="http://schemas.openxmlformats.org/drawingml/2006/main" xmlns:r="http://schemas.openxmlformats.org/officeDocument/2006/relationships" xmlns:p="http://schemas.openxmlformats.org/presentationml/2006/main">
   <p:cSld>
     <p:spTree>
@@ -9014,6 +9932,168 @@
           </a:fontRef>
         </p:style>
       </p:cxnSp>
+      <p:sp>
+        <p:nvSpPr>
+          <p:cNvPr id="25" name="CuadroTexto 24">
+            <a:extLst>
+              <a:ext uri="{FF2B5EF4-FFF2-40B4-BE49-F238E27FC236}">
+                <a16:creationId xmlns:a16="http://schemas.microsoft.com/office/drawing/2014/main" id="{A58FE6D5-7FF9-4A20-9D81-E4618F54BE68}"/>
+              </a:ext>
+            </a:extLst>
+          </p:cNvPr>
+          <p:cNvSpPr txBox="1"/>
+          <p:nvPr/>
+        </p:nvSpPr>
+        <p:spPr>
+          <a:xfrm>
+            <a:off x="2286000" y="3481800"/>
+            <a:ext cx="4572000" cy="1034899"/>
+          </a:xfrm>
+          <a:prstGeom prst="rect">
+            <a:avLst/>
+          </a:prstGeom>
+          <a:noFill/>
+        </p:spPr>
+        <p:txBody>
+          <a:bodyPr wrap="square">
+            <a:spAutoFit/>
+          </a:bodyPr>
+          <a:lstStyle/>
+          <a:p>
+            <a:pPr marL="114300" lvl="0" indent="0" algn="l" rtl="0">
+              <a:lnSpc>
+                <a:spcPct val="150000"/>
+              </a:lnSpc>
+              <a:spcBef>
+                <a:spcPts val="0"/>
+              </a:spcBef>
+              <a:spcAft>
+                <a:spcPts val="0"/>
+              </a:spcAft>
+              <a:buSzPts val="1800"/>
+              <a:buNone/>
+            </a:pPr>
+            <a:r>
+              <a:rPr lang="es-MX" sz="1400" dirty="0" err="1">
+                <a:latin typeface="Courier New" panose="02070309020205020404" pitchFamily="49" charset="0"/>
+                <a:cs typeface="Courier New" panose="02070309020205020404" pitchFamily="49" charset="0"/>
+              </a:rPr>
+              <a:t>lm_model</a:t>
+            </a:r>
+            <a:r>
+              <a:rPr lang="es-MX" sz="1400" dirty="0">
+                <a:latin typeface="Courier New" panose="02070309020205020404" pitchFamily="49" charset="0"/>
+                <a:cs typeface="Courier New" panose="02070309020205020404" pitchFamily="49" charset="0"/>
+              </a:rPr>
+              <a:t> &lt;- </a:t>
+            </a:r>
+            <a:r>
+              <a:rPr lang="es-MX" sz="1400" dirty="0" err="1">
+                <a:latin typeface="Courier New" panose="02070309020205020404" pitchFamily="49" charset="0"/>
+                <a:cs typeface="Courier New" panose="02070309020205020404" pitchFamily="49" charset="0"/>
+              </a:rPr>
+              <a:t>linear_reg</a:t>
+            </a:r>
+            <a:r>
+              <a:rPr lang="es-MX" sz="1400" dirty="0">
+                <a:latin typeface="Courier New" panose="02070309020205020404" pitchFamily="49" charset="0"/>
+                <a:cs typeface="Courier New" panose="02070309020205020404" pitchFamily="49" charset="0"/>
+              </a:rPr>
+              <a:t>() %&gt;% </a:t>
+            </a:r>
+          </a:p>
+          <a:p>
+            <a:pPr marL="114300" lvl="0" indent="0" algn="l" rtl="0">
+              <a:lnSpc>
+                <a:spcPct val="150000"/>
+              </a:lnSpc>
+              <a:spcBef>
+                <a:spcPts val="0"/>
+              </a:spcBef>
+              <a:spcAft>
+                <a:spcPts val="0"/>
+              </a:spcAft>
+              <a:buSzPts val="1800"/>
+              <a:buNone/>
+            </a:pPr>
+            <a:r>
+              <a:rPr lang="es-MX" sz="1400" dirty="0">
+                <a:latin typeface="Courier New" panose="02070309020205020404" pitchFamily="49" charset="0"/>
+                <a:cs typeface="Courier New" panose="02070309020205020404" pitchFamily="49" charset="0"/>
+              </a:rPr>
+              <a:t>	    </a:t>
+            </a:r>
+            <a:r>
+              <a:rPr lang="es-MX" sz="1400" dirty="0" err="1">
+                <a:latin typeface="Courier New" panose="02070309020205020404" pitchFamily="49" charset="0"/>
+                <a:cs typeface="Courier New" panose="02070309020205020404" pitchFamily="49" charset="0"/>
+              </a:rPr>
+              <a:t>set_engine</a:t>
+            </a:r>
+            <a:r>
+              <a:rPr lang="es-MX" sz="1400" dirty="0">
+                <a:latin typeface="Courier New" panose="02070309020205020404" pitchFamily="49" charset="0"/>
+                <a:cs typeface="Courier New" panose="02070309020205020404" pitchFamily="49" charset="0"/>
+              </a:rPr>
+              <a:t>(‘lm’) %&gt;%</a:t>
+            </a:r>
+          </a:p>
+          <a:p>
+            <a:pPr marL="114300" lvl="0" indent="0" algn="l" rtl="0">
+              <a:lnSpc>
+                <a:spcPct val="150000"/>
+              </a:lnSpc>
+              <a:spcBef>
+                <a:spcPts val="0"/>
+              </a:spcBef>
+              <a:spcAft>
+                <a:spcPts val="0"/>
+              </a:spcAft>
+              <a:buSzPts val="1800"/>
+              <a:buNone/>
+            </a:pPr>
+            <a:r>
+              <a:rPr lang="es-MX" dirty="0">
+                <a:latin typeface="Courier New" panose="02070309020205020404" pitchFamily="49" charset="0"/>
+                <a:cs typeface="Courier New" panose="02070309020205020404" pitchFamily="49" charset="0"/>
+              </a:rPr>
+              <a:t>	    </a:t>
+            </a:r>
+            <a:r>
+              <a:rPr lang="es-MX" dirty="0" err="1">
+                <a:latin typeface="Courier New" panose="02070309020205020404" pitchFamily="49" charset="0"/>
+                <a:cs typeface="Courier New" panose="02070309020205020404" pitchFamily="49" charset="0"/>
+              </a:rPr>
+              <a:t>set_mode</a:t>
+            </a:r>
+            <a:r>
+              <a:rPr lang="es-MX" dirty="0">
+                <a:latin typeface="Courier New" panose="02070309020205020404" pitchFamily="49" charset="0"/>
+                <a:cs typeface="Courier New" panose="02070309020205020404" pitchFamily="49" charset="0"/>
+              </a:rPr>
+              <a:t>(‘</a:t>
+            </a:r>
+            <a:r>
+              <a:rPr lang="es-MX" dirty="0" err="1">
+                <a:latin typeface="Courier New" panose="02070309020205020404" pitchFamily="49" charset="0"/>
+                <a:cs typeface="Courier New" panose="02070309020205020404" pitchFamily="49" charset="0"/>
+              </a:rPr>
+              <a:t>regression</a:t>
+            </a:r>
+            <a:r>
+              <a:rPr lang="es-MX" dirty="0">
+                <a:latin typeface="Courier New" panose="02070309020205020404" pitchFamily="49" charset="0"/>
+                <a:cs typeface="Courier New" panose="02070309020205020404" pitchFamily="49" charset="0"/>
+              </a:rPr>
+              <a:t>’)</a:t>
+            </a:r>
+            <a:endParaRPr lang="es-MX" sz="1400" dirty="0">
+              <a:latin typeface="Courier New" panose="02070309020205020404" pitchFamily="49" charset="0"/>
+              <a:cs typeface="Courier New" panose="02070309020205020404" pitchFamily="49" charset="0"/>
+            </a:endParaRPr>
+          </a:p>
+        </p:txBody>
+      </p:sp>
     </p:spTree>
     <p:extLst>
       <p:ext uri="{BB962C8B-B14F-4D97-AF65-F5344CB8AC3E}">
@@ -10110,6 +11190,192 @@
           </a:p>
         </p:txBody>
       </p:sp>
+      <p:sp>
+        <p:nvSpPr>
+          <p:cNvPr id="25" name="CuadroTexto 24">
+            <a:extLst>
+              <a:ext uri="{FF2B5EF4-FFF2-40B4-BE49-F238E27FC236}">
+                <a16:creationId xmlns:a16="http://schemas.microsoft.com/office/drawing/2014/main" id="{456D1E98-163F-4329-AF0A-7C64FAA973B8}"/>
+              </a:ext>
+            </a:extLst>
+          </p:cNvPr>
+          <p:cNvSpPr txBox="1"/>
+          <p:nvPr/>
+        </p:nvSpPr>
+        <p:spPr>
+          <a:xfrm>
+            <a:off x="1094283" y="3846562"/>
+            <a:ext cx="7637487" cy="1034899"/>
+          </a:xfrm>
+          <a:prstGeom prst="rect">
+            <a:avLst/>
+          </a:prstGeom>
+          <a:noFill/>
+        </p:spPr>
+        <p:txBody>
+          <a:bodyPr wrap="square">
+            <a:spAutoFit/>
+          </a:bodyPr>
+          <a:lstStyle/>
+          <a:p>
+            <a:pPr marL="114300" lvl="0" indent="0" algn="l" rtl="0">
+              <a:lnSpc>
+                <a:spcPct val="150000"/>
+              </a:lnSpc>
+              <a:spcBef>
+                <a:spcPts val="0"/>
+              </a:spcBef>
+              <a:spcAft>
+                <a:spcPts val="0"/>
+              </a:spcAft>
+              <a:buSzPts val="1800"/>
+              <a:buNone/>
+            </a:pPr>
+            <a:r>
+              <a:rPr lang="es-MX" sz="1400" dirty="0" err="1">
+                <a:latin typeface="Courier New" panose="02070309020205020404" pitchFamily="49" charset="0"/>
+                <a:cs typeface="Courier New" panose="02070309020205020404" pitchFamily="49" charset="0"/>
+              </a:rPr>
+              <a:t>lm_rec</a:t>
+            </a:r>
+            <a:r>
+              <a:rPr lang="es-MX" sz="1400" dirty="0">
+                <a:latin typeface="Courier New" panose="02070309020205020404" pitchFamily="49" charset="0"/>
+                <a:cs typeface="Courier New" panose="02070309020205020404" pitchFamily="49" charset="0"/>
+              </a:rPr>
+              <a:t> &lt;- </a:t>
+            </a:r>
+            <a:r>
+              <a:rPr lang="es-MX" sz="1400" dirty="0" err="1">
+                <a:latin typeface="Courier New" panose="02070309020205020404" pitchFamily="49" charset="0"/>
+                <a:cs typeface="Courier New" panose="02070309020205020404" pitchFamily="49" charset="0"/>
+              </a:rPr>
+              <a:t>recipe</a:t>
+            </a:r>
+            <a:r>
+              <a:rPr lang="es-MX" sz="1400" dirty="0">
+                <a:latin typeface="Courier New" panose="02070309020205020404" pitchFamily="49" charset="0"/>
+                <a:cs typeface="Courier New" panose="02070309020205020404" pitchFamily="49" charset="0"/>
+              </a:rPr>
+              <a:t>(</a:t>
+            </a:r>
+            <a:r>
+              <a:rPr lang="es-MX" sz="1400" dirty="0" err="1">
+                <a:latin typeface="Courier New" panose="02070309020205020404" pitchFamily="49" charset="0"/>
+                <a:cs typeface="Courier New" panose="02070309020205020404" pitchFamily="49" charset="0"/>
+              </a:rPr>
+              <a:t>ingreso_individual</a:t>
+            </a:r>
+            <a:r>
+              <a:rPr lang="es-MX" sz="1400" dirty="0">
+                <a:latin typeface="Courier New" panose="02070309020205020404" pitchFamily="49" charset="0"/>
+                <a:cs typeface="Courier New" panose="02070309020205020404" pitchFamily="49" charset="0"/>
+              </a:rPr>
+              <a:t> ~ </a:t>
+            </a:r>
+            <a:r>
+              <a:rPr lang="es-MX" sz="1400" dirty="0" err="1">
+                <a:latin typeface="Courier New" panose="02070309020205020404" pitchFamily="49" charset="0"/>
+                <a:cs typeface="Courier New" panose="02070309020205020404" pitchFamily="49" charset="0"/>
+              </a:rPr>
+              <a:t>horas_trabajo_domestico</a:t>
+            </a:r>
+            <a:r>
+              <a:rPr lang="es-MX" sz="1400" dirty="0">
+                <a:latin typeface="Courier New" panose="02070309020205020404" pitchFamily="49" charset="0"/>
+                <a:cs typeface="Courier New" panose="02070309020205020404" pitchFamily="49" charset="0"/>
+              </a:rPr>
+              <a:t> + sexo,</a:t>
+            </a:r>
+          </a:p>
+          <a:p>
+            <a:pPr marL="114300" lvl="0" indent="0" algn="l" rtl="0">
+              <a:lnSpc>
+                <a:spcPct val="150000"/>
+              </a:lnSpc>
+              <a:spcBef>
+                <a:spcPts val="0"/>
+              </a:spcBef>
+              <a:spcAft>
+                <a:spcPts val="0"/>
+              </a:spcAft>
+              <a:buSzPts val="1800"/>
+              <a:buNone/>
+            </a:pPr>
+            <a:r>
+              <a:rPr lang="es-MX" dirty="0">
+                <a:latin typeface="Courier New" panose="02070309020205020404" pitchFamily="49" charset="0"/>
+                <a:cs typeface="Courier New" panose="02070309020205020404" pitchFamily="49" charset="0"/>
+              </a:rPr>
+              <a:t>		 data = </a:t>
+            </a:r>
+            <a:r>
+              <a:rPr lang="es-MX" dirty="0" err="1">
+                <a:latin typeface="Courier New" panose="02070309020205020404" pitchFamily="49" charset="0"/>
+                <a:cs typeface="Courier New" panose="02070309020205020404" pitchFamily="49" charset="0"/>
+              </a:rPr>
+              <a:t>base_train</a:t>
+            </a:r>
+            <a:r>
+              <a:rPr lang="es-MX" sz="1400" dirty="0">
+                <a:latin typeface="Courier New" panose="02070309020205020404" pitchFamily="49" charset="0"/>
+                <a:cs typeface="Courier New" panose="02070309020205020404" pitchFamily="49" charset="0"/>
+              </a:rPr>
+              <a:t>) %&gt;% </a:t>
+            </a:r>
+          </a:p>
+          <a:p>
+            <a:pPr marL="114300" lvl="0" indent="0" algn="l" rtl="0">
+              <a:lnSpc>
+                <a:spcPct val="150000"/>
+              </a:lnSpc>
+              <a:spcBef>
+                <a:spcPts val="0"/>
+              </a:spcBef>
+              <a:spcAft>
+                <a:spcPts val="0"/>
+              </a:spcAft>
+              <a:buSzPts val="1800"/>
+              <a:buNone/>
+            </a:pPr>
+            <a:r>
+              <a:rPr lang="es-MX" sz="1400" dirty="0">
+                <a:latin typeface="Courier New" panose="02070309020205020404" pitchFamily="49" charset="0"/>
+                <a:cs typeface="Courier New" panose="02070309020205020404" pitchFamily="49" charset="0"/>
+              </a:rPr>
+              <a:t>	    </a:t>
+            </a:r>
+            <a:r>
+              <a:rPr lang="es-MX" sz="1400" dirty="0" err="1">
+                <a:latin typeface="Courier New" panose="02070309020205020404" pitchFamily="49" charset="0"/>
+                <a:cs typeface="Courier New" panose="02070309020205020404" pitchFamily="49" charset="0"/>
+              </a:rPr>
+              <a:t>set_dummy</a:t>
+            </a:r>
+            <a:r>
+              <a:rPr lang="es-MX" sz="1400" dirty="0">
+                <a:latin typeface="Courier New" panose="02070309020205020404" pitchFamily="49" charset="0"/>
+                <a:cs typeface="Courier New" panose="02070309020205020404" pitchFamily="49" charset="0"/>
+              </a:rPr>
+              <a:t>(sexo, id="</a:t>
+            </a:r>
+            <a:r>
+              <a:rPr lang="es-MX" sz="1400" dirty="0" err="1">
+                <a:latin typeface="Courier New" panose="02070309020205020404" pitchFamily="49" charset="0"/>
+                <a:cs typeface="Courier New" panose="02070309020205020404" pitchFamily="49" charset="0"/>
+              </a:rPr>
+              <a:t>dummy</a:t>
+            </a:r>
+            <a:r>
+              <a:rPr lang="es-MX" sz="1400" dirty="0">
+                <a:latin typeface="Courier New" panose="02070309020205020404" pitchFamily="49" charset="0"/>
+                <a:cs typeface="Courier New" panose="02070309020205020404" pitchFamily="49" charset="0"/>
+              </a:rPr>
+              <a:t>")</a:t>
+            </a:r>
+          </a:p>
+        </p:txBody>
+      </p:sp>
     </p:spTree>
     <p:extLst>
       <p:ext uri="{BB962C8B-B14F-4D97-AF65-F5344CB8AC3E}">
@@ -10124,6 +11390,932 @@
 </file>
 
 <file path=ppt/slides/slide5.xml><?xml version="1.0" encoding="utf-8"?>
+<p:sld xmlns:a="http://schemas.openxmlformats.org/drawingml/2006/main" xmlns:r="http://schemas.openxmlformats.org/officeDocument/2006/relationships" xmlns:p="http://schemas.openxmlformats.org/presentationml/2006/main">
+  <p:cSld>
+    <p:bg>
+      <p:bgPr>
+        <a:pattFill prst="pct50">
+          <a:fgClr>
+            <a:schemeClr val="lt2"/>
+          </a:fgClr>
+          <a:bgClr>
+            <a:schemeClr val="bg1"/>
+          </a:bgClr>
+        </a:pattFill>
+        <a:effectLst/>
+      </p:bgPr>
+    </p:bg>
+    <p:spTree>
+      <p:nvGrpSpPr>
+        <p:cNvPr id="1" name="Shape 227"/>
+        <p:cNvGrpSpPr/>
+        <p:nvPr/>
+      </p:nvGrpSpPr>
+      <p:grpSpPr>
+        <a:xfrm>
+          <a:off x="0" y="0"/>
+          <a:ext cx="0" cy="0"/>
+          <a:chOff x="0" y="0"/>
+          <a:chExt cx="0" cy="0"/>
+        </a:xfrm>
+      </p:grpSpPr>
+      <p:sp>
+        <p:nvSpPr>
+          <p:cNvPr id="25" name="CuadroTexto 24">
+            <a:extLst>
+              <a:ext uri="{FF2B5EF4-FFF2-40B4-BE49-F238E27FC236}">
+                <a16:creationId xmlns:a16="http://schemas.microsoft.com/office/drawing/2014/main" id="{456D1E98-163F-4329-AF0A-7C64FAA973B8}"/>
+              </a:ext>
+            </a:extLst>
+          </p:cNvPr>
+          <p:cNvSpPr txBox="1"/>
+          <p:nvPr/>
+        </p:nvSpPr>
+        <p:spPr>
+          <a:xfrm>
+            <a:off x="3625116" y="1170738"/>
+            <a:ext cx="4527028" cy="2650726"/>
+          </a:xfrm>
+          <a:prstGeom prst="rect">
+            <a:avLst/>
+          </a:prstGeom>
+          <a:noFill/>
+        </p:spPr>
+        <p:txBody>
+          <a:bodyPr wrap="square">
+            <a:spAutoFit/>
+          </a:bodyPr>
+          <a:lstStyle/>
+          <a:p>
+            <a:pPr marL="114300" lvl="0" indent="0" algn="l" rtl="0">
+              <a:lnSpc>
+                <a:spcPct val="150000"/>
+              </a:lnSpc>
+              <a:spcBef>
+                <a:spcPts val="0"/>
+              </a:spcBef>
+              <a:spcAft>
+                <a:spcPts val="0"/>
+              </a:spcAft>
+              <a:buSzPts val="1800"/>
+              <a:buNone/>
+            </a:pPr>
+            <a:r>
+              <a:rPr lang="es-MX" sz="1400" dirty="0" err="1">
+                <a:latin typeface="Courier New" panose="02070309020205020404" pitchFamily="49" charset="0"/>
+                <a:cs typeface="Courier New" panose="02070309020205020404" pitchFamily="49" charset="0"/>
+              </a:rPr>
+              <a:t>lm_wflow</a:t>
+            </a:r>
+            <a:r>
+              <a:rPr lang="es-MX" sz="1400" dirty="0">
+                <a:latin typeface="Courier New" panose="02070309020205020404" pitchFamily="49" charset="0"/>
+                <a:cs typeface="Courier New" panose="02070309020205020404" pitchFamily="49" charset="0"/>
+              </a:rPr>
+              <a:t> &lt;- </a:t>
+            </a:r>
+            <a:r>
+              <a:rPr lang="es-MX" sz="1400" dirty="0" err="1">
+                <a:latin typeface="Courier New" panose="02070309020205020404" pitchFamily="49" charset="0"/>
+                <a:cs typeface="Courier New" panose="02070309020205020404" pitchFamily="49" charset="0"/>
+              </a:rPr>
+              <a:t>workflow</a:t>
+            </a:r>
+            <a:r>
+              <a:rPr lang="es-MX" sz="1400" dirty="0">
+                <a:latin typeface="Courier New" panose="02070309020205020404" pitchFamily="49" charset="0"/>
+                <a:cs typeface="Courier New" panose="02070309020205020404" pitchFamily="49" charset="0"/>
+              </a:rPr>
+              <a:t>() %&gt;% </a:t>
+            </a:r>
+          </a:p>
+          <a:p>
+            <a:pPr marL="114300" lvl="0" indent="0" algn="l" rtl="0">
+              <a:lnSpc>
+                <a:spcPct val="150000"/>
+              </a:lnSpc>
+              <a:spcBef>
+                <a:spcPts val="0"/>
+              </a:spcBef>
+              <a:spcAft>
+                <a:spcPts val="0"/>
+              </a:spcAft>
+              <a:buSzPts val="1800"/>
+              <a:buNone/>
+            </a:pPr>
+            <a:r>
+              <a:rPr lang="es-MX" dirty="0">
+                <a:latin typeface="Courier New" panose="02070309020205020404" pitchFamily="49" charset="0"/>
+                <a:cs typeface="Courier New" panose="02070309020205020404" pitchFamily="49" charset="0"/>
+              </a:rPr>
+              <a:t>		</a:t>
+            </a:r>
+            <a:r>
+              <a:rPr lang="es-MX" sz="1400" dirty="0" err="1">
+                <a:latin typeface="Courier New" panose="02070309020205020404" pitchFamily="49" charset="0"/>
+                <a:cs typeface="Courier New" panose="02070309020205020404" pitchFamily="49" charset="0"/>
+              </a:rPr>
+              <a:t>add_model</a:t>
+            </a:r>
+            <a:r>
+              <a:rPr lang="es-MX" sz="1400" dirty="0">
+                <a:latin typeface="Courier New" panose="02070309020205020404" pitchFamily="49" charset="0"/>
+                <a:cs typeface="Courier New" panose="02070309020205020404" pitchFamily="49" charset="0"/>
+              </a:rPr>
+              <a:t>(</a:t>
+            </a:r>
+            <a:r>
+              <a:rPr lang="es-MX" sz="1400" dirty="0" err="1">
+                <a:latin typeface="Courier New" panose="02070309020205020404" pitchFamily="49" charset="0"/>
+                <a:cs typeface="Courier New" panose="02070309020205020404" pitchFamily="49" charset="0"/>
+              </a:rPr>
+              <a:t>lm_model</a:t>
+            </a:r>
+            <a:r>
+              <a:rPr lang="es-MX" sz="1400" dirty="0">
+                <a:latin typeface="Courier New" panose="02070309020205020404" pitchFamily="49" charset="0"/>
+                <a:cs typeface="Courier New" panose="02070309020205020404" pitchFamily="49" charset="0"/>
+              </a:rPr>
+              <a:t>) %&gt;% </a:t>
+            </a:r>
+          </a:p>
+          <a:p>
+            <a:pPr marL="114300" lvl="0" indent="0" algn="l" rtl="0">
+              <a:lnSpc>
+                <a:spcPct val="150000"/>
+              </a:lnSpc>
+              <a:spcBef>
+                <a:spcPts val="0"/>
+              </a:spcBef>
+              <a:spcAft>
+                <a:spcPts val="0"/>
+              </a:spcAft>
+              <a:buSzPts val="1800"/>
+              <a:buNone/>
+            </a:pPr>
+            <a:r>
+              <a:rPr lang="es-MX" dirty="0">
+                <a:latin typeface="Courier New" panose="02070309020205020404" pitchFamily="49" charset="0"/>
+                <a:cs typeface="Courier New" panose="02070309020205020404" pitchFamily="49" charset="0"/>
+              </a:rPr>
+              <a:t>		</a:t>
+            </a:r>
+            <a:r>
+              <a:rPr lang="es-MX" sz="1400" dirty="0" err="1">
+                <a:latin typeface="Courier New" panose="02070309020205020404" pitchFamily="49" charset="0"/>
+                <a:cs typeface="Courier New" panose="02070309020205020404" pitchFamily="49" charset="0"/>
+              </a:rPr>
+              <a:t>add_recipe</a:t>
+            </a:r>
+            <a:r>
+              <a:rPr lang="es-MX" sz="1400" dirty="0">
+                <a:latin typeface="Courier New" panose="02070309020205020404" pitchFamily="49" charset="0"/>
+                <a:cs typeface="Courier New" panose="02070309020205020404" pitchFamily="49" charset="0"/>
+              </a:rPr>
+              <a:t>(</a:t>
+            </a:r>
+            <a:r>
+              <a:rPr lang="es-MX" sz="1400" dirty="0" err="1">
+                <a:latin typeface="Courier New" panose="02070309020205020404" pitchFamily="49" charset="0"/>
+                <a:cs typeface="Courier New" panose="02070309020205020404" pitchFamily="49" charset="0"/>
+              </a:rPr>
+              <a:t>lm_rec</a:t>
+            </a:r>
+            <a:r>
+              <a:rPr lang="es-MX" dirty="0">
+                <a:latin typeface="Courier New" panose="02070309020205020404" pitchFamily="49" charset="0"/>
+                <a:cs typeface="Courier New" panose="02070309020205020404" pitchFamily="49" charset="0"/>
+              </a:rPr>
+              <a:t>)</a:t>
+            </a:r>
+          </a:p>
+          <a:p>
+            <a:pPr marL="114300" lvl="0" indent="0" algn="l" rtl="0">
+              <a:lnSpc>
+                <a:spcPct val="150000"/>
+              </a:lnSpc>
+              <a:spcBef>
+                <a:spcPts val="0"/>
+              </a:spcBef>
+              <a:spcAft>
+                <a:spcPts val="0"/>
+              </a:spcAft>
+              <a:buSzPts val="1800"/>
+              <a:buNone/>
+            </a:pPr>
+            <a:endParaRPr lang="es-MX" dirty="0">
+              <a:latin typeface="Courier New" panose="02070309020205020404" pitchFamily="49" charset="0"/>
+              <a:cs typeface="Courier New" panose="02070309020205020404" pitchFamily="49" charset="0"/>
+            </a:endParaRPr>
+          </a:p>
+          <a:p>
+            <a:pPr marL="114300" lvl="0" indent="0" algn="l" rtl="0">
+              <a:lnSpc>
+                <a:spcPct val="150000"/>
+              </a:lnSpc>
+              <a:spcBef>
+                <a:spcPts val="0"/>
+              </a:spcBef>
+              <a:spcAft>
+                <a:spcPts val="0"/>
+              </a:spcAft>
+              <a:buSzPts val="1800"/>
+              <a:buNone/>
+            </a:pPr>
+            <a:r>
+              <a:rPr lang="es-MX" dirty="0" err="1">
+                <a:latin typeface="Courier New" panose="02070309020205020404" pitchFamily="49" charset="0"/>
+                <a:cs typeface="Courier New" panose="02070309020205020404" pitchFamily="49" charset="0"/>
+              </a:rPr>
+              <a:t>l</a:t>
+            </a:r>
+            <a:r>
+              <a:rPr lang="es-MX" sz="1400" dirty="0" err="1">
+                <a:latin typeface="Courier New" panose="02070309020205020404" pitchFamily="49" charset="0"/>
+                <a:cs typeface="Courier New" panose="02070309020205020404" pitchFamily="49" charset="0"/>
+              </a:rPr>
+              <a:t>m_fit</a:t>
+            </a:r>
+            <a:r>
+              <a:rPr lang="es-MX" sz="1400" dirty="0">
+                <a:latin typeface="Courier New" panose="02070309020205020404" pitchFamily="49" charset="0"/>
+                <a:cs typeface="Courier New" panose="02070309020205020404" pitchFamily="49" charset="0"/>
+              </a:rPr>
+              <a:t> &lt;- </a:t>
+            </a:r>
+            <a:r>
+              <a:rPr lang="es-MX" sz="1400" dirty="0" err="1">
+                <a:latin typeface="Courier New" panose="02070309020205020404" pitchFamily="49" charset="0"/>
+                <a:cs typeface="Courier New" panose="02070309020205020404" pitchFamily="49" charset="0"/>
+              </a:rPr>
+              <a:t>lm_wflow</a:t>
+            </a:r>
+            <a:r>
+              <a:rPr lang="es-MX" sz="1400" dirty="0">
+                <a:latin typeface="Courier New" panose="02070309020205020404" pitchFamily="49" charset="0"/>
+                <a:cs typeface="Courier New" panose="02070309020205020404" pitchFamily="49" charset="0"/>
+              </a:rPr>
+              <a:t> %&gt;% </a:t>
+            </a:r>
+          </a:p>
+          <a:p>
+            <a:pPr marL="114300" lvl="0" indent="0" algn="l" rtl="0">
+              <a:lnSpc>
+                <a:spcPct val="150000"/>
+              </a:lnSpc>
+              <a:spcBef>
+                <a:spcPts val="0"/>
+              </a:spcBef>
+              <a:spcAft>
+                <a:spcPts val="0"/>
+              </a:spcAft>
+              <a:buSzPts val="1800"/>
+              <a:buNone/>
+            </a:pPr>
+            <a:r>
+              <a:rPr lang="es-MX" dirty="0">
+                <a:latin typeface="Courier New" panose="02070309020205020404" pitchFamily="49" charset="0"/>
+                <a:cs typeface="Courier New" panose="02070309020205020404" pitchFamily="49" charset="0"/>
+              </a:rPr>
+              <a:t>		</a:t>
+            </a:r>
+            <a:r>
+              <a:rPr lang="es-MX" dirty="0" err="1">
+                <a:latin typeface="Courier New" panose="02070309020205020404" pitchFamily="49" charset="0"/>
+                <a:cs typeface="Courier New" panose="02070309020205020404" pitchFamily="49" charset="0"/>
+              </a:rPr>
+              <a:t>fit</a:t>
+            </a:r>
+            <a:r>
+              <a:rPr lang="es-MX" dirty="0">
+                <a:latin typeface="Courier New" panose="02070309020205020404" pitchFamily="49" charset="0"/>
+                <a:cs typeface="Courier New" panose="02070309020205020404" pitchFamily="49" charset="0"/>
+              </a:rPr>
+              <a:t>(</a:t>
+            </a:r>
+            <a:r>
+              <a:rPr lang="es-MX" dirty="0" err="1">
+                <a:latin typeface="Courier New" panose="02070309020205020404" pitchFamily="49" charset="0"/>
+                <a:cs typeface="Courier New" panose="02070309020205020404" pitchFamily="49" charset="0"/>
+              </a:rPr>
+              <a:t>base_train</a:t>
+            </a:r>
+            <a:r>
+              <a:rPr lang="es-MX" dirty="0">
+                <a:latin typeface="Courier New" panose="02070309020205020404" pitchFamily="49" charset="0"/>
+                <a:cs typeface="Courier New" panose="02070309020205020404" pitchFamily="49" charset="0"/>
+              </a:rPr>
+              <a:t>)</a:t>
+            </a:r>
+          </a:p>
+          <a:p>
+            <a:pPr marL="114300" lvl="0" indent="0" algn="l" rtl="0">
+              <a:lnSpc>
+                <a:spcPct val="150000"/>
+              </a:lnSpc>
+              <a:spcBef>
+                <a:spcPts val="0"/>
+              </a:spcBef>
+              <a:spcAft>
+                <a:spcPts val="0"/>
+              </a:spcAft>
+              <a:buSzPts val="1800"/>
+              <a:buNone/>
+            </a:pPr>
+            <a:r>
+              <a:rPr lang="es-MX" sz="1400" dirty="0" err="1">
+                <a:latin typeface="Courier New" panose="02070309020205020404" pitchFamily="49" charset="0"/>
+                <a:cs typeface="Courier New" panose="02070309020205020404" pitchFamily="49" charset="0"/>
+              </a:rPr>
+              <a:t>lm_fit</a:t>
+            </a:r>
+            <a:r>
+              <a:rPr lang="es-MX" sz="1400" dirty="0">
+                <a:latin typeface="Courier New" panose="02070309020205020404" pitchFamily="49" charset="0"/>
+                <a:cs typeface="Courier New" panose="02070309020205020404" pitchFamily="49" charset="0"/>
+              </a:rPr>
+              <a:t> %&gt;% </a:t>
+            </a:r>
+            <a:r>
+              <a:rPr lang="es-MX" sz="1400" dirty="0" err="1">
+                <a:latin typeface="Courier New" panose="02070309020205020404" pitchFamily="49" charset="0"/>
+                <a:cs typeface="Courier New" panose="02070309020205020404" pitchFamily="49" charset="0"/>
+              </a:rPr>
+              <a:t>tidy</a:t>
+            </a:r>
+            <a:r>
+              <a:rPr lang="es-MX" sz="1400" dirty="0">
+                <a:latin typeface="Courier New" panose="02070309020205020404" pitchFamily="49" charset="0"/>
+                <a:cs typeface="Courier New" panose="02070309020205020404" pitchFamily="49" charset="0"/>
+              </a:rPr>
+              <a:t>()</a:t>
+            </a:r>
+          </a:p>
+          <a:p>
+            <a:pPr marL="114300" lvl="0" indent="0" algn="l" rtl="0">
+              <a:lnSpc>
+                <a:spcPct val="150000"/>
+              </a:lnSpc>
+              <a:spcBef>
+                <a:spcPts val="0"/>
+              </a:spcBef>
+              <a:spcAft>
+                <a:spcPts val="0"/>
+              </a:spcAft>
+              <a:buSzPts val="1800"/>
+              <a:buNone/>
+            </a:pPr>
+            <a:r>
+              <a:rPr lang="es-MX" dirty="0" err="1">
+                <a:latin typeface="Courier New" panose="02070309020205020404" pitchFamily="49" charset="0"/>
+                <a:cs typeface="Courier New" panose="02070309020205020404" pitchFamily="49" charset="0"/>
+              </a:rPr>
+              <a:t>lm_fit</a:t>
+            </a:r>
+            <a:r>
+              <a:rPr lang="es-MX" sz="1400" dirty="0">
+                <a:latin typeface="Courier New" panose="02070309020205020404" pitchFamily="49" charset="0"/>
+                <a:cs typeface="Courier New" panose="02070309020205020404" pitchFamily="49" charset="0"/>
+              </a:rPr>
+              <a:t> %&gt;% </a:t>
+            </a:r>
+            <a:r>
+              <a:rPr lang="es-MX" sz="1400" dirty="0" err="1">
+                <a:latin typeface="Courier New" panose="02070309020205020404" pitchFamily="49" charset="0"/>
+                <a:cs typeface="Courier New" panose="02070309020205020404" pitchFamily="49" charset="0"/>
+              </a:rPr>
+              <a:t>augment</a:t>
+            </a:r>
+            <a:r>
+              <a:rPr lang="es-MX" sz="1400" dirty="0">
+                <a:latin typeface="Courier New" panose="02070309020205020404" pitchFamily="49" charset="0"/>
+                <a:cs typeface="Courier New" panose="02070309020205020404" pitchFamily="49" charset="0"/>
+              </a:rPr>
+              <a:t>(</a:t>
+            </a:r>
+            <a:r>
+              <a:rPr lang="es-MX" sz="1400" dirty="0" err="1">
+                <a:latin typeface="Courier New" panose="02070309020205020404" pitchFamily="49" charset="0"/>
+                <a:cs typeface="Courier New" panose="02070309020205020404" pitchFamily="49" charset="0"/>
+              </a:rPr>
+              <a:t>base_train</a:t>
+            </a:r>
+            <a:r>
+              <a:rPr lang="es-MX" sz="1400" dirty="0">
+                <a:latin typeface="Courier New" panose="02070309020205020404" pitchFamily="49" charset="0"/>
+                <a:cs typeface="Courier New" panose="02070309020205020404" pitchFamily="49" charset="0"/>
+              </a:rPr>
+              <a:t>)</a:t>
+            </a:r>
+          </a:p>
+        </p:txBody>
+      </p:sp>
+      <p:grpSp>
+        <p:nvGrpSpPr>
+          <p:cNvPr id="2" name="Grupo 1">
+            <a:extLst>
+              <a:ext uri="{FF2B5EF4-FFF2-40B4-BE49-F238E27FC236}">
+                <a16:creationId xmlns:a16="http://schemas.microsoft.com/office/drawing/2014/main" id="{5260D92F-CE34-44E9-83E2-7872B1A9A930}"/>
+              </a:ext>
+            </a:extLst>
+          </p:cNvPr>
+          <p:cNvGrpSpPr/>
+          <p:nvPr/>
+        </p:nvGrpSpPr>
+        <p:grpSpPr>
+          <a:xfrm>
+            <a:off x="1474028" y="419724"/>
+            <a:ext cx="1648920" cy="3144289"/>
+            <a:chOff x="1219195" y="816963"/>
+            <a:chExt cx="1648920" cy="3144289"/>
+          </a:xfrm>
+        </p:grpSpPr>
+        <p:sp>
+          <p:nvSpPr>
+            <p:cNvPr id="5" name="Rectángulo: esquinas redondeadas 4">
+              <a:extLst>
+                <a:ext uri="{FF2B5EF4-FFF2-40B4-BE49-F238E27FC236}">
+                  <a16:creationId xmlns:a16="http://schemas.microsoft.com/office/drawing/2014/main" id="{B5F1ADFD-124A-4771-A1B8-1F4E5627381A}"/>
+                </a:ext>
+              </a:extLst>
+            </p:cNvPr>
+            <p:cNvSpPr/>
+            <p:nvPr/>
+          </p:nvSpPr>
+          <p:spPr>
+            <a:xfrm>
+              <a:off x="1219196" y="816963"/>
+              <a:ext cx="1648919" cy="502171"/>
+            </a:xfrm>
+            <a:prstGeom prst="roundRect">
+              <a:avLst/>
+            </a:prstGeom>
+            <a:noFill/>
+            <a:ln>
+              <a:solidFill>
+                <a:schemeClr val="accent3"/>
+              </a:solidFill>
+            </a:ln>
+          </p:spPr>
+          <p:style>
+            <a:lnRef idx="2">
+              <a:schemeClr val="accent1">
+                <a:shade val="50000"/>
+              </a:schemeClr>
+            </a:lnRef>
+            <a:fillRef idx="1">
+              <a:schemeClr val="accent1"/>
+            </a:fillRef>
+            <a:effectRef idx="0">
+              <a:schemeClr val="accent1"/>
+            </a:effectRef>
+            <a:fontRef idx="minor">
+              <a:schemeClr val="lt1"/>
+            </a:fontRef>
+          </p:style>
+          <p:txBody>
+            <a:bodyPr rtlCol="0" anchor="ctr"/>
+            <a:lstStyle/>
+            <a:p>
+              <a:pPr algn="ctr"/>
+              <a:r>
+                <a:rPr lang="es-MX" sz="2000" dirty="0" err="1">
+                  <a:solidFill>
+                    <a:schemeClr val="accent2"/>
+                  </a:solidFill>
+                  <a:latin typeface="Proxima Nova" panose="020B0604020202020204" charset="0"/>
+                </a:rPr>
+                <a:t>Workflow</a:t>
+              </a:r>
+              <a:endParaRPr lang="es-AR" sz="2000" dirty="0">
+                <a:solidFill>
+                  <a:schemeClr val="accent2"/>
+                </a:solidFill>
+                <a:latin typeface="Proxima Nova" panose="020B0604020202020204" charset="0"/>
+              </a:endParaRPr>
+            </a:p>
+          </p:txBody>
+        </p:sp>
+        <p:grpSp>
+          <p:nvGrpSpPr>
+            <p:cNvPr id="22" name="Grupo 21">
+              <a:extLst>
+                <a:ext uri="{FF2B5EF4-FFF2-40B4-BE49-F238E27FC236}">
+                  <a16:creationId xmlns:a16="http://schemas.microsoft.com/office/drawing/2014/main" id="{93F3B69B-5BB9-407C-B349-06ABB94A0838}"/>
+                </a:ext>
+              </a:extLst>
+            </p:cNvPr>
+            <p:cNvGrpSpPr/>
+            <p:nvPr/>
+          </p:nvGrpSpPr>
+          <p:grpSpPr>
+            <a:xfrm>
+              <a:off x="1219195" y="1683900"/>
+              <a:ext cx="1648919" cy="826958"/>
+              <a:chOff x="6526967" y="1264171"/>
+              <a:chExt cx="1648919" cy="826958"/>
+            </a:xfrm>
+          </p:grpSpPr>
+          <p:sp>
+            <p:nvSpPr>
+              <p:cNvPr id="19" name="Rectángulo: esquinas redondeadas 18">
+                <a:extLst>
+                  <a:ext uri="{FF2B5EF4-FFF2-40B4-BE49-F238E27FC236}">
+                    <a16:creationId xmlns:a16="http://schemas.microsoft.com/office/drawing/2014/main" id="{509970EA-0F7C-41A4-816B-9275D8C2E661}"/>
+                  </a:ext>
+                </a:extLst>
+              </p:cNvPr>
+              <p:cNvSpPr/>
+              <p:nvPr/>
+            </p:nvSpPr>
+            <p:spPr>
+              <a:xfrm>
+                <a:off x="6526967" y="1264171"/>
+                <a:ext cx="1648919" cy="359764"/>
+              </a:xfrm>
+              <a:prstGeom prst="roundRect">
+                <a:avLst/>
+              </a:prstGeom>
+              <a:noFill/>
+              <a:ln>
+                <a:solidFill>
+                  <a:schemeClr val="accent3"/>
+                </a:solidFill>
+              </a:ln>
+            </p:spPr>
+            <p:style>
+              <a:lnRef idx="2">
+                <a:schemeClr val="accent1">
+                  <a:shade val="50000"/>
+                </a:schemeClr>
+              </a:lnRef>
+              <a:fillRef idx="1">
+                <a:schemeClr val="accent1"/>
+              </a:fillRef>
+              <a:effectRef idx="0">
+                <a:schemeClr val="accent1"/>
+              </a:effectRef>
+              <a:fontRef idx="minor">
+                <a:schemeClr val="lt1"/>
+              </a:fontRef>
+            </p:style>
+            <p:txBody>
+              <a:bodyPr rtlCol="0" anchor="ctr"/>
+              <a:lstStyle/>
+              <a:p>
+                <a:pPr algn="ctr"/>
+                <a:r>
+                  <a:rPr lang="es-MX" dirty="0" err="1">
+                    <a:solidFill>
+                      <a:schemeClr val="accent2"/>
+                    </a:solidFill>
+                    <a:latin typeface="Proxima Nova" panose="020B0604020202020204" charset="0"/>
+                  </a:rPr>
+                  <a:t>Model</a:t>
+                </a:r>
+                <a:endParaRPr lang="es-AR" dirty="0">
+                  <a:solidFill>
+                    <a:schemeClr val="accent2"/>
+                  </a:solidFill>
+                  <a:latin typeface="Proxima Nova" panose="020B0604020202020204" charset="0"/>
+                </a:endParaRPr>
+              </a:p>
+            </p:txBody>
+          </p:sp>
+          <p:sp>
+            <p:nvSpPr>
+              <p:cNvPr id="20" name="Rectángulo: esquinas redondeadas 19">
+                <a:extLst>
+                  <a:ext uri="{FF2B5EF4-FFF2-40B4-BE49-F238E27FC236}">
+                    <a16:creationId xmlns:a16="http://schemas.microsoft.com/office/drawing/2014/main" id="{B6146A01-ADA9-4A45-A6F7-552D9EE78478}"/>
+                  </a:ext>
+                </a:extLst>
+              </p:cNvPr>
+              <p:cNvSpPr/>
+              <p:nvPr/>
+            </p:nvSpPr>
+            <p:spPr>
+              <a:xfrm>
+                <a:off x="6526967" y="1731365"/>
+                <a:ext cx="1648919" cy="359764"/>
+              </a:xfrm>
+              <a:prstGeom prst="roundRect">
+                <a:avLst/>
+              </a:prstGeom>
+              <a:noFill/>
+              <a:ln>
+                <a:solidFill>
+                  <a:schemeClr val="accent3"/>
+                </a:solidFill>
+              </a:ln>
+            </p:spPr>
+            <p:style>
+              <a:lnRef idx="2">
+                <a:schemeClr val="accent1">
+                  <a:shade val="50000"/>
+                </a:schemeClr>
+              </a:lnRef>
+              <a:fillRef idx="1">
+                <a:schemeClr val="accent1"/>
+              </a:fillRef>
+              <a:effectRef idx="0">
+                <a:schemeClr val="accent1"/>
+              </a:effectRef>
+              <a:fontRef idx="minor">
+                <a:schemeClr val="lt1"/>
+              </a:fontRef>
+            </p:style>
+            <p:txBody>
+              <a:bodyPr rtlCol="0" anchor="ctr"/>
+              <a:lstStyle/>
+              <a:p>
+                <a:pPr algn="ctr"/>
+                <a:r>
+                  <a:rPr lang="es-MX" dirty="0" err="1">
+                    <a:solidFill>
+                      <a:schemeClr val="accent2"/>
+                    </a:solidFill>
+                    <a:latin typeface="Proxima Nova" panose="020B0604020202020204" charset="0"/>
+                  </a:rPr>
+                  <a:t>Recipe</a:t>
+                </a:r>
+                <a:endParaRPr lang="es-AR" dirty="0">
+                  <a:solidFill>
+                    <a:schemeClr val="accent2"/>
+                  </a:solidFill>
+                  <a:latin typeface="Proxima Nova" panose="020B0604020202020204" charset="0"/>
+                </a:endParaRPr>
+              </a:p>
+            </p:txBody>
+          </p:sp>
+        </p:grpSp>
+        <p:cxnSp>
+          <p:nvCxnSpPr>
+            <p:cNvPr id="30" name="Conector recto de flecha 29">
+              <a:extLst>
+                <a:ext uri="{FF2B5EF4-FFF2-40B4-BE49-F238E27FC236}">
+                  <a16:creationId xmlns:a16="http://schemas.microsoft.com/office/drawing/2014/main" id="{CC6DCB1B-DB56-452B-B01C-F32AFD4F6176}"/>
+                </a:ext>
+              </a:extLst>
+            </p:cNvPr>
+            <p:cNvCxnSpPr>
+              <a:stCxn id="5" idx="2"/>
+              <a:endCxn id="19" idx="0"/>
+            </p:cNvCxnSpPr>
+            <p:nvPr/>
+          </p:nvCxnSpPr>
+          <p:spPr>
+            <a:xfrm flipH="1">
+              <a:off x="2043655" y="1319134"/>
+              <a:ext cx="1" cy="364766"/>
+            </a:xfrm>
+            <a:prstGeom prst="straightConnector1">
+              <a:avLst/>
+            </a:prstGeom>
+            <a:ln>
+              <a:tailEnd type="triangle"/>
+            </a:ln>
+          </p:spPr>
+          <p:style>
+            <a:lnRef idx="1">
+              <a:schemeClr val="accent1"/>
+            </a:lnRef>
+            <a:fillRef idx="0">
+              <a:schemeClr val="accent1"/>
+            </a:fillRef>
+            <a:effectRef idx="0">
+              <a:schemeClr val="accent1"/>
+            </a:effectRef>
+            <a:fontRef idx="minor">
+              <a:schemeClr val="tx1"/>
+            </a:fontRef>
+          </p:style>
+        </p:cxnSp>
+        <p:cxnSp>
+          <p:nvCxnSpPr>
+            <p:cNvPr id="27" name="Conector recto de flecha 26">
+              <a:extLst>
+                <a:ext uri="{FF2B5EF4-FFF2-40B4-BE49-F238E27FC236}">
+                  <a16:creationId xmlns:a16="http://schemas.microsoft.com/office/drawing/2014/main" id="{1EA8771F-B3FB-4414-9EA5-264D9A1FAD24}"/>
+                </a:ext>
+              </a:extLst>
+            </p:cNvPr>
+            <p:cNvCxnSpPr/>
+            <p:nvPr/>
+          </p:nvCxnSpPr>
+          <p:spPr>
+            <a:xfrm flipH="1">
+              <a:off x="2043654" y="2510858"/>
+              <a:ext cx="1" cy="360000"/>
+            </a:xfrm>
+            <a:prstGeom prst="straightConnector1">
+              <a:avLst/>
+            </a:prstGeom>
+            <a:ln>
+              <a:tailEnd type="triangle"/>
+            </a:ln>
+          </p:spPr>
+          <p:style>
+            <a:lnRef idx="1">
+              <a:schemeClr val="accent1"/>
+            </a:lnRef>
+            <a:fillRef idx="0">
+              <a:schemeClr val="accent1"/>
+            </a:fillRef>
+            <a:effectRef idx="0">
+              <a:schemeClr val="accent1"/>
+            </a:effectRef>
+            <a:fontRef idx="minor">
+              <a:schemeClr val="tx1"/>
+            </a:fontRef>
+          </p:style>
+        </p:cxnSp>
+        <p:sp>
+          <p:nvSpPr>
+            <p:cNvPr id="29" name="Rectángulo: esquinas redondeadas 28">
+              <a:extLst>
+                <a:ext uri="{FF2B5EF4-FFF2-40B4-BE49-F238E27FC236}">
+                  <a16:creationId xmlns:a16="http://schemas.microsoft.com/office/drawing/2014/main" id="{84AADCE0-DEDD-4542-BCD7-D1847F94DCD9}"/>
+                </a:ext>
+              </a:extLst>
+            </p:cNvPr>
+            <p:cNvSpPr/>
+            <p:nvPr/>
+          </p:nvSpPr>
+          <p:spPr>
+            <a:xfrm>
+              <a:off x="1219195" y="2875041"/>
+              <a:ext cx="1648919" cy="359764"/>
+            </a:xfrm>
+            <a:prstGeom prst="roundRect">
+              <a:avLst/>
+            </a:prstGeom>
+            <a:noFill/>
+            <a:ln>
+              <a:solidFill>
+                <a:schemeClr val="accent3"/>
+              </a:solidFill>
+            </a:ln>
+          </p:spPr>
+          <p:style>
+            <a:lnRef idx="2">
+              <a:schemeClr val="accent1">
+                <a:shade val="50000"/>
+              </a:schemeClr>
+            </a:lnRef>
+            <a:fillRef idx="1">
+              <a:schemeClr val="accent1"/>
+            </a:fillRef>
+            <a:effectRef idx="0">
+              <a:schemeClr val="accent1"/>
+            </a:effectRef>
+            <a:fontRef idx="minor">
+              <a:schemeClr val="lt1"/>
+            </a:fontRef>
+          </p:style>
+          <p:txBody>
+            <a:bodyPr rtlCol="0" anchor="ctr"/>
+            <a:lstStyle/>
+            <a:p>
+              <a:pPr algn="ctr"/>
+              <a:r>
+                <a:rPr lang="es-MX" dirty="0" err="1">
+                  <a:solidFill>
+                    <a:schemeClr val="accent2"/>
+                  </a:solidFill>
+                  <a:latin typeface="Proxima Nova" panose="020B0604020202020204" charset="0"/>
+                </a:rPr>
+                <a:t>Fit</a:t>
+              </a:r>
+              <a:endParaRPr lang="es-AR" dirty="0">
+                <a:solidFill>
+                  <a:schemeClr val="accent2"/>
+                </a:solidFill>
+                <a:latin typeface="Proxima Nova" panose="020B0604020202020204" charset="0"/>
+              </a:endParaRPr>
+            </a:p>
+          </p:txBody>
+        </p:sp>
+        <p:sp>
+          <p:nvSpPr>
+            <p:cNvPr id="32" name="Rectángulo: esquinas redondeadas 31">
+              <a:extLst>
+                <a:ext uri="{FF2B5EF4-FFF2-40B4-BE49-F238E27FC236}">
+                  <a16:creationId xmlns:a16="http://schemas.microsoft.com/office/drawing/2014/main" id="{7228FD63-036B-4BC8-BF1E-2551E942D3A7}"/>
+                </a:ext>
+              </a:extLst>
+            </p:cNvPr>
+            <p:cNvSpPr/>
+            <p:nvPr/>
+          </p:nvSpPr>
+          <p:spPr>
+            <a:xfrm>
+              <a:off x="1219195" y="3601488"/>
+              <a:ext cx="1648919" cy="359764"/>
+            </a:xfrm>
+            <a:prstGeom prst="roundRect">
+              <a:avLst/>
+            </a:prstGeom>
+            <a:noFill/>
+            <a:ln>
+              <a:solidFill>
+                <a:schemeClr val="accent3"/>
+              </a:solidFill>
+            </a:ln>
+          </p:spPr>
+          <p:style>
+            <a:lnRef idx="2">
+              <a:schemeClr val="accent1">
+                <a:shade val="50000"/>
+              </a:schemeClr>
+            </a:lnRef>
+            <a:fillRef idx="1">
+              <a:schemeClr val="accent1"/>
+            </a:fillRef>
+            <a:effectRef idx="0">
+              <a:schemeClr val="accent1"/>
+            </a:effectRef>
+            <a:fontRef idx="minor">
+              <a:schemeClr val="lt1"/>
+            </a:fontRef>
+          </p:style>
+          <p:txBody>
+            <a:bodyPr rtlCol="0" anchor="ctr"/>
+            <a:lstStyle/>
+            <a:p>
+              <a:pPr algn="ctr"/>
+              <a:r>
+                <a:rPr lang="es-MX" dirty="0" err="1">
+                  <a:solidFill>
+                    <a:schemeClr val="accent2"/>
+                  </a:solidFill>
+                  <a:latin typeface="Proxima Nova" panose="020B0604020202020204" charset="0"/>
+                </a:rPr>
+                <a:t>Predict</a:t>
+              </a:r>
+              <a:endParaRPr lang="es-AR" dirty="0">
+                <a:solidFill>
+                  <a:schemeClr val="accent2"/>
+                </a:solidFill>
+                <a:latin typeface="Proxima Nova" panose="020B0604020202020204" charset="0"/>
+              </a:endParaRPr>
+            </a:p>
+          </p:txBody>
+        </p:sp>
+        <p:cxnSp>
+          <p:nvCxnSpPr>
+            <p:cNvPr id="34" name="Conector recto de flecha 33">
+              <a:extLst>
+                <a:ext uri="{FF2B5EF4-FFF2-40B4-BE49-F238E27FC236}">
+                  <a16:creationId xmlns:a16="http://schemas.microsoft.com/office/drawing/2014/main" id="{D314A100-DCBB-4E52-AC34-916CDFE07D08}"/>
+                </a:ext>
+              </a:extLst>
+            </p:cNvPr>
+            <p:cNvCxnSpPr/>
+            <p:nvPr/>
+          </p:nvCxnSpPr>
+          <p:spPr>
+            <a:xfrm flipH="1">
+              <a:off x="2043653" y="3238988"/>
+              <a:ext cx="1" cy="360000"/>
+            </a:xfrm>
+            <a:prstGeom prst="straightConnector1">
+              <a:avLst/>
+            </a:prstGeom>
+            <a:ln>
+              <a:tailEnd type="triangle"/>
+            </a:ln>
+          </p:spPr>
+          <p:style>
+            <a:lnRef idx="1">
+              <a:schemeClr val="accent1"/>
+            </a:lnRef>
+            <a:fillRef idx="0">
+              <a:schemeClr val="accent1"/>
+            </a:fillRef>
+            <a:effectRef idx="0">
+              <a:schemeClr val="accent1"/>
+            </a:effectRef>
+            <a:fontRef idx="minor">
+              <a:schemeClr val="tx1"/>
+            </a:fontRef>
+          </p:style>
+        </p:cxnSp>
+      </p:grpSp>
+    </p:spTree>
+    <p:extLst>
+      <p:ext uri="{BB962C8B-B14F-4D97-AF65-F5344CB8AC3E}">
+        <p14:creationId xmlns:p14="http://schemas.microsoft.com/office/powerpoint/2010/main" val="1366173035"/>
+      </p:ext>
+    </p:extLst>
+  </p:cSld>
+  <p:clrMapOvr>
+    <a:masterClrMapping/>
+  </p:clrMapOvr>
+</p:sld>
+</file>
+
+<file path=ppt/slides/slide6.xml><?xml version="1.0" encoding="utf-8"?>
 <p:sld xmlns:a="http://schemas.openxmlformats.org/drawingml/2006/main" xmlns:r="http://schemas.openxmlformats.org/officeDocument/2006/relationships" xmlns:p="http://schemas.openxmlformats.org/presentationml/2006/main">
   <p:cSld>
     <p:bg>
@@ -11042,7 +13234,7 @@
 </p:sld>
 </file>
 
-<file path=ppt/slides/slide6.xml><?xml version="1.0" encoding="utf-8"?>
+<file path=ppt/slides/slide7.xml><?xml version="1.0" encoding="utf-8"?>
 <p:sld xmlns:a="http://schemas.openxmlformats.org/drawingml/2006/main" xmlns:r="http://schemas.openxmlformats.org/officeDocument/2006/relationships" xmlns:p="http://schemas.openxmlformats.org/presentationml/2006/main">
   <p:cSld>
     <p:bg>
@@ -11843,449 +14035,6 @@
 </p:sld>
 </file>
 
-<file path=ppt/slides/slide7.xml><?xml version="1.0" encoding="utf-8"?>
-<p:sld xmlns:a="http://schemas.openxmlformats.org/drawingml/2006/main" xmlns:r="http://schemas.openxmlformats.org/officeDocument/2006/relationships" xmlns:p="http://schemas.openxmlformats.org/presentationml/2006/main">
-  <p:cSld>
-    <p:spTree>
-      <p:nvGrpSpPr>
-        <p:cNvPr id="1" name="Shape 309"/>
-        <p:cNvGrpSpPr/>
-        <p:nvPr/>
-      </p:nvGrpSpPr>
-      <p:grpSpPr>
-        <a:xfrm>
-          <a:off x="0" y="0"/>
-          <a:ext cx="0" cy="0"/>
-          <a:chOff x="0" y="0"/>
-          <a:chExt cx="0" cy="0"/>
-        </a:xfrm>
-      </p:grpSpPr>
-      <p:sp>
-        <p:nvSpPr>
-          <p:cNvPr id="310" name="Google Shape;310;p53"/>
-          <p:cNvSpPr txBox="1">
-            <a:spLocks noGrp="1"/>
-          </p:cNvSpPr>
-          <p:nvPr>
-            <p:ph type="title"/>
-          </p:nvPr>
-        </p:nvSpPr>
-        <p:spPr>
-          <a:xfrm>
-            <a:off x="311700" y="156100"/>
-            <a:ext cx="8520600" cy="572700"/>
-          </a:xfrm>
-          <a:prstGeom prst="rect">
-            <a:avLst/>
-          </a:prstGeom>
-        </p:spPr>
-        <p:txBody>
-          <a:bodyPr spcFirstLastPara="1" wrap="square" lIns="91425" tIns="91425" rIns="91425" bIns="91425" anchor="t" anchorCtr="0">
-            <a:normAutofit fontScale="90000"/>
-          </a:bodyPr>
-          <a:lstStyle/>
-          <a:p>
-            <a:pPr marL="0" lvl="0" indent="0" algn="l" rtl="0">
-              <a:spcBef>
-                <a:spcPts val="0"/>
-              </a:spcBef>
-              <a:spcAft>
-                <a:spcPts val="0"/>
-              </a:spcAft>
-              <a:buNone/>
-            </a:pPr>
-            <a:r>
-              <a:rPr lang="en-GB" dirty="0" err="1"/>
-              <a:t>Muestra</a:t>
-            </a:r>
-            <a:endParaRPr dirty="0"/>
-          </a:p>
-        </p:txBody>
-      </p:sp>
-      <p:sp>
-        <p:nvSpPr>
-          <p:cNvPr id="311" name="Google Shape;311;p53"/>
-          <p:cNvSpPr txBox="1">
-            <a:spLocks noGrp="1"/>
-          </p:cNvSpPr>
-          <p:nvPr>
-            <p:ph type="body" idx="1"/>
-          </p:nvPr>
-        </p:nvSpPr>
-        <p:spPr>
-          <a:xfrm>
-            <a:off x="311700" y="728800"/>
-            <a:ext cx="4650044" cy="3416400"/>
-          </a:xfrm>
-          <a:prstGeom prst="rect">
-            <a:avLst/>
-          </a:prstGeom>
-        </p:spPr>
-        <p:txBody>
-          <a:bodyPr spcFirstLastPara="1" wrap="square" lIns="91425" tIns="91425" rIns="91425" bIns="91425" anchor="t" anchorCtr="0">
-            <a:normAutofit/>
-          </a:bodyPr>
-          <a:lstStyle/>
-          <a:p>
-            <a:pPr marL="114300" lvl="0" indent="0" algn="l" rtl="0">
-              <a:lnSpc>
-                <a:spcPct val="150000"/>
-              </a:lnSpc>
-              <a:spcBef>
-                <a:spcPts val="0"/>
-              </a:spcBef>
-              <a:spcAft>
-                <a:spcPts val="0"/>
-              </a:spcAft>
-              <a:buSzPts val="1800"/>
-              <a:buNone/>
-            </a:pPr>
-            <a:r>
-              <a:rPr lang="es-MX" sz="1200" dirty="0">
-                <a:latin typeface="Courier New" panose="02070309020205020404" pitchFamily="49" charset="0"/>
-                <a:cs typeface="Courier New" panose="02070309020205020404" pitchFamily="49" charset="0"/>
-              </a:rPr>
-              <a:t># Separo un test set</a:t>
-            </a:r>
-          </a:p>
-          <a:p>
-            <a:pPr marL="114300" lvl="0" indent="0" algn="l" rtl="0">
-              <a:lnSpc>
-                <a:spcPct val="150000"/>
-              </a:lnSpc>
-              <a:spcBef>
-                <a:spcPts val="0"/>
-              </a:spcBef>
-              <a:spcAft>
-                <a:spcPts val="0"/>
-              </a:spcAft>
-              <a:buSzPts val="1800"/>
-              <a:buNone/>
-            </a:pPr>
-            <a:r>
-              <a:rPr lang="es-MX" sz="1200" dirty="0" err="1">
-                <a:latin typeface="Courier New" panose="02070309020205020404" pitchFamily="49" charset="0"/>
-                <a:cs typeface="Courier New" panose="02070309020205020404" pitchFamily="49" charset="0"/>
-              </a:rPr>
-              <a:t>set.seed</a:t>
-            </a:r>
-            <a:r>
-              <a:rPr lang="es-MX" sz="1200" dirty="0">
-                <a:latin typeface="Courier New" panose="02070309020205020404" pitchFamily="49" charset="0"/>
-                <a:cs typeface="Courier New" panose="02070309020205020404" pitchFamily="49" charset="0"/>
-              </a:rPr>
-              <a:t>(123)</a:t>
-            </a:r>
-          </a:p>
-          <a:p>
-            <a:pPr marL="114300" lvl="0" indent="0" algn="l" rtl="0">
-              <a:lnSpc>
-                <a:spcPct val="150000"/>
-              </a:lnSpc>
-              <a:spcBef>
-                <a:spcPts val="0"/>
-              </a:spcBef>
-              <a:spcAft>
-                <a:spcPts val="0"/>
-              </a:spcAft>
-              <a:buSzPts val="1800"/>
-              <a:buNone/>
-            </a:pPr>
-            <a:r>
-              <a:rPr lang="es-MX" sz="1200" dirty="0" err="1">
-                <a:latin typeface="Courier New" panose="02070309020205020404" pitchFamily="49" charset="0"/>
-                <a:cs typeface="Courier New" panose="02070309020205020404" pitchFamily="49" charset="0"/>
-              </a:rPr>
-              <a:t>base_split</a:t>
-            </a:r>
-            <a:r>
-              <a:rPr lang="es-MX" sz="1200" dirty="0">
-                <a:latin typeface="Courier New" panose="02070309020205020404" pitchFamily="49" charset="0"/>
-                <a:cs typeface="Courier New" panose="02070309020205020404" pitchFamily="49" charset="0"/>
-              </a:rPr>
-              <a:t> &lt;- </a:t>
-            </a:r>
-            <a:r>
-              <a:rPr lang="es-MX" sz="1200" dirty="0" err="1">
-                <a:latin typeface="Courier New" panose="02070309020205020404" pitchFamily="49" charset="0"/>
-                <a:cs typeface="Courier New" panose="02070309020205020404" pitchFamily="49" charset="0"/>
-              </a:rPr>
-              <a:t>initial_Split</a:t>
-            </a:r>
-            <a:r>
-              <a:rPr lang="es-MX" sz="1200" dirty="0">
-                <a:latin typeface="Courier New" panose="02070309020205020404" pitchFamily="49" charset="0"/>
-                <a:cs typeface="Courier New" panose="02070309020205020404" pitchFamily="49" charset="0"/>
-              </a:rPr>
-              <a:t>(base, </a:t>
-            </a:r>
-            <a:r>
-              <a:rPr lang="es-MX" sz="1200" dirty="0" err="1">
-                <a:latin typeface="Courier New" panose="02070309020205020404" pitchFamily="49" charset="0"/>
-                <a:cs typeface="Courier New" panose="02070309020205020404" pitchFamily="49" charset="0"/>
-              </a:rPr>
-              <a:t>prop</a:t>
-            </a:r>
-            <a:r>
-              <a:rPr lang="es-MX" sz="1200" dirty="0">
-                <a:latin typeface="Courier New" panose="02070309020205020404" pitchFamily="49" charset="0"/>
-                <a:cs typeface="Courier New" panose="02070309020205020404" pitchFamily="49" charset="0"/>
-              </a:rPr>
-              <a:t>=0.8)</a:t>
-            </a:r>
-          </a:p>
-          <a:p>
-            <a:pPr marL="114300" lvl="0" indent="0" algn="l" rtl="0">
-              <a:lnSpc>
-                <a:spcPct val="150000"/>
-              </a:lnSpc>
-              <a:spcBef>
-                <a:spcPts val="0"/>
-              </a:spcBef>
-              <a:spcAft>
-                <a:spcPts val="0"/>
-              </a:spcAft>
-              <a:buSzPts val="1800"/>
-              <a:buNone/>
-            </a:pPr>
-            <a:r>
-              <a:rPr lang="es-MX" sz="1200" dirty="0" err="1">
-                <a:latin typeface="Courier New" panose="02070309020205020404" pitchFamily="49" charset="0"/>
-                <a:cs typeface="Courier New" panose="02070309020205020404" pitchFamily="49" charset="0"/>
-              </a:rPr>
-              <a:t>base_train</a:t>
-            </a:r>
-            <a:r>
-              <a:rPr lang="es-MX" sz="1200" dirty="0">
-                <a:latin typeface="Courier New" panose="02070309020205020404" pitchFamily="49" charset="0"/>
-                <a:cs typeface="Courier New" panose="02070309020205020404" pitchFamily="49" charset="0"/>
-              </a:rPr>
-              <a:t> &lt;- training(</a:t>
-            </a:r>
-            <a:r>
-              <a:rPr lang="es-MX" sz="1200" dirty="0" err="1">
-                <a:latin typeface="Courier New" panose="02070309020205020404" pitchFamily="49" charset="0"/>
-                <a:cs typeface="Courier New" panose="02070309020205020404" pitchFamily="49" charset="0"/>
-              </a:rPr>
-              <a:t>base_split</a:t>
-            </a:r>
-            <a:r>
-              <a:rPr lang="es-MX" sz="1200" dirty="0">
-                <a:latin typeface="Courier New" panose="02070309020205020404" pitchFamily="49" charset="0"/>
-                <a:cs typeface="Courier New" panose="02070309020205020404" pitchFamily="49" charset="0"/>
-              </a:rPr>
-              <a:t>)</a:t>
-            </a:r>
-          </a:p>
-          <a:p>
-            <a:pPr marL="114300" lvl="0" indent="0" algn="l" rtl="0">
-              <a:lnSpc>
-                <a:spcPct val="150000"/>
-              </a:lnSpc>
-              <a:spcBef>
-                <a:spcPts val="0"/>
-              </a:spcBef>
-              <a:spcAft>
-                <a:spcPts val="0"/>
-              </a:spcAft>
-              <a:buSzPts val="1800"/>
-              <a:buNone/>
-            </a:pPr>
-            <a:r>
-              <a:rPr lang="es-MX" sz="1200" dirty="0" err="1">
-                <a:latin typeface="Courier New" panose="02070309020205020404" pitchFamily="49" charset="0"/>
-                <a:cs typeface="Courier New" panose="02070309020205020404" pitchFamily="49" charset="0"/>
-              </a:rPr>
-              <a:t>base_test</a:t>
-            </a:r>
-            <a:r>
-              <a:rPr lang="es-MX" sz="1200" dirty="0">
-                <a:latin typeface="Courier New" panose="02070309020205020404" pitchFamily="49" charset="0"/>
-                <a:cs typeface="Courier New" panose="02070309020205020404" pitchFamily="49" charset="0"/>
-              </a:rPr>
-              <a:t>  &lt;- </a:t>
-            </a:r>
-            <a:r>
-              <a:rPr lang="es-MX" sz="1200" dirty="0" err="1">
-                <a:latin typeface="Courier New" panose="02070309020205020404" pitchFamily="49" charset="0"/>
-                <a:cs typeface="Courier New" panose="02070309020205020404" pitchFamily="49" charset="0"/>
-              </a:rPr>
-              <a:t>testing</a:t>
-            </a:r>
-            <a:r>
-              <a:rPr lang="es-MX" sz="1200" dirty="0">
-                <a:latin typeface="Courier New" panose="02070309020205020404" pitchFamily="49" charset="0"/>
-                <a:cs typeface="Courier New" panose="02070309020205020404" pitchFamily="49" charset="0"/>
-              </a:rPr>
-              <a:t>(</a:t>
-            </a:r>
-            <a:r>
-              <a:rPr lang="es-MX" sz="1200" dirty="0" err="1">
-                <a:latin typeface="Courier New" panose="02070309020205020404" pitchFamily="49" charset="0"/>
-                <a:cs typeface="Courier New" panose="02070309020205020404" pitchFamily="49" charset="0"/>
-              </a:rPr>
-              <a:t>base_split</a:t>
-            </a:r>
-            <a:r>
-              <a:rPr lang="es-MX" sz="1200" dirty="0">
-                <a:latin typeface="Courier New" panose="02070309020205020404" pitchFamily="49" charset="0"/>
-                <a:cs typeface="Courier New" panose="02070309020205020404" pitchFamily="49" charset="0"/>
-              </a:rPr>
-              <a:t>)</a:t>
-            </a:r>
-          </a:p>
-          <a:p>
-            <a:pPr marL="114300" lvl="0" indent="0" algn="l" rtl="0">
-              <a:lnSpc>
-                <a:spcPct val="150000"/>
-              </a:lnSpc>
-              <a:spcBef>
-                <a:spcPts val="0"/>
-              </a:spcBef>
-              <a:spcAft>
-                <a:spcPts val="0"/>
-              </a:spcAft>
-              <a:buSzPts val="1800"/>
-              <a:buNone/>
-            </a:pPr>
-            <a:endParaRPr lang="es-MX" sz="1200" dirty="0">
-              <a:latin typeface="Courier New" panose="02070309020205020404" pitchFamily="49" charset="0"/>
-              <a:cs typeface="Courier New" panose="02070309020205020404" pitchFamily="49" charset="0"/>
-            </a:endParaRPr>
-          </a:p>
-          <a:p>
-            <a:pPr marL="114300" lvl="0" indent="0" algn="l" rtl="0">
-              <a:lnSpc>
-                <a:spcPct val="150000"/>
-              </a:lnSpc>
-              <a:spcBef>
-                <a:spcPts val="0"/>
-              </a:spcBef>
-              <a:spcAft>
-                <a:spcPts val="0"/>
-              </a:spcAft>
-              <a:buSzPts val="1800"/>
-              <a:buNone/>
-            </a:pPr>
-            <a:r>
-              <a:rPr lang="es-MX" sz="1200" dirty="0">
-                <a:latin typeface="Courier New" panose="02070309020205020404" pitchFamily="49" charset="0"/>
-                <a:cs typeface="Courier New" panose="02070309020205020404" pitchFamily="49" charset="0"/>
-              </a:rPr>
-              <a:t># Para Cross </a:t>
-            </a:r>
-            <a:r>
-              <a:rPr lang="es-MX" sz="1200" dirty="0" err="1">
-                <a:latin typeface="Courier New" panose="02070309020205020404" pitchFamily="49" charset="0"/>
-                <a:cs typeface="Courier New" panose="02070309020205020404" pitchFamily="49" charset="0"/>
-              </a:rPr>
-              <a:t>Validation</a:t>
-            </a:r>
-            <a:endParaRPr lang="es-MX" sz="1200" dirty="0">
-              <a:latin typeface="Courier New" panose="02070309020205020404" pitchFamily="49" charset="0"/>
-              <a:cs typeface="Courier New" panose="02070309020205020404" pitchFamily="49" charset="0"/>
-            </a:endParaRPr>
-          </a:p>
-          <a:p>
-            <a:pPr marL="114300" lvl="0" indent="0" algn="l" rtl="0">
-              <a:lnSpc>
-                <a:spcPct val="150000"/>
-              </a:lnSpc>
-              <a:spcBef>
-                <a:spcPts val="0"/>
-              </a:spcBef>
-              <a:spcAft>
-                <a:spcPts val="0"/>
-              </a:spcAft>
-              <a:buSzPts val="1800"/>
-              <a:buNone/>
-            </a:pPr>
-            <a:r>
-              <a:rPr lang="es-MX" sz="1200" dirty="0" err="1">
-                <a:latin typeface="Courier New" panose="02070309020205020404" pitchFamily="49" charset="0"/>
-                <a:cs typeface="Courier New" panose="02070309020205020404" pitchFamily="49" charset="0"/>
-              </a:rPr>
-              <a:t>set.seed</a:t>
-            </a:r>
-            <a:r>
-              <a:rPr lang="es-MX" sz="1200" dirty="0">
-                <a:latin typeface="Courier New" panose="02070309020205020404" pitchFamily="49" charset="0"/>
-                <a:cs typeface="Courier New" panose="02070309020205020404" pitchFamily="49" charset="0"/>
-              </a:rPr>
-              <a:t>(234335)</a:t>
-            </a:r>
-          </a:p>
-          <a:p>
-            <a:pPr marL="114300" lvl="0" indent="0" algn="l" rtl="0">
-              <a:lnSpc>
-                <a:spcPct val="150000"/>
-              </a:lnSpc>
-              <a:spcBef>
-                <a:spcPts val="0"/>
-              </a:spcBef>
-              <a:spcAft>
-                <a:spcPts val="0"/>
-              </a:spcAft>
-              <a:buSzPts val="1800"/>
-              <a:buNone/>
-            </a:pPr>
-            <a:r>
-              <a:rPr lang="es-MX" sz="1200" dirty="0" err="1">
-                <a:latin typeface="Courier New" panose="02070309020205020404" pitchFamily="49" charset="0"/>
-                <a:cs typeface="Courier New" panose="02070309020205020404" pitchFamily="49" charset="0"/>
-              </a:rPr>
-              <a:t>base_folds</a:t>
-            </a:r>
-            <a:r>
-              <a:rPr lang="es-MX" sz="1200" dirty="0">
-                <a:latin typeface="Courier New" panose="02070309020205020404" pitchFamily="49" charset="0"/>
-                <a:cs typeface="Courier New" panose="02070309020205020404" pitchFamily="49" charset="0"/>
-              </a:rPr>
-              <a:t> &lt;- </a:t>
-            </a:r>
-            <a:r>
-              <a:rPr lang="es-MX" sz="1200" dirty="0" err="1">
-                <a:latin typeface="Courier New" panose="02070309020205020404" pitchFamily="49" charset="0"/>
-                <a:cs typeface="Courier New" panose="02070309020205020404" pitchFamily="49" charset="0"/>
-              </a:rPr>
-              <a:t>vfold_cv</a:t>
-            </a:r>
-            <a:r>
-              <a:rPr lang="es-MX" sz="1200" dirty="0">
-                <a:latin typeface="Courier New" panose="02070309020205020404" pitchFamily="49" charset="0"/>
-                <a:cs typeface="Courier New" panose="02070309020205020404" pitchFamily="49" charset="0"/>
-              </a:rPr>
-              <a:t>(</a:t>
-            </a:r>
-            <a:r>
-              <a:rPr lang="es-MX" sz="1200" dirty="0" err="1">
-                <a:latin typeface="Courier New" panose="02070309020205020404" pitchFamily="49" charset="0"/>
-                <a:cs typeface="Courier New" panose="02070309020205020404" pitchFamily="49" charset="0"/>
-              </a:rPr>
-              <a:t>base_train</a:t>
-            </a:r>
-            <a:r>
-              <a:rPr lang="es-MX" sz="1200" dirty="0">
-                <a:latin typeface="Courier New" panose="02070309020205020404" pitchFamily="49" charset="0"/>
-                <a:cs typeface="Courier New" panose="02070309020205020404" pitchFamily="49" charset="0"/>
-              </a:rPr>
-              <a:t>, v = 10)</a:t>
-            </a:r>
-            <a:endParaRPr sz="1200" dirty="0">
-              <a:latin typeface="Courier New" panose="02070309020205020404" pitchFamily="49" charset="0"/>
-              <a:cs typeface="Courier New" panose="02070309020205020404" pitchFamily="49" charset="0"/>
-            </a:endParaRPr>
-          </a:p>
-        </p:txBody>
-      </p:sp>
-    </p:spTree>
-  </p:cSld>
-  <p:clrMapOvr>
-    <a:masterClrMapping/>
-  </p:clrMapOvr>
-</p:sld>
-</file>
-
 <file path=ppt/slides/slide8.xml><?xml version="1.0" encoding="utf-8"?>
 <p:sld xmlns:a="http://schemas.openxmlformats.org/drawingml/2006/main" xmlns:r="http://schemas.openxmlformats.org/officeDocument/2006/relationships" xmlns:p="http://schemas.openxmlformats.org/presentationml/2006/main">
   <p:cSld>
@@ -12339,19 +14088,7 @@
             </a:pPr>
             <a:r>
               <a:rPr lang="en-GB" dirty="0" err="1"/>
-              <a:t>Estimación</a:t>
-            </a:r>
-            <a:r>
-              <a:rPr lang="en-GB" dirty="0"/>
-              <a:t> y CV con </a:t>
-            </a:r>
-            <a:r>
-              <a:rPr lang="en-GB" i="1" dirty="0"/>
-              <a:t>un</a:t>
-            </a:r>
-            <a:r>
-              <a:rPr lang="en-GB" dirty="0"/>
-              <a:t> workflow</a:t>
+              <a:t>Muestra</a:t>
             </a:r>
             <a:endParaRPr dirty="0"/>
           </a:p>
@@ -12369,8 +14106,8 @@
         </p:nvSpPr>
         <p:spPr>
           <a:xfrm>
-            <a:off x="311699" y="728799"/>
-            <a:ext cx="6164052" cy="3963121"/>
+            <a:off x="311700" y="728800"/>
+            <a:ext cx="4650044" cy="3416400"/>
           </a:xfrm>
           <a:prstGeom prst="rect">
             <a:avLst/>
@@ -12378,7 +14115,7 @@
         </p:spPr>
         <p:txBody>
           <a:bodyPr spcFirstLastPara="1" wrap="square" lIns="91425" tIns="91425" rIns="91425" bIns="91425" anchor="t" anchorCtr="0">
-            <a:normAutofit lnSpcReduction="10000"/>
+            <a:normAutofit/>
           </a:bodyPr>
           <a:lstStyle/>
           <a:p>
@@ -12400,7 +14137,7 @@
                 <a:latin typeface="Courier New" panose="02070309020205020404" pitchFamily="49" charset="0"/>
                 <a:cs typeface="Courier New" panose="02070309020205020404" pitchFamily="49" charset="0"/>
               </a:rPr>
-              <a:t># Estimación del modelo</a:t>
+              <a:t># Separo un test set</a:t>
             </a:r>
           </a:p>
           <a:p>
@@ -12422,28 +14159,14 @@
                 <a:latin typeface="Courier New" panose="02070309020205020404" pitchFamily="49" charset="0"/>
                 <a:cs typeface="Courier New" panose="02070309020205020404" pitchFamily="49" charset="0"/>
               </a:rPr>
-              <a:t>lm_fit</a:t>
+              <a:t>set.seed</a:t>
             </a:r>
             <a:r>
               <a:rPr lang="es-MX" sz="1200" dirty="0">
                 <a:latin typeface="Courier New" panose="02070309020205020404" pitchFamily="49" charset="0"/>
                 <a:cs typeface="Courier New" panose="02070309020205020404" pitchFamily="49" charset="0"/>
               </a:rPr>
-              <a:t> &lt;- </a:t>
-            </a:r>
-            <a:r>
-              <a:rPr lang="es-MX" sz="1200" dirty="0" err="1">
-                <a:latin typeface="Courier New" panose="02070309020205020404" pitchFamily="49" charset="0"/>
-                <a:cs typeface="Courier New" panose="02070309020205020404" pitchFamily="49" charset="0"/>
-              </a:rPr>
-              <a:t>lm_wflow</a:t>
-            </a:r>
-            <a:r>
-              <a:rPr lang="es-MX" sz="1200" dirty="0">
-                <a:latin typeface="Courier New" panose="02070309020205020404" pitchFamily="49" charset="0"/>
-                <a:cs typeface="Courier New" panose="02070309020205020404" pitchFamily="49" charset="0"/>
-              </a:rPr>
-              <a:t> %&gt;% </a:t>
+              <a:t>(123)</a:t>
             </a:r>
           </a:p>
           <a:p>
@@ -12461,32 +14184,139 @@
               <a:buNone/>
             </a:pPr>
             <a:r>
+              <a:rPr lang="es-MX" sz="1200" dirty="0" err="1">
+                <a:latin typeface="Courier New" panose="02070309020205020404" pitchFamily="49" charset="0"/>
+                <a:cs typeface="Courier New" panose="02070309020205020404" pitchFamily="49" charset="0"/>
+              </a:rPr>
+              <a:t>base_split</a:t>
+            </a:r>
+            <a:r>
               <a:rPr lang="es-MX" sz="1200" dirty="0">
                 <a:latin typeface="Courier New" panose="02070309020205020404" pitchFamily="49" charset="0"/>
                 <a:cs typeface="Courier New" panose="02070309020205020404" pitchFamily="49" charset="0"/>
               </a:rPr>
-              <a:t>	    </a:t>
+              <a:t> &lt;- </a:t>
             </a:r>
             <a:r>
               <a:rPr lang="es-MX" sz="1200" dirty="0" err="1">
                 <a:latin typeface="Courier New" panose="02070309020205020404" pitchFamily="49" charset="0"/>
                 <a:cs typeface="Courier New" panose="02070309020205020404" pitchFamily="49" charset="0"/>
               </a:rPr>
-              <a:t>fit</a:t>
+              <a:t>initial_Split</a:t>
             </a:r>
             <a:r>
               <a:rPr lang="es-MX" sz="1200" dirty="0">
                 <a:latin typeface="Courier New" panose="02070309020205020404" pitchFamily="49" charset="0"/>
                 <a:cs typeface="Courier New" panose="02070309020205020404" pitchFamily="49" charset="0"/>
               </a:rPr>
-              <a:t>(data = </a:t>
+              <a:t>(base, </a:t>
             </a:r>
             <a:r>
               <a:rPr lang="es-MX" sz="1200" dirty="0" err="1">
                 <a:latin typeface="Courier New" panose="02070309020205020404" pitchFamily="49" charset="0"/>
                 <a:cs typeface="Courier New" panose="02070309020205020404" pitchFamily="49" charset="0"/>
               </a:rPr>
+              <a:t>prop</a:t>
+            </a:r>
+            <a:r>
+              <a:rPr lang="es-MX" sz="1200" dirty="0">
+                <a:latin typeface="Courier New" panose="02070309020205020404" pitchFamily="49" charset="0"/>
+                <a:cs typeface="Courier New" panose="02070309020205020404" pitchFamily="49" charset="0"/>
+              </a:rPr>
+              <a:t>=0.8)</a:t>
+            </a:r>
+          </a:p>
+          <a:p>
+            <a:pPr marL="114300" lvl="0" indent="0" algn="l" rtl="0">
+              <a:lnSpc>
+                <a:spcPct val="150000"/>
+              </a:lnSpc>
+              <a:spcBef>
+                <a:spcPts val="0"/>
+              </a:spcBef>
+              <a:spcAft>
+                <a:spcPts val="0"/>
+              </a:spcAft>
+              <a:buSzPts val="1800"/>
+              <a:buNone/>
+            </a:pPr>
+            <a:r>
+              <a:rPr lang="es-MX" sz="1200" dirty="0" err="1">
+                <a:latin typeface="Courier New" panose="02070309020205020404" pitchFamily="49" charset="0"/>
+                <a:cs typeface="Courier New" panose="02070309020205020404" pitchFamily="49" charset="0"/>
+              </a:rPr>
               <a:t>base_train</a:t>
+            </a:r>
+            <a:r>
+              <a:rPr lang="es-MX" sz="1200" dirty="0">
+                <a:latin typeface="Courier New" panose="02070309020205020404" pitchFamily="49" charset="0"/>
+                <a:cs typeface="Courier New" panose="02070309020205020404" pitchFamily="49" charset="0"/>
+              </a:rPr>
+              <a:t> &lt;- training(</a:t>
+            </a:r>
+            <a:r>
+              <a:rPr lang="es-MX" sz="1200" dirty="0" err="1">
+                <a:latin typeface="Courier New" panose="02070309020205020404" pitchFamily="49" charset="0"/>
+                <a:cs typeface="Courier New" panose="02070309020205020404" pitchFamily="49" charset="0"/>
+              </a:rPr>
+              <a:t>base_split</a:t>
+            </a:r>
+            <a:r>
+              <a:rPr lang="es-MX" sz="1200" dirty="0">
+                <a:latin typeface="Courier New" panose="02070309020205020404" pitchFamily="49" charset="0"/>
+                <a:cs typeface="Courier New" panose="02070309020205020404" pitchFamily="49" charset="0"/>
+              </a:rPr>
+              <a:t>)</a:t>
+            </a:r>
+          </a:p>
+          <a:p>
+            <a:pPr marL="114300" lvl="0" indent="0" algn="l" rtl="0">
+              <a:lnSpc>
+                <a:spcPct val="150000"/>
+              </a:lnSpc>
+              <a:spcBef>
+                <a:spcPts val="0"/>
+              </a:spcBef>
+              <a:spcAft>
+                <a:spcPts val="0"/>
+              </a:spcAft>
+              <a:buSzPts val="1800"/>
+              <a:buNone/>
+            </a:pPr>
+            <a:r>
+              <a:rPr lang="es-MX" sz="1200" dirty="0" err="1">
+                <a:latin typeface="Courier New" panose="02070309020205020404" pitchFamily="49" charset="0"/>
+                <a:cs typeface="Courier New" panose="02070309020205020404" pitchFamily="49" charset="0"/>
+              </a:rPr>
+              <a:t>base_test</a:t>
+            </a:r>
+            <a:r>
+              <a:rPr lang="es-MX" sz="1200" dirty="0">
+                <a:latin typeface="Courier New" panose="02070309020205020404" pitchFamily="49" charset="0"/>
+                <a:cs typeface="Courier New" panose="02070309020205020404" pitchFamily="49" charset="0"/>
+              </a:rPr>
+              <a:t>  &lt;- </a:t>
+            </a:r>
+            <a:r>
+              <a:rPr lang="es-MX" sz="1200" dirty="0" err="1">
+                <a:latin typeface="Courier New" panose="02070309020205020404" pitchFamily="49" charset="0"/>
+                <a:cs typeface="Courier New" panose="02070309020205020404" pitchFamily="49" charset="0"/>
+              </a:rPr>
+              <a:t>testing</a:t>
+            </a:r>
+            <a:r>
+              <a:rPr lang="es-MX" sz="1200" dirty="0">
+                <a:latin typeface="Courier New" panose="02070309020205020404" pitchFamily="49" charset="0"/>
+                <a:cs typeface="Courier New" panose="02070309020205020404" pitchFamily="49" charset="0"/>
+              </a:rPr>
+              <a:t>(</a:t>
+            </a:r>
+            <a:r>
+              <a:rPr lang="es-MX" sz="1200" dirty="0" err="1">
+                <a:latin typeface="Courier New" panose="02070309020205020404" pitchFamily="49" charset="0"/>
+                <a:cs typeface="Courier New" panose="02070309020205020404" pitchFamily="49" charset="0"/>
+              </a:rPr>
+              <a:t>base_split</a:t>
             </a:r>
             <a:r>
               <a:rPr lang="es-MX" sz="1200" dirty="0">
@@ -12534,94 +14364,15 @@
                 <a:latin typeface="Courier New" panose="02070309020205020404" pitchFamily="49" charset="0"/>
                 <a:cs typeface="Courier New" panose="02070309020205020404" pitchFamily="49" charset="0"/>
               </a:rPr>
-              <a:t># Predicciones y residuos</a:t>
-            </a:r>
-          </a:p>
-          <a:p>
-            <a:pPr marL="114300" lvl="0" indent="0" algn="l" rtl="0">
-              <a:lnSpc>
-                <a:spcPct val="150000"/>
-              </a:lnSpc>
-              <a:spcBef>
-                <a:spcPts val="0"/>
-              </a:spcBef>
-              <a:spcAft>
-                <a:spcPts val="0"/>
-              </a:spcAft>
-              <a:buSzPts val="1800"/>
-              <a:buNone/>
-            </a:pPr>
+              <a:t># Para Cross </a:t>
+            </a:r>
             <a:r>
               <a:rPr lang="es-MX" sz="1200" dirty="0" err="1">
                 <a:latin typeface="Courier New" panose="02070309020205020404" pitchFamily="49" charset="0"/>
                 <a:cs typeface="Courier New" panose="02070309020205020404" pitchFamily="49" charset="0"/>
               </a:rPr>
-              <a:t>lm_pred</a:t>
-            </a:r>
-            <a:r>
-              <a:rPr lang="es-MX" sz="1200" dirty="0">
-                <a:latin typeface="Courier New" panose="02070309020205020404" pitchFamily="49" charset="0"/>
-                <a:cs typeface="Courier New" panose="02070309020205020404" pitchFamily="49" charset="0"/>
-              </a:rPr>
-              <a:t> &lt;- </a:t>
-            </a:r>
-            <a:r>
-              <a:rPr lang="es-MX" sz="1200" dirty="0" err="1">
-                <a:latin typeface="Courier New" panose="02070309020205020404" pitchFamily="49" charset="0"/>
-                <a:cs typeface="Courier New" panose="02070309020205020404" pitchFamily="49" charset="0"/>
-              </a:rPr>
-              <a:t>augment</a:t>
-            </a:r>
-            <a:r>
-              <a:rPr lang="es-MX" sz="1200" dirty="0">
-                <a:latin typeface="Courier New" panose="02070309020205020404" pitchFamily="49" charset="0"/>
-                <a:cs typeface="Courier New" panose="02070309020205020404" pitchFamily="49" charset="0"/>
-              </a:rPr>
-              <a:t>(</a:t>
-            </a:r>
-            <a:r>
-              <a:rPr lang="es-MX" sz="1200" dirty="0" err="1">
-                <a:latin typeface="Courier New" panose="02070309020205020404" pitchFamily="49" charset="0"/>
-                <a:cs typeface="Courier New" panose="02070309020205020404" pitchFamily="49" charset="0"/>
-              </a:rPr>
-              <a:t>lm_fit</a:t>
-            </a:r>
-            <a:r>
-              <a:rPr lang="es-MX" sz="1200" dirty="0">
-                <a:latin typeface="Courier New" panose="02070309020205020404" pitchFamily="49" charset="0"/>
-                <a:cs typeface="Courier New" panose="02070309020205020404" pitchFamily="49" charset="0"/>
-              </a:rPr>
-              <a:t>, </a:t>
-            </a:r>
-            <a:r>
-              <a:rPr lang="es-MX" sz="1200" dirty="0" err="1">
-                <a:latin typeface="Courier New" panose="02070309020205020404" pitchFamily="49" charset="0"/>
-                <a:cs typeface="Courier New" panose="02070309020205020404" pitchFamily="49" charset="0"/>
-              </a:rPr>
-              <a:t>base_train</a:t>
-            </a:r>
-            <a:r>
-              <a:rPr lang="es-MX" sz="1200" dirty="0">
-                <a:latin typeface="Courier New" panose="02070309020205020404" pitchFamily="49" charset="0"/>
-                <a:cs typeface="Courier New" panose="02070309020205020404" pitchFamily="49" charset="0"/>
-              </a:rPr>
-              <a:t>)</a:t>
-            </a:r>
-          </a:p>
-          <a:p>
-            <a:pPr marL="114300" lvl="0" indent="0" algn="l" rtl="0">
-              <a:lnSpc>
-                <a:spcPct val="150000"/>
-              </a:lnSpc>
-              <a:spcBef>
-                <a:spcPts val="0"/>
-              </a:spcBef>
-              <a:spcAft>
-                <a:spcPts val="0"/>
-              </a:spcAft>
-              <a:buSzPts val="1800"/>
-              <a:buNone/>
-            </a:pPr>
+              <a:t>Validation</a:t>
+            </a:r>
             <a:endParaRPr lang="es-MX" sz="1200" dirty="0">
               <a:latin typeface="Courier New" panose="02070309020205020404" pitchFamily="49" charset="0"/>
               <a:cs typeface="Courier New" panose="02070309020205020404" pitchFamily="49" charset="0"/>
@@ -12642,39 +14393,18 @@
               <a:buNone/>
             </a:pPr>
             <a:r>
+              <a:rPr lang="es-MX" sz="1200" dirty="0" err="1">
+                <a:latin typeface="Courier New" panose="02070309020205020404" pitchFamily="49" charset="0"/>
+                <a:cs typeface="Courier New" panose="02070309020205020404" pitchFamily="49" charset="0"/>
+              </a:rPr>
+              <a:t>set.seed</a:t>
+            </a:r>
+            <a:r>
               <a:rPr lang="es-MX" sz="1200" dirty="0">
                 <a:latin typeface="Courier New" panose="02070309020205020404" pitchFamily="49" charset="0"/>
                 <a:cs typeface="Courier New" panose="02070309020205020404" pitchFamily="49" charset="0"/>
               </a:rPr>
-              <a:t># Cross </a:t>
-            </a:r>
-            <a:r>
-              <a:rPr lang="es-MX" sz="1200" dirty="0" err="1">
-                <a:latin typeface="Courier New" panose="02070309020205020404" pitchFamily="49" charset="0"/>
-                <a:cs typeface="Courier New" panose="02070309020205020404" pitchFamily="49" charset="0"/>
-              </a:rPr>
-              <a:t>Validation</a:t>
-            </a:r>
-            <a:r>
-              <a:rPr lang="es-MX" sz="1200" dirty="0">
-                <a:latin typeface="Courier New" panose="02070309020205020404" pitchFamily="49" charset="0"/>
-                <a:cs typeface="Courier New" panose="02070309020205020404" pitchFamily="49" charset="0"/>
-              </a:rPr>
-              <a:t> (</a:t>
-            </a:r>
-            <a:r>
-              <a:rPr lang="es-MX" sz="1200" dirty="0" err="1">
-                <a:latin typeface="Courier New" panose="02070309020205020404" pitchFamily="49" charset="0"/>
-                <a:cs typeface="Courier New" panose="02070309020205020404" pitchFamily="49" charset="0"/>
-              </a:rPr>
-              <a:t>resampling</a:t>
-            </a:r>
-            <a:r>
-              <a:rPr lang="es-MX" sz="1200" dirty="0">
-                <a:latin typeface="Courier New" panose="02070309020205020404" pitchFamily="49" charset="0"/>
-                <a:cs typeface="Courier New" panose="02070309020205020404" pitchFamily="49" charset="0"/>
-              </a:rPr>
-              <a:t>)</a:t>
+              <a:t>(234335)</a:t>
             </a:r>
           </a:p>
           <a:p>
@@ -12696,7 +14426,7 @@
                 <a:latin typeface="Courier New" panose="02070309020205020404" pitchFamily="49" charset="0"/>
                 <a:cs typeface="Courier New" panose="02070309020205020404" pitchFamily="49" charset="0"/>
               </a:rPr>
-              <a:t>lm_res</a:t>
+              <a:t>base_folds</a:t>
             </a:r>
             <a:r>
               <a:rPr lang="es-MX" sz="1200" dirty="0">
@@ -12710,226 +14440,28 @@
                 <a:latin typeface="Courier New" panose="02070309020205020404" pitchFamily="49" charset="0"/>
                 <a:cs typeface="Courier New" panose="02070309020205020404" pitchFamily="49" charset="0"/>
               </a:rPr>
-              <a:t>lm_wflow</a:t>
+              <a:t>vfold_cv</a:t>
             </a:r>
             <a:r>
               <a:rPr lang="es-MX" sz="1200" dirty="0">
                 <a:latin typeface="Courier New" panose="02070309020205020404" pitchFamily="49" charset="0"/>
                 <a:cs typeface="Courier New" panose="02070309020205020404" pitchFamily="49" charset="0"/>
               </a:rPr>
-              <a:t> %&gt;%</a:t>
-            </a:r>
-          </a:p>
-          <a:p>
-            <a:pPr marL="114300" lvl="0" indent="0" algn="l" rtl="0">
-              <a:lnSpc>
-                <a:spcPct val="150000"/>
-              </a:lnSpc>
-              <a:spcBef>
-                <a:spcPts val="0"/>
-              </a:spcBef>
-              <a:spcAft>
-                <a:spcPts val="0"/>
-              </a:spcAft>
-              <a:buSzPts val="1800"/>
-              <a:buNone/>
-            </a:pPr>
+              <a:t>(</a:t>
+            </a:r>
+            <a:r>
+              <a:rPr lang="es-MX" sz="1200" dirty="0" err="1">
+                <a:latin typeface="Courier New" panose="02070309020205020404" pitchFamily="49" charset="0"/>
+                <a:cs typeface="Courier New" panose="02070309020205020404" pitchFamily="49" charset="0"/>
+              </a:rPr>
+              <a:t>base_train</a:t>
+            </a:r>
             <a:r>
               <a:rPr lang="es-MX" sz="1200" dirty="0">
                 <a:latin typeface="Courier New" panose="02070309020205020404" pitchFamily="49" charset="0"/>
                 <a:cs typeface="Courier New" panose="02070309020205020404" pitchFamily="49" charset="0"/>
               </a:rPr>
-              <a:t>	    </a:t>
-            </a:r>
-            <a:r>
-              <a:rPr lang="es-MX" sz="1200" dirty="0" err="1">
-                <a:latin typeface="Courier New" panose="02070309020205020404" pitchFamily="49" charset="0"/>
-                <a:cs typeface="Courier New" panose="02070309020205020404" pitchFamily="49" charset="0"/>
-              </a:rPr>
-              <a:t>fit_resamples</a:t>
-            </a:r>
-            <a:r>
-              <a:rPr lang="es-MX" sz="1200" dirty="0">
-                <a:latin typeface="Courier New" panose="02070309020205020404" pitchFamily="49" charset="0"/>
-                <a:cs typeface="Courier New" panose="02070309020205020404" pitchFamily="49" charset="0"/>
-              </a:rPr>
-              <a:t>(</a:t>
-            </a:r>
-            <a:r>
-              <a:rPr lang="es-MX" sz="1200" dirty="0" err="1">
-                <a:latin typeface="Courier New" panose="02070309020205020404" pitchFamily="49" charset="0"/>
-                <a:cs typeface="Courier New" panose="02070309020205020404" pitchFamily="49" charset="0"/>
-              </a:rPr>
-              <a:t>base_folds</a:t>
-            </a:r>
-            <a:r>
-              <a:rPr lang="es-MX" sz="1200" dirty="0">
-                <a:latin typeface="Courier New" panose="02070309020205020404" pitchFamily="49" charset="0"/>
-                <a:cs typeface="Courier New" panose="02070309020205020404" pitchFamily="49" charset="0"/>
-              </a:rPr>
-              <a:t>, </a:t>
-            </a:r>
-          </a:p>
-          <a:p>
-            <a:pPr marL="114300" lvl="0" indent="0" algn="l" rtl="0">
-              <a:lnSpc>
-                <a:spcPct val="150000"/>
-              </a:lnSpc>
-              <a:spcBef>
-                <a:spcPts val="0"/>
-              </a:spcBef>
-              <a:spcAft>
-                <a:spcPts val="0"/>
-              </a:spcAft>
-              <a:buSzPts val="1800"/>
-              <a:buNone/>
-            </a:pPr>
-            <a:r>
-              <a:rPr lang="es-MX" sz="1200" dirty="0">
-                <a:latin typeface="Courier New" panose="02070309020205020404" pitchFamily="49" charset="0"/>
-                <a:cs typeface="Courier New" panose="02070309020205020404" pitchFamily="49" charset="0"/>
-              </a:rPr>
-              <a:t>	                  </a:t>
-            </a:r>
-            <a:r>
-              <a:rPr lang="en-US" sz="1200" dirty="0" err="1">
-                <a:latin typeface="Courier New" panose="02070309020205020404" pitchFamily="49" charset="0"/>
-                <a:cs typeface="Courier New" panose="02070309020205020404" pitchFamily="49" charset="0"/>
-              </a:rPr>
-              <a:t>control_resamples</a:t>
-            </a:r>
-            <a:r>
-              <a:rPr lang="en-US" sz="1200" dirty="0">
-                <a:latin typeface="Courier New" panose="02070309020205020404" pitchFamily="49" charset="0"/>
-                <a:cs typeface="Courier New" panose="02070309020205020404" pitchFamily="49" charset="0"/>
-              </a:rPr>
-              <a:t>(</a:t>
-            </a:r>
-            <a:r>
-              <a:rPr lang="en-US" sz="1200" dirty="0" err="1">
-                <a:latin typeface="Courier New" panose="02070309020205020404" pitchFamily="49" charset="0"/>
-                <a:cs typeface="Courier New" panose="02070309020205020404" pitchFamily="49" charset="0"/>
-              </a:rPr>
-              <a:t>save_pred</a:t>
-            </a:r>
-            <a:r>
-              <a:rPr lang="en-US" sz="1200" dirty="0">
-                <a:latin typeface="Courier New" panose="02070309020205020404" pitchFamily="49" charset="0"/>
-                <a:cs typeface="Courier New" panose="02070309020205020404" pitchFamily="49" charset="0"/>
-              </a:rPr>
-              <a:t> = TRUE</a:t>
-            </a:r>
-            <a:r>
-              <a:rPr lang="es-MX" sz="1200" dirty="0">
-                <a:latin typeface="Courier New" panose="02070309020205020404" pitchFamily="49" charset="0"/>
-                <a:cs typeface="Courier New" panose="02070309020205020404" pitchFamily="49" charset="0"/>
-              </a:rPr>
-              <a:t>))</a:t>
-            </a:r>
-          </a:p>
-          <a:p>
-            <a:pPr marL="114300" lvl="0" indent="0" algn="l" rtl="0">
-              <a:lnSpc>
-                <a:spcPct val="150000"/>
-              </a:lnSpc>
-              <a:spcBef>
-                <a:spcPts val="0"/>
-              </a:spcBef>
-              <a:spcAft>
-                <a:spcPts val="0"/>
-              </a:spcAft>
-              <a:buSzPts val="1800"/>
-              <a:buNone/>
-            </a:pPr>
-            <a:endParaRPr lang="es-MX" sz="1200" dirty="0">
-              <a:latin typeface="Courier New" panose="02070309020205020404" pitchFamily="49" charset="0"/>
-              <a:cs typeface="Courier New" panose="02070309020205020404" pitchFamily="49" charset="0"/>
-            </a:endParaRPr>
-          </a:p>
-          <a:p>
-            <a:pPr marL="114300" lvl="0" indent="0" algn="l" rtl="0">
-              <a:lnSpc>
-                <a:spcPct val="150000"/>
-              </a:lnSpc>
-              <a:spcBef>
-                <a:spcPts val="0"/>
-              </a:spcBef>
-              <a:spcAft>
-                <a:spcPts val="0"/>
-              </a:spcAft>
-              <a:buSzPts val="1800"/>
-              <a:buNone/>
-            </a:pPr>
-            <a:r>
-              <a:rPr lang="es-MX" sz="1200" dirty="0">
-                <a:latin typeface="Courier New" panose="02070309020205020404" pitchFamily="49" charset="0"/>
-                <a:cs typeface="Courier New" panose="02070309020205020404" pitchFamily="49" charset="0"/>
-              </a:rPr>
-              <a:t># Evaluación final con test set</a:t>
-            </a:r>
-          </a:p>
-          <a:p>
-            <a:pPr marL="114300" lvl="0" indent="0" algn="l" rtl="0">
-              <a:lnSpc>
-                <a:spcPct val="150000"/>
-              </a:lnSpc>
-              <a:spcBef>
-                <a:spcPts val="0"/>
-              </a:spcBef>
-              <a:spcAft>
-                <a:spcPts val="0"/>
-              </a:spcAft>
-              <a:buSzPts val="1800"/>
-              <a:buNone/>
-            </a:pPr>
-            <a:r>
-              <a:rPr lang="es-MX" sz="1200" dirty="0" err="1">
-                <a:latin typeface="Courier New" panose="02070309020205020404" pitchFamily="49" charset="0"/>
-                <a:cs typeface="Courier New" panose="02070309020205020404" pitchFamily="49" charset="0"/>
-              </a:rPr>
-              <a:t>lm_pred_test</a:t>
-            </a:r>
-            <a:r>
-              <a:rPr lang="es-MX" sz="1200" dirty="0">
-                <a:latin typeface="Courier New" panose="02070309020205020404" pitchFamily="49" charset="0"/>
-                <a:cs typeface="Courier New" panose="02070309020205020404" pitchFamily="49" charset="0"/>
-              </a:rPr>
-              <a:t> &lt;- </a:t>
-            </a:r>
-            <a:r>
-              <a:rPr lang="es-MX" sz="1200" dirty="0" err="1">
-                <a:latin typeface="Courier New" panose="02070309020205020404" pitchFamily="49" charset="0"/>
-                <a:cs typeface="Courier New" panose="02070309020205020404" pitchFamily="49" charset="0"/>
-              </a:rPr>
-              <a:t>augment</a:t>
-            </a:r>
-            <a:r>
-              <a:rPr lang="es-MX" sz="1200" dirty="0">
-                <a:latin typeface="Courier New" panose="02070309020205020404" pitchFamily="49" charset="0"/>
-                <a:cs typeface="Courier New" panose="02070309020205020404" pitchFamily="49" charset="0"/>
-              </a:rPr>
-              <a:t>(</a:t>
-            </a:r>
-            <a:r>
-              <a:rPr lang="es-MX" sz="1200" dirty="0" err="1">
-                <a:latin typeface="Courier New" panose="02070309020205020404" pitchFamily="49" charset="0"/>
-                <a:cs typeface="Courier New" panose="02070309020205020404" pitchFamily="49" charset="0"/>
-              </a:rPr>
-              <a:t>lm_fit</a:t>
-            </a:r>
-            <a:r>
-              <a:rPr lang="es-MX" sz="1200" dirty="0">
-                <a:latin typeface="Courier New" panose="02070309020205020404" pitchFamily="49" charset="0"/>
-                <a:cs typeface="Courier New" panose="02070309020205020404" pitchFamily="49" charset="0"/>
-              </a:rPr>
-              <a:t>, </a:t>
-            </a:r>
-            <a:r>
-              <a:rPr lang="es-MX" sz="1200" dirty="0" err="1">
-                <a:latin typeface="Courier New" panose="02070309020205020404" pitchFamily="49" charset="0"/>
-                <a:cs typeface="Courier New" panose="02070309020205020404" pitchFamily="49" charset="0"/>
-              </a:rPr>
-              <a:t>base_test</a:t>
+              <a:t>, v = 10)</a:t>
             </a:r>
             <a:endParaRPr sz="1200" dirty="0">
               <a:latin typeface="Courier New" panose="02070309020205020404" pitchFamily="49" charset="0"/>
@@ -12939,11 +14471,6 @@
         </p:txBody>
       </p:sp>
     </p:spTree>
-    <p:extLst>
-      <p:ext uri="{BB962C8B-B14F-4D97-AF65-F5344CB8AC3E}">
-        <p14:creationId xmlns:p14="http://schemas.microsoft.com/office/powerpoint/2010/main" val="2885533041"/>
-      </p:ext>
-    </p:extLst>
   </p:cSld>
   <p:clrMapOvr>
     <a:masterClrMapping/>
@@ -13003,8 +14530,20 @@
               <a:buNone/>
             </a:pPr>
             <a:r>
+              <a:rPr lang="en-GB" dirty="0" err="1"/>
+              <a:t>Estimación</a:t>
+            </a:r>
+            <a:r>
               <a:rPr lang="en-GB" dirty="0"/>
-              <a:t>Tuning</a:t>
+              <a:t> y CV con </a:t>
+            </a:r>
+            <a:r>
+              <a:rPr lang="en-GB" i="1" dirty="0"/>
+              <a:t>un</a:t>
+            </a:r>
+            <a:r>
+              <a:rPr lang="en-GB" dirty="0"/>
+              <a:t> workflow</a:t>
             </a:r>
             <a:endParaRPr dirty="0"/>
           </a:p>
@@ -13023,7 +14562,7 @@
         <p:spPr>
           <a:xfrm>
             <a:off x="311699" y="728799"/>
-            <a:ext cx="6164052" cy="4258601"/>
+            <a:ext cx="6164052" cy="3963121"/>
           </a:xfrm>
           <a:prstGeom prst="rect">
             <a:avLst/>
@@ -13031,7 +14570,7 @@
         </p:spPr>
         <p:txBody>
           <a:bodyPr spcFirstLastPara="1" wrap="square" lIns="91425" tIns="91425" rIns="91425" bIns="91425" anchor="t" anchorCtr="0">
-            <a:normAutofit fontScale="85000" lnSpcReduction="20000"/>
+            <a:normAutofit lnSpcReduction="10000"/>
           </a:bodyPr>
           <a:lstStyle/>
           <a:p>
@@ -13053,7 +14592,7 @@
                 <a:latin typeface="Courier New" panose="02070309020205020404" pitchFamily="49" charset="0"/>
                 <a:cs typeface="Courier New" panose="02070309020205020404" pitchFamily="49" charset="0"/>
               </a:rPr>
-              <a:t># Quiero agregar términos polinómicos a mi lm tuneando el grado</a:t>
+              <a:t># Estimación del modelo</a:t>
             </a:r>
           </a:p>
           <a:p>
@@ -13075,7 +14614,7 @@
                 <a:latin typeface="Courier New" panose="02070309020205020404" pitchFamily="49" charset="0"/>
                 <a:cs typeface="Courier New" panose="02070309020205020404" pitchFamily="49" charset="0"/>
               </a:rPr>
-              <a:t>lm_rec_tune</a:t>
+              <a:t>lm_fit</a:t>
             </a:r>
             <a:r>
               <a:rPr lang="es-MX" sz="1200" dirty="0">
@@ -13089,7 +14628,7 @@
                 <a:latin typeface="Courier New" panose="02070309020205020404" pitchFamily="49" charset="0"/>
                 <a:cs typeface="Courier New" panose="02070309020205020404" pitchFamily="49" charset="0"/>
               </a:rPr>
-              <a:t>lm_rec</a:t>
+              <a:t>lm_wflow</a:t>
             </a:r>
             <a:r>
               <a:rPr lang="es-MX" sz="1200" dirty="0">
@@ -13118,71 +14657,35 @@
                 <a:latin typeface="Courier New" panose="02070309020205020404" pitchFamily="49" charset="0"/>
                 <a:cs typeface="Courier New" panose="02070309020205020404" pitchFamily="49" charset="0"/>
               </a:rPr>
-              <a:t>	    	</a:t>
+              <a:t>	    </a:t>
             </a:r>
             <a:r>
               <a:rPr lang="es-MX" sz="1200" dirty="0" err="1">
                 <a:latin typeface="Courier New" panose="02070309020205020404" pitchFamily="49" charset="0"/>
                 <a:cs typeface="Courier New" panose="02070309020205020404" pitchFamily="49" charset="0"/>
               </a:rPr>
-              <a:t>step_poly</a:t>
+              <a:t>fit</a:t>
             </a:r>
             <a:r>
               <a:rPr lang="es-MX" sz="1200" dirty="0">
                 <a:latin typeface="Courier New" panose="02070309020205020404" pitchFamily="49" charset="0"/>
                 <a:cs typeface="Courier New" panose="02070309020205020404" pitchFamily="49" charset="0"/>
               </a:rPr>
-              <a:t>(</a:t>
+              <a:t>(data = </a:t>
             </a:r>
             <a:r>
               <a:rPr lang="es-MX" sz="1200" dirty="0" err="1">
                 <a:latin typeface="Courier New" panose="02070309020205020404" pitchFamily="49" charset="0"/>
                 <a:cs typeface="Courier New" panose="02070309020205020404" pitchFamily="49" charset="0"/>
               </a:rPr>
-              <a:t>all_numeric_predictors</a:t>
+              <a:t>base_train</a:t>
             </a:r>
             <a:r>
               <a:rPr lang="es-MX" sz="1200" dirty="0">
                 <a:latin typeface="Courier New" panose="02070309020205020404" pitchFamily="49" charset="0"/>
                 <a:cs typeface="Courier New" panose="02070309020205020404" pitchFamily="49" charset="0"/>
               </a:rPr>
-              <a:t>(),</a:t>
-            </a:r>
-          </a:p>
-          <a:p>
-            <a:pPr marL="114300" lvl="0" indent="0" algn="l" rtl="0">
-              <a:lnSpc>
-                <a:spcPct val="150000"/>
-              </a:lnSpc>
-              <a:spcBef>
-                <a:spcPts val="0"/>
-              </a:spcBef>
-              <a:spcAft>
-                <a:spcPts val="0"/>
-              </a:spcAft>
-              <a:buSzPts val="1800"/>
-              <a:buNone/>
-            </a:pPr>
-            <a:r>
-              <a:rPr lang="es-MX" sz="1200" dirty="0">
-                <a:latin typeface="Courier New" panose="02070309020205020404" pitchFamily="49" charset="0"/>
-                <a:cs typeface="Courier New" panose="02070309020205020404" pitchFamily="49" charset="0"/>
-              </a:rPr>
-              <a:t>	     		   </a:t>
-            </a:r>
-            <a:r>
-              <a:rPr lang="es-MX" sz="1200" dirty="0" err="1">
-                <a:latin typeface="Courier New" panose="02070309020205020404" pitchFamily="49" charset="0"/>
-                <a:cs typeface="Courier New" panose="02070309020205020404" pitchFamily="49" charset="0"/>
-              </a:rPr>
-              <a:t>degree</a:t>
-            </a:r>
-            <a:r>
-              <a:rPr lang="es-MX" sz="1200" dirty="0">
-                <a:latin typeface="Courier New" panose="02070309020205020404" pitchFamily="49" charset="0"/>
-                <a:cs typeface="Courier New" panose="02070309020205020404" pitchFamily="49" charset="0"/>
-              </a:rPr>
-              <a:t> = tune())</a:t>
+              <a:t>)</a:t>
             </a:r>
           </a:p>
           <a:p>
@@ -13223,19 +14726,8 @@
                 <a:latin typeface="Courier New" panose="02070309020205020404" pitchFamily="49" charset="0"/>
                 <a:cs typeface="Courier New" panose="02070309020205020404" pitchFamily="49" charset="0"/>
               </a:rPr>
-              <a:t># Armo el </a:t>
-            </a:r>
-            <a:r>
-              <a:rPr lang="es-MX" sz="1200" dirty="0" err="1">
-                <a:latin typeface="Courier New" panose="02070309020205020404" pitchFamily="49" charset="0"/>
-                <a:cs typeface="Courier New" panose="02070309020205020404" pitchFamily="49" charset="0"/>
-              </a:rPr>
-              <a:t>workflow</a:t>
-            </a:r>
-            <a:endParaRPr lang="es-MX" sz="1200" dirty="0">
-              <a:latin typeface="Courier New" panose="02070309020205020404" pitchFamily="49" charset="0"/>
-              <a:cs typeface="Courier New" panose="02070309020205020404" pitchFamily="49" charset="0"/>
-            </a:endParaRPr>
+              <a:t># Predicciones y residuos</a:t>
+            </a:r>
           </a:p>
           <a:p>
             <a:pPr marL="114300" lvl="0" indent="0" algn="l" rtl="0">
@@ -13256,7 +14748,7 @@
                 <a:latin typeface="Courier New" panose="02070309020205020404" pitchFamily="49" charset="0"/>
                 <a:cs typeface="Courier New" panose="02070309020205020404" pitchFamily="49" charset="0"/>
               </a:rPr>
-              <a:t>lm_wflow_tune</a:t>
+              <a:t>lm_pred</a:t>
             </a:r>
             <a:r>
               <a:rPr lang="es-MX" sz="1200" dirty="0">
@@ -13270,93 +14762,35 @@
                 <a:latin typeface="Courier New" panose="02070309020205020404" pitchFamily="49" charset="0"/>
                 <a:cs typeface="Courier New" panose="02070309020205020404" pitchFamily="49" charset="0"/>
               </a:rPr>
-              <a:t>lm_workflow</a:t>
+              <a:t>augment</a:t>
             </a:r>
             <a:r>
               <a:rPr lang="es-MX" sz="1200" dirty="0">
                 <a:latin typeface="Courier New" panose="02070309020205020404" pitchFamily="49" charset="0"/>
                 <a:cs typeface="Courier New" panose="02070309020205020404" pitchFamily="49" charset="0"/>
               </a:rPr>
-              <a:t>() %&gt;%</a:t>
-            </a:r>
-          </a:p>
-          <a:p>
-            <a:pPr marL="114300" lvl="0" indent="0" algn="l" rtl="0">
-              <a:lnSpc>
-                <a:spcPct val="150000"/>
-              </a:lnSpc>
-              <a:spcBef>
-                <a:spcPts val="0"/>
-              </a:spcBef>
-              <a:spcAft>
-                <a:spcPts val="0"/>
-              </a:spcAft>
-              <a:buSzPts val="1800"/>
-              <a:buNone/>
-            </a:pPr>
+              <a:t>(</a:t>
+            </a:r>
+            <a:r>
+              <a:rPr lang="es-MX" sz="1200" dirty="0" err="1">
+                <a:latin typeface="Courier New" panose="02070309020205020404" pitchFamily="49" charset="0"/>
+                <a:cs typeface="Courier New" panose="02070309020205020404" pitchFamily="49" charset="0"/>
+              </a:rPr>
+              <a:t>lm_fit</a:t>
+            </a:r>
             <a:r>
               <a:rPr lang="es-MX" sz="1200" dirty="0">
                 <a:latin typeface="Courier New" panose="02070309020205020404" pitchFamily="49" charset="0"/>
                 <a:cs typeface="Courier New" panose="02070309020205020404" pitchFamily="49" charset="0"/>
               </a:rPr>
-              <a:t>	    	</a:t>
+              <a:t>, </a:t>
             </a:r>
             <a:r>
               <a:rPr lang="es-MX" sz="1200" dirty="0" err="1">
                 <a:latin typeface="Courier New" panose="02070309020205020404" pitchFamily="49" charset="0"/>
                 <a:cs typeface="Courier New" panose="02070309020205020404" pitchFamily="49" charset="0"/>
               </a:rPr>
-              <a:t>remove_reipe</a:t>
-            </a:r>
-            <a:r>
-              <a:rPr lang="es-MX" sz="1200" dirty="0">
-                <a:latin typeface="Courier New" panose="02070309020205020404" pitchFamily="49" charset="0"/>
-                <a:cs typeface="Courier New" panose="02070309020205020404" pitchFamily="49" charset="0"/>
-              </a:rPr>
-              <a:t>() %&gt;%</a:t>
-            </a:r>
-          </a:p>
-          <a:p>
-            <a:pPr marL="114300" lvl="0" indent="0" algn="l" rtl="0">
-              <a:lnSpc>
-                <a:spcPct val="150000"/>
-              </a:lnSpc>
-              <a:spcBef>
-                <a:spcPts val="0"/>
-              </a:spcBef>
-              <a:spcAft>
-                <a:spcPts val="0"/>
-              </a:spcAft>
-              <a:buSzPts val="1800"/>
-              <a:buNone/>
-            </a:pPr>
-            <a:r>
-              <a:rPr lang="es-MX" sz="1200" dirty="0">
-                <a:latin typeface="Courier New" panose="02070309020205020404" pitchFamily="49" charset="0"/>
-                <a:cs typeface="Courier New" panose="02070309020205020404" pitchFamily="49" charset="0"/>
-              </a:rPr>
-              <a:t>	    	</a:t>
-            </a:r>
-            <a:r>
-              <a:rPr lang="es-MX" sz="1200" dirty="0" err="1">
-                <a:latin typeface="Courier New" panose="02070309020205020404" pitchFamily="49" charset="0"/>
-                <a:cs typeface="Courier New" panose="02070309020205020404" pitchFamily="49" charset="0"/>
-              </a:rPr>
-              <a:t>add_recipe</a:t>
-            </a:r>
-            <a:r>
-              <a:rPr lang="es-MX" sz="1200" dirty="0">
-                <a:latin typeface="Courier New" panose="02070309020205020404" pitchFamily="49" charset="0"/>
-                <a:cs typeface="Courier New" panose="02070309020205020404" pitchFamily="49" charset="0"/>
-              </a:rPr>
-              <a:t>(</a:t>
-            </a:r>
-            <a:r>
-              <a:rPr lang="es-MX" sz="1200" dirty="0" err="1">
-                <a:latin typeface="Courier New" panose="02070309020205020404" pitchFamily="49" charset="0"/>
-                <a:cs typeface="Courier New" panose="02070309020205020404" pitchFamily="49" charset="0"/>
-              </a:rPr>
-              <a:t>lm_rec_tune</a:t>
+              <a:t>base_train</a:t>
             </a:r>
             <a:r>
               <a:rPr lang="es-MX" sz="1200" dirty="0">
@@ -13404,7 +14838,35 @@
                 <a:latin typeface="Courier New" panose="02070309020205020404" pitchFamily="49" charset="0"/>
                 <a:cs typeface="Courier New" panose="02070309020205020404" pitchFamily="49" charset="0"/>
               </a:rPr>
-              <a:t># Creo grilla de parámetros a tunear (los tune())</a:t>
+              <a:t># Cross </a:t>
+            </a:r>
+            <a:r>
+              <a:rPr lang="es-MX" sz="1200" dirty="0" err="1">
+                <a:latin typeface="Courier New" panose="02070309020205020404" pitchFamily="49" charset="0"/>
+                <a:cs typeface="Courier New" panose="02070309020205020404" pitchFamily="49" charset="0"/>
+              </a:rPr>
+              <a:t>Validation</a:t>
+            </a:r>
+            <a:r>
+              <a:rPr lang="es-MX" sz="1200" dirty="0">
+                <a:latin typeface="Courier New" panose="02070309020205020404" pitchFamily="49" charset="0"/>
+                <a:cs typeface="Courier New" panose="02070309020205020404" pitchFamily="49" charset="0"/>
+              </a:rPr>
+              <a:t> (</a:t>
+            </a:r>
+            <a:r>
+              <a:rPr lang="es-MX" sz="1200" dirty="0" err="1">
+                <a:latin typeface="Courier New" panose="02070309020205020404" pitchFamily="49" charset="0"/>
+                <a:cs typeface="Courier New" panose="02070309020205020404" pitchFamily="49" charset="0"/>
+              </a:rPr>
+              <a:t>resampling</a:t>
+            </a:r>
+            <a:r>
+              <a:rPr lang="es-MX" sz="1200" dirty="0">
+                <a:latin typeface="Courier New" panose="02070309020205020404" pitchFamily="49" charset="0"/>
+                <a:cs typeface="Courier New" panose="02070309020205020404" pitchFamily="49" charset="0"/>
+              </a:rPr>
+              <a:t>)</a:t>
             </a:r>
           </a:p>
           <a:p>
@@ -13422,24 +14884,67 @@
               <a:buNone/>
             </a:pPr>
             <a:r>
+              <a:rPr lang="es-MX" sz="1200" dirty="0" err="1">
+                <a:latin typeface="Courier New" panose="02070309020205020404" pitchFamily="49" charset="0"/>
+                <a:cs typeface="Courier New" panose="02070309020205020404" pitchFamily="49" charset="0"/>
+              </a:rPr>
+              <a:t>lm_res</a:t>
+            </a:r>
+            <a:r>
               <a:rPr lang="es-MX" sz="1200" dirty="0">
                 <a:latin typeface="Courier New" panose="02070309020205020404" pitchFamily="49" charset="0"/>
                 <a:cs typeface="Courier New" panose="02070309020205020404" pitchFamily="49" charset="0"/>
               </a:rPr>
-              <a:t>grilla &lt;- </a:t>
+              <a:t> &lt;- </a:t>
             </a:r>
             <a:r>
               <a:rPr lang="es-MX" sz="1200" dirty="0" err="1">
                 <a:latin typeface="Courier New" panose="02070309020205020404" pitchFamily="49" charset="0"/>
                 <a:cs typeface="Courier New" panose="02070309020205020404" pitchFamily="49" charset="0"/>
               </a:rPr>
-              <a:t>tibble</a:t>
+              <a:t>lm_wflow</a:t>
             </a:r>
             <a:r>
               <a:rPr lang="es-MX" sz="1200" dirty="0">
                 <a:latin typeface="Courier New" panose="02070309020205020404" pitchFamily="49" charset="0"/>
                 <a:cs typeface="Courier New" panose="02070309020205020404" pitchFamily="49" charset="0"/>
               </a:rPr>
+              <a:t> %&gt;%</a:t>
+            </a:r>
+          </a:p>
+          <a:p>
+            <a:pPr marL="114300" lvl="0" indent="0" algn="l" rtl="0">
+              <a:lnSpc>
+                <a:spcPct val="150000"/>
+              </a:lnSpc>
+              <a:spcBef>
+                <a:spcPts val="0"/>
+              </a:spcBef>
+              <a:spcAft>
+                <a:spcPts val="0"/>
+              </a:spcAft>
+              <a:buSzPts val="1800"/>
+              <a:buNone/>
+            </a:pPr>
+            <a:r>
+              <a:rPr lang="es-MX" sz="1200" dirty="0">
+                <a:latin typeface="Courier New" panose="02070309020205020404" pitchFamily="49" charset="0"/>
+                <a:cs typeface="Courier New" panose="02070309020205020404" pitchFamily="49" charset="0"/>
+              </a:rPr>
+              <a:t>	    </a:t>
+            </a:r>
+            <a:r>
+              <a:rPr lang="es-MX" sz="1200" dirty="0" err="1">
+                <a:latin typeface="Courier New" panose="02070309020205020404" pitchFamily="49" charset="0"/>
+                <a:cs typeface="Courier New" panose="02070309020205020404" pitchFamily="49" charset="0"/>
+              </a:rPr>
+              <a:t>fit_resamples</a:t>
+            </a:r>
+            <a:r>
+              <a:rPr lang="es-MX" sz="1200" dirty="0">
+                <a:latin typeface="Courier New" panose="02070309020205020404" pitchFamily="49" charset="0"/>
+                <a:cs typeface="Courier New" panose="02070309020205020404" pitchFamily="49" charset="0"/>
+              </a:rPr>
               <a:t>(</a:t>
             </a:r>
             <a:r>
@@ -13447,14 +14952,71 @@
                 <a:latin typeface="Courier New" panose="02070309020205020404" pitchFamily="49" charset="0"/>
                 <a:cs typeface="Courier New" panose="02070309020205020404" pitchFamily="49" charset="0"/>
               </a:rPr>
-              <a:t>degree</a:t>
+              <a:t>base_folds</a:t>
             </a:r>
             <a:r>
               <a:rPr lang="es-MX" sz="1200" dirty="0">
                 <a:latin typeface="Courier New" panose="02070309020205020404" pitchFamily="49" charset="0"/>
                 <a:cs typeface="Courier New" panose="02070309020205020404" pitchFamily="49" charset="0"/>
               </a:rPr>
-              <a:t> = 1:5</a:t>
+              <a:t>, </a:t>
+            </a:r>
+          </a:p>
+          <a:p>
+            <a:pPr marL="114300" lvl="0" indent="0" algn="l" rtl="0">
+              <a:lnSpc>
+                <a:spcPct val="150000"/>
+              </a:lnSpc>
+              <a:spcBef>
+                <a:spcPts val="0"/>
+              </a:spcBef>
+              <a:spcAft>
+                <a:spcPts val="0"/>
+              </a:spcAft>
+              <a:buSzPts val="1800"/>
+              <a:buNone/>
+            </a:pPr>
+            <a:r>
+              <a:rPr lang="es-MX" sz="1200" dirty="0">
+                <a:latin typeface="Courier New" panose="02070309020205020404" pitchFamily="49" charset="0"/>
+                <a:cs typeface="Courier New" panose="02070309020205020404" pitchFamily="49" charset="0"/>
+              </a:rPr>
+              <a:t>	                  </a:t>
+            </a:r>
+            <a:r>
+              <a:rPr lang="en-US" sz="1200" dirty="0" err="1">
+                <a:latin typeface="Courier New" panose="02070309020205020404" pitchFamily="49" charset="0"/>
+                <a:cs typeface="Courier New" panose="02070309020205020404" pitchFamily="49" charset="0"/>
+              </a:rPr>
+              <a:t>control_resamples</a:t>
+            </a:r>
+            <a:r>
+              <a:rPr lang="en-US" sz="1200" dirty="0">
+                <a:latin typeface="Courier New" panose="02070309020205020404" pitchFamily="49" charset="0"/>
+                <a:cs typeface="Courier New" panose="02070309020205020404" pitchFamily="49" charset="0"/>
+              </a:rPr>
+              <a:t>(</a:t>
+            </a:r>
+            <a:r>
+              <a:rPr lang="en-US" sz="1200" dirty="0" err="1">
+                <a:latin typeface="Courier New" panose="02070309020205020404" pitchFamily="49" charset="0"/>
+                <a:cs typeface="Courier New" panose="02070309020205020404" pitchFamily="49" charset="0"/>
+              </a:rPr>
+              <a:t>save_pred</a:t>
+            </a:r>
+            <a:r>
+              <a:rPr lang="en-US" sz="1200" dirty="0">
+                <a:latin typeface="Courier New" panose="02070309020205020404" pitchFamily="49" charset="0"/>
+                <a:cs typeface="Courier New" panose="02070309020205020404" pitchFamily="49" charset="0"/>
+              </a:rPr>
+              <a:t> = TRUE</a:t>
+            </a:r>
+            <a:r>
+              <a:rPr lang="es-MX" sz="1200" dirty="0">
+                <a:latin typeface="Courier New" panose="02070309020205020404" pitchFamily="49" charset="0"/>
+                <a:cs typeface="Courier New" panose="02070309020205020404" pitchFamily="49" charset="0"/>
+              </a:rPr>
+              <a:t>))</a:t>
             </a:r>
           </a:p>
           <a:p>
@@ -13495,35 +15057,7 @@
                 <a:latin typeface="Courier New" panose="02070309020205020404" pitchFamily="49" charset="0"/>
                 <a:cs typeface="Courier New" panose="02070309020205020404" pitchFamily="49" charset="0"/>
               </a:rPr>
-              <a:t># Corro métricas con </a:t>
-            </a:r>
-            <a:r>
-              <a:rPr lang="es-MX" sz="1200" dirty="0" err="1">
-                <a:latin typeface="Courier New" panose="02070309020205020404" pitchFamily="49" charset="0"/>
-                <a:cs typeface="Courier New" panose="02070309020205020404" pitchFamily="49" charset="0"/>
-              </a:rPr>
-              <a:t>cross</a:t>
-            </a:r>
-            <a:r>
-              <a:rPr lang="es-MX" sz="1200" dirty="0">
-                <a:latin typeface="Courier New" panose="02070309020205020404" pitchFamily="49" charset="0"/>
-                <a:cs typeface="Courier New" panose="02070309020205020404" pitchFamily="49" charset="0"/>
-              </a:rPr>
-              <a:t> </a:t>
-            </a:r>
-            <a:r>
-              <a:rPr lang="es-MX" sz="1200" dirty="0" err="1">
-                <a:latin typeface="Courier New" panose="02070309020205020404" pitchFamily="49" charset="0"/>
-                <a:cs typeface="Courier New" panose="02070309020205020404" pitchFamily="49" charset="0"/>
-              </a:rPr>
-              <a:t>validation</a:t>
-            </a:r>
-            <a:r>
-              <a:rPr lang="es-MX" sz="1200" dirty="0">
-                <a:latin typeface="Courier New" panose="02070309020205020404" pitchFamily="49" charset="0"/>
-                <a:cs typeface="Courier New" panose="02070309020205020404" pitchFamily="49" charset="0"/>
-              </a:rPr>
-              <a:t> y ploteo</a:t>
+              <a:t># Evaluación final con test set</a:t>
             </a:r>
           </a:p>
           <a:p>
@@ -13545,7 +15079,7 @@
                 <a:latin typeface="Courier New" panose="02070309020205020404" pitchFamily="49" charset="0"/>
                 <a:cs typeface="Courier New" panose="02070309020205020404" pitchFamily="49" charset="0"/>
               </a:rPr>
-              <a:t>tune_res</a:t>
+              <a:t>lm_pred_test</a:t>
             </a:r>
             <a:r>
               <a:rPr lang="es-MX" sz="1200" dirty="0">
@@ -13559,7 +15093,7 @@
                 <a:latin typeface="Courier New" panose="02070309020205020404" pitchFamily="49" charset="0"/>
                 <a:cs typeface="Courier New" panose="02070309020205020404" pitchFamily="49" charset="0"/>
               </a:rPr>
-              <a:t>tune_grid</a:t>
+              <a:t>augment</a:t>
             </a:r>
             <a:r>
               <a:rPr lang="es-MX" sz="1200" dirty="0">
@@ -13568,292 +15102,28 @@
               </a:rPr>
               <a:t>(</a:t>
             </a:r>
-          </a:p>
-          <a:p>
-            <a:pPr marL="114300" lvl="0" indent="0" algn="l" rtl="0">
-              <a:lnSpc>
-                <a:spcPct val="150000"/>
-              </a:lnSpc>
-              <a:spcBef>
-                <a:spcPts val="0"/>
-              </a:spcBef>
-              <a:spcAft>
-                <a:spcPts val="0"/>
-              </a:spcAft>
-              <a:buSzPts val="1800"/>
-              <a:buNone/>
-            </a:pPr>
+            <a:r>
+              <a:rPr lang="es-MX" sz="1200" dirty="0" err="1">
+                <a:latin typeface="Courier New" panose="02070309020205020404" pitchFamily="49" charset="0"/>
+                <a:cs typeface="Courier New" panose="02070309020205020404" pitchFamily="49" charset="0"/>
+              </a:rPr>
+              <a:t>lm_fit</a:t>
+            </a:r>
             <a:r>
               <a:rPr lang="es-MX" sz="1200" dirty="0">
                 <a:latin typeface="Courier New" panose="02070309020205020404" pitchFamily="49" charset="0"/>
                 <a:cs typeface="Courier New" panose="02070309020205020404" pitchFamily="49" charset="0"/>
               </a:rPr>
-              <a:t>  </a:t>
+              <a:t>, </a:t>
             </a:r>
             <a:r>
               <a:rPr lang="es-MX" sz="1200" dirty="0" err="1">
                 <a:latin typeface="Courier New" panose="02070309020205020404" pitchFamily="49" charset="0"/>
                 <a:cs typeface="Courier New" panose="02070309020205020404" pitchFamily="49" charset="0"/>
               </a:rPr>
-              <a:t>object</a:t>
-            </a:r>
-            <a:r>
-              <a:rPr lang="es-MX" sz="1200" dirty="0">
-                <a:latin typeface="Courier New" panose="02070309020205020404" pitchFamily="49" charset="0"/>
-                <a:cs typeface="Courier New" panose="02070309020205020404" pitchFamily="49" charset="0"/>
-              </a:rPr>
-              <a:t> = </a:t>
-            </a:r>
-            <a:r>
-              <a:rPr lang="es-MX" sz="1200" dirty="0" err="1">
-                <a:latin typeface="Courier New" panose="02070309020205020404" pitchFamily="49" charset="0"/>
-                <a:cs typeface="Courier New" panose="02070309020205020404" pitchFamily="49" charset="0"/>
-              </a:rPr>
-              <a:t>lm_wflow_tune</a:t>
-            </a:r>
-            <a:r>
-              <a:rPr lang="es-MX" sz="1200" dirty="0">
-                <a:latin typeface="Courier New" panose="02070309020205020404" pitchFamily="49" charset="0"/>
-                <a:cs typeface="Courier New" panose="02070309020205020404" pitchFamily="49" charset="0"/>
-              </a:rPr>
-              <a:t>, # Qué modelo voy a tunear</a:t>
-            </a:r>
-          </a:p>
-          <a:p>
-            <a:pPr marL="114300" lvl="0" indent="0" algn="l" rtl="0">
-              <a:lnSpc>
-                <a:spcPct val="150000"/>
-              </a:lnSpc>
-              <a:spcBef>
-                <a:spcPts val="0"/>
-              </a:spcBef>
-              <a:spcAft>
-                <a:spcPts val="0"/>
-              </a:spcAft>
-              <a:buSzPts val="1800"/>
-              <a:buNone/>
-            </a:pPr>
-            <a:r>
-              <a:rPr lang="es-MX" sz="1200" dirty="0">
-                <a:latin typeface="Courier New" panose="02070309020205020404" pitchFamily="49" charset="0"/>
-                <a:cs typeface="Courier New" panose="02070309020205020404" pitchFamily="49" charset="0"/>
-              </a:rPr>
-              <a:t>  </a:t>
-            </a:r>
-            <a:r>
-              <a:rPr lang="es-MX" sz="1200" dirty="0" err="1">
-                <a:latin typeface="Courier New" panose="02070309020205020404" pitchFamily="49" charset="0"/>
-                <a:cs typeface="Courier New" panose="02070309020205020404" pitchFamily="49" charset="0"/>
-              </a:rPr>
-              <a:t>resamples</a:t>
-            </a:r>
-            <a:r>
-              <a:rPr lang="es-MX" sz="1200" dirty="0">
-                <a:latin typeface="Courier New" panose="02070309020205020404" pitchFamily="49" charset="0"/>
-                <a:cs typeface="Courier New" panose="02070309020205020404" pitchFamily="49" charset="0"/>
-              </a:rPr>
-              <a:t> = </a:t>
-            </a:r>
-            <a:r>
-              <a:rPr lang="es-MX" sz="1200" dirty="0" err="1">
-                <a:latin typeface="Courier New" panose="02070309020205020404" pitchFamily="49" charset="0"/>
-                <a:cs typeface="Courier New" panose="02070309020205020404" pitchFamily="49" charset="0"/>
-              </a:rPr>
-              <a:t>base_folds</a:t>
-            </a:r>
-            <a:r>
-              <a:rPr lang="es-MX" sz="1200" dirty="0">
-                <a:latin typeface="Courier New" panose="02070309020205020404" pitchFamily="49" charset="0"/>
-                <a:cs typeface="Courier New" panose="02070309020205020404" pitchFamily="49" charset="0"/>
-              </a:rPr>
-              <a:t>, # De dónde saco los </a:t>
-            </a:r>
-            <a:r>
-              <a:rPr lang="es-MX" sz="1200" dirty="0" err="1">
-                <a:latin typeface="Courier New" panose="02070309020205020404" pitchFamily="49" charset="0"/>
-                <a:cs typeface="Courier New" panose="02070309020205020404" pitchFamily="49" charset="0"/>
-              </a:rPr>
-              <a:t>folds</a:t>
-            </a:r>
-            <a:r>
-              <a:rPr lang="es-MX" sz="1200" dirty="0">
-                <a:latin typeface="Courier New" panose="02070309020205020404" pitchFamily="49" charset="0"/>
-                <a:cs typeface="Courier New" panose="02070309020205020404" pitchFamily="49" charset="0"/>
-              </a:rPr>
-              <a:t> de datos </a:t>
-            </a:r>
-          </a:p>
-          <a:p>
-            <a:pPr marL="114300" lvl="0" indent="0" algn="l" rtl="0">
-              <a:lnSpc>
-                <a:spcPct val="150000"/>
-              </a:lnSpc>
-              <a:spcBef>
-                <a:spcPts val="0"/>
-              </a:spcBef>
-              <a:spcAft>
-                <a:spcPts val="0"/>
-              </a:spcAft>
-              <a:buSzPts val="1800"/>
-              <a:buNone/>
-            </a:pPr>
-            <a:r>
-              <a:rPr lang="es-MX" sz="1200" dirty="0">
-                <a:latin typeface="Courier New" panose="02070309020205020404" pitchFamily="49" charset="0"/>
-                <a:cs typeface="Courier New" panose="02070309020205020404" pitchFamily="49" charset="0"/>
-              </a:rPr>
-              <a:t>  </a:t>
-            </a:r>
-            <a:r>
-              <a:rPr lang="es-MX" sz="1200" dirty="0" err="1">
-                <a:latin typeface="Courier New" panose="02070309020205020404" pitchFamily="49" charset="0"/>
-                <a:cs typeface="Courier New" panose="02070309020205020404" pitchFamily="49" charset="0"/>
-              </a:rPr>
-              <a:t>grid</a:t>
-            </a:r>
-            <a:r>
-              <a:rPr lang="es-MX" sz="1200" dirty="0">
-                <a:latin typeface="Courier New" panose="02070309020205020404" pitchFamily="49" charset="0"/>
-                <a:cs typeface="Courier New" panose="02070309020205020404" pitchFamily="49" charset="0"/>
-              </a:rPr>
-              <a:t> = grilla,          # </a:t>
-            </a:r>
-            <a:r>
-              <a:rPr lang="es-MX" sz="1200" dirty="0" err="1">
-                <a:latin typeface="Courier New" panose="02070309020205020404" pitchFamily="49" charset="0"/>
-                <a:cs typeface="Courier New" panose="02070309020205020404" pitchFamily="49" charset="0"/>
-              </a:rPr>
-              <a:t>Hiperparametros</a:t>
-            </a:r>
-            <a:r>
-              <a:rPr lang="es-MX" sz="1200" dirty="0">
-                <a:latin typeface="Courier New" panose="02070309020205020404" pitchFamily="49" charset="0"/>
-                <a:cs typeface="Courier New" panose="02070309020205020404" pitchFamily="49" charset="0"/>
-              </a:rPr>
-              <a:t> a evaluar</a:t>
-            </a:r>
-          </a:p>
-          <a:p>
-            <a:pPr marL="114300" lvl="0" indent="0" algn="l" rtl="0">
-              <a:lnSpc>
-                <a:spcPct val="150000"/>
-              </a:lnSpc>
-              <a:spcBef>
-                <a:spcPts val="0"/>
-              </a:spcBef>
-              <a:spcAft>
-                <a:spcPts val="0"/>
-              </a:spcAft>
-              <a:buSzPts val="1800"/>
-              <a:buNone/>
-            </a:pPr>
-            <a:r>
-              <a:rPr lang="es-MX" sz="1200" dirty="0">
-                <a:latin typeface="Courier New" panose="02070309020205020404" pitchFamily="49" charset="0"/>
-                <a:cs typeface="Courier New" panose="02070309020205020404" pitchFamily="49" charset="0"/>
-              </a:rPr>
-              <a:t>  </a:t>
-            </a:r>
-            <a:r>
-              <a:rPr lang="es-MX" sz="1200" dirty="0" err="1">
-                <a:latin typeface="Courier New" panose="02070309020205020404" pitchFamily="49" charset="0"/>
-                <a:cs typeface="Courier New" panose="02070309020205020404" pitchFamily="49" charset="0"/>
-              </a:rPr>
-              <a:t>metrics</a:t>
-            </a:r>
-            <a:r>
-              <a:rPr lang="es-MX" sz="1200" dirty="0">
-                <a:latin typeface="Courier New" panose="02070309020205020404" pitchFamily="49" charset="0"/>
-                <a:cs typeface="Courier New" panose="02070309020205020404" pitchFamily="49" charset="0"/>
-              </a:rPr>
-              <a:t> = </a:t>
-            </a:r>
-            <a:r>
-              <a:rPr lang="es-MX" sz="1200" dirty="0" err="1">
-                <a:latin typeface="Courier New" panose="02070309020205020404" pitchFamily="49" charset="0"/>
-                <a:cs typeface="Courier New" panose="02070309020205020404" pitchFamily="49" charset="0"/>
-              </a:rPr>
-              <a:t>metric_set</a:t>
-            </a:r>
-            <a:r>
-              <a:rPr lang="es-MX" sz="1200" dirty="0">
-                <a:latin typeface="Courier New" panose="02070309020205020404" pitchFamily="49" charset="0"/>
-                <a:cs typeface="Courier New" panose="02070309020205020404" pitchFamily="49" charset="0"/>
-              </a:rPr>
-              <a:t>(</a:t>
-            </a:r>
-            <a:r>
-              <a:rPr lang="es-MX" sz="1200" dirty="0" err="1">
-                <a:latin typeface="Courier New" panose="02070309020205020404" pitchFamily="49" charset="0"/>
-                <a:cs typeface="Courier New" panose="02070309020205020404" pitchFamily="49" charset="0"/>
-              </a:rPr>
-              <a:t>rmse</a:t>
-            </a:r>
-            <a:r>
-              <a:rPr lang="es-MX" sz="1200" dirty="0">
-                <a:latin typeface="Courier New" panose="02070309020205020404" pitchFamily="49" charset="0"/>
-                <a:cs typeface="Courier New" panose="02070309020205020404" pitchFamily="49" charset="0"/>
-              </a:rPr>
-              <a:t>, </a:t>
-            </a:r>
-            <a:r>
-              <a:rPr lang="es-MX" sz="1200" dirty="0" err="1">
-                <a:latin typeface="Courier New" panose="02070309020205020404" pitchFamily="49" charset="0"/>
-                <a:cs typeface="Courier New" panose="02070309020205020404" pitchFamily="49" charset="0"/>
-              </a:rPr>
-              <a:t>rsq</a:t>
-            </a:r>
-            <a:r>
-              <a:rPr lang="es-MX" sz="1200" dirty="0">
-                <a:latin typeface="Courier New" panose="02070309020205020404" pitchFamily="49" charset="0"/>
-                <a:cs typeface="Courier New" panose="02070309020205020404" pitchFamily="49" charset="0"/>
-              </a:rPr>
-              <a:t>) # Métricas a evaluar</a:t>
-            </a:r>
-          </a:p>
-          <a:p>
-            <a:pPr marL="114300" lvl="0" indent="0" algn="l" rtl="0">
-              <a:lnSpc>
-                <a:spcPct val="150000"/>
-              </a:lnSpc>
-              <a:spcBef>
-                <a:spcPts val="0"/>
-              </a:spcBef>
-              <a:spcAft>
-                <a:spcPts val="0"/>
-              </a:spcAft>
-              <a:buSzPts val="1800"/>
-              <a:buNone/>
-            </a:pPr>
-            <a:r>
-              <a:rPr lang="es-MX" sz="1200" dirty="0">
-                <a:latin typeface="Courier New" panose="02070309020205020404" pitchFamily="49" charset="0"/>
-                <a:cs typeface="Courier New" panose="02070309020205020404" pitchFamily="49" charset="0"/>
-              </a:rPr>
-              <a:t>) %&gt;% </a:t>
-            </a:r>
-            <a:r>
-              <a:rPr lang="es-MX" sz="1200" dirty="0" err="1">
-                <a:latin typeface="Courier New" panose="02070309020205020404" pitchFamily="49" charset="0"/>
-                <a:cs typeface="Courier New" panose="02070309020205020404" pitchFamily="49" charset="0"/>
-              </a:rPr>
-              <a:t>autoplot</a:t>
-            </a:r>
-            <a:r>
-              <a:rPr lang="es-MX" sz="1200" dirty="0">
-                <a:latin typeface="Courier New" panose="02070309020205020404" pitchFamily="49" charset="0"/>
-                <a:cs typeface="Courier New" panose="02070309020205020404" pitchFamily="49" charset="0"/>
-              </a:rPr>
-              <a:t>()          # Que me haga directo el </a:t>
-            </a:r>
-            <a:r>
-              <a:rPr lang="es-MX" sz="1200" dirty="0" err="1">
-                <a:latin typeface="Courier New" panose="02070309020205020404" pitchFamily="49" charset="0"/>
-                <a:cs typeface="Courier New" panose="02070309020205020404" pitchFamily="49" charset="0"/>
-              </a:rPr>
-              <a:t>plot</a:t>
-            </a:r>
-            <a:endParaRPr lang="es-MX" sz="1200" dirty="0">
+              <a:t>base_test</a:t>
+            </a:r>
+            <a:endParaRPr sz="1200" dirty="0">
               <a:latin typeface="Courier New" panose="02070309020205020404" pitchFamily="49" charset="0"/>
               <a:cs typeface="Courier New" panose="02070309020205020404" pitchFamily="49" charset="0"/>
             </a:endParaRPr>
@@ -13863,7 +15133,7 @@
     </p:spTree>
     <p:extLst>
       <p:ext uri="{BB962C8B-B14F-4D97-AF65-F5344CB8AC3E}">
-        <p14:creationId xmlns:p14="http://schemas.microsoft.com/office/powerpoint/2010/main" val="3128468253"/>
+        <p14:creationId xmlns:p14="http://schemas.microsoft.com/office/powerpoint/2010/main" val="2885533041"/>
       </p:ext>
     </p:extLst>
   </p:cSld>

</xml_diff>